<commit_message>
Added more detailed explanation of image to image readme. Added new image for image readme.
</commit_message>
<xml_diff>
--- a/extra_materials/Run Fibonacci Graphs.pptx
+++ b/extra_materials/Run Fibonacci Graphs.pptx
@@ -6,6 +6,7 @@
   </p:sldMasterIdLst>
   <p:sldIdLst>
     <p:sldId id="256" r:id="rId2"/>
+    <p:sldId id="257" r:id="rId3"/>
   </p:sldIdLst>
   <p:sldSz cx="12192000" cy="6858000"/>
   <p:notesSz cx="6858000" cy="9144000"/>
@@ -104,6 +105,11 @@
       </a:defRPr>
     </a:lvl9pPr>
   </p:defaultTextStyle>
+  <p:extLst>
+    <p:ext uri="{EFAFB233-063F-42B5-8137-9DF3F51BA10A}">
+      <p15:sldGuideLst xmlns:p15="http://schemas.microsoft.com/office/powerpoint/2012/main"/>
+    </p:ext>
+  </p:extLst>
 </p:presentation>
 </file>
 
@@ -3774,6 +3780,1072 @@
     <p:extLst>
       <p:ext uri="{BB962C8B-B14F-4D97-AF65-F5344CB8AC3E}">
         <p14:creationId xmlns:p14="http://schemas.microsoft.com/office/powerpoint/2010/main" val="3409493098"/>
+      </p:ext>
+    </p:extLst>
+  </p:cSld>
+  <p:clrMapOvr>
+    <a:masterClrMapping/>
+  </p:clrMapOvr>
+</p:sld>
+</file>
+
+<file path=ppt/slides/slide2.xml><?xml version="1.0" encoding="utf-8"?>
+<p:sld xmlns:a="http://schemas.openxmlformats.org/drawingml/2006/main" xmlns:r="http://schemas.openxmlformats.org/officeDocument/2006/relationships" xmlns:p="http://schemas.openxmlformats.org/presentationml/2006/main">
+  <p:cSld>
+    <p:spTree>
+      <p:nvGrpSpPr>
+        <p:cNvPr id="1" name=""/>
+        <p:cNvGrpSpPr/>
+        <p:nvPr/>
+      </p:nvGrpSpPr>
+      <p:grpSpPr>
+        <a:xfrm>
+          <a:off x="0" y="0"/>
+          <a:ext cx="0" cy="0"/>
+          <a:chOff x="0" y="0"/>
+          <a:chExt cx="0" cy="0"/>
+        </a:xfrm>
+      </p:grpSpPr>
+      <p:sp>
+        <p:nvSpPr>
+          <p:cNvPr id="13" name="Rectangle: Rounded Corners 12">
+            <a:extLst>
+              <a:ext uri="{FF2B5EF4-FFF2-40B4-BE49-F238E27FC236}">
+                <a16:creationId xmlns:a16="http://schemas.microsoft.com/office/drawing/2014/main" id="{47A1E658-B0A6-EBDE-803D-CEF7FBD43326}"/>
+              </a:ext>
+            </a:extLst>
+          </p:cNvPr>
+          <p:cNvSpPr/>
+          <p:nvPr/>
+        </p:nvSpPr>
+        <p:spPr>
+          <a:xfrm>
+            <a:off x="1009815" y="485030"/>
+            <a:ext cx="5621573" cy="5987332"/>
+          </a:xfrm>
+          <a:prstGeom prst="roundRect">
+            <a:avLst/>
+          </a:prstGeom>
+          <a:solidFill>
+            <a:schemeClr val="accent1">
+              <a:lumMod val="50000"/>
+            </a:schemeClr>
+          </a:solidFill>
+          <a:ln>
+            <a:solidFill>
+              <a:schemeClr val="tx1">
+                <a:lumMod val="95000"/>
+                <a:lumOff val="5000"/>
+              </a:schemeClr>
+            </a:solidFill>
+          </a:ln>
+        </p:spPr>
+        <p:style>
+          <a:lnRef idx="2">
+            <a:schemeClr val="accent1">
+              <a:shade val="15000"/>
+            </a:schemeClr>
+          </a:lnRef>
+          <a:fillRef idx="1">
+            <a:schemeClr val="accent1"/>
+          </a:fillRef>
+          <a:effectRef idx="0">
+            <a:schemeClr val="accent1"/>
+          </a:effectRef>
+          <a:fontRef idx="minor">
+            <a:schemeClr val="lt1"/>
+          </a:fontRef>
+        </p:style>
+        <p:txBody>
+          <a:bodyPr rtlCol="0" anchor="t"/>
+          <a:lstStyle/>
+          <a:p>
+            <a:pPr algn="ctr"/>
+            <a:r>
+              <a:rPr lang="en-US" sz="4800" dirty="0" err="1">
+                <a:solidFill>
+                  <a:schemeClr val="bg1"/>
+                </a:solidFill>
+              </a:rPr>
+              <a:t>Gunicorn</a:t>
+            </a:r>
+            <a:r>
+              <a:rPr lang="en-US" sz="4800" dirty="0">
+                <a:solidFill>
+                  <a:schemeClr val="bg1"/>
+                </a:solidFill>
+              </a:rPr>
+              <a:t> Server</a:t>
+            </a:r>
+          </a:p>
+        </p:txBody>
+      </p:sp>
+      <p:sp>
+        <p:nvSpPr>
+          <p:cNvPr id="12" name="Rectangle: Rounded Corners 11">
+            <a:extLst>
+              <a:ext uri="{FF2B5EF4-FFF2-40B4-BE49-F238E27FC236}">
+                <a16:creationId xmlns:a16="http://schemas.microsoft.com/office/drawing/2014/main" id="{DE907EA6-7CBD-F605-D6DE-F3CBF0A996BF}"/>
+              </a:ext>
+            </a:extLst>
+          </p:cNvPr>
+          <p:cNvSpPr/>
+          <p:nvPr/>
+        </p:nvSpPr>
+        <p:spPr>
+          <a:xfrm>
+            <a:off x="1288112" y="1622067"/>
+            <a:ext cx="5136542" cy="4691269"/>
+          </a:xfrm>
+          <a:prstGeom prst="roundRect">
+            <a:avLst/>
+          </a:prstGeom>
+          <a:solidFill>
+            <a:schemeClr val="tx2">
+              <a:lumMod val="25000"/>
+              <a:lumOff val="75000"/>
+            </a:schemeClr>
+          </a:solidFill>
+          <a:ln>
+            <a:solidFill>
+              <a:schemeClr val="tx1">
+                <a:lumMod val="95000"/>
+                <a:lumOff val="5000"/>
+              </a:schemeClr>
+            </a:solidFill>
+          </a:ln>
+        </p:spPr>
+        <p:style>
+          <a:lnRef idx="2">
+            <a:schemeClr val="accent1">
+              <a:shade val="15000"/>
+            </a:schemeClr>
+          </a:lnRef>
+          <a:fillRef idx="1">
+            <a:schemeClr val="accent1"/>
+          </a:fillRef>
+          <a:effectRef idx="0">
+            <a:schemeClr val="accent1"/>
+          </a:effectRef>
+          <a:fontRef idx="minor">
+            <a:schemeClr val="lt1"/>
+          </a:fontRef>
+        </p:style>
+        <p:txBody>
+          <a:bodyPr rtlCol="0" anchor="t"/>
+          <a:lstStyle/>
+          <a:p>
+            <a:pPr algn="ctr"/>
+            <a:r>
+              <a:rPr lang="en-US" sz="3600" dirty="0">
+                <a:solidFill>
+                  <a:schemeClr val="tx1"/>
+                </a:solidFill>
+              </a:rPr>
+              <a:t>Flask API</a:t>
+            </a:r>
+          </a:p>
+        </p:txBody>
+      </p:sp>
+      <p:grpSp>
+        <p:nvGrpSpPr>
+          <p:cNvPr id="11" name="Group 10">
+            <a:extLst>
+              <a:ext uri="{FF2B5EF4-FFF2-40B4-BE49-F238E27FC236}">
+                <a16:creationId xmlns:a16="http://schemas.microsoft.com/office/drawing/2014/main" id="{148D9039-ABA1-7FC6-E016-14F12A7A431D}"/>
+              </a:ext>
+            </a:extLst>
+          </p:cNvPr>
+          <p:cNvGrpSpPr/>
+          <p:nvPr/>
+        </p:nvGrpSpPr>
+        <p:grpSpPr>
+          <a:xfrm>
+            <a:off x="1552655" y="2590679"/>
+            <a:ext cx="4606871" cy="3521345"/>
+            <a:chOff x="2216257" y="1387097"/>
+            <a:chExt cx="4606871" cy="3521345"/>
+          </a:xfrm>
+        </p:grpSpPr>
+        <p:sp>
+          <p:nvSpPr>
+            <p:cNvPr id="7" name="Rectangle: Rounded Corners 6">
+              <a:extLst>
+                <a:ext uri="{FF2B5EF4-FFF2-40B4-BE49-F238E27FC236}">
+                  <a16:creationId xmlns:a16="http://schemas.microsoft.com/office/drawing/2014/main" id="{D524A359-7508-D0E2-9D16-7ACC315F44FF}"/>
+                </a:ext>
+              </a:extLst>
+            </p:cNvPr>
+            <p:cNvSpPr/>
+            <p:nvPr/>
+          </p:nvSpPr>
+          <p:spPr>
+            <a:xfrm>
+              <a:off x="2216257" y="2448731"/>
+              <a:ext cx="4606871" cy="2459711"/>
+            </a:xfrm>
+            <a:prstGeom prst="roundRect">
+              <a:avLst/>
+            </a:prstGeom>
+            <a:solidFill>
+              <a:schemeClr val="accent6">
+                <a:lumMod val="40000"/>
+                <a:lumOff val="60000"/>
+              </a:schemeClr>
+            </a:solidFill>
+            <a:ln>
+              <a:solidFill>
+                <a:schemeClr val="tx1">
+                  <a:lumMod val="95000"/>
+                  <a:lumOff val="5000"/>
+                </a:schemeClr>
+              </a:solidFill>
+            </a:ln>
+          </p:spPr>
+          <p:style>
+            <a:lnRef idx="2">
+              <a:schemeClr val="accent1">
+                <a:shade val="15000"/>
+              </a:schemeClr>
+            </a:lnRef>
+            <a:fillRef idx="1">
+              <a:schemeClr val="accent1"/>
+            </a:fillRef>
+            <a:effectRef idx="0">
+              <a:schemeClr val="accent1"/>
+            </a:effectRef>
+            <a:fontRef idx="minor">
+              <a:schemeClr val="lt1"/>
+            </a:fontRef>
+          </p:style>
+          <p:txBody>
+            <a:bodyPr rtlCol="0" anchor="t"/>
+            <a:lstStyle/>
+            <a:p>
+              <a:pPr algn="ctr"/>
+              <a:r>
+                <a:rPr lang="en-US" dirty="0">
+                  <a:solidFill>
+                    <a:schemeClr val="tx1"/>
+                  </a:solidFill>
+                </a:rPr>
+                <a:t>REST APIs</a:t>
+              </a:r>
+            </a:p>
+          </p:txBody>
+        </p:sp>
+        <p:sp>
+          <p:nvSpPr>
+            <p:cNvPr id="2" name="Rectangle: Rounded Corners 1">
+              <a:extLst>
+                <a:ext uri="{FF2B5EF4-FFF2-40B4-BE49-F238E27FC236}">
+                  <a16:creationId xmlns:a16="http://schemas.microsoft.com/office/drawing/2014/main" id="{20D7E05F-D02A-3C03-A68A-F8016ED03699}"/>
+                </a:ext>
+              </a:extLst>
+            </p:cNvPr>
+            <p:cNvSpPr/>
+            <p:nvPr/>
+          </p:nvSpPr>
+          <p:spPr>
+            <a:xfrm>
+              <a:off x="2537201" y="2991173"/>
+              <a:ext cx="3964984" cy="526942"/>
+            </a:xfrm>
+            <a:prstGeom prst="roundRect">
+              <a:avLst/>
+            </a:prstGeom>
+            <a:solidFill>
+              <a:schemeClr val="accent2">
+                <a:lumMod val="60000"/>
+                <a:lumOff val="40000"/>
+              </a:schemeClr>
+            </a:solidFill>
+            <a:ln>
+              <a:solidFill>
+                <a:schemeClr val="tx1">
+                  <a:lumMod val="95000"/>
+                  <a:lumOff val="5000"/>
+                </a:schemeClr>
+              </a:solidFill>
+            </a:ln>
+          </p:spPr>
+          <p:style>
+            <a:lnRef idx="2">
+              <a:schemeClr val="accent2">
+                <a:shade val="15000"/>
+              </a:schemeClr>
+            </a:lnRef>
+            <a:fillRef idx="1">
+              <a:schemeClr val="accent2"/>
+            </a:fillRef>
+            <a:effectRef idx="0">
+              <a:schemeClr val="accent2"/>
+            </a:effectRef>
+            <a:fontRef idx="minor">
+              <a:schemeClr val="lt1"/>
+            </a:fontRef>
+          </p:style>
+          <p:txBody>
+            <a:bodyPr rtlCol="0" anchor="ctr"/>
+            <a:lstStyle/>
+            <a:p>
+              <a:pPr algn="ctr"/>
+              <a:r>
+                <a:rPr lang="en-US" dirty="0">
+                  <a:solidFill>
+                    <a:schemeClr val="tx1"/>
+                  </a:solidFill>
+                </a:rPr>
+                <a:t>“/” API Endpoint</a:t>
+              </a:r>
+            </a:p>
+          </p:txBody>
+        </p:sp>
+        <p:sp>
+          <p:nvSpPr>
+            <p:cNvPr id="3" name="Rectangle: Rounded Corners 2">
+              <a:extLst>
+                <a:ext uri="{FF2B5EF4-FFF2-40B4-BE49-F238E27FC236}">
+                  <a16:creationId xmlns:a16="http://schemas.microsoft.com/office/drawing/2014/main" id="{AF1B6A2F-AEAF-1D0B-12DC-4DE589B00098}"/>
+                </a:ext>
+              </a:extLst>
+            </p:cNvPr>
+            <p:cNvSpPr/>
+            <p:nvPr/>
+          </p:nvSpPr>
+          <p:spPr>
+            <a:xfrm>
+              <a:off x="2537201" y="3609814"/>
+              <a:ext cx="3964984" cy="526942"/>
+            </a:xfrm>
+            <a:prstGeom prst="roundRect">
+              <a:avLst/>
+            </a:prstGeom>
+            <a:solidFill>
+              <a:schemeClr val="accent2">
+                <a:lumMod val="60000"/>
+                <a:lumOff val="40000"/>
+              </a:schemeClr>
+            </a:solidFill>
+            <a:ln>
+              <a:solidFill>
+                <a:schemeClr val="tx1">
+                  <a:lumMod val="95000"/>
+                  <a:lumOff val="5000"/>
+                </a:schemeClr>
+              </a:solidFill>
+            </a:ln>
+          </p:spPr>
+          <p:style>
+            <a:lnRef idx="2">
+              <a:schemeClr val="accent2">
+                <a:shade val="15000"/>
+              </a:schemeClr>
+            </a:lnRef>
+            <a:fillRef idx="1">
+              <a:schemeClr val="accent2"/>
+            </a:fillRef>
+            <a:effectRef idx="0">
+              <a:schemeClr val="accent2"/>
+            </a:effectRef>
+            <a:fontRef idx="minor">
+              <a:schemeClr val="lt1"/>
+            </a:fontRef>
+          </p:style>
+          <p:txBody>
+            <a:bodyPr rtlCol="0" anchor="ctr"/>
+            <a:lstStyle/>
+            <a:p>
+              <a:pPr algn="ctr"/>
+              <a:r>
+                <a:rPr lang="en-US" dirty="0">
+                  <a:solidFill>
+                    <a:schemeClr val="tx1"/>
+                  </a:solidFill>
+                </a:rPr>
+                <a:t>“/</a:t>
+              </a:r>
+              <a:r>
+                <a:rPr lang="en-US" dirty="0" err="1">
+                  <a:solidFill>
+                    <a:schemeClr val="tx1"/>
+                  </a:solidFill>
+                </a:rPr>
+                <a:t>healthcheck</a:t>
+              </a:r>
+              <a:r>
+                <a:rPr lang="en-US" dirty="0">
+                  <a:solidFill>
+                    <a:schemeClr val="tx1"/>
+                  </a:solidFill>
+                </a:rPr>
+                <a:t>” API Endpoint</a:t>
+              </a:r>
+            </a:p>
+          </p:txBody>
+        </p:sp>
+        <p:sp>
+          <p:nvSpPr>
+            <p:cNvPr id="4" name="Rectangle: Rounded Corners 3">
+              <a:extLst>
+                <a:ext uri="{FF2B5EF4-FFF2-40B4-BE49-F238E27FC236}">
+                  <a16:creationId xmlns:a16="http://schemas.microsoft.com/office/drawing/2014/main" id="{F860E409-4BBD-261D-C821-9BFB5E35D419}"/>
+                </a:ext>
+              </a:extLst>
+            </p:cNvPr>
+            <p:cNvSpPr/>
+            <p:nvPr/>
+          </p:nvSpPr>
+          <p:spPr>
+            <a:xfrm>
+              <a:off x="2537201" y="4228455"/>
+              <a:ext cx="3964984" cy="526942"/>
+            </a:xfrm>
+            <a:prstGeom prst="roundRect">
+              <a:avLst/>
+            </a:prstGeom>
+            <a:solidFill>
+              <a:schemeClr val="accent2">
+                <a:lumMod val="60000"/>
+                <a:lumOff val="40000"/>
+              </a:schemeClr>
+            </a:solidFill>
+            <a:ln>
+              <a:solidFill>
+                <a:schemeClr val="tx1">
+                  <a:lumMod val="95000"/>
+                  <a:lumOff val="5000"/>
+                </a:schemeClr>
+              </a:solidFill>
+            </a:ln>
+          </p:spPr>
+          <p:style>
+            <a:lnRef idx="2">
+              <a:schemeClr val="accent2">
+                <a:shade val="15000"/>
+              </a:schemeClr>
+            </a:lnRef>
+            <a:fillRef idx="1">
+              <a:schemeClr val="accent2"/>
+            </a:fillRef>
+            <a:effectRef idx="0">
+              <a:schemeClr val="accent2"/>
+            </a:effectRef>
+            <a:fontRef idx="minor">
+              <a:schemeClr val="lt1"/>
+            </a:fontRef>
+          </p:style>
+          <p:txBody>
+            <a:bodyPr rtlCol="0" anchor="ctr"/>
+            <a:lstStyle/>
+            <a:p>
+              <a:pPr algn="ctr"/>
+              <a:r>
+                <a:rPr lang="en-US" dirty="0">
+                  <a:solidFill>
+                    <a:schemeClr val="tx1"/>
+                  </a:solidFill>
+                </a:rPr>
+                <a:t>“/start” API Endpoint</a:t>
+              </a:r>
+            </a:p>
+          </p:txBody>
+        </p:sp>
+        <p:sp>
+          <p:nvSpPr>
+            <p:cNvPr id="5" name="Rectangle: Rounded Corners 4">
+              <a:extLst>
+                <a:ext uri="{FF2B5EF4-FFF2-40B4-BE49-F238E27FC236}">
+                  <a16:creationId xmlns:a16="http://schemas.microsoft.com/office/drawing/2014/main" id="{5ADB7E4B-329C-91A5-9B2F-FD998D19A553}"/>
+                </a:ext>
+              </a:extLst>
+            </p:cNvPr>
+            <p:cNvSpPr/>
+            <p:nvPr/>
+          </p:nvSpPr>
+          <p:spPr>
+            <a:xfrm>
+              <a:off x="2216257" y="1387097"/>
+              <a:ext cx="2258876" cy="526942"/>
+            </a:xfrm>
+            <a:prstGeom prst="roundRect">
+              <a:avLst/>
+            </a:prstGeom>
+            <a:solidFill>
+              <a:schemeClr val="accent6">
+                <a:lumMod val="40000"/>
+                <a:lumOff val="60000"/>
+              </a:schemeClr>
+            </a:solidFill>
+            <a:ln>
+              <a:solidFill>
+                <a:schemeClr val="tx1">
+                  <a:lumMod val="95000"/>
+                  <a:lumOff val="5000"/>
+                </a:schemeClr>
+              </a:solidFill>
+            </a:ln>
+          </p:spPr>
+          <p:style>
+            <a:lnRef idx="2">
+              <a:schemeClr val="accent1">
+                <a:shade val="15000"/>
+              </a:schemeClr>
+            </a:lnRef>
+            <a:fillRef idx="1">
+              <a:schemeClr val="accent1"/>
+            </a:fillRef>
+            <a:effectRef idx="0">
+              <a:schemeClr val="accent1"/>
+            </a:effectRef>
+            <a:fontRef idx="minor">
+              <a:schemeClr val="lt1"/>
+            </a:fontRef>
+          </p:style>
+          <p:txBody>
+            <a:bodyPr rtlCol="0" anchor="ctr"/>
+            <a:lstStyle/>
+            <a:p>
+              <a:pPr algn="ctr"/>
+              <a:r>
+                <a:rPr lang="en-US" dirty="0">
+                  <a:solidFill>
+                    <a:schemeClr val="tx1"/>
+                  </a:solidFill>
+                </a:rPr>
+                <a:t>STDOUT Logger</a:t>
+              </a:r>
+            </a:p>
+          </p:txBody>
+        </p:sp>
+        <p:sp>
+          <p:nvSpPr>
+            <p:cNvPr id="6" name="Rectangle: Rounded Corners 5">
+              <a:extLst>
+                <a:ext uri="{FF2B5EF4-FFF2-40B4-BE49-F238E27FC236}">
+                  <a16:creationId xmlns:a16="http://schemas.microsoft.com/office/drawing/2014/main" id="{C6980586-45EA-C16F-C610-7DE0DD8D62AC}"/>
+                </a:ext>
+              </a:extLst>
+            </p:cNvPr>
+            <p:cNvSpPr/>
+            <p:nvPr/>
+          </p:nvSpPr>
+          <p:spPr>
+            <a:xfrm>
+              <a:off x="4564251" y="1387097"/>
+              <a:ext cx="2258877" cy="526942"/>
+            </a:xfrm>
+            <a:prstGeom prst="roundRect">
+              <a:avLst/>
+            </a:prstGeom>
+            <a:solidFill>
+              <a:schemeClr val="accent6">
+                <a:lumMod val="40000"/>
+                <a:lumOff val="60000"/>
+              </a:schemeClr>
+            </a:solidFill>
+            <a:ln>
+              <a:solidFill>
+                <a:schemeClr val="tx1">
+                  <a:lumMod val="95000"/>
+                  <a:lumOff val="5000"/>
+                </a:schemeClr>
+              </a:solidFill>
+            </a:ln>
+          </p:spPr>
+          <p:style>
+            <a:lnRef idx="2">
+              <a:schemeClr val="accent1">
+                <a:shade val="15000"/>
+              </a:schemeClr>
+            </a:lnRef>
+            <a:fillRef idx="1">
+              <a:schemeClr val="accent1"/>
+            </a:fillRef>
+            <a:effectRef idx="0">
+              <a:schemeClr val="accent1"/>
+            </a:effectRef>
+            <a:fontRef idx="minor">
+              <a:schemeClr val="lt1"/>
+            </a:fontRef>
+          </p:style>
+          <p:txBody>
+            <a:bodyPr rtlCol="0" anchor="ctr"/>
+            <a:lstStyle/>
+            <a:p>
+              <a:pPr algn="ctr"/>
+              <a:r>
+                <a:rPr lang="en-US" dirty="0">
+                  <a:solidFill>
+                    <a:schemeClr val="tx1"/>
+                  </a:solidFill>
+                </a:rPr>
+                <a:t>Send Threader</a:t>
+              </a:r>
+            </a:p>
+          </p:txBody>
+        </p:sp>
+        <p:sp>
+          <p:nvSpPr>
+            <p:cNvPr id="9" name="Arrow: Down 8">
+              <a:extLst>
+                <a:ext uri="{FF2B5EF4-FFF2-40B4-BE49-F238E27FC236}">
+                  <a16:creationId xmlns:a16="http://schemas.microsoft.com/office/drawing/2014/main" id="{45AB5A5C-B9D4-8EC0-C6E9-054FCA96F06B}"/>
+                </a:ext>
+              </a:extLst>
+            </p:cNvPr>
+            <p:cNvSpPr/>
+            <p:nvPr/>
+          </p:nvSpPr>
+          <p:spPr>
+            <a:xfrm flipV="1">
+              <a:off x="5527082" y="1914039"/>
+              <a:ext cx="333213" cy="1077134"/>
+            </a:xfrm>
+            <a:prstGeom prst="downArrow">
+              <a:avLst/>
+            </a:prstGeom>
+            <a:ln>
+              <a:solidFill>
+                <a:schemeClr val="tx1">
+                  <a:lumMod val="95000"/>
+                  <a:lumOff val="5000"/>
+                </a:schemeClr>
+              </a:solidFill>
+            </a:ln>
+          </p:spPr>
+          <p:style>
+            <a:lnRef idx="2">
+              <a:schemeClr val="accent1">
+                <a:shade val="15000"/>
+              </a:schemeClr>
+            </a:lnRef>
+            <a:fillRef idx="1">
+              <a:schemeClr val="accent1"/>
+            </a:fillRef>
+            <a:effectRef idx="0">
+              <a:schemeClr val="accent1"/>
+            </a:effectRef>
+            <a:fontRef idx="minor">
+              <a:schemeClr val="lt1"/>
+            </a:fontRef>
+          </p:style>
+          <p:txBody>
+            <a:bodyPr rtlCol="0" anchor="ctr"/>
+            <a:lstStyle/>
+            <a:p>
+              <a:pPr algn="ctr"/>
+              <a:endParaRPr lang="en-US"/>
+            </a:p>
+          </p:txBody>
+        </p:sp>
+        <p:sp>
+          <p:nvSpPr>
+            <p:cNvPr id="10" name="Arrow: Down 9">
+              <a:extLst>
+                <a:ext uri="{FF2B5EF4-FFF2-40B4-BE49-F238E27FC236}">
+                  <a16:creationId xmlns:a16="http://schemas.microsoft.com/office/drawing/2014/main" id="{54BAC557-F541-5893-BEB8-474E84537DB8}"/>
+                </a:ext>
+              </a:extLst>
+            </p:cNvPr>
+            <p:cNvSpPr/>
+            <p:nvPr/>
+          </p:nvSpPr>
+          <p:spPr>
+            <a:xfrm flipV="1">
+              <a:off x="3179088" y="1921789"/>
+              <a:ext cx="333213" cy="534692"/>
+            </a:xfrm>
+            <a:prstGeom prst="downArrow">
+              <a:avLst/>
+            </a:prstGeom>
+            <a:ln>
+              <a:solidFill>
+                <a:schemeClr val="tx1">
+                  <a:lumMod val="95000"/>
+                  <a:lumOff val="5000"/>
+                </a:schemeClr>
+              </a:solidFill>
+            </a:ln>
+          </p:spPr>
+          <p:style>
+            <a:lnRef idx="2">
+              <a:schemeClr val="accent1">
+                <a:shade val="15000"/>
+              </a:schemeClr>
+            </a:lnRef>
+            <a:fillRef idx="1">
+              <a:schemeClr val="accent1"/>
+            </a:fillRef>
+            <a:effectRef idx="0">
+              <a:schemeClr val="accent1"/>
+            </a:effectRef>
+            <a:fontRef idx="minor">
+              <a:schemeClr val="lt1"/>
+            </a:fontRef>
+          </p:style>
+          <p:txBody>
+            <a:bodyPr rtlCol="0" anchor="ctr"/>
+            <a:lstStyle/>
+            <a:p>
+              <a:pPr algn="ctr"/>
+              <a:endParaRPr lang="en-US" dirty="0"/>
+            </a:p>
+          </p:txBody>
+        </p:sp>
+      </p:grpSp>
+      <p:sp>
+        <p:nvSpPr>
+          <p:cNvPr id="14" name="Rectangle: Rounded Corners 13">
+            <a:extLst>
+              <a:ext uri="{FF2B5EF4-FFF2-40B4-BE49-F238E27FC236}">
+                <a16:creationId xmlns:a16="http://schemas.microsoft.com/office/drawing/2014/main" id="{85EBA4FA-2CF3-B2B6-CC74-DBB0CBC3AA11}"/>
+              </a:ext>
+            </a:extLst>
+          </p:cNvPr>
+          <p:cNvSpPr/>
+          <p:nvPr/>
+        </p:nvSpPr>
+        <p:spPr>
+          <a:xfrm>
+            <a:off x="7476602" y="4359985"/>
+            <a:ext cx="3888187" cy="1433763"/>
+          </a:xfrm>
+          <a:prstGeom prst="roundRect">
+            <a:avLst/>
+          </a:prstGeom>
+          <a:solidFill>
+            <a:schemeClr val="accent1">
+              <a:lumMod val="50000"/>
+            </a:schemeClr>
+          </a:solidFill>
+          <a:ln>
+            <a:solidFill>
+              <a:schemeClr val="tx1">
+                <a:lumMod val="95000"/>
+                <a:lumOff val="5000"/>
+              </a:schemeClr>
+            </a:solidFill>
+          </a:ln>
+        </p:spPr>
+        <p:style>
+          <a:lnRef idx="2">
+            <a:schemeClr val="accent1">
+              <a:shade val="15000"/>
+            </a:schemeClr>
+          </a:lnRef>
+          <a:fillRef idx="1">
+            <a:schemeClr val="accent1"/>
+          </a:fillRef>
+          <a:effectRef idx="0">
+            <a:schemeClr val="accent1"/>
+          </a:effectRef>
+          <a:fontRef idx="minor">
+            <a:schemeClr val="lt1"/>
+          </a:fontRef>
+        </p:style>
+        <p:txBody>
+          <a:bodyPr rtlCol="0" anchor="t"/>
+          <a:lstStyle/>
+          <a:p>
+            <a:pPr algn="ctr"/>
+            <a:r>
+              <a:rPr lang="en-US" sz="3600" dirty="0">
+                <a:solidFill>
+                  <a:schemeClr val="bg1"/>
+                </a:solidFill>
+              </a:rPr>
+              <a:t>Health Check Daemon</a:t>
+            </a:r>
+          </a:p>
+        </p:txBody>
+      </p:sp>
+      <p:sp>
+        <p:nvSpPr>
+          <p:cNvPr id="15" name="Rectangle: Rounded Corners 14">
+            <a:extLst>
+              <a:ext uri="{FF2B5EF4-FFF2-40B4-BE49-F238E27FC236}">
+                <a16:creationId xmlns:a16="http://schemas.microsoft.com/office/drawing/2014/main" id="{1D9E1E91-1844-CFBC-B812-AAE9ACF1A14E}"/>
+              </a:ext>
+            </a:extLst>
+          </p:cNvPr>
+          <p:cNvSpPr/>
+          <p:nvPr/>
+        </p:nvSpPr>
+        <p:spPr>
+          <a:xfrm>
+            <a:off x="7476603" y="2137268"/>
+            <a:ext cx="3888187" cy="1433763"/>
+          </a:xfrm>
+          <a:prstGeom prst="roundRect">
+            <a:avLst/>
+          </a:prstGeom>
+          <a:solidFill>
+            <a:schemeClr val="accent1">
+              <a:lumMod val="50000"/>
+            </a:schemeClr>
+          </a:solidFill>
+          <a:ln>
+            <a:solidFill>
+              <a:schemeClr val="tx1">
+                <a:lumMod val="95000"/>
+                <a:lumOff val="5000"/>
+              </a:schemeClr>
+            </a:solidFill>
+          </a:ln>
+        </p:spPr>
+        <p:style>
+          <a:lnRef idx="2">
+            <a:schemeClr val="accent1">
+              <a:shade val="15000"/>
+            </a:schemeClr>
+          </a:lnRef>
+          <a:fillRef idx="1">
+            <a:schemeClr val="accent1"/>
+          </a:fillRef>
+          <a:effectRef idx="0">
+            <a:schemeClr val="accent1"/>
+          </a:effectRef>
+          <a:fontRef idx="minor">
+            <a:schemeClr val="lt1"/>
+          </a:fontRef>
+        </p:style>
+        <p:txBody>
+          <a:bodyPr rtlCol="0" anchor="t"/>
+          <a:lstStyle/>
+          <a:p>
+            <a:pPr algn="ctr"/>
+            <a:r>
+              <a:rPr lang="en-US" sz="3600" dirty="0">
+                <a:solidFill>
+                  <a:schemeClr val="bg1"/>
+                </a:solidFill>
+              </a:rPr>
+              <a:t>Send Number Daemon</a:t>
+            </a:r>
+          </a:p>
+        </p:txBody>
+      </p:sp>
+      <p:sp>
+        <p:nvSpPr>
+          <p:cNvPr id="16" name="Arrow: Down 15">
+            <a:extLst>
+              <a:ext uri="{FF2B5EF4-FFF2-40B4-BE49-F238E27FC236}">
+                <a16:creationId xmlns:a16="http://schemas.microsoft.com/office/drawing/2014/main" id="{E0A94AF7-5B6B-60F5-2E68-98F93EFDF03C}"/>
+              </a:ext>
+            </a:extLst>
+          </p:cNvPr>
+          <p:cNvSpPr/>
+          <p:nvPr/>
+        </p:nvSpPr>
+        <p:spPr>
+          <a:xfrm rot="5400000" flipV="1">
+            <a:off x="6653887" y="2198040"/>
+            <a:ext cx="333213" cy="1312219"/>
+          </a:xfrm>
+          <a:prstGeom prst="downArrow">
+            <a:avLst/>
+          </a:prstGeom>
+          <a:ln>
+            <a:solidFill>
+              <a:schemeClr val="tx1">
+                <a:lumMod val="95000"/>
+                <a:lumOff val="5000"/>
+              </a:schemeClr>
+            </a:solidFill>
+          </a:ln>
+        </p:spPr>
+        <p:style>
+          <a:lnRef idx="2">
+            <a:schemeClr val="accent1">
+              <a:shade val="15000"/>
+            </a:schemeClr>
+          </a:lnRef>
+          <a:fillRef idx="1">
+            <a:schemeClr val="accent1"/>
+          </a:fillRef>
+          <a:effectRef idx="0">
+            <a:schemeClr val="accent1"/>
+          </a:effectRef>
+          <a:fontRef idx="minor">
+            <a:schemeClr val="lt1"/>
+          </a:fontRef>
+        </p:style>
+        <p:txBody>
+          <a:bodyPr rtlCol="0" anchor="ctr"/>
+          <a:lstStyle/>
+          <a:p>
+            <a:pPr algn="ctr"/>
+            <a:endParaRPr lang="en-US"/>
+          </a:p>
+        </p:txBody>
+      </p:sp>
+      <p:sp>
+        <p:nvSpPr>
+          <p:cNvPr id="17" name="Arrow: Down 16">
+            <a:extLst>
+              <a:ext uri="{FF2B5EF4-FFF2-40B4-BE49-F238E27FC236}">
+                <a16:creationId xmlns:a16="http://schemas.microsoft.com/office/drawing/2014/main" id="{F3DE97EA-2960-FBE6-6D6F-1CB7F11378C9}"/>
+              </a:ext>
+            </a:extLst>
+          </p:cNvPr>
+          <p:cNvSpPr/>
+          <p:nvPr/>
+        </p:nvSpPr>
+        <p:spPr>
+          <a:xfrm rot="16200000" flipV="1">
+            <a:off x="6488557" y="4260285"/>
+            <a:ext cx="333213" cy="1633162"/>
+          </a:xfrm>
+          <a:prstGeom prst="downArrow">
+            <a:avLst/>
+          </a:prstGeom>
+          <a:ln>
+            <a:solidFill>
+              <a:schemeClr val="tx1">
+                <a:lumMod val="95000"/>
+                <a:lumOff val="5000"/>
+              </a:schemeClr>
+            </a:solidFill>
+          </a:ln>
+        </p:spPr>
+        <p:style>
+          <a:lnRef idx="2">
+            <a:schemeClr val="accent1">
+              <a:shade val="15000"/>
+            </a:schemeClr>
+          </a:lnRef>
+          <a:fillRef idx="1">
+            <a:schemeClr val="accent1"/>
+          </a:fillRef>
+          <a:effectRef idx="0">
+            <a:schemeClr val="accent1"/>
+          </a:effectRef>
+          <a:fontRef idx="minor">
+            <a:schemeClr val="lt1"/>
+          </a:fontRef>
+        </p:style>
+        <p:txBody>
+          <a:bodyPr rtlCol="0" anchor="ctr"/>
+          <a:lstStyle/>
+          <a:p>
+            <a:pPr algn="ctr"/>
+            <a:endParaRPr lang="en-US"/>
+          </a:p>
+        </p:txBody>
+      </p:sp>
+      <p:sp>
+        <p:nvSpPr>
+          <p:cNvPr id="8" name="Oval 7">
+            <a:extLst>
+              <a:ext uri="{FF2B5EF4-FFF2-40B4-BE49-F238E27FC236}">
+                <a16:creationId xmlns:a16="http://schemas.microsoft.com/office/drawing/2014/main" id="{CD9EC967-D1D0-193B-8152-79EC7D8CCF70}"/>
+              </a:ext>
+            </a:extLst>
+          </p:cNvPr>
+          <p:cNvSpPr/>
+          <p:nvPr/>
+        </p:nvSpPr>
+        <p:spPr>
+          <a:xfrm>
+            <a:off x="7471745" y="630176"/>
+            <a:ext cx="2557220" cy="991891"/>
+          </a:xfrm>
+          <a:prstGeom prst="ellipse">
+            <a:avLst/>
+          </a:prstGeom>
+          <a:solidFill>
+            <a:schemeClr val="accent5">
+              <a:lumMod val="50000"/>
+            </a:schemeClr>
+          </a:solidFill>
+        </p:spPr>
+        <p:style>
+          <a:lnRef idx="2">
+            <a:schemeClr val="accent1">
+              <a:shade val="15000"/>
+            </a:schemeClr>
+          </a:lnRef>
+          <a:fillRef idx="1">
+            <a:schemeClr val="accent1"/>
+          </a:fillRef>
+          <a:effectRef idx="0">
+            <a:schemeClr val="accent1"/>
+          </a:effectRef>
+          <a:fontRef idx="minor">
+            <a:schemeClr val="lt1"/>
+          </a:fontRef>
+        </p:style>
+        <p:txBody>
+          <a:bodyPr rtlCol="0" anchor="ctr"/>
+          <a:lstStyle/>
+          <a:p>
+            <a:pPr algn="ctr"/>
+            <a:r>
+              <a:rPr lang="en-US" sz="2400" dirty="0"/>
+              <a:t>TLS Materials</a:t>
+            </a:r>
+          </a:p>
+        </p:txBody>
+      </p:sp>
+      <p:sp>
+        <p:nvSpPr>
+          <p:cNvPr id="18" name="Arrow: Down 17">
+            <a:extLst>
+              <a:ext uri="{FF2B5EF4-FFF2-40B4-BE49-F238E27FC236}">
+                <a16:creationId xmlns:a16="http://schemas.microsoft.com/office/drawing/2014/main" id="{D9F31D42-108D-C102-B790-777D1A1ACFDD}"/>
+              </a:ext>
+            </a:extLst>
+          </p:cNvPr>
+          <p:cNvSpPr/>
+          <p:nvPr/>
+        </p:nvSpPr>
+        <p:spPr>
+          <a:xfrm rot="16200000" flipV="1">
+            <a:off x="6865974" y="695276"/>
+            <a:ext cx="333213" cy="878328"/>
+          </a:xfrm>
+          <a:prstGeom prst="downArrow">
+            <a:avLst/>
+          </a:prstGeom>
+          <a:ln>
+            <a:solidFill>
+              <a:schemeClr val="tx1">
+                <a:lumMod val="95000"/>
+                <a:lumOff val="5000"/>
+              </a:schemeClr>
+            </a:solidFill>
+          </a:ln>
+        </p:spPr>
+        <p:style>
+          <a:lnRef idx="2">
+            <a:schemeClr val="accent1">
+              <a:shade val="15000"/>
+            </a:schemeClr>
+          </a:lnRef>
+          <a:fillRef idx="1">
+            <a:schemeClr val="accent1"/>
+          </a:fillRef>
+          <a:effectRef idx="0">
+            <a:schemeClr val="accent1"/>
+          </a:effectRef>
+          <a:fontRef idx="minor">
+            <a:schemeClr val="lt1"/>
+          </a:fontRef>
+        </p:style>
+        <p:txBody>
+          <a:bodyPr rtlCol="0" anchor="ctr"/>
+          <a:lstStyle/>
+          <a:p>
+            <a:pPr algn="ctr"/>
+            <a:endParaRPr lang="en-US" dirty="0"/>
+          </a:p>
+        </p:txBody>
+      </p:sp>
+    </p:spTree>
+    <p:extLst>
+      <p:ext uri="{BB962C8B-B14F-4D97-AF65-F5344CB8AC3E}">
+        <p14:creationId xmlns:p14="http://schemas.microsoft.com/office/powerpoint/2010/main" val="3238273521"/>
       </p:ext>
     </p:extLst>
   </p:cSld>

</xml_diff>

<commit_message>
Updated graphics. Filled in use case one readme. Updated fibonacci image test python program to specify base folder.
</commit_message>
<xml_diff>
--- a/extra_materials/Run Fibonacci Graphs.pptx
+++ b/extra_materials/Run Fibonacci Graphs.pptx
@@ -7,6 +7,7 @@
   <p:sldIdLst>
     <p:sldId id="256" r:id="rId2"/>
     <p:sldId id="257" r:id="rId3"/>
+    <p:sldId id="258" r:id="rId4"/>
   </p:sldIdLst>
   <p:sldSz cx="12192000" cy="6858000"/>
   <p:notesSz cx="6858000" cy="9144000"/>
@@ -260,7 +261,7 @@
           <a:p>
             <a:fld id="{62C98A4D-3422-4F51-9ECD-C0D7C885462A}" type="datetimeFigureOut">
               <a:rPr lang="en-US" smtClean="0"/>
-              <a:t>9/27/2025</a:t>
+              <a:t>9/29/2025</a:t>
             </a:fld>
             <a:endParaRPr lang="en-US"/>
           </a:p>
@@ -458,7 +459,7 @@
           <a:p>
             <a:fld id="{62C98A4D-3422-4F51-9ECD-C0D7C885462A}" type="datetimeFigureOut">
               <a:rPr lang="en-US" smtClean="0"/>
-              <a:t>9/27/2025</a:t>
+              <a:t>9/29/2025</a:t>
             </a:fld>
             <a:endParaRPr lang="en-US"/>
           </a:p>
@@ -666,7 +667,7 @@
           <a:p>
             <a:fld id="{62C98A4D-3422-4F51-9ECD-C0D7C885462A}" type="datetimeFigureOut">
               <a:rPr lang="en-US" smtClean="0"/>
-              <a:t>9/27/2025</a:t>
+              <a:t>9/29/2025</a:t>
             </a:fld>
             <a:endParaRPr lang="en-US"/>
           </a:p>
@@ -864,7 +865,7 @@
           <a:p>
             <a:fld id="{62C98A4D-3422-4F51-9ECD-C0D7C885462A}" type="datetimeFigureOut">
               <a:rPr lang="en-US" smtClean="0"/>
-              <a:t>9/27/2025</a:t>
+              <a:t>9/29/2025</a:t>
             </a:fld>
             <a:endParaRPr lang="en-US"/>
           </a:p>
@@ -1139,7 +1140,7 @@
           <a:p>
             <a:fld id="{62C98A4D-3422-4F51-9ECD-C0D7C885462A}" type="datetimeFigureOut">
               <a:rPr lang="en-US" smtClean="0"/>
-              <a:t>9/27/2025</a:t>
+              <a:t>9/29/2025</a:t>
             </a:fld>
             <a:endParaRPr lang="en-US"/>
           </a:p>
@@ -1404,7 +1405,7 @@
           <a:p>
             <a:fld id="{62C98A4D-3422-4F51-9ECD-C0D7C885462A}" type="datetimeFigureOut">
               <a:rPr lang="en-US" smtClean="0"/>
-              <a:t>9/27/2025</a:t>
+              <a:t>9/29/2025</a:t>
             </a:fld>
             <a:endParaRPr lang="en-US"/>
           </a:p>
@@ -1816,7 +1817,7 @@
           <a:p>
             <a:fld id="{62C98A4D-3422-4F51-9ECD-C0D7C885462A}" type="datetimeFigureOut">
               <a:rPr lang="en-US" smtClean="0"/>
-              <a:t>9/27/2025</a:t>
+              <a:t>9/29/2025</a:t>
             </a:fld>
             <a:endParaRPr lang="en-US"/>
           </a:p>
@@ -1957,7 +1958,7 @@
           <a:p>
             <a:fld id="{62C98A4D-3422-4F51-9ECD-C0D7C885462A}" type="datetimeFigureOut">
               <a:rPr lang="en-US" smtClean="0"/>
-              <a:t>9/27/2025</a:t>
+              <a:t>9/29/2025</a:t>
             </a:fld>
             <a:endParaRPr lang="en-US"/>
           </a:p>
@@ -2070,7 +2071,7 @@
           <a:p>
             <a:fld id="{62C98A4D-3422-4F51-9ECD-C0D7C885462A}" type="datetimeFigureOut">
               <a:rPr lang="en-US" smtClean="0"/>
-              <a:t>9/27/2025</a:t>
+              <a:t>9/29/2025</a:t>
             </a:fld>
             <a:endParaRPr lang="en-US"/>
           </a:p>
@@ -2381,7 +2382,7 @@
           <a:p>
             <a:fld id="{62C98A4D-3422-4F51-9ECD-C0D7C885462A}" type="datetimeFigureOut">
               <a:rPr lang="en-US" smtClean="0"/>
-              <a:t>9/27/2025</a:t>
+              <a:t>9/29/2025</a:t>
             </a:fld>
             <a:endParaRPr lang="en-US"/>
           </a:p>
@@ -2669,7 +2670,7 @@
           <a:p>
             <a:fld id="{62C98A4D-3422-4F51-9ECD-C0D7C885462A}" type="datetimeFigureOut">
               <a:rPr lang="en-US" smtClean="0"/>
-              <a:t>9/27/2025</a:t>
+              <a:t>9/29/2025</a:t>
             </a:fld>
             <a:endParaRPr lang="en-US"/>
           </a:p>
@@ -2910,7 +2911,7 @@
           <a:p>
             <a:fld id="{62C98A4D-3422-4F51-9ECD-C0D7C885462A}" type="datetimeFigureOut">
               <a:rPr lang="en-US" smtClean="0"/>
-              <a:t>9/27/2025</a:t>
+              <a:t>9/29/2025</a:t>
             </a:fld>
             <a:endParaRPr lang="en-US"/>
           </a:p>
@@ -4755,9 +4756,7 @@
             <a:avLst/>
           </a:prstGeom>
           <a:solidFill>
-            <a:schemeClr val="accent5">
-              <a:lumMod val="50000"/>
-            </a:schemeClr>
+            <a:schemeClr val="tx1"/>
           </a:solidFill>
         </p:spPr>
         <p:style>
@@ -4846,6 +4845,2405 @@
     <p:extLst>
       <p:ext uri="{BB962C8B-B14F-4D97-AF65-F5344CB8AC3E}">
         <p14:creationId xmlns:p14="http://schemas.microsoft.com/office/powerpoint/2010/main" val="3238273521"/>
+      </p:ext>
+    </p:extLst>
+  </p:cSld>
+  <p:clrMapOvr>
+    <a:masterClrMapping/>
+  </p:clrMapOvr>
+</p:sld>
+</file>
+
+<file path=ppt/slides/slide3.xml><?xml version="1.0" encoding="utf-8"?>
+<p:sld xmlns:a="http://schemas.openxmlformats.org/drawingml/2006/main" xmlns:r="http://schemas.openxmlformats.org/officeDocument/2006/relationships" xmlns:p="http://schemas.openxmlformats.org/presentationml/2006/main">
+  <p:cSld>
+    <p:spTree>
+      <p:nvGrpSpPr>
+        <p:cNvPr id="1" name=""/>
+        <p:cNvGrpSpPr/>
+        <p:nvPr/>
+      </p:nvGrpSpPr>
+      <p:grpSpPr>
+        <a:xfrm>
+          <a:off x="0" y="0"/>
+          <a:ext cx="0" cy="0"/>
+          <a:chOff x="0" y="0"/>
+          <a:chExt cx="0" cy="0"/>
+        </a:xfrm>
+      </p:grpSpPr>
+      <p:sp>
+        <p:nvSpPr>
+          <p:cNvPr id="60" name="Rectangle: Rounded Corners 59">
+            <a:extLst>
+              <a:ext uri="{FF2B5EF4-FFF2-40B4-BE49-F238E27FC236}">
+                <a16:creationId xmlns:a16="http://schemas.microsoft.com/office/drawing/2014/main" id="{18C01EFA-A7F7-603C-5B03-926834DC5775}"/>
+              </a:ext>
+            </a:extLst>
+          </p:cNvPr>
+          <p:cNvSpPr/>
+          <p:nvPr/>
+        </p:nvSpPr>
+        <p:spPr>
+          <a:xfrm>
+            <a:off x="2631614" y="706030"/>
+            <a:ext cx="9287953" cy="5445940"/>
+          </a:xfrm>
+          <a:prstGeom prst="roundRect">
+            <a:avLst/>
+          </a:prstGeom>
+          <a:solidFill>
+            <a:schemeClr val="tx2">
+              <a:lumMod val="10000"/>
+              <a:lumOff val="90000"/>
+            </a:schemeClr>
+          </a:solidFill>
+        </p:spPr>
+        <p:style>
+          <a:lnRef idx="2">
+            <a:schemeClr val="accent1">
+              <a:shade val="15000"/>
+            </a:schemeClr>
+          </a:lnRef>
+          <a:fillRef idx="1">
+            <a:schemeClr val="accent1"/>
+          </a:fillRef>
+          <a:effectRef idx="0">
+            <a:schemeClr val="accent1"/>
+          </a:effectRef>
+          <a:fontRef idx="minor">
+            <a:schemeClr val="lt1"/>
+          </a:fontRef>
+        </p:style>
+        <p:txBody>
+          <a:bodyPr rtlCol="0" anchor="t"/>
+          <a:lstStyle/>
+          <a:p>
+            <a:pPr algn="ctr"/>
+            <a:r>
+              <a:rPr lang="en-US" sz="2800" b="1" dirty="0">
+                <a:solidFill>
+                  <a:schemeClr val="tx1"/>
+                </a:solidFill>
+              </a:rPr>
+              <a:t>Docker Compose Application</a:t>
+            </a:r>
+          </a:p>
+        </p:txBody>
+      </p:sp>
+      <p:grpSp>
+        <p:nvGrpSpPr>
+          <p:cNvPr id="59" name="Group 58">
+            <a:extLst>
+              <a:ext uri="{FF2B5EF4-FFF2-40B4-BE49-F238E27FC236}">
+                <a16:creationId xmlns:a16="http://schemas.microsoft.com/office/drawing/2014/main" id="{5C4CDE9E-189C-6E1B-8445-846ADE698E40}"/>
+              </a:ext>
+            </a:extLst>
+          </p:cNvPr>
+          <p:cNvGrpSpPr/>
+          <p:nvPr/>
+        </p:nvGrpSpPr>
+        <p:grpSpPr>
+          <a:xfrm>
+            <a:off x="2973944" y="1550036"/>
+            <a:ext cx="8556365" cy="4237347"/>
+            <a:chOff x="1849151" y="1289068"/>
+            <a:chExt cx="8556365" cy="4237347"/>
+          </a:xfrm>
+        </p:grpSpPr>
+        <p:grpSp>
+          <p:nvGrpSpPr>
+            <p:cNvPr id="8" name="Group 7">
+              <a:extLst>
+                <a:ext uri="{FF2B5EF4-FFF2-40B4-BE49-F238E27FC236}">
+                  <a16:creationId xmlns:a16="http://schemas.microsoft.com/office/drawing/2014/main" id="{2795CC6A-3609-3E04-3DBB-72606AF0907B}"/>
+                </a:ext>
+              </a:extLst>
+            </p:cNvPr>
+            <p:cNvGrpSpPr/>
+            <p:nvPr/>
+          </p:nvGrpSpPr>
+          <p:grpSpPr>
+            <a:xfrm>
+              <a:off x="1850446" y="1289068"/>
+              <a:ext cx="1934705" cy="2114078"/>
+              <a:chOff x="1428427" y="1503336"/>
+              <a:chExt cx="1934705" cy="2114078"/>
+            </a:xfrm>
+          </p:grpSpPr>
+          <p:sp>
+            <p:nvSpPr>
+              <p:cNvPr id="3" name="Rectangle: Rounded Corners 2">
+                <a:extLst>
+                  <a:ext uri="{FF2B5EF4-FFF2-40B4-BE49-F238E27FC236}">
+                    <a16:creationId xmlns:a16="http://schemas.microsoft.com/office/drawing/2014/main" id="{AAB7457E-D276-0813-20CE-EB1CAE809E06}"/>
+                  </a:ext>
+                </a:extLst>
+              </p:cNvPr>
+              <p:cNvSpPr/>
+              <p:nvPr/>
+            </p:nvSpPr>
+            <p:spPr>
+              <a:xfrm>
+                <a:off x="1428427" y="1503336"/>
+                <a:ext cx="1934705" cy="2114078"/>
+              </a:xfrm>
+              <a:prstGeom prst="roundRect">
+                <a:avLst/>
+              </a:prstGeom>
+              <a:solidFill>
+                <a:srgbClr val="FD7F7F"/>
+              </a:solidFill>
+            </p:spPr>
+            <p:style>
+              <a:lnRef idx="2">
+                <a:schemeClr val="accent2">
+                  <a:shade val="15000"/>
+                </a:schemeClr>
+              </a:lnRef>
+              <a:fillRef idx="1">
+                <a:schemeClr val="accent2"/>
+              </a:fillRef>
+              <a:effectRef idx="0">
+                <a:schemeClr val="accent2"/>
+              </a:effectRef>
+              <a:fontRef idx="minor">
+                <a:schemeClr val="lt1"/>
+              </a:fontRef>
+            </p:style>
+            <p:txBody>
+              <a:bodyPr rtlCol="0" anchor="t"/>
+              <a:lstStyle/>
+              <a:p>
+                <a:pPr algn="ctr"/>
+                <a:r>
+                  <a:rPr lang="en-US" sz="1600" b="1" dirty="0">
+                    <a:solidFill>
+                      <a:schemeClr val="tx1"/>
+                    </a:solidFill>
+                    <a:latin typeface="Arial" panose="020B0604020202020204" pitchFamily="34" charset="0"/>
+                    <a:cs typeface="Arial" panose="020B0604020202020204" pitchFamily="34" charset="0"/>
+                  </a:rPr>
+                  <a:t>Server Stage 1</a:t>
+                </a:r>
+                <a:endParaRPr lang="en-US" sz="3200" b="1" dirty="0">
+                  <a:solidFill>
+                    <a:schemeClr val="tx1"/>
+                  </a:solidFill>
+                  <a:latin typeface="Arial" panose="020B0604020202020204" pitchFamily="34" charset="0"/>
+                  <a:cs typeface="Arial" panose="020B0604020202020204" pitchFamily="34" charset="0"/>
+                </a:endParaRPr>
+              </a:p>
+            </p:txBody>
+          </p:sp>
+          <p:sp>
+            <p:nvSpPr>
+              <p:cNvPr id="2" name="Rectangle: Rounded Corners 1">
+                <a:extLst>
+                  <a:ext uri="{FF2B5EF4-FFF2-40B4-BE49-F238E27FC236}">
+                    <a16:creationId xmlns:a16="http://schemas.microsoft.com/office/drawing/2014/main" id="{7F88A7E8-C8AC-F666-99F2-647F00042FCE}"/>
+                  </a:ext>
+                </a:extLst>
+              </p:cNvPr>
+              <p:cNvSpPr/>
+              <p:nvPr/>
+            </p:nvSpPr>
+            <p:spPr>
+              <a:xfrm>
+                <a:off x="1999203" y="2042775"/>
+                <a:ext cx="793152" cy="395501"/>
+              </a:xfrm>
+              <a:prstGeom prst="roundRect">
+                <a:avLst/>
+              </a:prstGeom>
+              <a:solidFill>
+                <a:schemeClr val="accent1">
+                  <a:lumMod val="50000"/>
+                </a:schemeClr>
+              </a:solidFill>
+              <a:ln>
+                <a:solidFill>
+                  <a:schemeClr val="tx1">
+                    <a:lumMod val="95000"/>
+                    <a:lumOff val="5000"/>
+                  </a:schemeClr>
+                </a:solidFill>
+              </a:ln>
+            </p:spPr>
+            <p:style>
+              <a:lnRef idx="2">
+                <a:schemeClr val="accent1">
+                  <a:shade val="15000"/>
+                </a:schemeClr>
+              </a:lnRef>
+              <a:fillRef idx="1">
+                <a:schemeClr val="accent1"/>
+              </a:fillRef>
+              <a:effectRef idx="0">
+                <a:schemeClr val="accent1"/>
+              </a:effectRef>
+              <a:fontRef idx="minor">
+                <a:schemeClr val="lt1"/>
+              </a:fontRef>
+            </p:style>
+            <p:txBody>
+              <a:bodyPr rtlCol="0" anchor="ctr"/>
+              <a:lstStyle/>
+              <a:p>
+                <a:pPr algn="ctr"/>
+                <a:r>
+                  <a:rPr lang="en-US" sz="1000" dirty="0">
+                    <a:solidFill>
+                      <a:schemeClr val="bg1"/>
+                    </a:solidFill>
+                  </a:rPr>
+                  <a:t>Fibonacci Image</a:t>
+                </a:r>
+              </a:p>
+            </p:txBody>
+          </p:sp>
+          <p:sp>
+            <p:nvSpPr>
+              <p:cNvPr id="4" name="Rectangle: Rounded Corners 3">
+                <a:extLst>
+                  <a:ext uri="{FF2B5EF4-FFF2-40B4-BE49-F238E27FC236}">
+                    <a16:creationId xmlns:a16="http://schemas.microsoft.com/office/drawing/2014/main" id="{C8D35E55-9E6A-538D-7CE3-466F7CF00F79}"/>
+                  </a:ext>
+                </a:extLst>
+              </p:cNvPr>
+              <p:cNvSpPr/>
+              <p:nvPr/>
+            </p:nvSpPr>
+            <p:spPr>
+              <a:xfrm>
+                <a:off x="1536759" y="2567259"/>
+                <a:ext cx="793152" cy="395501"/>
+              </a:xfrm>
+              <a:prstGeom prst="roundRect">
+                <a:avLst/>
+              </a:prstGeom>
+              <a:solidFill>
+                <a:schemeClr val="accent1">
+                  <a:lumMod val="50000"/>
+                </a:schemeClr>
+              </a:solidFill>
+              <a:ln>
+                <a:solidFill>
+                  <a:schemeClr val="tx1">
+                    <a:lumMod val="95000"/>
+                    <a:lumOff val="5000"/>
+                  </a:schemeClr>
+                </a:solidFill>
+              </a:ln>
+            </p:spPr>
+            <p:style>
+              <a:lnRef idx="2">
+                <a:schemeClr val="accent1">
+                  <a:shade val="15000"/>
+                </a:schemeClr>
+              </a:lnRef>
+              <a:fillRef idx="1">
+                <a:schemeClr val="accent1"/>
+              </a:fillRef>
+              <a:effectRef idx="0">
+                <a:schemeClr val="accent1"/>
+              </a:effectRef>
+              <a:fontRef idx="minor">
+                <a:schemeClr val="lt1"/>
+              </a:fontRef>
+            </p:style>
+            <p:txBody>
+              <a:bodyPr rtlCol="0" anchor="ctr"/>
+              <a:lstStyle/>
+              <a:p>
+                <a:pPr algn="ctr"/>
+                <a:r>
+                  <a:rPr lang="en-US" sz="1000" dirty="0">
+                    <a:solidFill>
+                      <a:schemeClr val="bg1"/>
+                    </a:solidFill>
+                  </a:rPr>
+                  <a:t>Env Variables</a:t>
+                </a:r>
+              </a:p>
+            </p:txBody>
+          </p:sp>
+          <p:sp>
+            <p:nvSpPr>
+              <p:cNvPr id="5" name="Rectangle: Rounded Corners 4">
+                <a:extLst>
+                  <a:ext uri="{FF2B5EF4-FFF2-40B4-BE49-F238E27FC236}">
+                    <a16:creationId xmlns:a16="http://schemas.microsoft.com/office/drawing/2014/main" id="{B8441CF1-BA66-3516-5D09-72A95185C035}"/>
+                  </a:ext>
+                </a:extLst>
+              </p:cNvPr>
+              <p:cNvSpPr/>
+              <p:nvPr/>
+            </p:nvSpPr>
+            <p:spPr>
+              <a:xfrm>
+                <a:off x="2438243" y="2563536"/>
+                <a:ext cx="793152" cy="395501"/>
+              </a:xfrm>
+              <a:prstGeom prst="roundRect">
+                <a:avLst/>
+              </a:prstGeom>
+              <a:solidFill>
+                <a:schemeClr val="accent1">
+                  <a:lumMod val="50000"/>
+                </a:schemeClr>
+              </a:solidFill>
+              <a:ln>
+                <a:solidFill>
+                  <a:schemeClr val="tx1">
+                    <a:lumMod val="95000"/>
+                    <a:lumOff val="5000"/>
+                  </a:schemeClr>
+                </a:solidFill>
+              </a:ln>
+            </p:spPr>
+            <p:style>
+              <a:lnRef idx="2">
+                <a:schemeClr val="accent1">
+                  <a:shade val="15000"/>
+                </a:schemeClr>
+              </a:lnRef>
+              <a:fillRef idx="1">
+                <a:schemeClr val="accent1"/>
+              </a:fillRef>
+              <a:effectRef idx="0">
+                <a:schemeClr val="accent1"/>
+              </a:effectRef>
+              <a:fontRef idx="minor">
+                <a:schemeClr val="lt1"/>
+              </a:fontRef>
+            </p:style>
+            <p:txBody>
+              <a:bodyPr rtlCol="0" anchor="ctr"/>
+              <a:lstStyle/>
+              <a:p>
+                <a:pPr algn="ctr"/>
+                <a:r>
+                  <a:rPr lang="en-US" sz="1000" dirty="0">
+                    <a:solidFill>
+                      <a:schemeClr val="bg1"/>
+                    </a:solidFill>
+                  </a:rPr>
+                  <a:t>Host Mappings</a:t>
+                </a:r>
+              </a:p>
+            </p:txBody>
+          </p:sp>
+          <p:sp>
+            <p:nvSpPr>
+              <p:cNvPr id="6" name="Rectangle: Rounded Corners 5">
+                <a:extLst>
+                  <a:ext uri="{FF2B5EF4-FFF2-40B4-BE49-F238E27FC236}">
+                    <a16:creationId xmlns:a16="http://schemas.microsoft.com/office/drawing/2014/main" id="{25A82EDA-C80A-E7AB-475D-07436E27AFD8}"/>
+                  </a:ext>
+                </a:extLst>
+              </p:cNvPr>
+              <p:cNvSpPr/>
+              <p:nvPr/>
+            </p:nvSpPr>
+            <p:spPr>
+              <a:xfrm>
+                <a:off x="2449945" y="3088019"/>
+                <a:ext cx="793152" cy="395501"/>
+              </a:xfrm>
+              <a:prstGeom prst="roundRect">
+                <a:avLst/>
+              </a:prstGeom>
+              <a:solidFill>
+                <a:schemeClr val="tx1"/>
+              </a:solidFill>
+              <a:ln>
+                <a:solidFill>
+                  <a:schemeClr val="tx1">
+                    <a:lumMod val="95000"/>
+                    <a:lumOff val="5000"/>
+                  </a:schemeClr>
+                </a:solidFill>
+              </a:ln>
+            </p:spPr>
+            <p:style>
+              <a:lnRef idx="2">
+                <a:schemeClr val="accent1">
+                  <a:shade val="15000"/>
+                </a:schemeClr>
+              </a:lnRef>
+              <a:fillRef idx="1">
+                <a:schemeClr val="accent1"/>
+              </a:fillRef>
+              <a:effectRef idx="0">
+                <a:schemeClr val="accent1"/>
+              </a:effectRef>
+              <a:fontRef idx="minor">
+                <a:schemeClr val="lt1"/>
+              </a:fontRef>
+            </p:style>
+            <p:txBody>
+              <a:bodyPr rtlCol="0" anchor="ctr"/>
+              <a:lstStyle/>
+              <a:p>
+                <a:pPr algn="ctr"/>
+                <a:r>
+                  <a:rPr lang="en-US" sz="1000" dirty="0">
+                    <a:solidFill>
+                      <a:schemeClr val="bg1"/>
+                    </a:solidFill>
+                  </a:rPr>
+                  <a:t>TLS Secrets</a:t>
+                </a:r>
+              </a:p>
+            </p:txBody>
+          </p:sp>
+          <p:sp>
+            <p:nvSpPr>
+              <p:cNvPr id="7" name="Rectangle: Rounded Corners 6">
+                <a:extLst>
+                  <a:ext uri="{FF2B5EF4-FFF2-40B4-BE49-F238E27FC236}">
+                    <a16:creationId xmlns:a16="http://schemas.microsoft.com/office/drawing/2014/main" id="{32C86211-9307-A9D2-AB04-D5FC444BAC52}"/>
+                  </a:ext>
+                </a:extLst>
+              </p:cNvPr>
+              <p:cNvSpPr/>
+              <p:nvPr/>
+            </p:nvSpPr>
+            <p:spPr>
+              <a:xfrm>
+                <a:off x="1536759" y="3088020"/>
+                <a:ext cx="793152" cy="395501"/>
+              </a:xfrm>
+              <a:prstGeom prst="roundRect">
+                <a:avLst/>
+              </a:prstGeom>
+              <a:solidFill>
+                <a:srgbClr val="A02B93"/>
+              </a:solidFill>
+              <a:ln>
+                <a:solidFill>
+                  <a:schemeClr val="tx1">
+                    <a:lumMod val="95000"/>
+                    <a:lumOff val="5000"/>
+                  </a:schemeClr>
+                </a:solidFill>
+              </a:ln>
+            </p:spPr>
+            <p:style>
+              <a:lnRef idx="2">
+                <a:schemeClr val="accent1">
+                  <a:shade val="15000"/>
+                </a:schemeClr>
+              </a:lnRef>
+              <a:fillRef idx="1">
+                <a:schemeClr val="accent1"/>
+              </a:fillRef>
+              <a:effectRef idx="0">
+                <a:schemeClr val="accent1"/>
+              </a:effectRef>
+              <a:fontRef idx="minor">
+                <a:schemeClr val="lt1"/>
+              </a:fontRef>
+            </p:style>
+            <p:txBody>
+              <a:bodyPr rtlCol="0" anchor="ctr"/>
+              <a:lstStyle/>
+              <a:p>
+                <a:pPr algn="ctr"/>
+                <a:r>
+                  <a:rPr lang="en-US" sz="1000" dirty="0">
+                    <a:solidFill>
+                      <a:schemeClr val="bg1"/>
+                    </a:solidFill>
+                  </a:rPr>
+                  <a:t>Network Interface</a:t>
+                </a:r>
+              </a:p>
+            </p:txBody>
+          </p:sp>
+        </p:grpSp>
+        <p:grpSp>
+          <p:nvGrpSpPr>
+            <p:cNvPr id="9" name="Group 8">
+              <a:extLst>
+                <a:ext uri="{FF2B5EF4-FFF2-40B4-BE49-F238E27FC236}">
+                  <a16:creationId xmlns:a16="http://schemas.microsoft.com/office/drawing/2014/main" id="{F5F0454D-92E2-1DCE-A541-F940F512A716}"/>
+                </a:ext>
+              </a:extLst>
+            </p:cNvPr>
+            <p:cNvGrpSpPr/>
+            <p:nvPr/>
+          </p:nvGrpSpPr>
+          <p:grpSpPr>
+            <a:xfrm>
+              <a:off x="4056371" y="1295952"/>
+              <a:ext cx="1934705" cy="2114078"/>
+              <a:chOff x="1428427" y="1503336"/>
+              <a:chExt cx="1934705" cy="2114078"/>
+            </a:xfrm>
+          </p:grpSpPr>
+          <p:sp>
+            <p:nvSpPr>
+              <p:cNvPr id="10" name="Rectangle: Rounded Corners 9">
+                <a:extLst>
+                  <a:ext uri="{FF2B5EF4-FFF2-40B4-BE49-F238E27FC236}">
+                    <a16:creationId xmlns:a16="http://schemas.microsoft.com/office/drawing/2014/main" id="{9231F8FA-9451-34B1-1AA8-7C30ABEC5418}"/>
+                  </a:ext>
+                </a:extLst>
+              </p:cNvPr>
+              <p:cNvSpPr/>
+              <p:nvPr/>
+            </p:nvSpPr>
+            <p:spPr>
+              <a:xfrm>
+                <a:off x="1428427" y="1503336"/>
+                <a:ext cx="1934705" cy="2114078"/>
+              </a:xfrm>
+              <a:prstGeom prst="roundRect">
+                <a:avLst/>
+              </a:prstGeom>
+              <a:solidFill>
+                <a:srgbClr val="F2AA84"/>
+              </a:solidFill>
+            </p:spPr>
+            <p:style>
+              <a:lnRef idx="2">
+                <a:schemeClr val="accent2">
+                  <a:shade val="15000"/>
+                </a:schemeClr>
+              </a:lnRef>
+              <a:fillRef idx="1">
+                <a:schemeClr val="accent2"/>
+              </a:fillRef>
+              <a:effectRef idx="0">
+                <a:schemeClr val="accent2"/>
+              </a:effectRef>
+              <a:fontRef idx="minor">
+                <a:schemeClr val="lt1"/>
+              </a:fontRef>
+            </p:style>
+            <p:txBody>
+              <a:bodyPr rtlCol="0" anchor="t"/>
+              <a:lstStyle/>
+              <a:p>
+                <a:pPr algn="ctr"/>
+                <a:r>
+                  <a:rPr lang="en-US" sz="1600" b="1" dirty="0">
+                    <a:solidFill>
+                      <a:schemeClr val="tx1"/>
+                    </a:solidFill>
+                    <a:latin typeface="Arial" panose="020B0604020202020204" pitchFamily="34" charset="0"/>
+                    <a:cs typeface="Arial" panose="020B0604020202020204" pitchFamily="34" charset="0"/>
+                  </a:rPr>
+                  <a:t>Server Stage 2</a:t>
+                </a:r>
+                <a:endParaRPr lang="en-US" sz="3200" b="1" dirty="0">
+                  <a:solidFill>
+                    <a:schemeClr val="tx1"/>
+                  </a:solidFill>
+                  <a:latin typeface="Arial" panose="020B0604020202020204" pitchFamily="34" charset="0"/>
+                  <a:cs typeface="Arial" panose="020B0604020202020204" pitchFamily="34" charset="0"/>
+                </a:endParaRPr>
+              </a:p>
+            </p:txBody>
+          </p:sp>
+          <p:sp>
+            <p:nvSpPr>
+              <p:cNvPr id="11" name="Rectangle: Rounded Corners 10">
+                <a:extLst>
+                  <a:ext uri="{FF2B5EF4-FFF2-40B4-BE49-F238E27FC236}">
+                    <a16:creationId xmlns:a16="http://schemas.microsoft.com/office/drawing/2014/main" id="{7683A0A3-DF32-2988-39EB-E6A94CF7A755}"/>
+                  </a:ext>
+                </a:extLst>
+              </p:cNvPr>
+              <p:cNvSpPr/>
+              <p:nvPr/>
+            </p:nvSpPr>
+            <p:spPr>
+              <a:xfrm>
+                <a:off x="1999203" y="2042775"/>
+                <a:ext cx="793152" cy="395501"/>
+              </a:xfrm>
+              <a:prstGeom prst="roundRect">
+                <a:avLst/>
+              </a:prstGeom>
+              <a:solidFill>
+                <a:schemeClr val="accent1">
+                  <a:lumMod val="50000"/>
+                </a:schemeClr>
+              </a:solidFill>
+              <a:ln>
+                <a:solidFill>
+                  <a:schemeClr val="tx1">
+                    <a:lumMod val="95000"/>
+                    <a:lumOff val="5000"/>
+                  </a:schemeClr>
+                </a:solidFill>
+              </a:ln>
+            </p:spPr>
+            <p:style>
+              <a:lnRef idx="2">
+                <a:schemeClr val="accent1">
+                  <a:shade val="15000"/>
+                </a:schemeClr>
+              </a:lnRef>
+              <a:fillRef idx="1">
+                <a:schemeClr val="accent1"/>
+              </a:fillRef>
+              <a:effectRef idx="0">
+                <a:schemeClr val="accent1"/>
+              </a:effectRef>
+              <a:fontRef idx="minor">
+                <a:schemeClr val="lt1"/>
+              </a:fontRef>
+            </p:style>
+            <p:txBody>
+              <a:bodyPr rtlCol="0" anchor="ctr"/>
+              <a:lstStyle/>
+              <a:p>
+                <a:pPr algn="ctr"/>
+                <a:r>
+                  <a:rPr lang="en-US" sz="1000" dirty="0">
+                    <a:solidFill>
+                      <a:schemeClr val="bg1"/>
+                    </a:solidFill>
+                  </a:rPr>
+                  <a:t>Fibonacci Image</a:t>
+                </a:r>
+              </a:p>
+            </p:txBody>
+          </p:sp>
+          <p:sp>
+            <p:nvSpPr>
+              <p:cNvPr id="12" name="Rectangle: Rounded Corners 11">
+                <a:extLst>
+                  <a:ext uri="{FF2B5EF4-FFF2-40B4-BE49-F238E27FC236}">
+                    <a16:creationId xmlns:a16="http://schemas.microsoft.com/office/drawing/2014/main" id="{8EDA39CD-A79C-9219-468D-5755A5613410}"/>
+                  </a:ext>
+                </a:extLst>
+              </p:cNvPr>
+              <p:cNvSpPr/>
+              <p:nvPr/>
+            </p:nvSpPr>
+            <p:spPr>
+              <a:xfrm>
+                <a:off x="1536759" y="2567259"/>
+                <a:ext cx="793152" cy="395501"/>
+              </a:xfrm>
+              <a:prstGeom prst="roundRect">
+                <a:avLst/>
+              </a:prstGeom>
+              <a:solidFill>
+                <a:schemeClr val="accent1">
+                  <a:lumMod val="50000"/>
+                </a:schemeClr>
+              </a:solidFill>
+              <a:ln>
+                <a:solidFill>
+                  <a:schemeClr val="tx1">
+                    <a:lumMod val="95000"/>
+                    <a:lumOff val="5000"/>
+                  </a:schemeClr>
+                </a:solidFill>
+              </a:ln>
+            </p:spPr>
+            <p:style>
+              <a:lnRef idx="2">
+                <a:schemeClr val="accent1">
+                  <a:shade val="15000"/>
+                </a:schemeClr>
+              </a:lnRef>
+              <a:fillRef idx="1">
+                <a:schemeClr val="accent1"/>
+              </a:fillRef>
+              <a:effectRef idx="0">
+                <a:schemeClr val="accent1"/>
+              </a:effectRef>
+              <a:fontRef idx="minor">
+                <a:schemeClr val="lt1"/>
+              </a:fontRef>
+            </p:style>
+            <p:txBody>
+              <a:bodyPr rtlCol="0" anchor="ctr"/>
+              <a:lstStyle/>
+              <a:p>
+                <a:pPr algn="ctr"/>
+                <a:r>
+                  <a:rPr lang="en-US" sz="1000" dirty="0">
+                    <a:solidFill>
+                      <a:schemeClr val="bg1"/>
+                    </a:solidFill>
+                  </a:rPr>
+                  <a:t>Env Variables</a:t>
+                </a:r>
+              </a:p>
+            </p:txBody>
+          </p:sp>
+          <p:sp>
+            <p:nvSpPr>
+              <p:cNvPr id="13" name="Rectangle: Rounded Corners 12">
+                <a:extLst>
+                  <a:ext uri="{FF2B5EF4-FFF2-40B4-BE49-F238E27FC236}">
+                    <a16:creationId xmlns:a16="http://schemas.microsoft.com/office/drawing/2014/main" id="{D014137E-D199-2B17-AAC1-A9250447A011}"/>
+                  </a:ext>
+                </a:extLst>
+              </p:cNvPr>
+              <p:cNvSpPr/>
+              <p:nvPr/>
+            </p:nvSpPr>
+            <p:spPr>
+              <a:xfrm>
+                <a:off x="2438243" y="2563536"/>
+                <a:ext cx="793152" cy="395501"/>
+              </a:xfrm>
+              <a:prstGeom prst="roundRect">
+                <a:avLst/>
+              </a:prstGeom>
+              <a:solidFill>
+                <a:schemeClr val="accent1">
+                  <a:lumMod val="50000"/>
+                </a:schemeClr>
+              </a:solidFill>
+              <a:ln>
+                <a:solidFill>
+                  <a:schemeClr val="tx1">
+                    <a:lumMod val="95000"/>
+                    <a:lumOff val="5000"/>
+                  </a:schemeClr>
+                </a:solidFill>
+              </a:ln>
+            </p:spPr>
+            <p:style>
+              <a:lnRef idx="2">
+                <a:schemeClr val="accent1">
+                  <a:shade val="15000"/>
+                </a:schemeClr>
+              </a:lnRef>
+              <a:fillRef idx="1">
+                <a:schemeClr val="accent1"/>
+              </a:fillRef>
+              <a:effectRef idx="0">
+                <a:schemeClr val="accent1"/>
+              </a:effectRef>
+              <a:fontRef idx="minor">
+                <a:schemeClr val="lt1"/>
+              </a:fontRef>
+            </p:style>
+            <p:txBody>
+              <a:bodyPr rtlCol="0" anchor="ctr"/>
+              <a:lstStyle/>
+              <a:p>
+                <a:pPr algn="ctr"/>
+                <a:r>
+                  <a:rPr lang="en-US" sz="1000" dirty="0">
+                    <a:solidFill>
+                      <a:schemeClr val="bg1"/>
+                    </a:solidFill>
+                  </a:rPr>
+                  <a:t>Host Mappings</a:t>
+                </a:r>
+              </a:p>
+            </p:txBody>
+          </p:sp>
+          <p:sp>
+            <p:nvSpPr>
+              <p:cNvPr id="14" name="Rectangle: Rounded Corners 13">
+                <a:extLst>
+                  <a:ext uri="{FF2B5EF4-FFF2-40B4-BE49-F238E27FC236}">
+                    <a16:creationId xmlns:a16="http://schemas.microsoft.com/office/drawing/2014/main" id="{B0A01B58-389C-9A23-C722-3B77AACE1636}"/>
+                  </a:ext>
+                </a:extLst>
+              </p:cNvPr>
+              <p:cNvSpPr/>
+              <p:nvPr/>
+            </p:nvSpPr>
+            <p:spPr>
+              <a:xfrm>
+                <a:off x="2449945" y="3088019"/>
+                <a:ext cx="793152" cy="395501"/>
+              </a:xfrm>
+              <a:prstGeom prst="roundRect">
+                <a:avLst/>
+              </a:prstGeom>
+              <a:solidFill>
+                <a:schemeClr val="tx1"/>
+              </a:solidFill>
+              <a:ln>
+                <a:solidFill>
+                  <a:schemeClr val="tx1">
+                    <a:lumMod val="95000"/>
+                    <a:lumOff val="5000"/>
+                  </a:schemeClr>
+                </a:solidFill>
+              </a:ln>
+            </p:spPr>
+            <p:style>
+              <a:lnRef idx="2">
+                <a:schemeClr val="accent1">
+                  <a:shade val="15000"/>
+                </a:schemeClr>
+              </a:lnRef>
+              <a:fillRef idx="1">
+                <a:schemeClr val="accent1"/>
+              </a:fillRef>
+              <a:effectRef idx="0">
+                <a:schemeClr val="accent1"/>
+              </a:effectRef>
+              <a:fontRef idx="minor">
+                <a:schemeClr val="lt1"/>
+              </a:fontRef>
+            </p:style>
+            <p:txBody>
+              <a:bodyPr rtlCol="0" anchor="ctr"/>
+              <a:lstStyle/>
+              <a:p>
+                <a:pPr algn="ctr"/>
+                <a:r>
+                  <a:rPr lang="en-US" sz="1000" dirty="0">
+                    <a:solidFill>
+                      <a:schemeClr val="bg1"/>
+                    </a:solidFill>
+                  </a:rPr>
+                  <a:t>TLS Secrets</a:t>
+                </a:r>
+              </a:p>
+            </p:txBody>
+          </p:sp>
+          <p:sp>
+            <p:nvSpPr>
+              <p:cNvPr id="15" name="Rectangle: Rounded Corners 14">
+                <a:extLst>
+                  <a:ext uri="{FF2B5EF4-FFF2-40B4-BE49-F238E27FC236}">
+                    <a16:creationId xmlns:a16="http://schemas.microsoft.com/office/drawing/2014/main" id="{87B0A199-14FF-9150-053F-37D36D91C18D}"/>
+                  </a:ext>
+                </a:extLst>
+              </p:cNvPr>
+              <p:cNvSpPr/>
+              <p:nvPr/>
+            </p:nvSpPr>
+            <p:spPr>
+              <a:xfrm>
+                <a:off x="1536759" y="3088020"/>
+                <a:ext cx="793152" cy="395501"/>
+              </a:xfrm>
+              <a:prstGeom prst="roundRect">
+                <a:avLst/>
+              </a:prstGeom>
+              <a:solidFill>
+                <a:srgbClr val="A02B93"/>
+              </a:solidFill>
+              <a:ln>
+                <a:solidFill>
+                  <a:schemeClr val="tx1">
+                    <a:lumMod val="95000"/>
+                    <a:lumOff val="5000"/>
+                  </a:schemeClr>
+                </a:solidFill>
+              </a:ln>
+            </p:spPr>
+            <p:style>
+              <a:lnRef idx="2">
+                <a:schemeClr val="accent1">
+                  <a:shade val="15000"/>
+                </a:schemeClr>
+              </a:lnRef>
+              <a:fillRef idx="1">
+                <a:schemeClr val="accent1"/>
+              </a:fillRef>
+              <a:effectRef idx="0">
+                <a:schemeClr val="accent1"/>
+              </a:effectRef>
+              <a:fontRef idx="minor">
+                <a:schemeClr val="lt1"/>
+              </a:fontRef>
+            </p:style>
+            <p:txBody>
+              <a:bodyPr rtlCol="0" anchor="ctr"/>
+              <a:lstStyle/>
+              <a:p>
+                <a:pPr algn="ctr"/>
+                <a:r>
+                  <a:rPr lang="en-US" sz="1000" dirty="0">
+                    <a:solidFill>
+                      <a:schemeClr val="bg1"/>
+                    </a:solidFill>
+                  </a:rPr>
+                  <a:t>Network Interface</a:t>
+                </a:r>
+              </a:p>
+            </p:txBody>
+          </p:sp>
+        </p:grpSp>
+        <p:grpSp>
+          <p:nvGrpSpPr>
+            <p:cNvPr id="16" name="Group 15">
+              <a:extLst>
+                <a:ext uri="{FF2B5EF4-FFF2-40B4-BE49-F238E27FC236}">
+                  <a16:creationId xmlns:a16="http://schemas.microsoft.com/office/drawing/2014/main" id="{1D0E44A7-9995-FA58-33CD-61FF0F5E9BFB}"/>
+                </a:ext>
+              </a:extLst>
+            </p:cNvPr>
+            <p:cNvGrpSpPr/>
+            <p:nvPr/>
+          </p:nvGrpSpPr>
+          <p:grpSpPr>
+            <a:xfrm>
+              <a:off x="6263591" y="1302836"/>
+              <a:ext cx="1934705" cy="2114078"/>
+              <a:chOff x="1428427" y="1503336"/>
+              <a:chExt cx="1934705" cy="2114078"/>
+            </a:xfrm>
+          </p:grpSpPr>
+          <p:sp>
+            <p:nvSpPr>
+              <p:cNvPr id="17" name="Rectangle: Rounded Corners 16">
+                <a:extLst>
+                  <a:ext uri="{FF2B5EF4-FFF2-40B4-BE49-F238E27FC236}">
+                    <a16:creationId xmlns:a16="http://schemas.microsoft.com/office/drawing/2014/main" id="{BBBC2732-F2C7-1070-C4F6-AA5D506B549F}"/>
+                  </a:ext>
+                </a:extLst>
+              </p:cNvPr>
+              <p:cNvSpPr/>
+              <p:nvPr/>
+            </p:nvSpPr>
+            <p:spPr>
+              <a:xfrm>
+                <a:off x="1428427" y="1503336"/>
+                <a:ext cx="1934705" cy="2114078"/>
+              </a:xfrm>
+              <a:prstGeom prst="roundRect">
+                <a:avLst/>
+              </a:prstGeom>
+              <a:solidFill>
+                <a:srgbClr val="B4E5A2"/>
+              </a:solidFill>
+            </p:spPr>
+            <p:style>
+              <a:lnRef idx="2">
+                <a:schemeClr val="accent2">
+                  <a:shade val="15000"/>
+                </a:schemeClr>
+              </a:lnRef>
+              <a:fillRef idx="1">
+                <a:schemeClr val="accent2"/>
+              </a:fillRef>
+              <a:effectRef idx="0">
+                <a:schemeClr val="accent2"/>
+              </a:effectRef>
+              <a:fontRef idx="minor">
+                <a:schemeClr val="lt1"/>
+              </a:fontRef>
+            </p:style>
+            <p:txBody>
+              <a:bodyPr rtlCol="0" anchor="t"/>
+              <a:lstStyle/>
+              <a:p>
+                <a:pPr algn="ctr"/>
+                <a:r>
+                  <a:rPr lang="en-US" sz="1600" b="1" dirty="0">
+                    <a:solidFill>
+                      <a:schemeClr val="tx1"/>
+                    </a:solidFill>
+                    <a:latin typeface="Arial" panose="020B0604020202020204" pitchFamily="34" charset="0"/>
+                    <a:cs typeface="Arial" panose="020B0604020202020204" pitchFamily="34" charset="0"/>
+                  </a:rPr>
+                  <a:t>Server Stage …</a:t>
+                </a:r>
+                <a:endParaRPr lang="en-US" sz="3200" b="1" dirty="0">
+                  <a:solidFill>
+                    <a:schemeClr val="tx1"/>
+                  </a:solidFill>
+                  <a:latin typeface="Arial" panose="020B0604020202020204" pitchFamily="34" charset="0"/>
+                  <a:cs typeface="Arial" panose="020B0604020202020204" pitchFamily="34" charset="0"/>
+                </a:endParaRPr>
+              </a:p>
+            </p:txBody>
+          </p:sp>
+          <p:sp>
+            <p:nvSpPr>
+              <p:cNvPr id="18" name="Rectangle: Rounded Corners 17">
+                <a:extLst>
+                  <a:ext uri="{FF2B5EF4-FFF2-40B4-BE49-F238E27FC236}">
+                    <a16:creationId xmlns:a16="http://schemas.microsoft.com/office/drawing/2014/main" id="{7EAFCB6D-E209-0C5E-D5E2-AB61BA762500}"/>
+                  </a:ext>
+                </a:extLst>
+              </p:cNvPr>
+              <p:cNvSpPr/>
+              <p:nvPr/>
+            </p:nvSpPr>
+            <p:spPr>
+              <a:xfrm>
+                <a:off x="1999203" y="2042775"/>
+                <a:ext cx="793152" cy="395501"/>
+              </a:xfrm>
+              <a:prstGeom prst="roundRect">
+                <a:avLst/>
+              </a:prstGeom>
+              <a:solidFill>
+                <a:schemeClr val="accent1">
+                  <a:lumMod val="50000"/>
+                </a:schemeClr>
+              </a:solidFill>
+              <a:ln>
+                <a:solidFill>
+                  <a:schemeClr val="tx1">
+                    <a:lumMod val="95000"/>
+                    <a:lumOff val="5000"/>
+                  </a:schemeClr>
+                </a:solidFill>
+              </a:ln>
+            </p:spPr>
+            <p:style>
+              <a:lnRef idx="2">
+                <a:schemeClr val="accent1">
+                  <a:shade val="15000"/>
+                </a:schemeClr>
+              </a:lnRef>
+              <a:fillRef idx="1">
+                <a:schemeClr val="accent1"/>
+              </a:fillRef>
+              <a:effectRef idx="0">
+                <a:schemeClr val="accent1"/>
+              </a:effectRef>
+              <a:fontRef idx="minor">
+                <a:schemeClr val="lt1"/>
+              </a:fontRef>
+            </p:style>
+            <p:txBody>
+              <a:bodyPr rtlCol="0" anchor="ctr"/>
+              <a:lstStyle/>
+              <a:p>
+                <a:pPr algn="ctr"/>
+                <a:r>
+                  <a:rPr lang="en-US" sz="1000" dirty="0">
+                    <a:solidFill>
+                      <a:schemeClr val="bg1"/>
+                    </a:solidFill>
+                  </a:rPr>
+                  <a:t>Fibonacci Image</a:t>
+                </a:r>
+              </a:p>
+            </p:txBody>
+          </p:sp>
+          <p:sp>
+            <p:nvSpPr>
+              <p:cNvPr id="19" name="Rectangle: Rounded Corners 18">
+                <a:extLst>
+                  <a:ext uri="{FF2B5EF4-FFF2-40B4-BE49-F238E27FC236}">
+                    <a16:creationId xmlns:a16="http://schemas.microsoft.com/office/drawing/2014/main" id="{61605300-0E86-B3BA-B9BA-8301DF079F31}"/>
+                  </a:ext>
+                </a:extLst>
+              </p:cNvPr>
+              <p:cNvSpPr/>
+              <p:nvPr/>
+            </p:nvSpPr>
+            <p:spPr>
+              <a:xfrm>
+                <a:off x="1536759" y="2567259"/>
+                <a:ext cx="793152" cy="395501"/>
+              </a:xfrm>
+              <a:prstGeom prst="roundRect">
+                <a:avLst/>
+              </a:prstGeom>
+              <a:solidFill>
+                <a:schemeClr val="accent1">
+                  <a:lumMod val="50000"/>
+                </a:schemeClr>
+              </a:solidFill>
+              <a:ln>
+                <a:solidFill>
+                  <a:schemeClr val="tx1">
+                    <a:lumMod val="95000"/>
+                    <a:lumOff val="5000"/>
+                  </a:schemeClr>
+                </a:solidFill>
+              </a:ln>
+            </p:spPr>
+            <p:style>
+              <a:lnRef idx="2">
+                <a:schemeClr val="accent1">
+                  <a:shade val="15000"/>
+                </a:schemeClr>
+              </a:lnRef>
+              <a:fillRef idx="1">
+                <a:schemeClr val="accent1"/>
+              </a:fillRef>
+              <a:effectRef idx="0">
+                <a:schemeClr val="accent1"/>
+              </a:effectRef>
+              <a:fontRef idx="minor">
+                <a:schemeClr val="lt1"/>
+              </a:fontRef>
+            </p:style>
+            <p:txBody>
+              <a:bodyPr rtlCol="0" anchor="ctr"/>
+              <a:lstStyle/>
+              <a:p>
+                <a:pPr algn="ctr"/>
+                <a:r>
+                  <a:rPr lang="en-US" sz="1000" dirty="0">
+                    <a:solidFill>
+                      <a:schemeClr val="bg1"/>
+                    </a:solidFill>
+                  </a:rPr>
+                  <a:t>Env Variables</a:t>
+                </a:r>
+              </a:p>
+            </p:txBody>
+          </p:sp>
+          <p:sp>
+            <p:nvSpPr>
+              <p:cNvPr id="20" name="Rectangle: Rounded Corners 19">
+                <a:extLst>
+                  <a:ext uri="{FF2B5EF4-FFF2-40B4-BE49-F238E27FC236}">
+                    <a16:creationId xmlns:a16="http://schemas.microsoft.com/office/drawing/2014/main" id="{0B72A9A3-0FAC-3012-F871-2E4B59545F04}"/>
+                  </a:ext>
+                </a:extLst>
+              </p:cNvPr>
+              <p:cNvSpPr/>
+              <p:nvPr/>
+            </p:nvSpPr>
+            <p:spPr>
+              <a:xfrm>
+                <a:off x="2438243" y="2563536"/>
+                <a:ext cx="793152" cy="395501"/>
+              </a:xfrm>
+              <a:prstGeom prst="roundRect">
+                <a:avLst/>
+              </a:prstGeom>
+              <a:solidFill>
+                <a:schemeClr val="accent1">
+                  <a:lumMod val="50000"/>
+                </a:schemeClr>
+              </a:solidFill>
+              <a:ln>
+                <a:solidFill>
+                  <a:schemeClr val="tx1">
+                    <a:lumMod val="95000"/>
+                    <a:lumOff val="5000"/>
+                  </a:schemeClr>
+                </a:solidFill>
+              </a:ln>
+            </p:spPr>
+            <p:style>
+              <a:lnRef idx="2">
+                <a:schemeClr val="accent1">
+                  <a:shade val="15000"/>
+                </a:schemeClr>
+              </a:lnRef>
+              <a:fillRef idx="1">
+                <a:schemeClr val="accent1"/>
+              </a:fillRef>
+              <a:effectRef idx="0">
+                <a:schemeClr val="accent1"/>
+              </a:effectRef>
+              <a:fontRef idx="minor">
+                <a:schemeClr val="lt1"/>
+              </a:fontRef>
+            </p:style>
+            <p:txBody>
+              <a:bodyPr rtlCol="0" anchor="ctr"/>
+              <a:lstStyle/>
+              <a:p>
+                <a:pPr algn="ctr"/>
+                <a:r>
+                  <a:rPr lang="en-US" sz="1000" dirty="0">
+                    <a:solidFill>
+                      <a:schemeClr val="bg1"/>
+                    </a:solidFill>
+                  </a:rPr>
+                  <a:t>Host Mappings</a:t>
+                </a:r>
+              </a:p>
+            </p:txBody>
+          </p:sp>
+          <p:sp>
+            <p:nvSpPr>
+              <p:cNvPr id="21" name="Rectangle: Rounded Corners 20">
+                <a:extLst>
+                  <a:ext uri="{FF2B5EF4-FFF2-40B4-BE49-F238E27FC236}">
+                    <a16:creationId xmlns:a16="http://schemas.microsoft.com/office/drawing/2014/main" id="{31FB9785-4193-56F5-85F3-4A4C08B45AED}"/>
+                  </a:ext>
+                </a:extLst>
+              </p:cNvPr>
+              <p:cNvSpPr/>
+              <p:nvPr/>
+            </p:nvSpPr>
+            <p:spPr>
+              <a:xfrm>
+                <a:off x="2449945" y="3088019"/>
+                <a:ext cx="793152" cy="395501"/>
+              </a:xfrm>
+              <a:prstGeom prst="roundRect">
+                <a:avLst/>
+              </a:prstGeom>
+              <a:solidFill>
+                <a:schemeClr val="tx1"/>
+              </a:solidFill>
+              <a:ln>
+                <a:solidFill>
+                  <a:schemeClr val="tx1">
+                    <a:lumMod val="95000"/>
+                    <a:lumOff val="5000"/>
+                  </a:schemeClr>
+                </a:solidFill>
+              </a:ln>
+            </p:spPr>
+            <p:style>
+              <a:lnRef idx="2">
+                <a:schemeClr val="accent1">
+                  <a:shade val="15000"/>
+                </a:schemeClr>
+              </a:lnRef>
+              <a:fillRef idx="1">
+                <a:schemeClr val="accent1"/>
+              </a:fillRef>
+              <a:effectRef idx="0">
+                <a:schemeClr val="accent1"/>
+              </a:effectRef>
+              <a:fontRef idx="minor">
+                <a:schemeClr val="lt1"/>
+              </a:fontRef>
+            </p:style>
+            <p:txBody>
+              <a:bodyPr rtlCol="0" anchor="ctr"/>
+              <a:lstStyle/>
+              <a:p>
+                <a:pPr algn="ctr"/>
+                <a:r>
+                  <a:rPr lang="en-US" sz="1000" dirty="0">
+                    <a:solidFill>
+                      <a:schemeClr val="bg1"/>
+                    </a:solidFill>
+                  </a:rPr>
+                  <a:t>TLS Secrets</a:t>
+                </a:r>
+              </a:p>
+            </p:txBody>
+          </p:sp>
+          <p:sp>
+            <p:nvSpPr>
+              <p:cNvPr id="22" name="Rectangle: Rounded Corners 21">
+                <a:extLst>
+                  <a:ext uri="{FF2B5EF4-FFF2-40B4-BE49-F238E27FC236}">
+                    <a16:creationId xmlns:a16="http://schemas.microsoft.com/office/drawing/2014/main" id="{05BE6FAE-EFE9-48FB-12F7-6399A01D08FE}"/>
+                  </a:ext>
+                </a:extLst>
+              </p:cNvPr>
+              <p:cNvSpPr/>
+              <p:nvPr/>
+            </p:nvSpPr>
+            <p:spPr>
+              <a:xfrm>
+                <a:off x="1536759" y="3088020"/>
+                <a:ext cx="793152" cy="395501"/>
+              </a:xfrm>
+              <a:prstGeom prst="roundRect">
+                <a:avLst/>
+              </a:prstGeom>
+              <a:solidFill>
+                <a:srgbClr val="A02B93"/>
+              </a:solidFill>
+              <a:ln>
+                <a:solidFill>
+                  <a:schemeClr val="tx1">
+                    <a:lumMod val="95000"/>
+                    <a:lumOff val="5000"/>
+                  </a:schemeClr>
+                </a:solidFill>
+              </a:ln>
+            </p:spPr>
+            <p:style>
+              <a:lnRef idx="2">
+                <a:schemeClr val="accent1">
+                  <a:shade val="15000"/>
+                </a:schemeClr>
+              </a:lnRef>
+              <a:fillRef idx="1">
+                <a:schemeClr val="accent1"/>
+              </a:fillRef>
+              <a:effectRef idx="0">
+                <a:schemeClr val="accent1"/>
+              </a:effectRef>
+              <a:fontRef idx="minor">
+                <a:schemeClr val="lt1"/>
+              </a:fontRef>
+            </p:style>
+            <p:txBody>
+              <a:bodyPr rtlCol="0" anchor="ctr"/>
+              <a:lstStyle/>
+              <a:p>
+                <a:pPr algn="ctr"/>
+                <a:r>
+                  <a:rPr lang="en-US" sz="1000" dirty="0">
+                    <a:solidFill>
+                      <a:schemeClr val="bg1"/>
+                    </a:solidFill>
+                  </a:rPr>
+                  <a:t>Network Interface</a:t>
+                </a:r>
+              </a:p>
+            </p:txBody>
+          </p:sp>
+        </p:grpSp>
+        <p:grpSp>
+          <p:nvGrpSpPr>
+            <p:cNvPr id="23" name="Group 22">
+              <a:extLst>
+                <a:ext uri="{FF2B5EF4-FFF2-40B4-BE49-F238E27FC236}">
+                  <a16:creationId xmlns:a16="http://schemas.microsoft.com/office/drawing/2014/main" id="{3A2A63A4-6987-6DAC-5468-9EDE7963E303}"/>
+                </a:ext>
+              </a:extLst>
+            </p:cNvPr>
+            <p:cNvGrpSpPr/>
+            <p:nvPr/>
+          </p:nvGrpSpPr>
+          <p:grpSpPr>
+            <a:xfrm>
+              <a:off x="8470811" y="1289068"/>
+              <a:ext cx="1934705" cy="2114078"/>
+              <a:chOff x="1428427" y="1503336"/>
+              <a:chExt cx="1934705" cy="2114078"/>
+            </a:xfrm>
+          </p:grpSpPr>
+          <p:sp>
+            <p:nvSpPr>
+              <p:cNvPr id="24" name="Rectangle: Rounded Corners 23">
+                <a:extLst>
+                  <a:ext uri="{FF2B5EF4-FFF2-40B4-BE49-F238E27FC236}">
+                    <a16:creationId xmlns:a16="http://schemas.microsoft.com/office/drawing/2014/main" id="{29413E02-1A2C-E4F0-F034-6D21E8005BD5}"/>
+                  </a:ext>
+                </a:extLst>
+              </p:cNvPr>
+              <p:cNvSpPr/>
+              <p:nvPr/>
+            </p:nvSpPr>
+            <p:spPr>
+              <a:xfrm>
+                <a:off x="1428427" y="1503336"/>
+                <a:ext cx="1934705" cy="2114078"/>
+              </a:xfrm>
+              <a:prstGeom prst="roundRect">
+                <a:avLst/>
+              </a:prstGeom>
+              <a:solidFill>
+                <a:srgbClr val="A6CAEC"/>
+              </a:solidFill>
+            </p:spPr>
+            <p:style>
+              <a:lnRef idx="2">
+                <a:schemeClr val="accent2">
+                  <a:shade val="15000"/>
+                </a:schemeClr>
+              </a:lnRef>
+              <a:fillRef idx="1">
+                <a:schemeClr val="accent2"/>
+              </a:fillRef>
+              <a:effectRef idx="0">
+                <a:schemeClr val="accent2"/>
+              </a:effectRef>
+              <a:fontRef idx="minor">
+                <a:schemeClr val="lt1"/>
+              </a:fontRef>
+            </p:style>
+            <p:txBody>
+              <a:bodyPr rtlCol="0" anchor="t"/>
+              <a:lstStyle/>
+              <a:p>
+                <a:pPr algn="ctr"/>
+                <a:r>
+                  <a:rPr lang="en-US" sz="1600" b="1" dirty="0">
+                    <a:solidFill>
+                      <a:schemeClr val="tx1"/>
+                    </a:solidFill>
+                    <a:latin typeface="Arial" panose="020B0604020202020204" pitchFamily="34" charset="0"/>
+                    <a:cs typeface="Arial" panose="020B0604020202020204" pitchFamily="34" charset="0"/>
+                  </a:rPr>
+                  <a:t>Server Stage N</a:t>
+                </a:r>
+                <a:endParaRPr lang="en-US" sz="3200" b="1" dirty="0">
+                  <a:solidFill>
+                    <a:schemeClr val="tx1"/>
+                  </a:solidFill>
+                  <a:latin typeface="Arial" panose="020B0604020202020204" pitchFamily="34" charset="0"/>
+                  <a:cs typeface="Arial" panose="020B0604020202020204" pitchFamily="34" charset="0"/>
+                </a:endParaRPr>
+              </a:p>
+            </p:txBody>
+          </p:sp>
+          <p:sp>
+            <p:nvSpPr>
+              <p:cNvPr id="25" name="Rectangle: Rounded Corners 24">
+                <a:extLst>
+                  <a:ext uri="{FF2B5EF4-FFF2-40B4-BE49-F238E27FC236}">
+                    <a16:creationId xmlns:a16="http://schemas.microsoft.com/office/drawing/2014/main" id="{BA40B7CD-F08F-F549-C812-4DF65A1DA45F}"/>
+                  </a:ext>
+                </a:extLst>
+              </p:cNvPr>
+              <p:cNvSpPr/>
+              <p:nvPr/>
+            </p:nvSpPr>
+            <p:spPr>
+              <a:xfrm>
+                <a:off x="1999203" y="2042775"/>
+                <a:ext cx="793152" cy="395501"/>
+              </a:xfrm>
+              <a:prstGeom prst="roundRect">
+                <a:avLst/>
+              </a:prstGeom>
+              <a:solidFill>
+                <a:schemeClr val="accent1">
+                  <a:lumMod val="50000"/>
+                </a:schemeClr>
+              </a:solidFill>
+              <a:ln>
+                <a:solidFill>
+                  <a:schemeClr val="tx1">
+                    <a:lumMod val="95000"/>
+                    <a:lumOff val="5000"/>
+                  </a:schemeClr>
+                </a:solidFill>
+              </a:ln>
+            </p:spPr>
+            <p:style>
+              <a:lnRef idx="2">
+                <a:schemeClr val="accent1">
+                  <a:shade val="15000"/>
+                </a:schemeClr>
+              </a:lnRef>
+              <a:fillRef idx="1">
+                <a:schemeClr val="accent1"/>
+              </a:fillRef>
+              <a:effectRef idx="0">
+                <a:schemeClr val="accent1"/>
+              </a:effectRef>
+              <a:fontRef idx="minor">
+                <a:schemeClr val="lt1"/>
+              </a:fontRef>
+            </p:style>
+            <p:txBody>
+              <a:bodyPr rtlCol="0" anchor="ctr"/>
+              <a:lstStyle/>
+              <a:p>
+                <a:pPr algn="ctr"/>
+                <a:r>
+                  <a:rPr lang="en-US" sz="1000" dirty="0">
+                    <a:solidFill>
+                      <a:schemeClr val="bg1"/>
+                    </a:solidFill>
+                  </a:rPr>
+                  <a:t>Fibonacci Image</a:t>
+                </a:r>
+              </a:p>
+            </p:txBody>
+          </p:sp>
+          <p:sp>
+            <p:nvSpPr>
+              <p:cNvPr id="26" name="Rectangle: Rounded Corners 25">
+                <a:extLst>
+                  <a:ext uri="{FF2B5EF4-FFF2-40B4-BE49-F238E27FC236}">
+                    <a16:creationId xmlns:a16="http://schemas.microsoft.com/office/drawing/2014/main" id="{8CE0D5C3-0BDB-30D7-5403-9496F77039AE}"/>
+                  </a:ext>
+                </a:extLst>
+              </p:cNvPr>
+              <p:cNvSpPr/>
+              <p:nvPr/>
+            </p:nvSpPr>
+            <p:spPr>
+              <a:xfrm>
+                <a:off x="1536759" y="2567259"/>
+                <a:ext cx="793152" cy="395501"/>
+              </a:xfrm>
+              <a:prstGeom prst="roundRect">
+                <a:avLst/>
+              </a:prstGeom>
+              <a:solidFill>
+                <a:schemeClr val="accent1">
+                  <a:lumMod val="50000"/>
+                </a:schemeClr>
+              </a:solidFill>
+              <a:ln>
+                <a:solidFill>
+                  <a:schemeClr val="tx1">
+                    <a:lumMod val="95000"/>
+                    <a:lumOff val="5000"/>
+                  </a:schemeClr>
+                </a:solidFill>
+              </a:ln>
+            </p:spPr>
+            <p:style>
+              <a:lnRef idx="2">
+                <a:schemeClr val="accent1">
+                  <a:shade val="15000"/>
+                </a:schemeClr>
+              </a:lnRef>
+              <a:fillRef idx="1">
+                <a:schemeClr val="accent1"/>
+              </a:fillRef>
+              <a:effectRef idx="0">
+                <a:schemeClr val="accent1"/>
+              </a:effectRef>
+              <a:fontRef idx="minor">
+                <a:schemeClr val="lt1"/>
+              </a:fontRef>
+            </p:style>
+            <p:txBody>
+              <a:bodyPr rtlCol="0" anchor="ctr"/>
+              <a:lstStyle/>
+              <a:p>
+                <a:pPr algn="ctr"/>
+                <a:r>
+                  <a:rPr lang="en-US" sz="1000" dirty="0">
+                    <a:solidFill>
+                      <a:schemeClr val="bg1"/>
+                    </a:solidFill>
+                  </a:rPr>
+                  <a:t>Env Variables</a:t>
+                </a:r>
+              </a:p>
+            </p:txBody>
+          </p:sp>
+          <p:sp>
+            <p:nvSpPr>
+              <p:cNvPr id="27" name="Rectangle: Rounded Corners 26">
+                <a:extLst>
+                  <a:ext uri="{FF2B5EF4-FFF2-40B4-BE49-F238E27FC236}">
+                    <a16:creationId xmlns:a16="http://schemas.microsoft.com/office/drawing/2014/main" id="{2CE266A0-2D5B-E314-043D-5DB4314E4C6D}"/>
+                  </a:ext>
+                </a:extLst>
+              </p:cNvPr>
+              <p:cNvSpPr/>
+              <p:nvPr/>
+            </p:nvSpPr>
+            <p:spPr>
+              <a:xfrm>
+                <a:off x="2438243" y="2563536"/>
+                <a:ext cx="793152" cy="395501"/>
+              </a:xfrm>
+              <a:prstGeom prst="roundRect">
+                <a:avLst/>
+              </a:prstGeom>
+              <a:solidFill>
+                <a:schemeClr val="accent1">
+                  <a:lumMod val="50000"/>
+                </a:schemeClr>
+              </a:solidFill>
+              <a:ln>
+                <a:solidFill>
+                  <a:schemeClr val="tx1">
+                    <a:lumMod val="95000"/>
+                    <a:lumOff val="5000"/>
+                  </a:schemeClr>
+                </a:solidFill>
+              </a:ln>
+            </p:spPr>
+            <p:style>
+              <a:lnRef idx="2">
+                <a:schemeClr val="accent1">
+                  <a:shade val="15000"/>
+                </a:schemeClr>
+              </a:lnRef>
+              <a:fillRef idx="1">
+                <a:schemeClr val="accent1"/>
+              </a:fillRef>
+              <a:effectRef idx="0">
+                <a:schemeClr val="accent1"/>
+              </a:effectRef>
+              <a:fontRef idx="minor">
+                <a:schemeClr val="lt1"/>
+              </a:fontRef>
+            </p:style>
+            <p:txBody>
+              <a:bodyPr rtlCol="0" anchor="ctr"/>
+              <a:lstStyle/>
+              <a:p>
+                <a:pPr algn="ctr"/>
+                <a:r>
+                  <a:rPr lang="en-US" sz="1000" dirty="0">
+                    <a:solidFill>
+                      <a:schemeClr val="bg1"/>
+                    </a:solidFill>
+                  </a:rPr>
+                  <a:t>Host Mappings</a:t>
+                </a:r>
+              </a:p>
+            </p:txBody>
+          </p:sp>
+          <p:sp>
+            <p:nvSpPr>
+              <p:cNvPr id="28" name="Rectangle: Rounded Corners 27">
+                <a:extLst>
+                  <a:ext uri="{FF2B5EF4-FFF2-40B4-BE49-F238E27FC236}">
+                    <a16:creationId xmlns:a16="http://schemas.microsoft.com/office/drawing/2014/main" id="{B50F8EF5-2B21-54A6-A61F-B6B1963BB0E3}"/>
+                  </a:ext>
+                </a:extLst>
+              </p:cNvPr>
+              <p:cNvSpPr/>
+              <p:nvPr/>
+            </p:nvSpPr>
+            <p:spPr>
+              <a:xfrm>
+                <a:off x="2449945" y="3088019"/>
+                <a:ext cx="793152" cy="395501"/>
+              </a:xfrm>
+              <a:prstGeom prst="roundRect">
+                <a:avLst/>
+              </a:prstGeom>
+              <a:solidFill>
+                <a:schemeClr val="tx1"/>
+              </a:solidFill>
+              <a:ln>
+                <a:solidFill>
+                  <a:schemeClr val="tx1">
+                    <a:lumMod val="95000"/>
+                    <a:lumOff val="5000"/>
+                  </a:schemeClr>
+                </a:solidFill>
+              </a:ln>
+            </p:spPr>
+            <p:style>
+              <a:lnRef idx="2">
+                <a:schemeClr val="accent1">
+                  <a:shade val="15000"/>
+                </a:schemeClr>
+              </a:lnRef>
+              <a:fillRef idx="1">
+                <a:schemeClr val="accent1"/>
+              </a:fillRef>
+              <a:effectRef idx="0">
+                <a:schemeClr val="accent1"/>
+              </a:effectRef>
+              <a:fontRef idx="minor">
+                <a:schemeClr val="lt1"/>
+              </a:fontRef>
+            </p:style>
+            <p:txBody>
+              <a:bodyPr rtlCol="0" anchor="ctr"/>
+              <a:lstStyle/>
+              <a:p>
+                <a:pPr algn="ctr"/>
+                <a:r>
+                  <a:rPr lang="en-US" sz="1000" dirty="0">
+                    <a:solidFill>
+                      <a:schemeClr val="bg1"/>
+                    </a:solidFill>
+                  </a:rPr>
+                  <a:t>TLS Secrets</a:t>
+                </a:r>
+              </a:p>
+            </p:txBody>
+          </p:sp>
+          <p:sp>
+            <p:nvSpPr>
+              <p:cNvPr id="29" name="Rectangle: Rounded Corners 28">
+                <a:extLst>
+                  <a:ext uri="{FF2B5EF4-FFF2-40B4-BE49-F238E27FC236}">
+                    <a16:creationId xmlns:a16="http://schemas.microsoft.com/office/drawing/2014/main" id="{DBAA6B31-201E-910D-B13A-67A007AB4BD8}"/>
+                  </a:ext>
+                </a:extLst>
+              </p:cNvPr>
+              <p:cNvSpPr/>
+              <p:nvPr/>
+            </p:nvSpPr>
+            <p:spPr>
+              <a:xfrm>
+                <a:off x="1536759" y="3088020"/>
+                <a:ext cx="793152" cy="395501"/>
+              </a:xfrm>
+              <a:prstGeom prst="roundRect">
+                <a:avLst/>
+              </a:prstGeom>
+              <a:solidFill>
+                <a:srgbClr val="A02B93"/>
+              </a:solidFill>
+              <a:ln>
+                <a:solidFill>
+                  <a:schemeClr val="tx1">
+                    <a:lumMod val="95000"/>
+                    <a:lumOff val="5000"/>
+                  </a:schemeClr>
+                </a:solidFill>
+              </a:ln>
+            </p:spPr>
+            <p:style>
+              <a:lnRef idx="2">
+                <a:schemeClr val="accent1">
+                  <a:shade val="15000"/>
+                </a:schemeClr>
+              </a:lnRef>
+              <a:fillRef idx="1">
+                <a:schemeClr val="accent1"/>
+              </a:fillRef>
+              <a:effectRef idx="0">
+                <a:schemeClr val="accent1"/>
+              </a:effectRef>
+              <a:fontRef idx="minor">
+                <a:schemeClr val="lt1"/>
+              </a:fontRef>
+            </p:style>
+            <p:txBody>
+              <a:bodyPr rtlCol="0" anchor="ctr"/>
+              <a:lstStyle/>
+              <a:p>
+                <a:pPr algn="ctr"/>
+                <a:r>
+                  <a:rPr lang="en-US" sz="1000" dirty="0">
+                    <a:solidFill>
+                      <a:schemeClr val="bg1"/>
+                    </a:solidFill>
+                  </a:rPr>
+                  <a:t>Network Interface</a:t>
+                </a:r>
+              </a:p>
+            </p:txBody>
+          </p:sp>
+        </p:grpSp>
+        <p:sp>
+          <p:nvSpPr>
+            <p:cNvPr id="33" name="Rectangle: Rounded Corners 32">
+              <a:extLst>
+                <a:ext uri="{FF2B5EF4-FFF2-40B4-BE49-F238E27FC236}">
+                  <a16:creationId xmlns:a16="http://schemas.microsoft.com/office/drawing/2014/main" id="{96AECA4E-304C-C478-F18D-2D2C46303177}"/>
+                </a:ext>
+              </a:extLst>
+            </p:cNvPr>
+            <p:cNvSpPr/>
+            <p:nvPr/>
+          </p:nvSpPr>
+          <p:spPr>
+            <a:xfrm>
+              <a:off x="6263591" y="4347277"/>
+              <a:ext cx="4141925" cy="1165370"/>
+            </a:xfrm>
+            <a:prstGeom prst="roundRect">
+              <a:avLst/>
+            </a:prstGeom>
+            <a:solidFill>
+              <a:schemeClr val="tx1"/>
+            </a:solidFill>
+          </p:spPr>
+          <p:style>
+            <a:lnRef idx="2">
+              <a:schemeClr val="accent5">
+                <a:shade val="15000"/>
+              </a:schemeClr>
+            </a:lnRef>
+            <a:fillRef idx="1">
+              <a:schemeClr val="accent5"/>
+            </a:fillRef>
+            <a:effectRef idx="0">
+              <a:schemeClr val="accent5"/>
+            </a:effectRef>
+            <a:fontRef idx="minor">
+              <a:schemeClr val="lt1"/>
+            </a:fontRef>
+          </p:style>
+          <p:txBody>
+            <a:bodyPr rtlCol="0" anchor="ctr"/>
+            <a:lstStyle/>
+            <a:p>
+              <a:pPr algn="ctr"/>
+              <a:r>
+                <a:rPr lang="en-US" sz="3200" dirty="0"/>
+                <a:t>TLS Secret Pool</a:t>
+              </a:r>
+            </a:p>
+          </p:txBody>
+        </p:sp>
+        <p:sp>
+          <p:nvSpPr>
+            <p:cNvPr id="34" name="Rectangle: Rounded Corners 33">
+              <a:extLst>
+                <a:ext uri="{FF2B5EF4-FFF2-40B4-BE49-F238E27FC236}">
+                  <a16:creationId xmlns:a16="http://schemas.microsoft.com/office/drawing/2014/main" id="{0A7B1C31-26A7-E505-ADA7-4CD68D1681F9}"/>
+                </a:ext>
+              </a:extLst>
+            </p:cNvPr>
+            <p:cNvSpPr/>
+            <p:nvPr/>
+          </p:nvSpPr>
+          <p:spPr>
+            <a:xfrm>
+              <a:off x="1849151" y="4361045"/>
+              <a:ext cx="4141925" cy="1165370"/>
+            </a:xfrm>
+            <a:prstGeom prst="roundRect">
+              <a:avLst/>
+            </a:prstGeom>
+            <a:solidFill>
+              <a:srgbClr val="A02B93"/>
+            </a:solidFill>
+          </p:spPr>
+          <p:style>
+            <a:lnRef idx="2">
+              <a:schemeClr val="accent5">
+                <a:shade val="15000"/>
+              </a:schemeClr>
+            </a:lnRef>
+            <a:fillRef idx="1">
+              <a:schemeClr val="accent5"/>
+            </a:fillRef>
+            <a:effectRef idx="0">
+              <a:schemeClr val="accent5"/>
+            </a:effectRef>
+            <a:fontRef idx="minor">
+              <a:schemeClr val="lt1"/>
+            </a:fontRef>
+          </p:style>
+          <p:txBody>
+            <a:bodyPr rtlCol="0" anchor="ctr"/>
+            <a:lstStyle/>
+            <a:p>
+              <a:pPr algn="ctr"/>
+              <a:r>
+                <a:rPr lang="en-US" sz="3200" dirty="0"/>
+                <a:t>Network Interface</a:t>
+              </a:r>
+            </a:p>
+          </p:txBody>
+        </p:sp>
+        <p:cxnSp>
+          <p:nvCxnSpPr>
+            <p:cNvPr id="36" name="Connector: Elbow 35">
+              <a:extLst>
+                <a:ext uri="{FF2B5EF4-FFF2-40B4-BE49-F238E27FC236}">
+                  <a16:creationId xmlns:a16="http://schemas.microsoft.com/office/drawing/2014/main" id="{B56E6BCA-4E84-FCBC-B25F-8A795DB38F3A}"/>
+                </a:ext>
+              </a:extLst>
+            </p:cNvPr>
+            <p:cNvCxnSpPr>
+              <a:stCxn id="34" idx="0"/>
+              <a:endCxn id="7" idx="2"/>
+            </p:cNvCxnSpPr>
+            <p:nvPr/>
+          </p:nvCxnSpPr>
+          <p:spPr>
+            <a:xfrm rot="16200000" flipV="1">
+              <a:off x="2591838" y="3032769"/>
+              <a:ext cx="1091792" cy="1564760"/>
+            </a:xfrm>
+            <a:prstGeom prst="bentConnector3">
+              <a:avLst/>
+            </a:prstGeom>
+            <a:ln w="76200">
+              <a:solidFill>
+                <a:srgbClr val="A02B93"/>
+              </a:solidFill>
+              <a:headEnd type="triangle" w="med" len="med"/>
+              <a:tailEnd type="triangle" w="med" len="med"/>
+            </a:ln>
+          </p:spPr>
+          <p:style>
+            <a:lnRef idx="2">
+              <a:schemeClr val="accent5"/>
+            </a:lnRef>
+            <a:fillRef idx="0">
+              <a:schemeClr val="accent5"/>
+            </a:fillRef>
+            <a:effectRef idx="1">
+              <a:schemeClr val="accent5"/>
+            </a:effectRef>
+            <a:fontRef idx="minor">
+              <a:schemeClr val="tx1"/>
+            </a:fontRef>
+          </p:style>
+        </p:cxnSp>
+        <p:cxnSp>
+          <p:nvCxnSpPr>
+            <p:cNvPr id="38" name="Connector: Elbow 37">
+              <a:extLst>
+                <a:ext uri="{FF2B5EF4-FFF2-40B4-BE49-F238E27FC236}">
+                  <a16:creationId xmlns:a16="http://schemas.microsoft.com/office/drawing/2014/main" id="{BF2CA08E-9FF6-0FD7-6A31-3A2820536690}"/>
+                </a:ext>
+              </a:extLst>
+            </p:cNvPr>
+            <p:cNvCxnSpPr>
+              <a:cxnSpLocks/>
+              <a:stCxn id="34" idx="0"/>
+              <a:endCxn id="15" idx="2"/>
+            </p:cNvCxnSpPr>
+            <p:nvPr/>
+          </p:nvCxnSpPr>
+          <p:spPr>
+            <a:xfrm rot="5400000" flipH="1" flipV="1">
+              <a:off x="3698242" y="3498009"/>
+              <a:ext cx="1084908" cy="641165"/>
+            </a:xfrm>
+            <a:prstGeom prst="bentConnector3">
+              <a:avLst>
+                <a:gd name="adj1" fmla="val 50000"/>
+              </a:avLst>
+            </a:prstGeom>
+            <a:ln w="76200">
+              <a:solidFill>
+                <a:srgbClr val="A02B93"/>
+              </a:solidFill>
+              <a:headEnd type="triangle" w="med" len="med"/>
+              <a:tailEnd type="triangle" w="med" len="med"/>
+            </a:ln>
+          </p:spPr>
+          <p:style>
+            <a:lnRef idx="2">
+              <a:schemeClr val="accent5"/>
+            </a:lnRef>
+            <a:fillRef idx="0">
+              <a:schemeClr val="accent5"/>
+            </a:fillRef>
+            <a:effectRef idx="1">
+              <a:schemeClr val="accent5"/>
+            </a:effectRef>
+            <a:fontRef idx="minor">
+              <a:schemeClr val="tx1"/>
+            </a:fontRef>
+          </p:style>
+        </p:cxnSp>
+        <p:cxnSp>
+          <p:nvCxnSpPr>
+            <p:cNvPr id="41" name="Connector: Elbow 40">
+              <a:extLst>
+                <a:ext uri="{FF2B5EF4-FFF2-40B4-BE49-F238E27FC236}">
+                  <a16:creationId xmlns:a16="http://schemas.microsoft.com/office/drawing/2014/main" id="{5FD161E1-A61D-C01C-FDDA-BE896D6AA62B}"/>
+                </a:ext>
+              </a:extLst>
+            </p:cNvPr>
+            <p:cNvCxnSpPr>
+              <a:cxnSpLocks/>
+              <a:stCxn id="34" idx="0"/>
+              <a:endCxn id="22" idx="2"/>
+            </p:cNvCxnSpPr>
+            <p:nvPr/>
+          </p:nvCxnSpPr>
+          <p:spPr>
+            <a:xfrm rot="5400000" flipH="1" flipV="1">
+              <a:off x="4805294" y="2397841"/>
+              <a:ext cx="1078024" cy="2848385"/>
+            </a:xfrm>
+            <a:prstGeom prst="bentConnector3">
+              <a:avLst>
+                <a:gd name="adj1" fmla="val 50000"/>
+              </a:avLst>
+            </a:prstGeom>
+            <a:ln w="76200">
+              <a:solidFill>
+                <a:srgbClr val="A02B93"/>
+              </a:solidFill>
+              <a:headEnd type="triangle" w="med" len="med"/>
+              <a:tailEnd type="triangle" w="med" len="med"/>
+            </a:ln>
+          </p:spPr>
+          <p:style>
+            <a:lnRef idx="2">
+              <a:schemeClr val="accent5"/>
+            </a:lnRef>
+            <a:fillRef idx="0">
+              <a:schemeClr val="accent5"/>
+            </a:fillRef>
+            <a:effectRef idx="1">
+              <a:schemeClr val="accent5"/>
+            </a:effectRef>
+            <a:fontRef idx="minor">
+              <a:schemeClr val="tx1"/>
+            </a:fontRef>
+          </p:style>
+        </p:cxnSp>
+        <p:cxnSp>
+          <p:nvCxnSpPr>
+            <p:cNvPr id="44" name="Connector: Elbow 43">
+              <a:extLst>
+                <a:ext uri="{FF2B5EF4-FFF2-40B4-BE49-F238E27FC236}">
+                  <a16:creationId xmlns:a16="http://schemas.microsoft.com/office/drawing/2014/main" id="{43AE7DB9-F58B-294D-1C4E-0B6CFAE89F66}"/>
+                </a:ext>
+              </a:extLst>
+            </p:cNvPr>
+            <p:cNvCxnSpPr>
+              <a:cxnSpLocks/>
+              <a:stCxn id="34" idx="0"/>
+              <a:endCxn id="29" idx="2"/>
+            </p:cNvCxnSpPr>
+            <p:nvPr/>
+          </p:nvCxnSpPr>
+          <p:spPr>
+            <a:xfrm rot="5400000" flipH="1" flipV="1">
+              <a:off x="5902020" y="1287347"/>
+              <a:ext cx="1091792" cy="5055605"/>
+            </a:xfrm>
+            <a:prstGeom prst="bentConnector3">
+              <a:avLst>
+                <a:gd name="adj1" fmla="val 50000"/>
+              </a:avLst>
+            </a:prstGeom>
+            <a:ln w="76200">
+              <a:solidFill>
+                <a:srgbClr val="A02B93"/>
+              </a:solidFill>
+              <a:headEnd type="triangle" w="med" len="med"/>
+              <a:tailEnd type="triangle" w="med" len="med"/>
+            </a:ln>
+          </p:spPr>
+          <p:style>
+            <a:lnRef idx="2">
+              <a:schemeClr val="accent5"/>
+            </a:lnRef>
+            <a:fillRef idx="0">
+              <a:schemeClr val="accent5"/>
+            </a:fillRef>
+            <a:effectRef idx="1">
+              <a:schemeClr val="accent5"/>
+            </a:effectRef>
+            <a:fontRef idx="minor">
+              <a:schemeClr val="tx1"/>
+            </a:fontRef>
+          </p:style>
+        </p:cxnSp>
+        <p:cxnSp>
+          <p:nvCxnSpPr>
+            <p:cNvPr id="47" name="Connector: Elbow 46">
+              <a:extLst>
+                <a:ext uri="{FF2B5EF4-FFF2-40B4-BE49-F238E27FC236}">
+                  <a16:creationId xmlns:a16="http://schemas.microsoft.com/office/drawing/2014/main" id="{8DC32AE8-0BD5-7A11-B3E9-6B5A35384BA5}"/>
+                </a:ext>
+              </a:extLst>
+            </p:cNvPr>
+            <p:cNvCxnSpPr>
+              <a:cxnSpLocks/>
+              <a:stCxn id="33" idx="0"/>
+              <a:endCxn id="28" idx="2"/>
+            </p:cNvCxnSpPr>
+            <p:nvPr/>
+          </p:nvCxnSpPr>
+          <p:spPr>
+            <a:xfrm rot="5400000" flipH="1" flipV="1">
+              <a:off x="8572717" y="3031090"/>
+              <a:ext cx="1078025" cy="1554351"/>
+            </a:xfrm>
+            <a:prstGeom prst="bentConnector3">
+              <a:avLst>
+                <a:gd name="adj1" fmla="val 50000"/>
+              </a:avLst>
+            </a:prstGeom>
+            <a:ln w="76200">
+              <a:solidFill>
+                <a:schemeClr val="tx1"/>
+              </a:solidFill>
+              <a:prstDash val="sysDot"/>
+              <a:headEnd type="triangle" w="med" len="med"/>
+              <a:tailEnd type="triangle" w="med" len="med"/>
+            </a:ln>
+          </p:spPr>
+          <p:style>
+            <a:lnRef idx="2">
+              <a:schemeClr val="accent5"/>
+            </a:lnRef>
+            <a:fillRef idx="0">
+              <a:schemeClr val="accent5"/>
+            </a:fillRef>
+            <a:effectRef idx="1">
+              <a:schemeClr val="accent5"/>
+            </a:effectRef>
+            <a:fontRef idx="minor">
+              <a:schemeClr val="tx1"/>
+            </a:fontRef>
+          </p:style>
+        </p:cxnSp>
+        <p:cxnSp>
+          <p:nvCxnSpPr>
+            <p:cNvPr id="50" name="Connector: Elbow 49">
+              <a:extLst>
+                <a:ext uri="{FF2B5EF4-FFF2-40B4-BE49-F238E27FC236}">
+                  <a16:creationId xmlns:a16="http://schemas.microsoft.com/office/drawing/2014/main" id="{9BD08930-FCB7-AFE6-789A-2DFAE7684EE3}"/>
+                </a:ext>
+              </a:extLst>
+            </p:cNvPr>
+            <p:cNvCxnSpPr>
+              <a:cxnSpLocks/>
+              <a:stCxn id="33" idx="0"/>
+              <a:endCxn id="21" idx="2"/>
+            </p:cNvCxnSpPr>
+            <p:nvPr/>
+          </p:nvCxnSpPr>
+          <p:spPr>
+            <a:xfrm rot="16200000" flipV="1">
+              <a:off x="7475992" y="3488714"/>
+              <a:ext cx="1064257" cy="652869"/>
+            </a:xfrm>
+            <a:prstGeom prst="bentConnector3">
+              <a:avLst>
+                <a:gd name="adj1" fmla="val 50000"/>
+              </a:avLst>
+            </a:prstGeom>
+            <a:ln w="76200">
+              <a:solidFill>
+                <a:schemeClr val="tx1"/>
+              </a:solidFill>
+              <a:prstDash val="sysDot"/>
+              <a:headEnd type="triangle" w="med" len="med"/>
+              <a:tailEnd type="triangle" w="med" len="med"/>
+            </a:ln>
+          </p:spPr>
+          <p:style>
+            <a:lnRef idx="2">
+              <a:schemeClr val="accent5"/>
+            </a:lnRef>
+            <a:fillRef idx="0">
+              <a:schemeClr val="accent5"/>
+            </a:fillRef>
+            <a:effectRef idx="1">
+              <a:schemeClr val="accent5"/>
+            </a:effectRef>
+            <a:fontRef idx="minor">
+              <a:schemeClr val="tx1"/>
+            </a:fontRef>
+          </p:style>
+        </p:cxnSp>
+        <p:cxnSp>
+          <p:nvCxnSpPr>
+            <p:cNvPr id="53" name="Connector: Elbow 52">
+              <a:extLst>
+                <a:ext uri="{FF2B5EF4-FFF2-40B4-BE49-F238E27FC236}">
+                  <a16:creationId xmlns:a16="http://schemas.microsoft.com/office/drawing/2014/main" id="{7DE2C7AF-A383-C39A-0C0E-C3230138E7F0}"/>
+                </a:ext>
+              </a:extLst>
+            </p:cNvPr>
+            <p:cNvCxnSpPr>
+              <a:cxnSpLocks/>
+              <a:stCxn id="33" idx="0"/>
+              <a:endCxn id="14" idx="2"/>
+            </p:cNvCxnSpPr>
+            <p:nvPr/>
+          </p:nvCxnSpPr>
+          <p:spPr>
+            <a:xfrm rot="16200000" flipV="1">
+              <a:off x="6368940" y="2381662"/>
+              <a:ext cx="1071141" cy="2860089"/>
+            </a:xfrm>
+            <a:prstGeom prst="bentConnector3">
+              <a:avLst>
+                <a:gd name="adj1" fmla="val 50000"/>
+              </a:avLst>
+            </a:prstGeom>
+            <a:ln w="76200">
+              <a:solidFill>
+                <a:schemeClr val="tx1"/>
+              </a:solidFill>
+              <a:prstDash val="sysDot"/>
+              <a:headEnd type="triangle" w="med" len="med"/>
+              <a:tailEnd type="triangle" w="med" len="med"/>
+            </a:ln>
+          </p:spPr>
+          <p:style>
+            <a:lnRef idx="2">
+              <a:schemeClr val="accent5"/>
+            </a:lnRef>
+            <a:fillRef idx="0">
+              <a:schemeClr val="accent5"/>
+            </a:fillRef>
+            <a:effectRef idx="1">
+              <a:schemeClr val="accent5"/>
+            </a:effectRef>
+            <a:fontRef idx="minor">
+              <a:schemeClr val="tx1"/>
+            </a:fontRef>
+          </p:style>
+        </p:cxnSp>
+        <p:cxnSp>
+          <p:nvCxnSpPr>
+            <p:cNvPr id="56" name="Connector: Elbow 55">
+              <a:extLst>
+                <a:ext uri="{FF2B5EF4-FFF2-40B4-BE49-F238E27FC236}">
+                  <a16:creationId xmlns:a16="http://schemas.microsoft.com/office/drawing/2014/main" id="{D632D3FA-4E1A-54DE-7A36-998558A21AC4}"/>
+                </a:ext>
+              </a:extLst>
+            </p:cNvPr>
+            <p:cNvCxnSpPr>
+              <a:cxnSpLocks/>
+              <a:stCxn id="33" idx="0"/>
+              <a:endCxn id="6" idx="2"/>
+            </p:cNvCxnSpPr>
+            <p:nvPr/>
+          </p:nvCxnSpPr>
+          <p:spPr>
+            <a:xfrm rot="16200000" flipV="1">
+              <a:off x="5262535" y="1275258"/>
+              <a:ext cx="1078025" cy="5066014"/>
+            </a:xfrm>
+            <a:prstGeom prst="bentConnector3">
+              <a:avLst>
+                <a:gd name="adj1" fmla="val 50000"/>
+              </a:avLst>
+            </a:prstGeom>
+            <a:ln w="76200">
+              <a:solidFill>
+                <a:schemeClr val="tx1"/>
+              </a:solidFill>
+              <a:prstDash val="sysDot"/>
+              <a:headEnd type="triangle" w="med" len="med"/>
+              <a:tailEnd type="triangle" w="med" len="med"/>
+            </a:ln>
+          </p:spPr>
+          <p:style>
+            <a:lnRef idx="2">
+              <a:schemeClr val="accent5"/>
+            </a:lnRef>
+            <a:fillRef idx="0">
+              <a:schemeClr val="accent5"/>
+            </a:fillRef>
+            <a:effectRef idx="1">
+              <a:schemeClr val="accent5"/>
+            </a:effectRef>
+            <a:fontRef idx="minor">
+              <a:schemeClr val="tx1"/>
+            </a:fontRef>
+          </p:style>
+        </p:cxnSp>
+      </p:grpSp>
+      <p:sp>
+        <p:nvSpPr>
+          <p:cNvPr id="63" name="Rectangle: Rounded Corners 62">
+            <a:extLst>
+              <a:ext uri="{FF2B5EF4-FFF2-40B4-BE49-F238E27FC236}">
+                <a16:creationId xmlns:a16="http://schemas.microsoft.com/office/drawing/2014/main" id="{A020AB24-A10C-9BCA-A352-4AC4ACB8C556}"/>
+              </a:ext>
+            </a:extLst>
+          </p:cNvPr>
+          <p:cNvSpPr/>
+          <p:nvPr/>
+        </p:nvSpPr>
+        <p:spPr>
+          <a:xfrm>
+            <a:off x="2290419" y="3134719"/>
+            <a:ext cx="793152" cy="395501"/>
+          </a:xfrm>
+          <a:prstGeom prst="roundRect">
+            <a:avLst/>
+          </a:prstGeom>
+          <a:solidFill>
+            <a:srgbClr val="A02B93"/>
+          </a:solidFill>
+          <a:ln>
+            <a:solidFill>
+              <a:schemeClr val="tx1">
+                <a:lumMod val="95000"/>
+                <a:lumOff val="5000"/>
+              </a:schemeClr>
+            </a:solidFill>
+          </a:ln>
+        </p:spPr>
+        <p:style>
+          <a:lnRef idx="2">
+            <a:schemeClr val="accent1">
+              <a:shade val="15000"/>
+            </a:schemeClr>
+          </a:lnRef>
+          <a:fillRef idx="1">
+            <a:schemeClr val="accent1"/>
+          </a:fillRef>
+          <a:effectRef idx="0">
+            <a:schemeClr val="accent1"/>
+          </a:effectRef>
+          <a:fontRef idx="minor">
+            <a:schemeClr val="lt1"/>
+          </a:fontRef>
+        </p:style>
+        <p:txBody>
+          <a:bodyPr rtlCol="0" anchor="ctr"/>
+          <a:lstStyle/>
+          <a:p>
+            <a:pPr algn="ctr"/>
+            <a:r>
+              <a:rPr lang="en-US" sz="1000" dirty="0">
+                <a:solidFill>
+                  <a:schemeClr val="bg1"/>
+                </a:solidFill>
+              </a:rPr>
+              <a:t>Port Binding</a:t>
+            </a:r>
+          </a:p>
+        </p:txBody>
+      </p:sp>
+      <p:pic>
+        <p:nvPicPr>
+          <p:cNvPr id="65" name="Graphic 64" descr="User with solid fill">
+            <a:extLst>
+              <a:ext uri="{FF2B5EF4-FFF2-40B4-BE49-F238E27FC236}">
+                <a16:creationId xmlns:a16="http://schemas.microsoft.com/office/drawing/2014/main" id="{30F184E5-D54C-B9DE-AE30-11EAD8CB5BCD}"/>
+              </a:ext>
+            </a:extLst>
+          </p:cNvPr>
+          <p:cNvPicPr>
+            <a:picLocks noChangeAspect="1"/>
+          </p:cNvPicPr>
+          <p:nvPr/>
+        </p:nvPicPr>
+        <p:blipFill>
+          <a:blip r:embed="rId2">
+            <a:extLst>
+              <a:ext uri="{96DAC541-7B7A-43D3-8B79-37D633B846F1}">
+                <asvg:svgBlip xmlns:asvg="http://schemas.microsoft.com/office/drawing/2016/SVG/main" r:embed="rId3"/>
+              </a:ext>
+            </a:extLst>
+          </a:blip>
+          <a:srcRect l="14735" t="12485" r="14357" b="12791"/>
+          <a:stretch>
+            <a:fillRect/>
+          </a:stretch>
+        </p:blipFill>
+        <p:spPr>
+          <a:xfrm>
+            <a:off x="339865" y="2697244"/>
+            <a:ext cx="1205577" cy="1270449"/>
+          </a:xfrm>
+          <a:prstGeom prst="rect">
+            <a:avLst/>
+          </a:prstGeom>
+        </p:spPr>
+      </p:pic>
+      <p:cxnSp>
+        <p:nvCxnSpPr>
+          <p:cNvPr id="67" name="Straight Arrow Connector 66">
+            <a:extLst>
+              <a:ext uri="{FF2B5EF4-FFF2-40B4-BE49-F238E27FC236}">
+                <a16:creationId xmlns:a16="http://schemas.microsoft.com/office/drawing/2014/main" id="{63C5A5F3-9C0F-E874-06F5-89BB66F09AA9}"/>
+              </a:ext>
+            </a:extLst>
+          </p:cNvPr>
+          <p:cNvCxnSpPr>
+            <a:cxnSpLocks/>
+            <a:endCxn id="63" idx="1"/>
+          </p:cNvCxnSpPr>
+          <p:nvPr/>
+        </p:nvCxnSpPr>
+        <p:spPr>
+          <a:xfrm>
+            <a:off x="1545442" y="3332468"/>
+            <a:ext cx="744977" cy="2"/>
+          </a:xfrm>
+          <a:prstGeom prst="straightConnector1">
+            <a:avLst/>
+          </a:prstGeom>
+          <a:ln w="76200">
+            <a:headEnd type="triangle" w="med" len="med"/>
+            <a:tailEnd type="triangle" w="med" len="med"/>
+          </a:ln>
+        </p:spPr>
+        <p:style>
+          <a:lnRef idx="2">
+            <a:schemeClr val="accent5"/>
+          </a:lnRef>
+          <a:fillRef idx="0">
+            <a:schemeClr val="accent5"/>
+          </a:fillRef>
+          <a:effectRef idx="1">
+            <a:schemeClr val="accent5"/>
+          </a:effectRef>
+          <a:fontRef idx="minor">
+            <a:schemeClr val="tx1"/>
+          </a:fontRef>
+        </p:style>
+      </p:cxnSp>
+    </p:spTree>
+    <p:extLst>
+      <p:ext uri="{BB962C8B-B14F-4D97-AF65-F5344CB8AC3E}">
+        <p14:creationId xmlns:p14="http://schemas.microsoft.com/office/powerpoint/2010/main" val="3081710981"/>
       </p:ext>
     </p:extLst>
   </p:cSld>

</xml_diff>

<commit_message>
Created README for use case three. Added two new images.
</commit_message>
<xml_diff>
--- a/extra_materials/Run Fibonacci Graphs.pptx
+++ b/extra_materials/Run Fibonacci Graphs.pptx
@@ -9,6 +9,8 @@
     <p:sldId id="257" r:id="rId3"/>
     <p:sldId id="259" r:id="rId4"/>
     <p:sldId id="258" r:id="rId5"/>
+    <p:sldId id="260" r:id="rId6"/>
+    <p:sldId id="261" r:id="rId7"/>
   </p:sldIdLst>
   <p:sldSz cx="12192000" cy="6858000"/>
   <p:notesSz cx="6858000" cy="9144000"/>
@@ -262,7 +264,7 @@
           <a:p>
             <a:fld id="{62C98A4D-3422-4F51-9ECD-C0D7C885462A}" type="datetimeFigureOut">
               <a:rPr lang="en-US" smtClean="0"/>
-              <a:t>9/29/2025</a:t>
+              <a:t>10/1/2025</a:t>
             </a:fld>
             <a:endParaRPr lang="en-US"/>
           </a:p>
@@ -460,7 +462,7 @@
           <a:p>
             <a:fld id="{62C98A4D-3422-4F51-9ECD-C0D7C885462A}" type="datetimeFigureOut">
               <a:rPr lang="en-US" smtClean="0"/>
-              <a:t>9/29/2025</a:t>
+              <a:t>10/1/2025</a:t>
             </a:fld>
             <a:endParaRPr lang="en-US"/>
           </a:p>
@@ -668,7 +670,7 @@
           <a:p>
             <a:fld id="{62C98A4D-3422-4F51-9ECD-C0D7C885462A}" type="datetimeFigureOut">
               <a:rPr lang="en-US" smtClean="0"/>
-              <a:t>9/29/2025</a:t>
+              <a:t>10/1/2025</a:t>
             </a:fld>
             <a:endParaRPr lang="en-US"/>
           </a:p>
@@ -866,7 +868,7 @@
           <a:p>
             <a:fld id="{62C98A4D-3422-4F51-9ECD-C0D7C885462A}" type="datetimeFigureOut">
               <a:rPr lang="en-US" smtClean="0"/>
-              <a:t>9/29/2025</a:t>
+              <a:t>10/1/2025</a:t>
             </a:fld>
             <a:endParaRPr lang="en-US"/>
           </a:p>
@@ -1141,7 +1143,7 @@
           <a:p>
             <a:fld id="{62C98A4D-3422-4F51-9ECD-C0D7C885462A}" type="datetimeFigureOut">
               <a:rPr lang="en-US" smtClean="0"/>
-              <a:t>9/29/2025</a:t>
+              <a:t>10/1/2025</a:t>
             </a:fld>
             <a:endParaRPr lang="en-US"/>
           </a:p>
@@ -1406,7 +1408,7 @@
           <a:p>
             <a:fld id="{62C98A4D-3422-4F51-9ECD-C0D7C885462A}" type="datetimeFigureOut">
               <a:rPr lang="en-US" smtClean="0"/>
-              <a:t>9/29/2025</a:t>
+              <a:t>10/1/2025</a:t>
             </a:fld>
             <a:endParaRPr lang="en-US"/>
           </a:p>
@@ -1818,7 +1820,7 @@
           <a:p>
             <a:fld id="{62C98A4D-3422-4F51-9ECD-C0D7C885462A}" type="datetimeFigureOut">
               <a:rPr lang="en-US" smtClean="0"/>
-              <a:t>9/29/2025</a:t>
+              <a:t>10/1/2025</a:t>
             </a:fld>
             <a:endParaRPr lang="en-US"/>
           </a:p>
@@ -1959,7 +1961,7 @@
           <a:p>
             <a:fld id="{62C98A4D-3422-4F51-9ECD-C0D7C885462A}" type="datetimeFigureOut">
               <a:rPr lang="en-US" smtClean="0"/>
-              <a:t>9/29/2025</a:t>
+              <a:t>10/1/2025</a:t>
             </a:fld>
             <a:endParaRPr lang="en-US"/>
           </a:p>
@@ -2072,7 +2074,7 @@
           <a:p>
             <a:fld id="{62C98A4D-3422-4F51-9ECD-C0D7C885462A}" type="datetimeFigureOut">
               <a:rPr lang="en-US" smtClean="0"/>
-              <a:t>9/29/2025</a:t>
+              <a:t>10/1/2025</a:t>
             </a:fld>
             <a:endParaRPr lang="en-US"/>
           </a:p>
@@ -2383,7 +2385,7 @@
           <a:p>
             <a:fld id="{62C98A4D-3422-4F51-9ECD-C0D7C885462A}" type="datetimeFigureOut">
               <a:rPr lang="en-US" smtClean="0"/>
-              <a:t>9/29/2025</a:t>
+              <a:t>10/1/2025</a:t>
             </a:fld>
             <a:endParaRPr lang="en-US"/>
           </a:p>
@@ -2671,7 +2673,7 @@
           <a:p>
             <a:fld id="{62C98A4D-3422-4F51-9ECD-C0D7C885462A}" type="datetimeFigureOut">
               <a:rPr lang="en-US" smtClean="0"/>
-              <a:t>9/29/2025</a:t>
+              <a:t>10/1/2025</a:t>
             </a:fld>
             <a:endParaRPr lang="en-US"/>
           </a:p>
@@ -2912,7 +2914,7 @@
           <a:p>
             <a:fld id="{62C98A4D-3422-4F51-9ECD-C0D7C885462A}" type="datetimeFigureOut">
               <a:rPr lang="en-US" smtClean="0"/>
-              <a:t>9/29/2025</a:t>
+              <a:t>10/1/2025</a:t>
             </a:fld>
             <a:endParaRPr lang="en-US"/>
           </a:p>
@@ -9550,6 +9552,3784 @@
     <p:extLst>
       <p:ext uri="{BB962C8B-B14F-4D97-AF65-F5344CB8AC3E}">
         <p14:creationId xmlns:p14="http://schemas.microsoft.com/office/powerpoint/2010/main" val="3081710981"/>
+      </p:ext>
+    </p:extLst>
+  </p:cSld>
+  <p:clrMapOvr>
+    <a:masterClrMapping/>
+  </p:clrMapOvr>
+</p:sld>
+</file>
+
+<file path=ppt/slides/slide5.xml><?xml version="1.0" encoding="utf-8"?>
+<p:sld xmlns:a="http://schemas.openxmlformats.org/drawingml/2006/main" xmlns:r="http://schemas.openxmlformats.org/officeDocument/2006/relationships" xmlns:p="http://schemas.openxmlformats.org/presentationml/2006/main">
+  <p:cSld>
+    <p:spTree>
+      <p:nvGrpSpPr>
+        <p:cNvPr id="1" name=""/>
+        <p:cNvGrpSpPr/>
+        <p:nvPr/>
+      </p:nvGrpSpPr>
+      <p:grpSpPr>
+        <a:xfrm>
+          <a:off x="0" y="0"/>
+          <a:ext cx="0" cy="0"/>
+          <a:chOff x="0" y="0"/>
+          <a:chExt cx="0" cy="0"/>
+        </a:xfrm>
+      </p:grpSpPr>
+      <p:grpSp>
+        <p:nvGrpSpPr>
+          <p:cNvPr id="84" name="Group 83">
+            <a:extLst>
+              <a:ext uri="{FF2B5EF4-FFF2-40B4-BE49-F238E27FC236}">
+                <a16:creationId xmlns:a16="http://schemas.microsoft.com/office/drawing/2014/main" id="{3C93FD21-69DD-1C1B-A86D-E34AA28823D1}"/>
+              </a:ext>
+            </a:extLst>
+          </p:cNvPr>
+          <p:cNvGrpSpPr/>
+          <p:nvPr/>
+        </p:nvGrpSpPr>
+        <p:grpSpPr>
+          <a:xfrm>
+            <a:off x="334471" y="422808"/>
+            <a:ext cx="11523058" cy="6012383"/>
+            <a:chOff x="1626498" y="1244041"/>
+            <a:chExt cx="9022621" cy="4452752"/>
+          </a:xfrm>
+        </p:grpSpPr>
+        <p:sp>
+          <p:nvSpPr>
+            <p:cNvPr id="32" name="Rectangle: Rounded Corners 31">
+              <a:extLst>
+                <a:ext uri="{FF2B5EF4-FFF2-40B4-BE49-F238E27FC236}">
+                  <a16:creationId xmlns:a16="http://schemas.microsoft.com/office/drawing/2014/main" id="{DC1017FE-CF4C-2363-A6FF-564EFF9B9164}"/>
+                </a:ext>
+              </a:extLst>
+            </p:cNvPr>
+            <p:cNvSpPr/>
+            <p:nvPr/>
+          </p:nvSpPr>
+          <p:spPr>
+            <a:xfrm>
+              <a:off x="1626498" y="1244041"/>
+              <a:ext cx="9022621" cy="4452752"/>
+            </a:xfrm>
+            <a:prstGeom prst="roundRect">
+              <a:avLst/>
+            </a:prstGeom>
+            <a:solidFill>
+              <a:schemeClr val="accent3">
+                <a:lumMod val="60000"/>
+                <a:lumOff val="40000"/>
+              </a:schemeClr>
+            </a:solidFill>
+            <a:ln>
+              <a:solidFill>
+                <a:schemeClr val="tx1">
+                  <a:lumMod val="85000"/>
+                  <a:lumOff val="15000"/>
+                </a:schemeClr>
+              </a:solidFill>
+            </a:ln>
+          </p:spPr>
+          <p:style>
+            <a:lnRef idx="2">
+              <a:schemeClr val="accent1">
+                <a:shade val="15000"/>
+              </a:schemeClr>
+            </a:lnRef>
+            <a:fillRef idx="1">
+              <a:schemeClr val="accent1"/>
+            </a:fillRef>
+            <a:effectRef idx="0">
+              <a:schemeClr val="accent1"/>
+            </a:effectRef>
+            <a:fontRef idx="minor">
+              <a:schemeClr val="lt1"/>
+            </a:fontRef>
+          </p:style>
+          <p:txBody>
+            <a:bodyPr rtlCol="0" anchor="t"/>
+            <a:lstStyle/>
+            <a:p>
+              <a:pPr algn="ctr"/>
+              <a:r>
+                <a:rPr lang="en-US" sz="4400" b="1" dirty="0">
+                  <a:solidFill>
+                    <a:schemeClr val="tx1"/>
+                  </a:solidFill>
+                </a:rPr>
+                <a:t>Kubernetes Pod</a:t>
+              </a:r>
+            </a:p>
+          </p:txBody>
+        </p:sp>
+        <p:grpSp>
+          <p:nvGrpSpPr>
+            <p:cNvPr id="10" name="Group 9">
+              <a:extLst>
+                <a:ext uri="{FF2B5EF4-FFF2-40B4-BE49-F238E27FC236}">
+                  <a16:creationId xmlns:a16="http://schemas.microsoft.com/office/drawing/2014/main" id="{FEB9785D-FCBF-3995-ACA6-70A4E012BA41}"/>
+                </a:ext>
+              </a:extLst>
+            </p:cNvPr>
+            <p:cNvGrpSpPr/>
+            <p:nvPr/>
+          </p:nvGrpSpPr>
+          <p:grpSpPr>
+            <a:xfrm>
+              <a:off x="4063113" y="2070100"/>
+              <a:ext cx="1934705" cy="1515300"/>
+              <a:chOff x="5181164" y="2131797"/>
+              <a:chExt cx="1934705" cy="1539201"/>
+            </a:xfrm>
+          </p:grpSpPr>
+          <p:sp>
+            <p:nvSpPr>
+              <p:cNvPr id="4" name="Rectangle: Rounded Corners 3">
+                <a:extLst>
+                  <a:ext uri="{FF2B5EF4-FFF2-40B4-BE49-F238E27FC236}">
+                    <a16:creationId xmlns:a16="http://schemas.microsoft.com/office/drawing/2014/main" id="{E10779A0-6680-0133-22EC-4127CB8FE41F}"/>
+                  </a:ext>
+                </a:extLst>
+              </p:cNvPr>
+              <p:cNvSpPr/>
+              <p:nvPr/>
+            </p:nvSpPr>
+            <p:spPr>
+              <a:xfrm>
+                <a:off x="5181164" y="2131797"/>
+                <a:ext cx="1934705" cy="1539201"/>
+              </a:xfrm>
+              <a:prstGeom prst="roundRect">
+                <a:avLst/>
+              </a:prstGeom>
+              <a:solidFill>
+                <a:srgbClr val="FD7F7F"/>
+              </a:solidFill>
+              <a:ln>
+                <a:solidFill>
+                  <a:schemeClr val="tx1">
+                    <a:lumMod val="85000"/>
+                    <a:lumOff val="15000"/>
+                  </a:schemeClr>
+                </a:solidFill>
+              </a:ln>
+            </p:spPr>
+            <p:style>
+              <a:lnRef idx="2">
+                <a:schemeClr val="accent2">
+                  <a:shade val="15000"/>
+                </a:schemeClr>
+              </a:lnRef>
+              <a:fillRef idx="1">
+                <a:schemeClr val="accent2"/>
+              </a:fillRef>
+              <a:effectRef idx="0">
+                <a:schemeClr val="accent2"/>
+              </a:effectRef>
+              <a:fontRef idx="minor">
+                <a:schemeClr val="lt1"/>
+              </a:fontRef>
+            </p:style>
+            <p:txBody>
+              <a:bodyPr rtlCol="0" anchor="t"/>
+              <a:lstStyle/>
+              <a:p>
+                <a:pPr algn="ctr"/>
+                <a:r>
+                  <a:rPr lang="en-US" sz="2000" b="1" dirty="0">
+                    <a:solidFill>
+                      <a:schemeClr val="tx1"/>
+                    </a:solidFill>
+                    <a:latin typeface="Arial" panose="020B0604020202020204" pitchFamily="34" charset="0"/>
+                    <a:cs typeface="Arial" panose="020B0604020202020204" pitchFamily="34" charset="0"/>
+                  </a:rPr>
+                  <a:t>Server Stage 1</a:t>
+                </a:r>
+                <a:endParaRPr lang="en-US" sz="4000" b="1" dirty="0">
+                  <a:solidFill>
+                    <a:schemeClr val="tx1"/>
+                  </a:solidFill>
+                  <a:latin typeface="Arial" panose="020B0604020202020204" pitchFamily="34" charset="0"/>
+                  <a:cs typeface="Arial" panose="020B0604020202020204" pitchFamily="34" charset="0"/>
+                </a:endParaRPr>
+              </a:p>
+            </p:txBody>
+          </p:sp>
+          <p:sp>
+            <p:nvSpPr>
+              <p:cNvPr id="5" name="Rectangle: Rounded Corners 4">
+                <a:extLst>
+                  <a:ext uri="{FF2B5EF4-FFF2-40B4-BE49-F238E27FC236}">
+                    <a16:creationId xmlns:a16="http://schemas.microsoft.com/office/drawing/2014/main" id="{1DF12D56-8520-F5F1-08BA-8527E8CE1B81}"/>
+                  </a:ext>
+                </a:extLst>
+              </p:cNvPr>
+              <p:cNvSpPr/>
+              <p:nvPr/>
+            </p:nvSpPr>
+            <p:spPr>
+              <a:xfrm>
+                <a:off x="6202682" y="2627727"/>
+                <a:ext cx="793152" cy="395501"/>
+              </a:xfrm>
+              <a:prstGeom prst="roundRect">
+                <a:avLst/>
+              </a:prstGeom>
+              <a:solidFill>
+                <a:schemeClr val="accent1">
+                  <a:lumMod val="50000"/>
+                </a:schemeClr>
+              </a:solidFill>
+              <a:ln>
+                <a:solidFill>
+                  <a:schemeClr val="tx1">
+                    <a:lumMod val="85000"/>
+                    <a:lumOff val="15000"/>
+                  </a:schemeClr>
+                </a:solidFill>
+              </a:ln>
+            </p:spPr>
+            <p:style>
+              <a:lnRef idx="2">
+                <a:schemeClr val="accent1">
+                  <a:shade val="15000"/>
+                </a:schemeClr>
+              </a:lnRef>
+              <a:fillRef idx="1">
+                <a:schemeClr val="accent1"/>
+              </a:fillRef>
+              <a:effectRef idx="0">
+                <a:schemeClr val="accent1"/>
+              </a:effectRef>
+              <a:fontRef idx="minor">
+                <a:schemeClr val="lt1"/>
+              </a:fontRef>
+            </p:style>
+            <p:txBody>
+              <a:bodyPr rtlCol="0" anchor="ctr"/>
+              <a:lstStyle/>
+              <a:p>
+                <a:pPr algn="ctr"/>
+                <a:r>
+                  <a:rPr lang="en-US" sz="1100" dirty="0">
+                    <a:solidFill>
+                      <a:schemeClr val="bg1"/>
+                    </a:solidFill>
+                  </a:rPr>
+                  <a:t>Fibonacci Image</a:t>
+                </a:r>
+              </a:p>
+            </p:txBody>
+          </p:sp>
+          <p:sp>
+            <p:nvSpPr>
+              <p:cNvPr id="6" name="Rectangle: Rounded Corners 5">
+                <a:extLst>
+                  <a:ext uri="{FF2B5EF4-FFF2-40B4-BE49-F238E27FC236}">
+                    <a16:creationId xmlns:a16="http://schemas.microsoft.com/office/drawing/2014/main" id="{2354488A-84F6-4C40-EB5E-7C71056691CF}"/>
+                  </a:ext>
+                </a:extLst>
+              </p:cNvPr>
+              <p:cNvSpPr/>
+              <p:nvPr/>
+            </p:nvSpPr>
+            <p:spPr>
+              <a:xfrm>
+                <a:off x="5289496" y="2620843"/>
+                <a:ext cx="793152" cy="395501"/>
+              </a:xfrm>
+              <a:prstGeom prst="roundRect">
+                <a:avLst/>
+              </a:prstGeom>
+              <a:solidFill>
+                <a:schemeClr val="accent1">
+                  <a:lumMod val="50000"/>
+                </a:schemeClr>
+              </a:solidFill>
+              <a:ln>
+                <a:solidFill>
+                  <a:schemeClr val="tx1">
+                    <a:lumMod val="85000"/>
+                    <a:lumOff val="15000"/>
+                  </a:schemeClr>
+                </a:solidFill>
+              </a:ln>
+            </p:spPr>
+            <p:style>
+              <a:lnRef idx="2">
+                <a:schemeClr val="accent1">
+                  <a:shade val="15000"/>
+                </a:schemeClr>
+              </a:lnRef>
+              <a:fillRef idx="1">
+                <a:schemeClr val="accent1"/>
+              </a:fillRef>
+              <a:effectRef idx="0">
+                <a:schemeClr val="accent1"/>
+              </a:effectRef>
+              <a:fontRef idx="minor">
+                <a:schemeClr val="lt1"/>
+              </a:fontRef>
+            </p:style>
+            <p:txBody>
+              <a:bodyPr rtlCol="0" anchor="ctr"/>
+              <a:lstStyle/>
+              <a:p>
+                <a:pPr algn="ctr"/>
+                <a:r>
+                  <a:rPr lang="en-US" sz="1100" dirty="0">
+                    <a:solidFill>
+                      <a:schemeClr val="bg1"/>
+                    </a:solidFill>
+                  </a:rPr>
+                  <a:t>Env Variables</a:t>
+                </a:r>
+              </a:p>
+            </p:txBody>
+          </p:sp>
+          <p:sp>
+            <p:nvSpPr>
+              <p:cNvPr id="8" name="Rectangle: Rounded Corners 7">
+                <a:extLst>
+                  <a:ext uri="{FF2B5EF4-FFF2-40B4-BE49-F238E27FC236}">
+                    <a16:creationId xmlns:a16="http://schemas.microsoft.com/office/drawing/2014/main" id="{BA540383-1CDF-C530-B130-8C31C9A014EF}"/>
+                  </a:ext>
+                </a:extLst>
+              </p:cNvPr>
+              <p:cNvSpPr/>
+              <p:nvPr/>
+            </p:nvSpPr>
+            <p:spPr>
+              <a:xfrm>
+                <a:off x="6202682" y="3141603"/>
+                <a:ext cx="793152" cy="395501"/>
+              </a:xfrm>
+              <a:prstGeom prst="roundRect">
+                <a:avLst/>
+              </a:prstGeom>
+              <a:solidFill>
+                <a:schemeClr val="tx1"/>
+              </a:solidFill>
+              <a:ln>
+                <a:solidFill>
+                  <a:schemeClr val="tx1">
+                    <a:lumMod val="85000"/>
+                    <a:lumOff val="15000"/>
+                  </a:schemeClr>
+                </a:solidFill>
+              </a:ln>
+            </p:spPr>
+            <p:style>
+              <a:lnRef idx="2">
+                <a:schemeClr val="accent1">
+                  <a:shade val="15000"/>
+                </a:schemeClr>
+              </a:lnRef>
+              <a:fillRef idx="1">
+                <a:schemeClr val="accent1"/>
+              </a:fillRef>
+              <a:effectRef idx="0">
+                <a:schemeClr val="accent1"/>
+              </a:effectRef>
+              <a:fontRef idx="minor">
+                <a:schemeClr val="lt1"/>
+              </a:fontRef>
+            </p:style>
+            <p:txBody>
+              <a:bodyPr rtlCol="0" anchor="ctr"/>
+              <a:lstStyle/>
+              <a:p>
+                <a:pPr algn="ctr"/>
+                <a:r>
+                  <a:rPr lang="en-US" sz="1100" dirty="0">
+                    <a:solidFill>
+                      <a:schemeClr val="bg1"/>
+                    </a:solidFill>
+                  </a:rPr>
+                  <a:t>Secret Mount</a:t>
+                </a:r>
+              </a:p>
+            </p:txBody>
+          </p:sp>
+          <p:sp>
+            <p:nvSpPr>
+              <p:cNvPr id="9" name="Rectangle: Rounded Corners 8">
+                <a:extLst>
+                  <a:ext uri="{FF2B5EF4-FFF2-40B4-BE49-F238E27FC236}">
+                    <a16:creationId xmlns:a16="http://schemas.microsoft.com/office/drawing/2014/main" id="{923B79FE-836D-D73F-983B-5AECB4439211}"/>
+                  </a:ext>
+                </a:extLst>
+              </p:cNvPr>
+              <p:cNvSpPr/>
+              <p:nvPr/>
+            </p:nvSpPr>
+            <p:spPr>
+              <a:xfrm>
+                <a:off x="5289496" y="3141604"/>
+                <a:ext cx="793152" cy="395501"/>
+              </a:xfrm>
+              <a:prstGeom prst="roundRect">
+                <a:avLst/>
+              </a:prstGeom>
+              <a:solidFill>
+                <a:schemeClr val="accent3">
+                  <a:lumMod val="50000"/>
+                </a:schemeClr>
+              </a:solidFill>
+              <a:ln>
+                <a:solidFill>
+                  <a:schemeClr val="tx1">
+                    <a:lumMod val="85000"/>
+                    <a:lumOff val="15000"/>
+                  </a:schemeClr>
+                </a:solidFill>
+              </a:ln>
+            </p:spPr>
+            <p:style>
+              <a:lnRef idx="2">
+                <a:schemeClr val="accent1">
+                  <a:shade val="15000"/>
+                </a:schemeClr>
+              </a:lnRef>
+              <a:fillRef idx="1">
+                <a:schemeClr val="accent1"/>
+              </a:fillRef>
+              <a:effectRef idx="0">
+                <a:schemeClr val="accent1"/>
+              </a:effectRef>
+              <a:fontRef idx="minor">
+                <a:schemeClr val="lt1"/>
+              </a:fontRef>
+            </p:style>
+            <p:txBody>
+              <a:bodyPr rtlCol="0" anchor="ctr"/>
+              <a:lstStyle/>
+              <a:p>
+                <a:pPr algn="ctr"/>
+                <a:r>
+                  <a:rPr lang="en-US" sz="1100" dirty="0">
+                    <a:solidFill>
+                      <a:schemeClr val="bg1"/>
+                    </a:solidFill>
+                  </a:rPr>
+                  <a:t>Port Binding</a:t>
+                </a:r>
+              </a:p>
+            </p:txBody>
+          </p:sp>
+        </p:grpSp>
+        <p:grpSp>
+          <p:nvGrpSpPr>
+            <p:cNvPr id="11" name="Group 10">
+              <a:extLst>
+                <a:ext uri="{FF2B5EF4-FFF2-40B4-BE49-F238E27FC236}">
+                  <a16:creationId xmlns:a16="http://schemas.microsoft.com/office/drawing/2014/main" id="{E496FC03-9EEF-3AFC-20B0-0B444088C717}"/>
+                </a:ext>
+              </a:extLst>
+            </p:cNvPr>
+            <p:cNvGrpSpPr/>
+            <p:nvPr/>
+          </p:nvGrpSpPr>
+          <p:grpSpPr>
+            <a:xfrm>
+              <a:off x="6287074" y="2070099"/>
+              <a:ext cx="1930837" cy="1522185"/>
+              <a:chOff x="5181164" y="2148812"/>
+              <a:chExt cx="1934705" cy="1522185"/>
+            </a:xfrm>
+          </p:grpSpPr>
+          <p:sp>
+            <p:nvSpPr>
+              <p:cNvPr id="12" name="Rectangle: Rounded Corners 11">
+                <a:extLst>
+                  <a:ext uri="{FF2B5EF4-FFF2-40B4-BE49-F238E27FC236}">
+                    <a16:creationId xmlns:a16="http://schemas.microsoft.com/office/drawing/2014/main" id="{30DCDA15-DC9F-0B63-DC47-6E4365EF18C5}"/>
+                  </a:ext>
+                </a:extLst>
+              </p:cNvPr>
+              <p:cNvSpPr/>
+              <p:nvPr/>
+            </p:nvSpPr>
+            <p:spPr>
+              <a:xfrm>
+                <a:off x="5181164" y="2148812"/>
+                <a:ext cx="1934705" cy="1522185"/>
+              </a:xfrm>
+              <a:prstGeom prst="roundRect">
+                <a:avLst/>
+              </a:prstGeom>
+              <a:solidFill>
+                <a:srgbClr val="F2AA84"/>
+              </a:solidFill>
+              <a:ln>
+                <a:solidFill>
+                  <a:schemeClr val="tx1">
+                    <a:lumMod val="85000"/>
+                    <a:lumOff val="15000"/>
+                  </a:schemeClr>
+                </a:solidFill>
+              </a:ln>
+            </p:spPr>
+            <p:style>
+              <a:lnRef idx="2">
+                <a:schemeClr val="accent2">
+                  <a:shade val="15000"/>
+                </a:schemeClr>
+              </a:lnRef>
+              <a:fillRef idx="1">
+                <a:schemeClr val="accent2"/>
+              </a:fillRef>
+              <a:effectRef idx="0">
+                <a:schemeClr val="accent2"/>
+              </a:effectRef>
+              <a:fontRef idx="minor">
+                <a:schemeClr val="lt1"/>
+              </a:fontRef>
+            </p:style>
+            <p:txBody>
+              <a:bodyPr rtlCol="0" anchor="t"/>
+              <a:lstStyle/>
+              <a:p>
+                <a:pPr algn="ctr"/>
+                <a:r>
+                  <a:rPr lang="en-US" sz="2000" b="1" dirty="0">
+                    <a:solidFill>
+                      <a:schemeClr val="tx1"/>
+                    </a:solidFill>
+                    <a:latin typeface="Arial" panose="020B0604020202020204" pitchFamily="34" charset="0"/>
+                    <a:cs typeface="Arial" panose="020B0604020202020204" pitchFamily="34" charset="0"/>
+                  </a:rPr>
+                  <a:t>Server Stage 2</a:t>
+                </a:r>
+                <a:endParaRPr lang="en-US" sz="4000" b="1" dirty="0">
+                  <a:solidFill>
+                    <a:schemeClr val="tx1"/>
+                  </a:solidFill>
+                  <a:latin typeface="Arial" panose="020B0604020202020204" pitchFamily="34" charset="0"/>
+                  <a:cs typeface="Arial" panose="020B0604020202020204" pitchFamily="34" charset="0"/>
+                </a:endParaRPr>
+              </a:p>
+            </p:txBody>
+          </p:sp>
+          <p:sp>
+            <p:nvSpPr>
+              <p:cNvPr id="14" name="Rectangle: Rounded Corners 13">
+                <a:extLst>
+                  <a:ext uri="{FF2B5EF4-FFF2-40B4-BE49-F238E27FC236}">
+                    <a16:creationId xmlns:a16="http://schemas.microsoft.com/office/drawing/2014/main" id="{AE69DB6E-4B7D-8933-8869-BB6017E7E21D}"/>
+                  </a:ext>
+                </a:extLst>
+              </p:cNvPr>
+              <p:cNvSpPr/>
+              <p:nvPr/>
+            </p:nvSpPr>
+            <p:spPr>
+              <a:xfrm>
+                <a:off x="5289496" y="2620843"/>
+                <a:ext cx="793152" cy="395501"/>
+              </a:xfrm>
+              <a:prstGeom prst="roundRect">
+                <a:avLst/>
+              </a:prstGeom>
+              <a:solidFill>
+                <a:schemeClr val="accent1">
+                  <a:lumMod val="50000"/>
+                </a:schemeClr>
+              </a:solidFill>
+              <a:ln>
+                <a:solidFill>
+                  <a:schemeClr val="tx1">
+                    <a:lumMod val="85000"/>
+                    <a:lumOff val="15000"/>
+                  </a:schemeClr>
+                </a:solidFill>
+              </a:ln>
+            </p:spPr>
+            <p:style>
+              <a:lnRef idx="2">
+                <a:schemeClr val="accent1">
+                  <a:shade val="15000"/>
+                </a:schemeClr>
+              </a:lnRef>
+              <a:fillRef idx="1">
+                <a:schemeClr val="accent1"/>
+              </a:fillRef>
+              <a:effectRef idx="0">
+                <a:schemeClr val="accent1"/>
+              </a:effectRef>
+              <a:fontRef idx="minor">
+                <a:schemeClr val="lt1"/>
+              </a:fontRef>
+            </p:style>
+            <p:txBody>
+              <a:bodyPr rtlCol="0" anchor="ctr"/>
+              <a:lstStyle/>
+              <a:p>
+                <a:pPr algn="ctr"/>
+                <a:r>
+                  <a:rPr lang="en-US" sz="1100" dirty="0">
+                    <a:solidFill>
+                      <a:schemeClr val="bg1"/>
+                    </a:solidFill>
+                  </a:rPr>
+                  <a:t>Env Variables</a:t>
+                </a:r>
+              </a:p>
+            </p:txBody>
+          </p:sp>
+          <p:sp>
+            <p:nvSpPr>
+              <p:cNvPr id="15" name="Rectangle: Rounded Corners 14">
+                <a:extLst>
+                  <a:ext uri="{FF2B5EF4-FFF2-40B4-BE49-F238E27FC236}">
+                    <a16:creationId xmlns:a16="http://schemas.microsoft.com/office/drawing/2014/main" id="{37B2C3CD-EE7A-10BF-8304-E18D4AE8BB9C}"/>
+                  </a:ext>
+                </a:extLst>
+              </p:cNvPr>
+              <p:cNvSpPr/>
+              <p:nvPr/>
+            </p:nvSpPr>
+            <p:spPr>
+              <a:xfrm>
+                <a:off x="6190980" y="2617120"/>
+                <a:ext cx="793152" cy="395501"/>
+              </a:xfrm>
+              <a:prstGeom prst="roundRect">
+                <a:avLst/>
+              </a:prstGeom>
+              <a:solidFill>
+                <a:schemeClr val="accent1">
+                  <a:lumMod val="50000"/>
+                </a:schemeClr>
+              </a:solidFill>
+              <a:ln>
+                <a:solidFill>
+                  <a:schemeClr val="tx1">
+                    <a:lumMod val="85000"/>
+                    <a:lumOff val="15000"/>
+                  </a:schemeClr>
+                </a:solidFill>
+              </a:ln>
+            </p:spPr>
+            <p:style>
+              <a:lnRef idx="2">
+                <a:schemeClr val="accent1">
+                  <a:shade val="15000"/>
+                </a:schemeClr>
+              </a:lnRef>
+              <a:fillRef idx="1">
+                <a:schemeClr val="accent1"/>
+              </a:fillRef>
+              <a:effectRef idx="0">
+                <a:schemeClr val="accent1"/>
+              </a:effectRef>
+              <a:fontRef idx="minor">
+                <a:schemeClr val="lt1"/>
+              </a:fontRef>
+            </p:style>
+            <p:txBody>
+              <a:bodyPr rtlCol="0" anchor="ctr"/>
+              <a:lstStyle/>
+              <a:p>
+                <a:pPr algn="ctr"/>
+                <a:r>
+                  <a:rPr lang="en-US" sz="1100" dirty="0">
+                    <a:solidFill>
+                      <a:schemeClr val="bg1"/>
+                    </a:solidFill>
+                  </a:rPr>
+                  <a:t>Fibonacci Image</a:t>
+                </a:r>
+              </a:p>
+            </p:txBody>
+          </p:sp>
+          <p:sp>
+            <p:nvSpPr>
+              <p:cNvPr id="16" name="Rectangle: Rounded Corners 15">
+                <a:extLst>
+                  <a:ext uri="{FF2B5EF4-FFF2-40B4-BE49-F238E27FC236}">
+                    <a16:creationId xmlns:a16="http://schemas.microsoft.com/office/drawing/2014/main" id="{5D22A233-D923-DBC7-1C86-8B9D029697E3}"/>
+                  </a:ext>
+                </a:extLst>
+              </p:cNvPr>
+              <p:cNvSpPr/>
+              <p:nvPr/>
+            </p:nvSpPr>
+            <p:spPr>
+              <a:xfrm>
+                <a:off x="6202682" y="3141603"/>
+                <a:ext cx="793152" cy="395501"/>
+              </a:xfrm>
+              <a:prstGeom prst="roundRect">
+                <a:avLst/>
+              </a:prstGeom>
+              <a:solidFill>
+                <a:schemeClr val="tx1"/>
+              </a:solidFill>
+              <a:ln>
+                <a:solidFill>
+                  <a:schemeClr val="tx1">
+                    <a:lumMod val="85000"/>
+                    <a:lumOff val="15000"/>
+                  </a:schemeClr>
+                </a:solidFill>
+              </a:ln>
+            </p:spPr>
+            <p:style>
+              <a:lnRef idx="2">
+                <a:schemeClr val="accent1">
+                  <a:shade val="15000"/>
+                </a:schemeClr>
+              </a:lnRef>
+              <a:fillRef idx="1">
+                <a:schemeClr val="accent1"/>
+              </a:fillRef>
+              <a:effectRef idx="0">
+                <a:schemeClr val="accent1"/>
+              </a:effectRef>
+              <a:fontRef idx="minor">
+                <a:schemeClr val="lt1"/>
+              </a:fontRef>
+            </p:style>
+            <p:txBody>
+              <a:bodyPr rtlCol="0" anchor="ctr"/>
+              <a:lstStyle/>
+              <a:p>
+                <a:pPr algn="ctr"/>
+                <a:r>
+                  <a:rPr lang="en-US" sz="1100" dirty="0">
+                    <a:solidFill>
+                      <a:schemeClr val="bg1"/>
+                    </a:solidFill>
+                  </a:rPr>
+                  <a:t>Secret Mount</a:t>
+                </a:r>
+              </a:p>
+            </p:txBody>
+          </p:sp>
+          <p:sp>
+            <p:nvSpPr>
+              <p:cNvPr id="17" name="Rectangle: Rounded Corners 16">
+                <a:extLst>
+                  <a:ext uri="{FF2B5EF4-FFF2-40B4-BE49-F238E27FC236}">
+                    <a16:creationId xmlns:a16="http://schemas.microsoft.com/office/drawing/2014/main" id="{096DA75C-7E61-72BC-FBAE-663755D83A67}"/>
+                  </a:ext>
+                </a:extLst>
+              </p:cNvPr>
+              <p:cNvSpPr/>
+              <p:nvPr/>
+            </p:nvSpPr>
+            <p:spPr>
+              <a:xfrm>
+                <a:off x="5289496" y="3141604"/>
+                <a:ext cx="793152" cy="395501"/>
+              </a:xfrm>
+              <a:prstGeom prst="roundRect">
+                <a:avLst/>
+              </a:prstGeom>
+              <a:solidFill>
+                <a:schemeClr val="accent3">
+                  <a:lumMod val="50000"/>
+                </a:schemeClr>
+              </a:solidFill>
+              <a:ln>
+                <a:solidFill>
+                  <a:schemeClr val="tx1">
+                    <a:lumMod val="85000"/>
+                    <a:lumOff val="15000"/>
+                  </a:schemeClr>
+                </a:solidFill>
+              </a:ln>
+            </p:spPr>
+            <p:style>
+              <a:lnRef idx="2">
+                <a:schemeClr val="accent1">
+                  <a:shade val="15000"/>
+                </a:schemeClr>
+              </a:lnRef>
+              <a:fillRef idx="1">
+                <a:schemeClr val="accent1"/>
+              </a:fillRef>
+              <a:effectRef idx="0">
+                <a:schemeClr val="accent1"/>
+              </a:effectRef>
+              <a:fontRef idx="minor">
+                <a:schemeClr val="lt1"/>
+              </a:fontRef>
+            </p:style>
+            <p:txBody>
+              <a:bodyPr rtlCol="0" anchor="ctr"/>
+              <a:lstStyle/>
+              <a:p>
+                <a:pPr algn="ctr"/>
+                <a:r>
+                  <a:rPr lang="en-US" sz="1100" dirty="0">
+                    <a:solidFill>
+                      <a:schemeClr val="bg1"/>
+                    </a:solidFill>
+                  </a:rPr>
+                  <a:t>Port Binding</a:t>
+                </a:r>
+              </a:p>
+            </p:txBody>
+          </p:sp>
+        </p:grpSp>
+        <p:grpSp>
+          <p:nvGrpSpPr>
+            <p:cNvPr id="18" name="Group 17">
+              <a:extLst>
+                <a:ext uri="{FF2B5EF4-FFF2-40B4-BE49-F238E27FC236}">
+                  <a16:creationId xmlns:a16="http://schemas.microsoft.com/office/drawing/2014/main" id="{3194643D-83B8-38FA-826B-AC844877328F}"/>
+                </a:ext>
+              </a:extLst>
+            </p:cNvPr>
+            <p:cNvGrpSpPr/>
+            <p:nvPr/>
+          </p:nvGrpSpPr>
+          <p:grpSpPr>
+            <a:xfrm>
+              <a:off x="4063113" y="3859794"/>
+              <a:ext cx="1934705" cy="1565037"/>
+              <a:chOff x="5181164" y="2105960"/>
+              <a:chExt cx="1934705" cy="1565037"/>
+            </a:xfrm>
+          </p:grpSpPr>
+          <p:sp>
+            <p:nvSpPr>
+              <p:cNvPr id="19" name="Rectangle: Rounded Corners 18">
+                <a:extLst>
+                  <a:ext uri="{FF2B5EF4-FFF2-40B4-BE49-F238E27FC236}">
+                    <a16:creationId xmlns:a16="http://schemas.microsoft.com/office/drawing/2014/main" id="{289139E2-AD68-AC68-7C7C-E676992B60AC}"/>
+                  </a:ext>
+                </a:extLst>
+              </p:cNvPr>
+              <p:cNvSpPr/>
+              <p:nvPr/>
+            </p:nvSpPr>
+            <p:spPr>
+              <a:xfrm>
+                <a:off x="5181164" y="2105960"/>
+                <a:ext cx="1934705" cy="1565037"/>
+              </a:xfrm>
+              <a:prstGeom prst="roundRect">
+                <a:avLst/>
+              </a:prstGeom>
+              <a:solidFill>
+                <a:srgbClr val="B4E5A2"/>
+              </a:solidFill>
+              <a:ln>
+                <a:solidFill>
+                  <a:schemeClr val="tx1">
+                    <a:lumMod val="85000"/>
+                    <a:lumOff val="15000"/>
+                  </a:schemeClr>
+                </a:solidFill>
+              </a:ln>
+            </p:spPr>
+            <p:style>
+              <a:lnRef idx="2">
+                <a:schemeClr val="accent2">
+                  <a:shade val="15000"/>
+                </a:schemeClr>
+              </a:lnRef>
+              <a:fillRef idx="1">
+                <a:schemeClr val="accent2"/>
+              </a:fillRef>
+              <a:effectRef idx="0">
+                <a:schemeClr val="accent2"/>
+              </a:effectRef>
+              <a:fontRef idx="minor">
+                <a:schemeClr val="lt1"/>
+              </a:fontRef>
+            </p:style>
+            <p:txBody>
+              <a:bodyPr rtlCol="0" anchor="t"/>
+              <a:lstStyle/>
+              <a:p>
+                <a:pPr algn="ctr"/>
+                <a:r>
+                  <a:rPr lang="en-US" sz="2000" b="1" dirty="0">
+                    <a:solidFill>
+                      <a:schemeClr val="tx1"/>
+                    </a:solidFill>
+                    <a:latin typeface="Arial" panose="020B0604020202020204" pitchFamily="34" charset="0"/>
+                    <a:cs typeface="Arial" panose="020B0604020202020204" pitchFamily="34" charset="0"/>
+                  </a:rPr>
+                  <a:t>Server Stage …</a:t>
+                </a:r>
+                <a:endParaRPr lang="en-US" sz="4000" b="1" dirty="0">
+                  <a:solidFill>
+                    <a:schemeClr val="tx1"/>
+                  </a:solidFill>
+                  <a:latin typeface="Arial" panose="020B0604020202020204" pitchFamily="34" charset="0"/>
+                  <a:cs typeface="Arial" panose="020B0604020202020204" pitchFamily="34" charset="0"/>
+                </a:endParaRPr>
+              </a:p>
+            </p:txBody>
+          </p:sp>
+          <p:sp>
+            <p:nvSpPr>
+              <p:cNvPr id="21" name="Rectangle: Rounded Corners 20">
+                <a:extLst>
+                  <a:ext uri="{FF2B5EF4-FFF2-40B4-BE49-F238E27FC236}">
+                    <a16:creationId xmlns:a16="http://schemas.microsoft.com/office/drawing/2014/main" id="{C907BEBB-EED1-C673-8056-90A8664FB27D}"/>
+                  </a:ext>
+                </a:extLst>
+              </p:cNvPr>
+              <p:cNvSpPr/>
+              <p:nvPr/>
+            </p:nvSpPr>
+            <p:spPr>
+              <a:xfrm>
+                <a:off x="5289496" y="2620843"/>
+                <a:ext cx="793152" cy="395501"/>
+              </a:xfrm>
+              <a:prstGeom prst="roundRect">
+                <a:avLst/>
+              </a:prstGeom>
+              <a:solidFill>
+                <a:schemeClr val="accent1">
+                  <a:lumMod val="50000"/>
+                </a:schemeClr>
+              </a:solidFill>
+              <a:ln>
+                <a:solidFill>
+                  <a:schemeClr val="tx1">
+                    <a:lumMod val="85000"/>
+                    <a:lumOff val="15000"/>
+                  </a:schemeClr>
+                </a:solidFill>
+              </a:ln>
+            </p:spPr>
+            <p:style>
+              <a:lnRef idx="2">
+                <a:schemeClr val="accent1">
+                  <a:shade val="15000"/>
+                </a:schemeClr>
+              </a:lnRef>
+              <a:fillRef idx="1">
+                <a:schemeClr val="accent1"/>
+              </a:fillRef>
+              <a:effectRef idx="0">
+                <a:schemeClr val="accent1"/>
+              </a:effectRef>
+              <a:fontRef idx="minor">
+                <a:schemeClr val="lt1"/>
+              </a:fontRef>
+            </p:style>
+            <p:txBody>
+              <a:bodyPr rtlCol="0" anchor="ctr"/>
+              <a:lstStyle/>
+              <a:p>
+                <a:pPr algn="ctr"/>
+                <a:r>
+                  <a:rPr lang="en-US" sz="1100" dirty="0">
+                    <a:solidFill>
+                      <a:schemeClr val="bg1"/>
+                    </a:solidFill>
+                  </a:rPr>
+                  <a:t>Env Variables</a:t>
+                </a:r>
+              </a:p>
+            </p:txBody>
+          </p:sp>
+          <p:sp>
+            <p:nvSpPr>
+              <p:cNvPr id="22" name="Rectangle: Rounded Corners 21">
+                <a:extLst>
+                  <a:ext uri="{FF2B5EF4-FFF2-40B4-BE49-F238E27FC236}">
+                    <a16:creationId xmlns:a16="http://schemas.microsoft.com/office/drawing/2014/main" id="{964468A8-E4A2-8FEE-AB7F-32383A99B543}"/>
+                  </a:ext>
+                </a:extLst>
+              </p:cNvPr>
+              <p:cNvSpPr/>
+              <p:nvPr/>
+            </p:nvSpPr>
+            <p:spPr>
+              <a:xfrm>
+                <a:off x="6190980" y="2617120"/>
+                <a:ext cx="793152" cy="395501"/>
+              </a:xfrm>
+              <a:prstGeom prst="roundRect">
+                <a:avLst/>
+              </a:prstGeom>
+              <a:solidFill>
+                <a:schemeClr val="accent1">
+                  <a:lumMod val="50000"/>
+                </a:schemeClr>
+              </a:solidFill>
+              <a:ln>
+                <a:solidFill>
+                  <a:schemeClr val="tx1">
+                    <a:lumMod val="85000"/>
+                    <a:lumOff val="15000"/>
+                  </a:schemeClr>
+                </a:solidFill>
+              </a:ln>
+            </p:spPr>
+            <p:style>
+              <a:lnRef idx="2">
+                <a:schemeClr val="accent1">
+                  <a:shade val="15000"/>
+                </a:schemeClr>
+              </a:lnRef>
+              <a:fillRef idx="1">
+                <a:schemeClr val="accent1"/>
+              </a:fillRef>
+              <a:effectRef idx="0">
+                <a:schemeClr val="accent1"/>
+              </a:effectRef>
+              <a:fontRef idx="minor">
+                <a:schemeClr val="lt1"/>
+              </a:fontRef>
+            </p:style>
+            <p:txBody>
+              <a:bodyPr rtlCol="0" anchor="ctr"/>
+              <a:lstStyle/>
+              <a:p>
+                <a:pPr algn="ctr"/>
+                <a:r>
+                  <a:rPr lang="en-US" sz="1100" dirty="0">
+                    <a:solidFill>
+                      <a:schemeClr val="bg1"/>
+                    </a:solidFill>
+                  </a:rPr>
+                  <a:t>Fibonacci Image</a:t>
+                </a:r>
+              </a:p>
+            </p:txBody>
+          </p:sp>
+          <p:sp>
+            <p:nvSpPr>
+              <p:cNvPr id="23" name="Rectangle: Rounded Corners 22">
+                <a:extLst>
+                  <a:ext uri="{FF2B5EF4-FFF2-40B4-BE49-F238E27FC236}">
+                    <a16:creationId xmlns:a16="http://schemas.microsoft.com/office/drawing/2014/main" id="{6B9657E4-5A07-4728-67BF-BD6DE01BA585}"/>
+                  </a:ext>
+                </a:extLst>
+              </p:cNvPr>
+              <p:cNvSpPr/>
+              <p:nvPr/>
+            </p:nvSpPr>
+            <p:spPr>
+              <a:xfrm>
+                <a:off x="6202682" y="3141603"/>
+                <a:ext cx="793152" cy="395501"/>
+              </a:xfrm>
+              <a:prstGeom prst="roundRect">
+                <a:avLst/>
+              </a:prstGeom>
+              <a:solidFill>
+                <a:schemeClr val="tx1"/>
+              </a:solidFill>
+              <a:ln>
+                <a:solidFill>
+                  <a:schemeClr val="tx1">
+                    <a:lumMod val="85000"/>
+                    <a:lumOff val="15000"/>
+                  </a:schemeClr>
+                </a:solidFill>
+              </a:ln>
+            </p:spPr>
+            <p:style>
+              <a:lnRef idx="2">
+                <a:schemeClr val="accent1">
+                  <a:shade val="15000"/>
+                </a:schemeClr>
+              </a:lnRef>
+              <a:fillRef idx="1">
+                <a:schemeClr val="accent1"/>
+              </a:fillRef>
+              <a:effectRef idx="0">
+                <a:schemeClr val="accent1"/>
+              </a:effectRef>
+              <a:fontRef idx="minor">
+                <a:schemeClr val="lt1"/>
+              </a:fontRef>
+            </p:style>
+            <p:txBody>
+              <a:bodyPr rtlCol="0" anchor="ctr"/>
+              <a:lstStyle/>
+              <a:p>
+                <a:pPr algn="ctr"/>
+                <a:r>
+                  <a:rPr lang="en-US" sz="1100" dirty="0">
+                    <a:solidFill>
+                      <a:schemeClr val="bg1"/>
+                    </a:solidFill>
+                  </a:rPr>
+                  <a:t>Secret Mount</a:t>
+                </a:r>
+              </a:p>
+            </p:txBody>
+          </p:sp>
+          <p:sp>
+            <p:nvSpPr>
+              <p:cNvPr id="24" name="Rectangle: Rounded Corners 23">
+                <a:extLst>
+                  <a:ext uri="{FF2B5EF4-FFF2-40B4-BE49-F238E27FC236}">
+                    <a16:creationId xmlns:a16="http://schemas.microsoft.com/office/drawing/2014/main" id="{24126C7C-9C82-C9C7-45E1-05F417AFD35B}"/>
+                  </a:ext>
+                </a:extLst>
+              </p:cNvPr>
+              <p:cNvSpPr/>
+              <p:nvPr/>
+            </p:nvSpPr>
+            <p:spPr>
+              <a:xfrm>
+                <a:off x="5289496" y="3141604"/>
+                <a:ext cx="793152" cy="395501"/>
+              </a:xfrm>
+              <a:prstGeom prst="roundRect">
+                <a:avLst/>
+              </a:prstGeom>
+              <a:solidFill>
+                <a:schemeClr val="accent3">
+                  <a:lumMod val="50000"/>
+                </a:schemeClr>
+              </a:solidFill>
+              <a:ln>
+                <a:solidFill>
+                  <a:schemeClr val="tx1">
+                    <a:lumMod val="85000"/>
+                    <a:lumOff val="15000"/>
+                  </a:schemeClr>
+                </a:solidFill>
+              </a:ln>
+            </p:spPr>
+            <p:style>
+              <a:lnRef idx="2">
+                <a:schemeClr val="accent1">
+                  <a:shade val="15000"/>
+                </a:schemeClr>
+              </a:lnRef>
+              <a:fillRef idx="1">
+                <a:schemeClr val="accent1"/>
+              </a:fillRef>
+              <a:effectRef idx="0">
+                <a:schemeClr val="accent1"/>
+              </a:effectRef>
+              <a:fontRef idx="minor">
+                <a:schemeClr val="lt1"/>
+              </a:fontRef>
+            </p:style>
+            <p:txBody>
+              <a:bodyPr rtlCol="0" anchor="ctr"/>
+              <a:lstStyle/>
+              <a:p>
+                <a:pPr algn="ctr"/>
+                <a:r>
+                  <a:rPr lang="en-US" sz="1100" dirty="0">
+                    <a:solidFill>
+                      <a:schemeClr val="bg1"/>
+                    </a:solidFill>
+                  </a:rPr>
+                  <a:t>Port Binding</a:t>
+                </a:r>
+              </a:p>
+            </p:txBody>
+          </p:sp>
+        </p:grpSp>
+        <p:grpSp>
+          <p:nvGrpSpPr>
+            <p:cNvPr id="25" name="Group 24">
+              <a:extLst>
+                <a:ext uri="{FF2B5EF4-FFF2-40B4-BE49-F238E27FC236}">
+                  <a16:creationId xmlns:a16="http://schemas.microsoft.com/office/drawing/2014/main" id="{CD71F89E-E44F-DB0D-0F0F-B060297A91A0}"/>
+                </a:ext>
+              </a:extLst>
+            </p:cNvPr>
+            <p:cNvGrpSpPr/>
+            <p:nvPr/>
+          </p:nvGrpSpPr>
+          <p:grpSpPr>
+            <a:xfrm>
+              <a:off x="6283206" y="3866678"/>
+              <a:ext cx="1934705" cy="1565037"/>
+              <a:chOff x="5181164" y="2105960"/>
+              <a:chExt cx="1934705" cy="1565037"/>
+            </a:xfrm>
+          </p:grpSpPr>
+          <p:sp>
+            <p:nvSpPr>
+              <p:cNvPr id="26" name="Rectangle: Rounded Corners 25">
+                <a:extLst>
+                  <a:ext uri="{FF2B5EF4-FFF2-40B4-BE49-F238E27FC236}">
+                    <a16:creationId xmlns:a16="http://schemas.microsoft.com/office/drawing/2014/main" id="{0B371029-6217-71C8-6A66-166C72CBC244}"/>
+                  </a:ext>
+                </a:extLst>
+              </p:cNvPr>
+              <p:cNvSpPr/>
+              <p:nvPr/>
+            </p:nvSpPr>
+            <p:spPr>
+              <a:xfrm>
+                <a:off x="5181164" y="2105960"/>
+                <a:ext cx="1934705" cy="1565037"/>
+              </a:xfrm>
+              <a:prstGeom prst="roundRect">
+                <a:avLst/>
+              </a:prstGeom>
+              <a:solidFill>
+                <a:srgbClr val="A6CAEC"/>
+              </a:solidFill>
+              <a:ln>
+                <a:solidFill>
+                  <a:schemeClr val="tx1">
+                    <a:lumMod val="85000"/>
+                    <a:lumOff val="15000"/>
+                  </a:schemeClr>
+                </a:solidFill>
+              </a:ln>
+            </p:spPr>
+            <p:style>
+              <a:lnRef idx="2">
+                <a:schemeClr val="accent2">
+                  <a:shade val="15000"/>
+                </a:schemeClr>
+              </a:lnRef>
+              <a:fillRef idx="1">
+                <a:schemeClr val="accent2"/>
+              </a:fillRef>
+              <a:effectRef idx="0">
+                <a:schemeClr val="accent2"/>
+              </a:effectRef>
+              <a:fontRef idx="minor">
+                <a:schemeClr val="lt1"/>
+              </a:fontRef>
+            </p:style>
+            <p:txBody>
+              <a:bodyPr rtlCol="0" anchor="t"/>
+              <a:lstStyle/>
+              <a:p>
+                <a:pPr algn="ctr"/>
+                <a:r>
+                  <a:rPr lang="en-US" sz="2000" b="1" dirty="0">
+                    <a:solidFill>
+                      <a:schemeClr val="tx1"/>
+                    </a:solidFill>
+                    <a:latin typeface="Arial" panose="020B0604020202020204" pitchFamily="34" charset="0"/>
+                    <a:cs typeface="Arial" panose="020B0604020202020204" pitchFamily="34" charset="0"/>
+                  </a:rPr>
+                  <a:t>Server Stage N</a:t>
+                </a:r>
+                <a:endParaRPr lang="en-US" sz="4000" b="1" dirty="0">
+                  <a:solidFill>
+                    <a:schemeClr val="tx1"/>
+                  </a:solidFill>
+                  <a:latin typeface="Arial" panose="020B0604020202020204" pitchFamily="34" charset="0"/>
+                  <a:cs typeface="Arial" panose="020B0604020202020204" pitchFamily="34" charset="0"/>
+                </a:endParaRPr>
+              </a:p>
+            </p:txBody>
+          </p:sp>
+          <p:sp>
+            <p:nvSpPr>
+              <p:cNvPr id="28" name="Rectangle: Rounded Corners 27">
+                <a:extLst>
+                  <a:ext uri="{FF2B5EF4-FFF2-40B4-BE49-F238E27FC236}">
+                    <a16:creationId xmlns:a16="http://schemas.microsoft.com/office/drawing/2014/main" id="{E7AB0D0D-E4F3-D032-AF6C-DCF197056C6A}"/>
+                  </a:ext>
+                </a:extLst>
+              </p:cNvPr>
+              <p:cNvSpPr/>
+              <p:nvPr/>
+            </p:nvSpPr>
+            <p:spPr>
+              <a:xfrm>
+                <a:off x="5289496" y="2620843"/>
+                <a:ext cx="793152" cy="395501"/>
+              </a:xfrm>
+              <a:prstGeom prst="roundRect">
+                <a:avLst/>
+              </a:prstGeom>
+              <a:solidFill>
+                <a:schemeClr val="accent1">
+                  <a:lumMod val="50000"/>
+                </a:schemeClr>
+              </a:solidFill>
+              <a:ln>
+                <a:solidFill>
+                  <a:schemeClr val="tx1">
+                    <a:lumMod val="85000"/>
+                    <a:lumOff val="15000"/>
+                  </a:schemeClr>
+                </a:solidFill>
+              </a:ln>
+            </p:spPr>
+            <p:style>
+              <a:lnRef idx="2">
+                <a:schemeClr val="accent1">
+                  <a:shade val="15000"/>
+                </a:schemeClr>
+              </a:lnRef>
+              <a:fillRef idx="1">
+                <a:schemeClr val="accent1"/>
+              </a:fillRef>
+              <a:effectRef idx="0">
+                <a:schemeClr val="accent1"/>
+              </a:effectRef>
+              <a:fontRef idx="minor">
+                <a:schemeClr val="lt1"/>
+              </a:fontRef>
+            </p:style>
+            <p:txBody>
+              <a:bodyPr rtlCol="0" anchor="ctr"/>
+              <a:lstStyle/>
+              <a:p>
+                <a:pPr algn="ctr"/>
+                <a:r>
+                  <a:rPr lang="en-US" sz="1100" dirty="0">
+                    <a:solidFill>
+                      <a:schemeClr val="bg1"/>
+                    </a:solidFill>
+                  </a:rPr>
+                  <a:t>Env Variables</a:t>
+                </a:r>
+              </a:p>
+            </p:txBody>
+          </p:sp>
+          <p:sp>
+            <p:nvSpPr>
+              <p:cNvPr id="29" name="Rectangle: Rounded Corners 28">
+                <a:extLst>
+                  <a:ext uri="{FF2B5EF4-FFF2-40B4-BE49-F238E27FC236}">
+                    <a16:creationId xmlns:a16="http://schemas.microsoft.com/office/drawing/2014/main" id="{5A5B67CE-1768-777D-BBE0-699F7C98915D}"/>
+                  </a:ext>
+                </a:extLst>
+              </p:cNvPr>
+              <p:cNvSpPr/>
+              <p:nvPr/>
+            </p:nvSpPr>
+            <p:spPr>
+              <a:xfrm>
+                <a:off x="6190980" y="2617120"/>
+                <a:ext cx="793152" cy="395501"/>
+              </a:xfrm>
+              <a:prstGeom prst="roundRect">
+                <a:avLst/>
+              </a:prstGeom>
+              <a:solidFill>
+                <a:schemeClr val="accent1">
+                  <a:lumMod val="50000"/>
+                </a:schemeClr>
+              </a:solidFill>
+              <a:ln>
+                <a:solidFill>
+                  <a:schemeClr val="tx1">
+                    <a:lumMod val="85000"/>
+                    <a:lumOff val="15000"/>
+                  </a:schemeClr>
+                </a:solidFill>
+              </a:ln>
+            </p:spPr>
+            <p:style>
+              <a:lnRef idx="2">
+                <a:schemeClr val="accent1">
+                  <a:shade val="15000"/>
+                </a:schemeClr>
+              </a:lnRef>
+              <a:fillRef idx="1">
+                <a:schemeClr val="accent1"/>
+              </a:fillRef>
+              <a:effectRef idx="0">
+                <a:schemeClr val="accent1"/>
+              </a:effectRef>
+              <a:fontRef idx="minor">
+                <a:schemeClr val="lt1"/>
+              </a:fontRef>
+            </p:style>
+            <p:txBody>
+              <a:bodyPr rtlCol="0" anchor="ctr"/>
+              <a:lstStyle/>
+              <a:p>
+                <a:pPr algn="ctr"/>
+                <a:r>
+                  <a:rPr lang="en-US" sz="1100" dirty="0">
+                    <a:solidFill>
+                      <a:schemeClr val="bg1"/>
+                    </a:solidFill>
+                  </a:rPr>
+                  <a:t>Fibonacci Image</a:t>
+                </a:r>
+              </a:p>
+            </p:txBody>
+          </p:sp>
+          <p:sp>
+            <p:nvSpPr>
+              <p:cNvPr id="30" name="Rectangle: Rounded Corners 29">
+                <a:extLst>
+                  <a:ext uri="{FF2B5EF4-FFF2-40B4-BE49-F238E27FC236}">
+                    <a16:creationId xmlns:a16="http://schemas.microsoft.com/office/drawing/2014/main" id="{68B9E567-DF60-5C72-16FC-93C37BC3E147}"/>
+                  </a:ext>
+                </a:extLst>
+              </p:cNvPr>
+              <p:cNvSpPr/>
+              <p:nvPr/>
+            </p:nvSpPr>
+            <p:spPr>
+              <a:xfrm>
+                <a:off x="6202682" y="3141603"/>
+                <a:ext cx="793152" cy="395501"/>
+              </a:xfrm>
+              <a:prstGeom prst="roundRect">
+                <a:avLst/>
+              </a:prstGeom>
+              <a:solidFill>
+                <a:schemeClr val="tx1"/>
+              </a:solidFill>
+              <a:ln>
+                <a:solidFill>
+                  <a:schemeClr val="tx1">
+                    <a:lumMod val="85000"/>
+                    <a:lumOff val="15000"/>
+                  </a:schemeClr>
+                </a:solidFill>
+              </a:ln>
+            </p:spPr>
+            <p:style>
+              <a:lnRef idx="2">
+                <a:schemeClr val="accent1">
+                  <a:shade val="15000"/>
+                </a:schemeClr>
+              </a:lnRef>
+              <a:fillRef idx="1">
+                <a:schemeClr val="accent1"/>
+              </a:fillRef>
+              <a:effectRef idx="0">
+                <a:schemeClr val="accent1"/>
+              </a:effectRef>
+              <a:fontRef idx="minor">
+                <a:schemeClr val="lt1"/>
+              </a:fontRef>
+            </p:style>
+            <p:txBody>
+              <a:bodyPr rtlCol="0" anchor="ctr"/>
+              <a:lstStyle/>
+              <a:p>
+                <a:pPr algn="ctr"/>
+                <a:r>
+                  <a:rPr lang="en-US" sz="1100" dirty="0">
+                    <a:solidFill>
+                      <a:schemeClr val="bg1"/>
+                    </a:solidFill>
+                  </a:rPr>
+                  <a:t>Secret Mount</a:t>
+                </a:r>
+              </a:p>
+            </p:txBody>
+          </p:sp>
+          <p:sp>
+            <p:nvSpPr>
+              <p:cNvPr id="31" name="Rectangle: Rounded Corners 30">
+                <a:extLst>
+                  <a:ext uri="{FF2B5EF4-FFF2-40B4-BE49-F238E27FC236}">
+                    <a16:creationId xmlns:a16="http://schemas.microsoft.com/office/drawing/2014/main" id="{1704D20F-7331-4EE0-0F93-31BF8A6FADBC}"/>
+                  </a:ext>
+                </a:extLst>
+              </p:cNvPr>
+              <p:cNvSpPr/>
+              <p:nvPr/>
+            </p:nvSpPr>
+            <p:spPr>
+              <a:xfrm>
+                <a:off x="5289496" y="3141604"/>
+                <a:ext cx="793152" cy="395501"/>
+              </a:xfrm>
+              <a:prstGeom prst="roundRect">
+                <a:avLst/>
+              </a:prstGeom>
+              <a:solidFill>
+                <a:schemeClr val="accent3">
+                  <a:lumMod val="50000"/>
+                </a:schemeClr>
+              </a:solidFill>
+              <a:ln>
+                <a:solidFill>
+                  <a:schemeClr val="tx1">
+                    <a:lumMod val="85000"/>
+                    <a:lumOff val="15000"/>
+                  </a:schemeClr>
+                </a:solidFill>
+              </a:ln>
+            </p:spPr>
+            <p:style>
+              <a:lnRef idx="2">
+                <a:schemeClr val="accent1">
+                  <a:shade val="15000"/>
+                </a:schemeClr>
+              </a:lnRef>
+              <a:fillRef idx="1">
+                <a:schemeClr val="accent1"/>
+              </a:fillRef>
+              <a:effectRef idx="0">
+                <a:schemeClr val="accent1"/>
+              </a:effectRef>
+              <a:fontRef idx="minor">
+                <a:schemeClr val="lt1"/>
+              </a:fontRef>
+            </p:style>
+            <p:txBody>
+              <a:bodyPr rtlCol="0" anchor="ctr"/>
+              <a:lstStyle/>
+              <a:p>
+                <a:pPr algn="ctr"/>
+                <a:r>
+                  <a:rPr lang="en-US" sz="1100" dirty="0">
+                    <a:solidFill>
+                      <a:schemeClr val="bg1"/>
+                    </a:solidFill>
+                  </a:rPr>
+                  <a:t>Port Binding</a:t>
+                </a:r>
+              </a:p>
+            </p:txBody>
+          </p:sp>
+        </p:grpSp>
+        <p:sp>
+          <p:nvSpPr>
+            <p:cNvPr id="33" name="Rectangle: Rounded Corners 32">
+              <a:extLst>
+                <a:ext uri="{FF2B5EF4-FFF2-40B4-BE49-F238E27FC236}">
+                  <a16:creationId xmlns:a16="http://schemas.microsoft.com/office/drawing/2014/main" id="{02DEC012-4F33-F23F-2844-38A7F20EF767}"/>
+                </a:ext>
+              </a:extLst>
+            </p:cNvPr>
+            <p:cNvSpPr/>
+            <p:nvPr/>
+          </p:nvSpPr>
+          <p:spPr>
+            <a:xfrm>
+              <a:off x="1779675" y="3090918"/>
+              <a:ext cx="1934706" cy="1286920"/>
+            </a:xfrm>
+            <a:prstGeom prst="roundRect">
+              <a:avLst/>
+            </a:prstGeom>
+            <a:solidFill>
+              <a:schemeClr val="accent3">
+                <a:lumMod val="50000"/>
+              </a:schemeClr>
+            </a:solidFill>
+            <a:ln>
+              <a:solidFill>
+                <a:schemeClr val="tx1">
+                  <a:lumMod val="85000"/>
+                  <a:lumOff val="15000"/>
+                </a:schemeClr>
+              </a:solidFill>
+            </a:ln>
+          </p:spPr>
+          <p:style>
+            <a:lnRef idx="2">
+              <a:schemeClr val="accent5">
+                <a:shade val="15000"/>
+              </a:schemeClr>
+            </a:lnRef>
+            <a:fillRef idx="1">
+              <a:schemeClr val="accent5"/>
+            </a:fillRef>
+            <a:effectRef idx="0">
+              <a:schemeClr val="accent5"/>
+            </a:effectRef>
+            <a:fontRef idx="minor">
+              <a:schemeClr val="lt1"/>
+            </a:fontRef>
+          </p:style>
+          <p:txBody>
+            <a:bodyPr rtlCol="0" anchor="ctr"/>
+            <a:lstStyle/>
+            <a:p>
+              <a:pPr algn="ctr"/>
+              <a:r>
+                <a:rPr lang="en-US" sz="4000" dirty="0"/>
+                <a:t>Network Interface</a:t>
+              </a:r>
+            </a:p>
+          </p:txBody>
+        </p:sp>
+        <p:sp>
+          <p:nvSpPr>
+            <p:cNvPr id="34" name="Rectangle: Rounded Corners 33">
+              <a:extLst>
+                <a:ext uri="{FF2B5EF4-FFF2-40B4-BE49-F238E27FC236}">
+                  <a16:creationId xmlns:a16="http://schemas.microsoft.com/office/drawing/2014/main" id="{EEB32F4C-1ECA-D677-7E12-9AF38547A637}"/>
+                </a:ext>
+              </a:extLst>
+            </p:cNvPr>
+            <p:cNvSpPr/>
+            <p:nvPr/>
+          </p:nvSpPr>
+          <p:spPr>
+            <a:xfrm>
+              <a:off x="8573897" y="3090918"/>
+              <a:ext cx="1934705" cy="1275742"/>
+            </a:xfrm>
+            <a:prstGeom prst="roundRect">
+              <a:avLst/>
+            </a:prstGeom>
+            <a:solidFill>
+              <a:schemeClr val="tx1"/>
+            </a:solidFill>
+            <a:ln>
+              <a:solidFill>
+                <a:schemeClr val="tx1">
+                  <a:lumMod val="85000"/>
+                  <a:lumOff val="15000"/>
+                </a:schemeClr>
+              </a:solidFill>
+            </a:ln>
+          </p:spPr>
+          <p:style>
+            <a:lnRef idx="2">
+              <a:schemeClr val="accent5">
+                <a:shade val="15000"/>
+              </a:schemeClr>
+            </a:lnRef>
+            <a:fillRef idx="1">
+              <a:schemeClr val="accent5"/>
+            </a:fillRef>
+            <a:effectRef idx="0">
+              <a:schemeClr val="accent5"/>
+            </a:effectRef>
+            <a:fontRef idx="minor">
+              <a:schemeClr val="lt1"/>
+            </a:fontRef>
+          </p:style>
+          <p:txBody>
+            <a:bodyPr rtlCol="0" anchor="ctr"/>
+            <a:lstStyle/>
+            <a:p>
+              <a:pPr algn="ctr"/>
+              <a:r>
+                <a:rPr lang="en-US" sz="4000" dirty="0"/>
+                <a:t>Pod Secrets</a:t>
+              </a:r>
+            </a:p>
+          </p:txBody>
+        </p:sp>
+        <p:cxnSp>
+          <p:nvCxnSpPr>
+            <p:cNvPr id="36" name="Connector: Elbow 35">
+              <a:extLst>
+                <a:ext uri="{FF2B5EF4-FFF2-40B4-BE49-F238E27FC236}">
+                  <a16:creationId xmlns:a16="http://schemas.microsoft.com/office/drawing/2014/main" id="{9D23477D-40E2-EAF2-006C-6B527FE8E355}"/>
+                </a:ext>
+              </a:extLst>
+            </p:cNvPr>
+            <p:cNvCxnSpPr>
+              <a:cxnSpLocks/>
+              <a:stCxn id="33" idx="3"/>
+              <a:endCxn id="9" idx="2"/>
+            </p:cNvCxnSpPr>
+            <p:nvPr/>
+          </p:nvCxnSpPr>
+          <p:spPr>
+            <a:xfrm flipV="1">
+              <a:off x="3714381" y="3453587"/>
+              <a:ext cx="853640" cy="280791"/>
+            </a:xfrm>
+            <a:prstGeom prst="bentConnector2">
+              <a:avLst/>
+            </a:prstGeom>
+            <a:ln w="57150">
+              <a:solidFill>
+                <a:schemeClr val="accent3">
+                  <a:lumMod val="50000"/>
+                </a:schemeClr>
+              </a:solidFill>
+              <a:headEnd type="triangle"/>
+              <a:tailEnd type="triangle"/>
+            </a:ln>
+          </p:spPr>
+          <p:style>
+            <a:lnRef idx="2">
+              <a:schemeClr val="accent1"/>
+            </a:lnRef>
+            <a:fillRef idx="0">
+              <a:schemeClr val="accent1"/>
+            </a:fillRef>
+            <a:effectRef idx="1">
+              <a:schemeClr val="accent1"/>
+            </a:effectRef>
+            <a:fontRef idx="minor">
+              <a:schemeClr val="tx1"/>
+            </a:fontRef>
+          </p:style>
+        </p:cxnSp>
+        <p:cxnSp>
+          <p:nvCxnSpPr>
+            <p:cNvPr id="39" name="Connector: Elbow 38">
+              <a:extLst>
+                <a:ext uri="{FF2B5EF4-FFF2-40B4-BE49-F238E27FC236}">
+                  <a16:creationId xmlns:a16="http://schemas.microsoft.com/office/drawing/2014/main" id="{E3202EA0-D34C-5BC4-01B8-4073FCB4DADC}"/>
+                </a:ext>
+              </a:extLst>
+            </p:cNvPr>
+            <p:cNvCxnSpPr>
+              <a:cxnSpLocks/>
+              <a:stCxn id="33" idx="3"/>
+              <a:endCxn id="24" idx="2"/>
+            </p:cNvCxnSpPr>
+            <p:nvPr/>
+          </p:nvCxnSpPr>
+          <p:spPr>
+            <a:xfrm>
+              <a:off x="3714381" y="3734378"/>
+              <a:ext cx="853640" cy="1556561"/>
+            </a:xfrm>
+            <a:prstGeom prst="bentConnector4">
+              <a:avLst>
+                <a:gd name="adj1" fmla="val 26771"/>
+                <a:gd name="adj2" fmla="val 114686"/>
+              </a:avLst>
+            </a:prstGeom>
+            <a:ln w="57150">
+              <a:solidFill>
+                <a:schemeClr val="accent3">
+                  <a:lumMod val="50000"/>
+                </a:schemeClr>
+              </a:solidFill>
+              <a:headEnd type="triangle"/>
+              <a:tailEnd type="triangle"/>
+            </a:ln>
+          </p:spPr>
+          <p:style>
+            <a:lnRef idx="2">
+              <a:schemeClr val="accent1"/>
+            </a:lnRef>
+            <a:fillRef idx="0">
+              <a:schemeClr val="accent1"/>
+            </a:fillRef>
+            <a:effectRef idx="1">
+              <a:schemeClr val="accent1"/>
+            </a:effectRef>
+            <a:fontRef idx="minor">
+              <a:schemeClr val="tx1"/>
+            </a:fontRef>
+          </p:style>
+        </p:cxnSp>
+        <p:cxnSp>
+          <p:nvCxnSpPr>
+            <p:cNvPr id="42" name="Connector: Elbow 41">
+              <a:extLst>
+                <a:ext uri="{FF2B5EF4-FFF2-40B4-BE49-F238E27FC236}">
+                  <a16:creationId xmlns:a16="http://schemas.microsoft.com/office/drawing/2014/main" id="{65672B57-86F8-706A-D5BD-8BC9F389C656}"/>
+                </a:ext>
+              </a:extLst>
+            </p:cNvPr>
+            <p:cNvCxnSpPr>
+              <a:cxnSpLocks/>
+              <a:stCxn id="33" idx="3"/>
+              <a:endCxn id="17" idx="2"/>
+            </p:cNvCxnSpPr>
+            <p:nvPr/>
+          </p:nvCxnSpPr>
+          <p:spPr>
+            <a:xfrm flipV="1">
+              <a:off x="3714381" y="3458392"/>
+              <a:ext cx="3076591" cy="275986"/>
+            </a:xfrm>
+            <a:prstGeom prst="bentConnector2">
+              <a:avLst/>
+            </a:prstGeom>
+            <a:ln w="57150">
+              <a:solidFill>
+                <a:schemeClr val="accent3">
+                  <a:lumMod val="50000"/>
+                </a:schemeClr>
+              </a:solidFill>
+              <a:headEnd type="triangle"/>
+              <a:tailEnd type="triangle"/>
+            </a:ln>
+          </p:spPr>
+          <p:style>
+            <a:lnRef idx="2">
+              <a:schemeClr val="accent1"/>
+            </a:lnRef>
+            <a:fillRef idx="0">
+              <a:schemeClr val="accent1"/>
+            </a:fillRef>
+            <a:effectRef idx="1">
+              <a:schemeClr val="accent1"/>
+            </a:effectRef>
+            <a:fontRef idx="minor">
+              <a:schemeClr val="tx1"/>
+            </a:fontRef>
+          </p:style>
+        </p:cxnSp>
+        <p:cxnSp>
+          <p:nvCxnSpPr>
+            <p:cNvPr id="45" name="Connector: Elbow 44">
+              <a:extLst>
+                <a:ext uri="{FF2B5EF4-FFF2-40B4-BE49-F238E27FC236}">
+                  <a16:creationId xmlns:a16="http://schemas.microsoft.com/office/drawing/2014/main" id="{D5C362D4-6282-2FC6-F234-CAE5D40FE052}"/>
+                </a:ext>
+              </a:extLst>
+            </p:cNvPr>
+            <p:cNvCxnSpPr>
+              <a:cxnSpLocks/>
+              <a:stCxn id="33" idx="3"/>
+              <a:endCxn id="31" idx="2"/>
+            </p:cNvCxnSpPr>
+            <p:nvPr/>
+          </p:nvCxnSpPr>
+          <p:spPr>
+            <a:xfrm>
+              <a:off x="3714381" y="3734378"/>
+              <a:ext cx="3073733" cy="1563445"/>
+            </a:xfrm>
+            <a:prstGeom prst="bentConnector4">
+              <a:avLst>
+                <a:gd name="adj1" fmla="val 7293"/>
+                <a:gd name="adj2" fmla="val 114622"/>
+              </a:avLst>
+            </a:prstGeom>
+            <a:ln w="57150">
+              <a:solidFill>
+                <a:schemeClr val="accent3">
+                  <a:lumMod val="50000"/>
+                </a:schemeClr>
+              </a:solidFill>
+              <a:headEnd type="triangle"/>
+              <a:tailEnd type="triangle"/>
+            </a:ln>
+          </p:spPr>
+          <p:style>
+            <a:lnRef idx="2">
+              <a:schemeClr val="accent1"/>
+            </a:lnRef>
+            <a:fillRef idx="0">
+              <a:schemeClr val="accent1"/>
+            </a:fillRef>
+            <a:effectRef idx="1">
+              <a:schemeClr val="accent1"/>
+            </a:effectRef>
+            <a:fontRef idx="minor">
+              <a:schemeClr val="tx1"/>
+            </a:fontRef>
+          </p:style>
+        </p:cxnSp>
+        <p:cxnSp>
+          <p:nvCxnSpPr>
+            <p:cNvPr id="49" name="Connector: Elbow 48">
+              <a:extLst>
+                <a:ext uri="{FF2B5EF4-FFF2-40B4-BE49-F238E27FC236}">
+                  <a16:creationId xmlns:a16="http://schemas.microsoft.com/office/drawing/2014/main" id="{1460A4C3-71E0-8A08-DF7F-E815713BBD80}"/>
+                </a:ext>
+              </a:extLst>
+            </p:cNvPr>
+            <p:cNvCxnSpPr>
+              <a:cxnSpLocks/>
+              <a:stCxn id="16" idx="2"/>
+              <a:endCxn id="34" idx="1"/>
+            </p:cNvCxnSpPr>
+            <p:nvPr/>
+          </p:nvCxnSpPr>
+          <p:spPr>
+            <a:xfrm rot="16200000" flipH="1">
+              <a:off x="8002916" y="3157808"/>
+              <a:ext cx="270398" cy="871564"/>
+            </a:xfrm>
+            <a:prstGeom prst="bentConnector2">
+              <a:avLst/>
+            </a:prstGeom>
+            <a:ln w="57150">
+              <a:solidFill>
+                <a:schemeClr val="tx1"/>
+              </a:solidFill>
+              <a:prstDash val="sysDot"/>
+              <a:headEnd type="triangle"/>
+              <a:tailEnd type="triangle"/>
+            </a:ln>
+          </p:spPr>
+          <p:style>
+            <a:lnRef idx="2">
+              <a:schemeClr val="accent1"/>
+            </a:lnRef>
+            <a:fillRef idx="0">
+              <a:schemeClr val="accent1"/>
+            </a:fillRef>
+            <a:effectRef idx="1">
+              <a:schemeClr val="accent1"/>
+            </a:effectRef>
+            <a:fontRef idx="minor">
+              <a:schemeClr val="tx1"/>
+            </a:fontRef>
+          </p:style>
+        </p:cxnSp>
+        <p:cxnSp>
+          <p:nvCxnSpPr>
+            <p:cNvPr id="53" name="Connector: Elbow 52">
+              <a:extLst>
+                <a:ext uri="{FF2B5EF4-FFF2-40B4-BE49-F238E27FC236}">
+                  <a16:creationId xmlns:a16="http://schemas.microsoft.com/office/drawing/2014/main" id="{D8D90A55-5C15-2F76-D0FE-230AC58E9296}"/>
+                </a:ext>
+              </a:extLst>
+            </p:cNvPr>
+            <p:cNvCxnSpPr>
+              <a:cxnSpLocks/>
+              <a:stCxn id="8" idx="2"/>
+              <a:endCxn id="34" idx="1"/>
+            </p:cNvCxnSpPr>
+            <p:nvPr/>
+          </p:nvCxnSpPr>
+          <p:spPr>
+            <a:xfrm rot="16200000" flipH="1">
+              <a:off x="6889951" y="2044842"/>
+              <a:ext cx="275203" cy="3092690"/>
+            </a:xfrm>
+            <a:prstGeom prst="bentConnector2">
+              <a:avLst/>
+            </a:prstGeom>
+            <a:ln w="57150">
+              <a:solidFill>
+                <a:schemeClr val="tx1"/>
+              </a:solidFill>
+              <a:prstDash val="sysDot"/>
+              <a:headEnd type="triangle"/>
+              <a:tailEnd type="triangle"/>
+            </a:ln>
+          </p:spPr>
+          <p:style>
+            <a:lnRef idx="2">
+              <a:schemeClr val="accent1"/>
+            </a:lnRef>
+            <a:fillRef idx="0">
+              <a:schemeClr val="accent1"/>
+            </a:fillRef>
+            <a:effectRef idx="1">
+              <a:schemeClr val="accent1"/>
+            </a:effectRef>
+            <a:fontRef idx="minor">
+              <a:schemeClr val="tx1"/>
+            </a:fontRef>
+          </p:style>
+        </p:cxnSp>
+        <p:cxnSp>
+          <p:nvCxnSpPr>
+            <p:cNvPr id="56" name="Connector: Elbow 55">
+              <a:extLst>
+                <a:ext uri="{FF2B5EF4-FFF2-40B4-BE49-F238E27FC236}">
+                  <a16:creationId xmlns:a16="http://schemas.microsoft.com/office/drawing/2014/main" id="{F3936706-EB4A-1475-2F02-7DA07B1C2836}"/>
+                </a:ext>
+              </a:extLst>
+            </p:cNvPr>
+            <p:cNvCxnSpPr>
+              <a:cxnSpLocks/>
+              <a:stCxn id="30" idx="2"/>
+              <a:endCxn id="34" idx="1"/>
+            </p:cNvCxnSpPr>
+            <p:nvPr/>
+          </p:nvCxnSpPr>
+          <p:spPr>
+            <a:xfrm rot="5400000" flipH="1" flipV="1">
+              <a:off x="7353081" y="4077007"/>
+              <a:ext cx="1569033" cy="872597"/>
+            </a:xfrm>
+            <a:prstGeom prst="bentConnector4">
+              <a:avLst>
+                <a:gd name="adj1" fmla="val -14569"/>
+                <a:gd name="adj2" fmla="val 72724"/>
+              </a:avLst>
+            </a:prstGeom>
+            <a:ln w="57150">
+              <a:solidFill>
+                <a:schemeClr val="tx1"/>
+              </a:solidFill>
+              <a:prstDash val="sysDot"/>
+              <a:headEnd type="triangle"/>
+              <a:tailEnd type="triangle"/>
+            </a:ln>
+          </p:spPr>
+          <p:style>
+            <a:lnRef idx="2">
+              <a:schemeClr val="accent1"/>
+            </a:lnRef>
+            <a:fillRef idx="0">
+              <a:schemeClr val="accent1"/>
+            </a:fillRef>
+            <a:effectRef idx="1">
+              <a:schemeClr val="accent1"/>
+            </a:effectRef>
+            <a:fontRef idx="minor">
+              <a:schemeClr val="tx1"/>
+            </a:fontRef>
+          </p:style>
+        </p:cxnSp>
+        <p:cxnSp>
+          <p:nvCxnSpPr>
+            <p:cNvPr id="59" name="Connector: Elbow 58">
+              <a:extLst>
+                <a:ext uri="{FF2B5EF4-FFF2-40B4-BE49-F238E27FC236}">
+                  <a16:creationId xmlns:a16="http://schemas.microsoft.com/office/drawing/2014/main" id="{FF521BD3-C3CE-CE36-35F9-6C74CC6C421A}"/>
+                </a:ext>
+              </a:extLst>
+            </p:cNvPr>
+            <p:cNvCxnSpPr>
+              <a:cxnSpLocks/>
+              <a:stCxn id="23" idx="2"/>
+              <a:endCxn id="34" idx="1"/>
+            </p:cNvCxnSpPr>
+            <p:nvPr/>
+          </p:nvCxnSpPr>
+          <p:spPr>
+            <a:xfrm rot="5400000" flipH="1" flipV="1">
+              <a:off x="6246477" y="2963519"/>
+              <a:ext cx="1562149" cy="3092690"/>
+            </a:xfrm>
+            <a:prstGeom prst="bentConnector4">
+              <a:avLst>
+                <a:gd name="adj1" fmla="val -14634"/>
+                <a:gd name="adj2" fmla="val 92549"/>
+              </a:avLst>
+            </a:prstGeom>
+            <a:ln w="57150">
+              <a:solidFill>
+                <a:schemeClr val="tx1"/>
+              </a:solidFill>
+              <a:prstDash val="sysDot"/>
+              <a:headEnd type="triangle"/>
+              <a:tailEnd type="triangle"/>
+            </a:ln>
+          </p:spPr>
+          <p:style>
+            <a:lnRef idx="2">
+              <a:schemeClr val="accent1"/>
+            </a:lnRef>
+            <a:fillRef idx="0">
+              <a:schemeClr val="accent1"/>
+            </a:fillRef>
+            <a:effectRef idx="1">
+              <a:schemeClr val="accent1"/>
+            </a:effectRef>
+            <a:fontRef idx="minor">
+              <a:schemeClr val="tx1"/>
+            </a:fontRef>
+          </p:style>
+        </p:cxnSp>
+      </p:grpSp>
+    </p:spTree>
+    <p:extLst>
+      <p:ext uri="{BB962C8B-B14F-4D97-AF65-F5344CB8AC3E}">
+        <p14:creationId xmlns:p14="http://schemas.microsoft.com/office/powerpoint/2010/main" val="2399547639"/>
+      </p:ext>
+    </p:extLst>
+  </p:cSld>
+  <p:clrMapOvr>
+    <a:masterClrMapping/>
+  </p:clrMapOvr>
+</p:sld>
+</file>
+
+<file path=ppt/slides/slide6.xml><?xml version="1.0" encoding="utf-8"?>
+<p:sld xmlns:a="http://schemas.openxmlformats.org/drawingml/2006/main" xmlns:r="http://schemas.openxmlformats.org/officeDocument/2006/relationships" xmlns:p="http://schemas.openxmlformats.org/presentationml/2006/main">
+  <p:cSld>
+    <p:spTree>
+      <p:nvGrpSpPr>
+        <p:cNvPr id="1" name=""/>
+        <p:cNvGrpSpPr/>
+        <p:nvPr/>
+      </p:nvGrpSpPr>
+      <p:grpSpPr>
+        <a:xfrm>
+          <a:off x="0" y="0"/>
+          <a:ext cx="0" cy="0"/>
+          <a:chOff x="0" y="0"/>
+          <a:chExt cx="0" cy="0"/>
+        </a:xfrm>
+      </p:grpSpPr>
+      <p:grpSp>
+        <p:nvGrpSpPr>
+          <p:cNvPr id="48" name="Group 47">
+            <a:extLst>
+              <a:ext uri="{FF2B5EF4-FFF2-40B4-BE49-F238E27FC236}">
+                <a16:creationId xmlns:a16="http://schemas.microsoft.com/office/drawing/2014/main" id="{D165900A-CC0D-8728-55D7-065B21241F6A}"/>
+              </a:ext>
+            </a:extLst>
+          </p:cNvPr>
+          <p:cNvGrpSpPr/>
+          <p:nvPr/>
+        </p:nvGrpSpPr>
+        <p:grpSpPr>
+          <a:xfrm>
+            <a:off x="212035" y="379674"/>
+            <a:ext cx="11767930" cy="6098651"/>
+            <a:chOff x="806829" y="755331"/>
+            <a:chExt cx="10503749" cy="5065502"/>
+          </a:xfrm>
+        </p:grpSpPr>
+        <p:sp>
+          <p:nvSpPr>
+            <p:cNvPr id="18" name="Rectangle: Rounded Corners 17">
+              <a:extLst>
+                <a:ext uri="{FF2B5EF4-FFF2-40B4-BE49-F238E27FC236}">
+                  <a16:creationId xmlns:a16="http://schemas.microsoft.com/office/drawing/2014/main" id="{7DE9C200-62E6-0BC7-B528-919A26965152}"/>
+                </a:ext>
+              </a:extLst>
+            </p:cNvPr>
+            <p:cNvSpPr/>
+            <p:nvPr/>
+          </p:nvSpPr>
+          <p:spPr>
+            <a:xfrm>
+              <a:off x="3030902" y="755331"/>
+              <a:ext cx="8279676" cy="5065502"/>
+            </a:xfrm>
+            <a:prstGeom prst="roundRect">
+              <a:avLst/>
+            </a:prstGeom>
+            <a:solidFill>
+              <a:schemeClr val="accent4">
+                <a:lumMod val="20000"/>
+                <a:lumOff val="80000"/>
+              </a:schemeClr>
+            </a:solidFill>
+            <a:ln>
+              <a:solidFill>
+                <a:schemeClr val="tx1">
+                  <a:lumMod val="85000"/>
+                  <a:lumOff val="15000"/>
+                </a:schemeClr>
+              </a:solidFill>
+            </a:ln>
+          </p:spPr>
+          <p:style>
+            <a:lnRef idx="2">
+              <a:schemeClr val="accent1">
+                <a:shade val="15000"/>
+              </a:schemeClr>
+            </a:lnRef>
+            <a:fillRef idx="1">
+              <a:schemeClr val="accent1"/>
+            </a:fillRef>
+            <a:effectRef idx="0">
+              <a:schemeClr val="accent1"/>
+            </a:effectRef>
+            <a:fontRef idx="minor">
+              <a:schemeClr val="lt1"/>
+            </a:fontRef>
+          </p:style>
+          <p:txBody>
+            <a:bodyPr rtlCol="0" anchor="t"/>
+            <a:lstStyle/>
+            <a:p>
+              <a:pPr algn="ctr"/>
+              <a:r>
+                <a:rPr lang="en-US" sz="4000" b="1" dirty="0">
+                  <a:solidFill>
+                    <a:schemeClr val="tx1"/>
+                  </a:solidFill>
+                </a:rPr>
+                <a:t>K8s Namespace &amp; Security Policy</a:t>
+              </a:r>
+            </a:p>
+          </p:txBody>
+        </p:sp>
+        <p:sp>
+          <p:nvSpPr>
+            <p:cNvPr id="13" name="Rectangle: Rounded Corners 12">
+              <a:extLst>
+                <a:ext uri="{FF2B5EF4-FFF2-40B4-BE49-F238E27FC236}">
+                  <a16:creationId xmlns:a16="http://schemas.microsoft.com/office/drawing/2014/main" id="{C56D4F05-DE4D-D394-5558-83EA31ED3301}"/>
+                </a:ext>
+              </a:extLst>
+            </p:cNvPr>
+            <p:cNvSpPr/>
+            <p:nvPr/>
+          </p:nvSpPr>
+          <p:spPr>
+            <a:xfrm>
+              <a:off x="6378075" y="1790298"/>
+              <a:ext cx="3093613" cy="3794449"/>
+            </a:xfrm>
+            <a:prstGeom prst="roundRect">
+              <a:avLst/>
+            </a:prstGeom>
+            <a:solidFill>
+              <a:srgbClr val="DCC480"/>
+            </a:solidFill>
+            <a:ln>
+              <a:solidFill>
+                <a:schemeClr val="tx1">
+                  <a:lumMod val="85000"/>
+                  <a:lumOff val="15000"/>
+                </a:schemeClr>
+              </a:solidFill>
+            </a:ln>
+          </p:spPr>
+          <p:style>
+            <a:lnRef idx="2">
+              <a:schemeClr val="accent1">
+                <a:shade val="15000"/>
+              </a:schemeClr>
+            </a:lnRef>
+            <a:fillRef idx="1">
+              <a:schemeClr val="accent1"/>
+            </a:fillRef>
+            <a:effectRef idx="0">
+              <a:schemeClr val="accent1"/>
+            </a:effectRef>
+            <a:fontRef idx="minor">
+              <a:schemeClr val="lt1"/>
+            </a:fontRef>
+          </p:style>
+          <p:txBody>
+            <a:bodyPr rtlCol="0" anchor="t"/>
+            <a:lstStyle/>
+            <a:p>
+              <a:pPr algn="ctr"/>
+              <a:r>
+                <a:rPr lang="en-US" sz="2400" b="1" dirty="0">
+                  <a:solidFill>
+                    <a:schemeClr val="tx1"/>
+                  </a:solidFill>
+                </a:rPr>
+                <a:t>K8s Admission Policy</a:t>
+              </a:r>
+            </a:p>
+          </p:txBody>
+        </p:sp>
+        <p:sp>
+          <p:nvSpPr>
+            <p:cNvPr id="6" name="Rectangle: Rounded Corners 5">
+              <a:extLst>
+                <a:ext uri="{FF2B5EF4-FFF2-40B4-BE49-F238E27FC236}">
+                  <a16:creationId xmlns:a16="http://schemas.microsoft.com/office/drawing/2014/main" id="{16410723-3695-496C-A257-A124EB1BBBF1}"/>
+                </a:ext>
+              </a:extLst>
+            </p:cNvPr>
+            <p:cNvSpPr/>
+            <p:nvPr/>
+          </p:nvSpPr>
+          <p:spPr>
+            <a:xfrm>
+              <a:off x="6704542" y="2411573"/>
+              <a:ext cx="2451854" cy="2931545"/>
+            </a:xfrm>
+            <a:prstGeom prst="roundRect">
+              <a:avLst/>
+            </a:prstGeom>
+            <a:solidFill>
+              <a:srgbClr val="FFFF99"/>
+            </a:solidFill>
+            <a:ln>
+              <a:solidFill>
+                <a:schemeClr val="tx1">
+                  <a:lumMod val="85000"/>
+                  <a:lumOff val="15000"/>
+                </a:schemeClr>
+              </a:solidFill>
+            </a:ln>
+          </p:spPr>
+          <p:style>
+            <a:lnRef idx="2">
+              <a:schemeClr val="accent1">
+                <a:shade val="15000"/>
+              </a:schemeClr>
+            </a:lnRef>
+            <a:fillRef idx="1">
+              <a:schemeClr val="accent1"/>
+            </a:fillRef>
+            <a:effectRef idx="0">
+              <a:schemeClr val="accent1"/>
+            </a:effectRef>
+            <a:fontRef idx="minor">
+              <a:schemeClr val="lt1"/>
+            </a:fontRef>
+          </p:style>
+          <p:txBody>
+            <a:bodyPr rtlCol="0" anchor="t"/>
+            <a:lstStyle/>
+            <a:p>
+              <a:pPr algn="ctr"/>
+              <a:r>
+                <a:rPr lang="en-US" sz="2400" b="1" dirty="0">
+                  <a:solidFill>
+                    <a:schemeClr val="tx1"/>
+                  </a:solidFill>
+                </a:rPr>
+                <a:t>K8s Deployment</a:t>
+              </a:r>
+            </a:p>
+          </p:txBody>
+        </p:sp>
+        <p:sp>
+          <p:nvSpPr>
+            <p:cNvPr id="2" name="Rectangle: Rounded Corners 1">
+              <a:extLst>
+                <a:ext uri="{FF2B5EF4-FFF2-40B4-BE49-F238E27FC236}">
+                  <a16:creationId xmlns:a16="http://schemas.microsoft.com/office/drawing/2014/main" id="{FED35FDA-C18E-7479-86D1-5E1D07FE1FB2}"/>
+                </a:ext>
+              </a:extLst>
+            </p:cNvPr>
+            <p:cNvSpPr/>
+            <p:nvPr/>
+          </p:nvSpPr>
+          <p:spPr>
+            <a:xfrm>
+              <a:off x="7038121" y="2979984"/>
+              <a:ext cx="1828241" cy="449016"/>
+            </a:xfrm>
+            <a:prstGeom prst="roundRect">
+              <a:avLst/>
+            </a:prstGeom>
+            <a:solidFill>
+              <a:schemeClr val="accent3">
+                <a:lumMod val="60000"/>
+                <a:lumOff val="40000"/>
+              </a:schemeClr>
+            </a:solidFill>
+            <a:ln>
+              <a:solidFill>
+                <a:schemeClr val="tx1">
+                  <a:lumMod val="85000"/>
+                  <a:lumOff val="15000"/>
+                </a:schemeClr>
+              </a:solidFill>
+            </a:ln>
+          </p:spPr>
+          <p:style>
+            <a:lnRef idx="2">
+              <a:schemeClr val="accent1">
+                <a:shade val="15000"/>
+              </a:schemeClr>
+            </a:lnRef>
+            <a:fillRef idx="1">
+              <a:schemeClr val="accent1"/>
+            </a:fillRef>
+            <a:effectRef idx="0">
+              <a:schemeClr val="accent1"/>
+            </a:effectRef>
+            <a:fontRef idx="minor">
+              <a:schemeClr val="lt1"/>
+            </a:fontRef>
+          </p:style>
+          <p:txBody>
+            <a:bodyPr rtlCol="0" anchor="t"/>
+            <a:lstStyle/>
+            <a:p>
+              <a:pPr algn="ctr"/>
+              <a:r>
+                <a:rPr lang="en-US" sz="2400" b="1" dirty="0">
+                  <a:solidFill>
+                    <a:schemeClr val="tx1"/>
+                  </a:solidFill>
+                </a:rPr>
+                <a:t>K8s Pod R1</a:t>
+              </a:r>
+            </a:p>
+          </p:txBody>
+        </p:sp>
+        <p:sp>
+          <p:nvSpPr>
+            <p:cNvPr id="12" name="Rectangle 11">
+              <a:extLst>
+                <a:ext uri="{FF2B5EF4-FFF2-40B4-BE49-F238E27FC236}">
+                  <a16:creationId xmlns:a16="http://schemas.microsoft.com/office/drawing/2014/main" id="{4786D88A-6A35-BB89-1B8C-1144744098B9}"/>
+                </a:ext>
+              </a:extLst>
+            </p:cNvPr>
+            <p:cNvSpPr/>
+            <p:nvPr/>
+          </p:nvSpPr>
+          <p:spPr>
+            <a:xfrm>
+              <a:off x="6932323" y="3047246"/>
+              <a:ext cx="211593" cy="314491"/>
+            </a:xfrm>
+            <a:prstGeom prst="rect">
+              <a:avLst/>
+            </a:prstGeom>
+            <a:solidFill>
+              <a:schemeClr val="accent3">
+                <a:lumMod val="50000"/>
+              </a:schemeClr>
+            </a:solidFill>
+            <a:ln>
+              <a:solidFill>
+                <a:schemeClr val="tx1">
+                  <a:lumMod val="85000"/>
+                  <a:lumOff val="15000"/>
+                </a:schemeClr>
+              </a:solidFill>
+            </a:ln>
+          </p:spPr>
+          <p:style>
+            <a:lnRef idx="2">
+              <a:schemeClr val="accent1">
+                <a:shade val="15000"/>
+              </a:schemeClr>
+            </a:lnRef>
+            <a:fillRef idx="1">
+              <a:schemeClr val="accent1"/>
+            </a:fillRef>
+            <a:effectRef idx="0">
+              <a:schemeClr val="accent1"/>
+            </a:effectRef>
+            <a:fontRef idx="minor">
+              <a:schemeClr val="lt1"/>
+            </a:fontRef>
+          </p:style>
+          <p:txBody>
+            <a:bodyPr rtlCol="0" anchor="ctr"/>
+            <a:lstStyle/>
+            <a:p>
+              <a:pPr algn="ctr"/>
+              <a:endParaRPr lang="en-US" sz="1600"/>
+            </a:p>
+          </p:txBody>
+        </p:sp>
+        <p:cxnSp>
+          <p:nvCxnSpPr>
+            <p:cNvPr id="20" name="Connector: Elbow 19">
+              <a:extLst>
+                <a:ext uri="{FF2B5EF4-FFF2-40B4-BE49-F238E27FC236}">
+                  <a16:creationId xmlns:a16="http://schemas.microsoft.com/office/drawing/2014/main" id="{59D5044C-1223-F5DB-451F-50B2BCB8762F}"/>
+                </a:ext>
+              </a:extLst>
+            </p:cNvPr>
+            <p:cNvCxnSpPr>
+              <a:cxnSpLocks/>
+              <a:stCxn id="12" idx="1"/>
+              <a:endCxn id="10" idx="3"/>
+            </p:cNvCxnSpPr>
+            <p:nvPr/>
+          </p:nvCxnSpPr>
+          <p:spPr>
+            <a:xfrm rot="10800000" flipV="1">
+              <a:off x="5930959" y="3204492"/>
+              <a:ext cx="1001365" cy="875480"/>
+            </a:xfrm>
+            <a:prstGeom prst="bentConnector3">
+              <a:avLst/>
+            </a:prstGeom>
+            <a:ln w="76200">
+              <a:solidFill>
+                <a:schemeClr val="accent3">
+                  <a:lumMod val="50000"/>
+                </a:schemeClr>
+              </a:solidFill>
+              <a:headEnd type="triangle"/>
+              <a:tailEnd type="triangle"/>
+            </a:ln>
+          </p:spPr>
+          <p:style>
+            <a:lnRef idx="2">
+              <a:schemeClr val="accent1"/>
+            </a:lnRef>
+            <a:fillRef idx="0">
+              <a:schemeClr val="accent1"/>
+            </a:fillRef>
+            <a:effectRef idx="1">
+              <a:schemeClr val="accent1"/>
+            </a:effectRef>
+            <a:fontRef idx="minor">
+              <a:schemeClr val="tx1"/>
+            </a:fontRef>
+          </p:style>
+        </p:cxnSp>
+        <p:cxnSp>
+          <p:nvCxnSpPr>
+            <p:cNvPr id="21" name="Connector: Elbow 20">
+              <a:extLst>
+                <a:ext uri="{FF2B5EF4-FFF2-40B4-BE49-F238E27FC236}">
+                  <a16:creationId xmlns:a16="http://schemas.microsoft.com/office/drawing/2014/main" id="{21C01C14-976C-7271-01EC-0FB843316A79}"/>
+                </a:ext>
+              </a:extLst>
+            </p:cNvPr>
+            <p:cNvCxnSpPr>
+              <a:cxnSpLocks/>
+              <a:stCxn id="39" idx="1"/>
+              <a:endCxn id="10" idx="3"/>
+            </p:cNvCxnSpPr>
+            <p:nvPr/>
+          </p:nvCxnSpPr>
+          <p:spPr>
+            <a:xfrm rot="10800000" flipV="1">
+              <a:off x="5930959" y="3769472"/>
+              <a:ext cx="1001365" cy="310500"/>
+            </a:xfrm>
+            <a:prstGeom prst="bentConnector3">
+              <a:avLst/>
+            </a:prstGeom>
+            <a:ln w="76200">
+              <a:solidFill>
+                <a:schemeClr val="accent3">
+                  <a:lumMod val="50000"/>
+                </a:schemeClr>
+              </a:solidFill>
+              <a:headEnd type="triangle"/>
+              <a:tailEnd type="triangle"/>
+            </a:ln>
+          </p:spPr>
+          <p:style>
+            <a:lnRef idx="2">
+              <a:schemeClr val="accent1"/>
+            </a:lnRef>
+            <a:fillRef idx="0">
+              <a:schemeClr val="accent1"/>
+            </a:fillRef>
+            <a:effectRef idx="1">
+              <a:schemeClr val="accent1"/>
+            </a:effectRef>
+            <a:fontRef idx="minor">
+              <a:schemeClr val="tx1"/>
+            </a:fontRef>
+          </p:style>
+        </p:cxnSp>
+        <p:cxnSp>
+          <p:nvCxnSpPr>
+            <p:cNvPr id="24" name="Connector: Elbow 23">
+              <a:extLst>
+                <a:ext uri="{FF2B5EF4-FFF2-40B4-BE49-F238E27FC236}">
+                  <a16:creationId xmlns:a16="http://schemas.microsoft.com/office/drawing/2014/main" id="{1A0B4533-52A4-5A39-3C88-5E2D78089895}"/>
+                </a:ext>
+              </a:extLst>
+            </p:cNvPr>
+            <p:cNvCxnSpPr>
+              <a:cxnSpLocks/>
+              <a:stCxn id="40" idx="1"/>
+              <a:endCxn id="10" idx="3"/>
+            </p:cNvCxnSpPr>
+            <p:nvPr/>
+          </p:nvCxnSpPr>
+          <p:spPr>
+            <a:xfrm rot="10800000">
+              <a:off x="5930958" y="4079973"/>
+              <a:ext cx="1001364" cy="256753"/>
+            </a:xfrm>
+            <a:prstGeom prst="bentConnector3">
+              <a:avLst>
+                <a:gd name="adj1" fmla="val 50000"/>
+              </a:avLst>
+            </a:prstGeom>
+            <a:ln w="76200">
+              <a:solidFill>
+                <a:schemeClr val="accent3">
+                  <a:lumMod val="50000"/>
+                </a:schemeClr>
+              </a:solidFill>
+              <a:headEnd type="triangle"/>
+              <a:tailEnd type="triangle"/>
+            </a:ln>
+          </p:spPr>
+          <p:style>
+            <a:lnRef idx="2">
+              <a:schemeClr val="accent1"/>
+            </a:lnRef>
+            <a:fillRef idx="0">
+              <a:schemeClr val="accent1"/>
+            </a:fillRef>
+            <a:effectRef idx="1">
+              <a:schemeClr val="accent1"/>
+            </a:effectRef>
+            <a:fontRef idx="minor">
+              <a:schemeClr val="tx1"/>
+            </a:fontRef>
+          </p:style>
+        </p:cxnSp>
+        <p:cxnSp>
+          <p:nvCxnSpPr>
+            <p:cNvPr id="27" name="Connector: Elbow 26">
+              <a:extLst>
+                <a:ext uri="{FF2B5EF4-FFF2-40B4-BE49-F238E27FC236}">
+                  <a16:creationId xmlns:a16="http://schemas.microsoft.com/office/drawing/2014/main" id="{A5D8E043-2DCA-3747-575E-6E6F35BE80E7}"/>
+                </a:ext>
+              </a:extLst>
+            </p:cNvPr>
+            <p:cNvCxnSpPr>
+              <a:cxnSpLocks/>
+              <a:stCxn id="41" idx="1"/>
+              <a:endCxn id="10" idx="3"/>
+            </p:cNvCxnSpPr>
+            <p:nvPr/>
+          </p:nvCxnSpPr>
+          <p:spPr>
+            <a:xfrm rot="10800000">
+              <a:off x="5930958" y="4079972"/>
+              <a:ext cx="1001364" cy="816198"/>
+            </a:xfrm>
+            <a:prstGeom prst="bentConnector3">
+              <a:avLst>
+                <a:gd name="adj1" fmla="val 50000"/>
+              </a:avLst>
+            </a:prstGeom>
+            <a:ln w="76200">
+              <a:solidFill>
+                <a:schemeClr val="accent3">
+                  <a:lumMod val="50000"/>
+                </a:schemeClr>
+              </a:solidFill>
+              <a:headEnd type="triangle"/>
+              <a:tailEnd type="triangle"/>
+            </a:ln>
+          </p:spPr>
+          <p:style>
+            <a:lnRef idx="2">
+              <a:schemeClr val="accent1"/>
+            </a:lnRef>
+            <a:fillRef idx="0">
+              <a:schemeClr val="accent1"/>
+            </a:fillRef>
+            <a:effectRef idx="1">
+              <a:schemeClr val="accent1"/>
+            </a:effectRef>
+            <a:fontRef idx="minor">
+              <a:schemeClr val="tx1"/>
+            </a:fontRef>
+          </p:style>
+        </p:cxnSp>
+        <p:sp>
+          <p:nvSpPr>
+            <p:cNvPr id="34" name="Rectangle: Rounded Corners 33">
+              <a:extLst>
+                <a:ext uri="{FF2B5EF4-FFF2-40B4-BE49-F238E27FC236}">
+                  <a16:creationId xmlns:a16="http://schemas.microsoft.com/office/drawing/2014/main" id="{60748C3C-9DB9-7B59-A5F5-D3CBF97E6268}"/>
+                </a:ext>
+              </a:extLst>
+            </p:cNvPr>
+            <p:cNvSpPr/>
+            <p:nvPr/>
+          </p:nvSpPr>
+          <p:spPr>
+            <a:xfrm>
+              <a:off x="7038121" y="3545301"/>
+              <a:ext cx="1828241" cy="449016"/>
+            </a:xfrm>
+            <a:prstGeom prst="roundRect">
+              <a:avLst/>
+            </a:prstGeom>
+            <a:solidFill>
+              <a:schemeClr val="accent3">
+                <a:lumMod val="60000"/>
+                <a:lumOff val="40000"/>
+              </a:schemeClr>
+            </a:solidFill>
+            <a:ln>
+              <a:solidFill>
+                <a:schemeClr val="tx1">
+                  <a:lumMod val="85000"/>
+                  <a:lumOff val="15000"/>
+                </a:schemeClr>
+              </a:solidFill>
+            </a:ln>
+          </p:spPr>
+          <p:style>
+            <a:lnRef idx="2">
+              <a:schemeClr val="accent1">
+                <a:shade val="15000"/>
+              </a:schemeClr>
+            </a:lnRef>
+            <a:fillRef idx="1">
+              <a:schemeClr val="accent1"/>
+            </a:fillRef>
+            <a:effectRef idx="0">
+              <a:schemeClr val="accent1"/>
+            </a:effectRef>
+            <a:fontRef idx="minor">
+              <a:schemeClr val="lt1"/>
+            </a:fontRef>
+          </p:style>
+          <p:txBody>
+            <a:bodyPr rtlCol="0" anchor="t"/>
+            <a:lstStyle/>
+            <a:p>
+              <a:pPr algn="ctr"/>
+              <a:r>
+                <a:rPr lang="en-US" sz="2400" b="1" dirty="0">
+                  <a:solidFill>
+                    <a:schemeClr val="tx1"/>
+                  </a:solidFill>
+                </a:rPr>
+                <a:t>K8s Pod R2</a:t>
+              </a:r>
+            </a:p>
+          </p:txBody>
+        </p:sp>
+        <p:sp>
+          <p:nvSpPr>
+            <p:cNvPr id="35" name="Rectangle: Rounded Corners 34">
+              <a:extLst>
+                <a:ext uri="{FF2B5EF4-FFF2-40B4-BE49-F238E27FC236}">
+                  <a16:creationId xmlns:a16="http://schemas.microsoft.com/office/drawing/2014/main" id="{2DE0FF58-2244-5C0B-C24A-D60F0CEF40CB}"/>
+                </a:ext>
+              </a:extLst>
+            </p:cNvPr>
+            <p:cNvSpPr/>
+            <p:nvPr/>
+          </p:nvSpPr>
+          <p:spPr>
+            <a:xfrm>
+              <a:off x="7038120" y="4115163"/>
+              <a:ext cx="1828241" cy="449016"/>
+            </a:xfrm>
+            <a:prstGeom prst="roundRect">
+              <a:avLst/>
+            </a:prstGeom>
+            <a:solidFill>
+              <a:schemeClr val="accent3">
+                <a:lumMod val="60000"/>
+                <a:lumOff val="40000"/>
+              </a:schemeClr>
+            </a:solidFill>
+            <a:ln>
+              <a:solidFill>
+                <a:schemeClr val="tx1">
+                  <a:lumMod val="85000"/>
+                  <a:lumOff val="15000"/>
+                </a:schemeClr>
+              </a:solidFill>
+            </a:ln>
+          </p:spPr>
+          <p:style>
+            <a:lnRef idx="2">
+              <a:schemeClr val="accent1">
+                <a:shade val="15000"/>
+              </a:schemeClr>
+            </a:lnRef>
+            <a:fillRef idx="1">
+              <a:schemeClr val="accent1"/>
+            </a:fillRef>
+            <a:effectRef idx="0">
+              <a:schemeClr val="accent1"/>
+            </a:effectRef>
+            <a:fontRef idx="minor">
+              <a:schemeClr val="lt1"/>
+            </a:fontRef>
+          </p:style>
+          <p:txBody>
+            <a:bodyPr rtlCol="0" anchor="t"/>
+            <a:lstStyle/>
+            <a:p>
+              <a:pPr algn="ctr"/>
+              <a:r>
+                <a:rPr lang="en-US" sz="2400" b="1" dirty="0">
+                  <a:solidFill>
+                    <a:schemeClr val="tx1"/>
+                  </a:solidFill>
+                </a:rPr>
+                <a:t>K8s Pod R…</a:t>
+              </a:r>
+            </a:p>
+          </p:txBody>
+        </p:sp>
+        <p:sp>
+          <p:nvSpPr>
+            <p:cNvPr id="36" name="Rectangle: Rounded Corners 35">
+              <a:extLst>
+                <a:ext uri="{FF2B5EF4-FFF2-40B4-BE49-F238E27FC236}">
+                  <a16:creationId xmlns:a16="http://schemas.microsoft.com/office/drawing/2014/main" id="{E4E72BEA-9C8D-CB80-7879-EBD0BD07C767}"/>
+                </a:ext>
+              </a:extLst>
+            </p:cNvPr>
+            <p:cNvSpPr/>
+            <p:nvPr/>
+          </p:nvSpPr>
+          <p:spPr>
+            <a:xfrm>
+              <a:off x="7038120" y="4671662"/>
+              <a:ext cx="1828241" cy="449016"/>
+            </a:xfrm>
+            <a:prstGeom prst="roundRect">
+              <a:avLst/>
+            </a:prstGeom>
+            <a:solidFill>
+              <a:schemeClr val="accent3">
+                <a:lumMod val="60000"/>
+                <a:lumOff val="40000"/>
+              </a:schemeClr>
+            </a:solidFill>
+            <a:ln>
+              <a:solidFill>
+                <a:schemeClr val="tx1">
+                  <a:lumMod val="85000"/>
+                  <a:lumOff val="15000"/>
+                </a:schemeClr>
+              </a:solidFill>
+            </a:ln>
+          </p:spPr>
+          <p:style>
+            <a:lnRef idx="2">
+              <a:schemeClr val="accent1">
+                <a:shade val="15000"/>
+              </a:schemeClr>
+            </a:lnRef>
+            <a:fillRef idx="1">
+              <a:schemeClr val="accent1"/>
+            </a:fillRef>
+            <a:effectRef idx="0">
+              <a:schemeClr val="accent1"/>
+            </a:effectRef>
+            <a:fontRef idx="minor">
+              <a:schemeClr val="lt1"/>
+            </a:fontRef>
+          </p:style>
+          <p:txBody>
+            <a:bodyPr rtlCol="0" anchor="t"/>
+            <a:lstStyle/>
+            <a:p>
+              <a:pPr algn="ctr"/>
+              <a:r>
+                <a:rPr lang="en-US" sz="2400" b="1" dirty="0">
+                  <a:solidFill>
+                    <a:schemeClr val="tx1"/>
+                  </a:solidFill>
+                </a:rPr>
+                <a:t>K8s Pod RN</a:t>
+              </a:r>
+            </a:p>
+          </p:txBody>
+        </p:sp>
+        <p:sp>
+          <p:nvSpPr>
+            <p:cNvPr id="39" name="Rectangle 38">
+              <a:extLst>
+                <a:ext uri="{FF2B5EF4-FFF2-40B4-BE49-F238E27FC236}">
+                  <a16:creationId xmlns:a16="http://schemas.microsoft.com/office/drawing/2014/main" id="{38DA8483-080C-E5BE-BA1E-A4746B36DD08}"/>
+                </a:ext>
+              </a:extLst>
+            </p:cNvPr>
+            <p:cNvSpPr/>
+            <p:nvPr/>
+          </p:nvSpPr>
+          <p:spPr>
+            <a:xfrm>
+              <a:off x="6932323" y="3612226"/>
+              <a:ext cx="211593" cy="314491"/>
+            </a:xfrm>
+            <a:prstGeom prst="rect">
+              <a:avLst/>
+            </a:prstGeom>
+            <a:solidFill>
+              <a:schemeClr val="accent3">
+                <a:lumMod val="50000"/>
+              </a:schemeClr>
+            </a:solidFill>
+            <a:ln>
+              <a:solidFill>
+                <a:schemeClr val="tx1">
+                  <a:lumMod val="85000"/>
+                  <a:lumOff val="15000"/>
+                </a:schemeClr>
+              </a:solidFill>
+            </a:ln>
+          </p:spPr>
+          <p:style>
+            <a:lnRef idx="2">
+              <a:schemeClr val="accent1">
+                <a:shade val="15000"/>
+              </a:schemeClr>
+            </a:lnRef>
+            <a:fillRef idx="1">
+              <a:schemeClr val="accent1"/>
+            </a:fillRef>
+            <a:effectRef idx="0">
+              <a:schemeClr val="accent1"/>
+            </a:effectRef>
+            <a:fontRef idx="minor">
+              <a:schemeClr val="lt1"/>
+            </a:fontRef>
+          </p:style>
+          <p:txBody>
+            <a:bodyPr rtlCol="0" anchor="ctr"/>
+            <a:lstStyle/>
+            <a:p>
+              <a:pPr algn="ctr"/>
+              <a:endParaRPr lang="en-US" sz="1600"/>
+            </a:p>
+          </p:txBody>
+        </p:sp>
+        <p:sp>
+          <p:nvSpPr>
+            <p:cNvPr id="40" name="Rectangle 39">
+              <a:extLst>
+                <a:ext uri="{FF2B5EF4-FFF2-40B4-BE49-F238E27FC236}">
+                  <a16:creationId xmlns:a16="http://schemas.microsoft.com/office/drawing/2014/main" id="{02844230-EAE2-34FF-0853-30A28F24B960}"/>
+                </a:ext>
+              </a:extLst>
+            </p:cNvPr>
+            <p:cNvSpPr/>
+            <p:nvPr/>
+          </p:nvSpPr>
+          <p:spPr>
+            <a:xfrm>
+              <a:off x="6932322" y="4179479"/>
+              <a:ext cx="211593" cy="314491"/>
+            </a:xfrm>
+            <a:prstGeom prst="rect">
+              <a:avLst/>
+            </a:prstGeom>
+            <a:solidFill>
+              <a:schemeClr val="accent3">
+                <a:lumMod val="50000"/>
+              </a:schemeClr>
+            </a:solidFill>
+            <a:ln>
+              <a:solidFill>
+                <a:schemeClr val="tx1">
+                  <a:lumMod val="85000"/>
+                  <a:lumOff val="15000"/>
+                </a:schemeClr>
+              </a:solidFill>
+            </a:ln>
+          </p:spPr>
+          <p:style>
+            <a:lnRef idx="2">
+              <a:schemeClr val="accent1">
+                <a:shade val="15000"/>
+              </a:schemeClr>
+            </a:lnRef>
+            <a:fillRef idx="1">
+              <a:schemeClr val="accent1"/>
+            </a:fillRef>
+            <a:effectRef idx="0">
+              <a:schemeClr val="accent1"/>
+            </a:effectRef>
+            <a:fontRef idx="minor">
+              <a:schemeClr val="lt1"/>
+            </a:fontRef>
+          </p:style>
+          <p:txBody>
+            <a:bodyPr rtlCol="0" anchor="ctr"/>
+            <a:lstStyle/>
+            <a:p>
+              <a:pPr algn="ctr"/>
+              <a:endParaRPr lang="en-US" sz="1600"/>
+            </a:p>
+          </p:txBody>
+        </p:sp>
+        <p:sp>
+          <p:nvSpPr>
+            <p:cNvPr id="41" name="Rectangle 40">
+              <a:extLst>
+                <a:ext uri="{FF2B5EF4-FFF2-40B4-BE49-F238E27FC236}">
+                  <a16:creationId xmlns:a16="http://schemas.microsoft.com/office/drawing/2014/main" id="{9F54CF6E-1A8D-4075-CEAA-E4F33C427138}"/>
+                </a:ext>
+              </a:extLst>
+            </p:cNvPr>
+            <p:cNvSpPr/>
+            <p:nvPr/>
+          </p:nvSpPr>
+          <p:spPr>
+            <a:xfrm>
+              <a:off x="6932322" y="4738924"/>
+              <a:ext cx="211593" cy="314491"/>
+            </a:xfrm>
+            <a:prstGeom prst="rect">
+              <a:avLst/>
+            </a:prstGeom>
+            <a:solidFill>
+              <a:schemeClr val="accent3">
+                <a:lumMod val="50000"/>
+              </a:schemeClr>
+            </a:solidFill>
+            <a:ln>
+              <a:solidFill>
+                <a:schemeClr val="tx1">
+                  <a:lumMod val="85000"/>
+                  <a:lumOff val="15000"/>
+                </a:schemeClr>
+              </a:solidFill>
+            </a:ln>
+          </p:spPr>
+          <p:style>
+            <a:lnRef idx="2">
+              <a:schemeClr val="accent1">
+                <a:shade val="15000"/>
+              </a:schemeClr>
+            </a:lnRef>
+            <a:fillRef idx="1">
+              <a:schemeClr val="accent1"/>
+            </a:fillRef>
+            <a:effectRef idx="0">
+              <a:schemeClr val="accent1"/>
+            </a:effectRef>
+            <a:fontRef idx="minor">
+              <a:schemeClr val="lt1"/>
+            </a:fontRef>
+          </p:style>
+          <p:txBody>
+            <a:bodyPr rtlCol="0" anchor="ctr"/>
+            <a:lstStyle/>
+            <a:p>
+              <a:pPr algn="ctr"/>
+              <a:endParaRPr lang="en-US" sz="1600"/>
+            </a:p>
+          </p:txBody>
+        </p:sp>
+        <p:pic>
+          <p:nvPicPr>
+            <p:cNvPr id="58" name="Graphic 57" descr="User with solid fill">
+              <a:extLst>
+                <a:ext uri="{FF2B5EF4-FFF2-40B4-BE49-F238E27FC236}">
+                  <a16:creationId xmlns:a16="http://schemas.microsoft.com/office/drawing/2014/main" id="{290A44A4-995C-4E97-488B-D42186F54F94}"/>
+                </a:ext>
+              </a:extLst>
+            </p:cNvPr>
+            <p:cNvPicPr>
+              <a:picLocks noChangeAspect="1"/>
+            </p:cNvPicPr>
+            <p:nvPr/>
+          </p:nvPicPr>
+          <p:blipFill>
+            <a:blip r:embed="rId2">
+              <a:extLst>
+                <a:ext uri="{96DAC541-7B7A-43D3-8B79-37D633B846F1}">
+                  <asvg:svgBlip xmlns:asvg="http://schemas.microsoft.com/office/drawing/2016/SVG/main" r:embed="rId3"/>
+                </a:ext>
+              </a:extLst>
+            </a:blip>
+            <a:srcRect l="14735" t="12485" r="14357" b="12791"/>
+            <a:stretch>
+              <a:fillRect/>
+            </a:stretch>
+          </p:blipFill>
+          <p:spPr>
+            <a:xfrm>
+              <a:off x="806829" y="3345349"/>
+              <a:ext cx="1205577" cy="1270449"/>
+            </a:xfrm>
+            <a:prstGeom prst="rect">
+              <a:avLst/>
+            </a:prstGeom>
+          </p:spPr>
+        </p:pic>
+        <p:cxnSp>
+          <p:nvCxnSpPr>
+            <p:cNvPr id="59" name="Connector: Elbow 58">
+              <a:extLst>
+                <a:ext uri="{FF2B5EF4-FFF2-40B4-BE49-F238E27FC236}">
+                  <a16:creationId xmlns:a16="http://schemas.microsoft.com/office/drawing/2014/main" id="{2AF9B3A3-B37E-0AE2-B727-C4A0650E8091}"/>
+                </a:ext>
+              </a:extLst>
+            </p:cNvPr>
+            <p:cNvCxnSpPr>
+              <a:cxnSpLocks/>
+              <a:stCxn id="57" idx="1"/>
+            </p:cNvCxnSpPr>
+            <p:nvPr/>
+          </p:nvCxnSpPr>
+          <p:spPr>
+            <a:xfrm rot="10800000">
+              <a:off x="1960034" y="4079972"/>
+              <a:ext cx="1070869" cy="1"/>
+            </a:xfrm>
+            <a:prstGeom prst="bentConnector3">
+              <a:avLst>
+                <a:gd name="adj1" fmla="val 50000"/>
+              </a:avLst>
+            </a:prstGeom>
+            <a:ln w="76200">
+              <a:solidFill>
+                <a:schemeClr val="accent3">
+                  <a:lumMod val="50000"/>
+                </a:schemeClr>
+              </a:solidFill>
+              <a:headEnd type="triangle"/>
+              <a:tailEnd type="triangle"/>
+            </a:ln>
+          </p:spPr>
+          <p:style>
+            <a:lnRef idx="2">
+              <a:schemeClr val="accent1"/>
+            </a:lnRef>
+            <a:fillRef idx="0">
+              <a:schemeClr val="accent1"/>
+            </a:fillRef>
+            <a:effectRef idx="1">
+              <a:schemeClr val="accent1"/>
+            </a:effectRef>
+            <a:fontRef idx="minor">
+              <a:schemeClr val="tx1"/>
+            </a:fontRef>
+          </p:style>
+        </p:cxnSp>
+        <p:sp>
+          <p:nvSpPr>
+            <p:cNvPr id="3" name="Rectangle: Rounded Corners 2">
+              <a:extLst>
+                <a:ext uri="{FF2B5EF4-FFF2-40B4-BE49-F238E27FC236}">
+                  <a16:creationId xmlns:a16="http://schemas.microsoft.com/office/drawing/2014/main" id="{ED7338E8-92EA-48D0-8058-F9033CFEE44D}"/>
+                </a:ext>
+              </a:extLst>
+            </p:cNvPr>
+            <p:cNvSpPr/>
+            <p:nvPr/>
+          </p:nvSpPr>
+          <p:spPr>
+            <a:xfrm>
+              <a:off x="3030902" y="3188103"/>
+              <a:ext cx="2900056" cy="1467172"/>
+            </a:xfrm>
+            <a:prstGeom prst="roundRect">
+              <a:avLst/>
+            </a:prstGeom>
+            <a:solidFill>
+              <a:srgbClr val="DCC480"/>
+            </a:solidFill>
+            <a:ln>
+              <a:solidFill>
+                <a:schemeClr val="tx1">
+                  <a:lumMod val="85000"/>
+                  <a:lumOff val="15000"/>
+                </a:schemeClr>
+              </a:solidFill>
+            </a:ln>
+          </p:spPr>
+          <p:style>
+            <a:lnRef idx="2">
+              <a:schemeClr val="accent1">
+                <a:shade val="15000"/>
+              </a:schemeClr>
+            </a:lnRef>
+            <a:fillRef idx="1">
+              <a:schemeClr val="accent1"/>
+            </a:fillRef>
+            <a:effectRef idx="0">
+              <a:schemeClr val="accent1"/>
+            </a:effectRef>
+            <a:fontRef idx="minor">
+              <a:schemeClr val="lt1"/>
+            </a:fontRef>
+          </p:style>
+          <p:txBody>
+            <a:bodyPr rtlCol="0" anchor="t"/>
+            <a:lstStyle/>
+            <a:p>
+              <a:pPr algn="ctr"/>
+              <a:r>
+                <a:rPr lang="en-US" sz="2400" b="1" dirty="0">
+                  <a:solidFill>
+                    <a:schemeClr val="tx1"/>
+                  </a:solidFill>
+                </a:rPr>
+                <a:t>K8s Network Policy</a:t>
+              </a:r>
+            </a:p>
+          </p:txBody>
+        </p:sp>
+        <p:sp>
+          <p:nvSpPr>
+            <p:cNvPr id="10" name="Rectangle: Rounded Corners 9">
+              <a:extLst>
+                <a:ext uri="{FF2B5EF4-FFF2-40B4-BE49-F238E27FC236}">
+                  <a16:creationId xmlns:a16="http://schemas.microsoft.com/office/drawing/2014/main" id="{C57CD498-0901-ADCC-2749-DE5FE6C5149B}"/>
+                </a:ext>
+              </a:extLst>
+            </p:cNvPr>
+            <p:cNvSpPr/>
+            <p:nvPr/>
+          </p:nvSpPr>
+          <p:spPr>
+            <a:xfrm>
+              <a:off x="4480930" y="3700549"/>
+              <a:ext cx="1450028" cy="758846"/>
+            </a:xfrm>
+            <a:prstGeom prst="roundRect">
+              <a:avLst/>
+            </a:prstGeom>
+            <a:solidFill>
+              <a:srgbClr val="FFFF99"/>
+            </a:solidFill>
+            <a:ln>
+              <a:solidFill>
+                <a:schemeClr val="tx1">
+                  <a:lumMod val="85000"/>
+                  <a:lumOff val="15000"/>
+                </a:schemeClr>
+              </a:solidFill>
+            </a:ln>
+          </p:spPr>
+          <p:style>
+            <a:lnRef idx="2">
+              <a:schemeClr val="accent1">
+                <a:shade val="15000"/>
+              </a:schemeClr>
+            </a:lnRef>
+            <a:fillRef idx="1">
+              <a:schemeClr val="accent1"/>
+            </a:fillRef>
+            <a:effectRef idx="0">
+              <a:schemeClr val="accent1"/>
+            </a:effectRef>
+            <a:fontRef idx="minor">
+              <a:schemeClr val="lt1"/>
+            </a:fontRef>
+          </p:style>
+          <p:txBody>
+            <a:bodyPr rtlCol="0" anchor="t"/>
+            <a:lstStyle/>
+            <a:p>
+              <a:pPr algn="ctr"/>
+              <a:r>
+                <a:rPr lang="en-US" sz="2400" b="1" dirty="0">
+                  <a:solidFill>
+                    <a:schemeClr val="tx1"/>
+                  </a:solidFill>
+                </a:rPr>
+                <a:t>K8s Service</a:t>
+              </a:r>
+            </a:p>
+          </p:txBody>
+        </p:sp>
+        <p:sp>
+          <p:nvSpPr>
+            <p:cNvPr id="57" name="Rectangle: Rounded Corners 56">
+              <a:extLst>
+                <a:ext uri="{FF2B5EF4-FFF2-40B4-BE49-F238E27FC236}">
+                  <a16:creationId xmlns:a16="http://schemas.microsoft.com/office/drawing/2014/main" id="{21483894-C739-797F-A0B7-66837D235B4C}"/>
+                </a:ext>
+              </a:extLst>
+            </p:cNvPr>
+            <p:cNvSpPr/>
+            <p:nvPr/>
+          </p:nvSpPr>
+          <p:spPr>
+            <a:xfrm>
+              <a:off x="3030902" y="3700549"/>
+              <a:ext cx="1450028" cy="758846"/>
+            </a:xfrm>
+            <a:prstGeom prst="roundRect">
+              <a:avLst/>
+            </a:prstGeom>
+            <a:solidFill>
+              <a:srgbClr val="FFFF99"/>
+            </a:solidFill>
+            <a:ln>
+              <a:solidFill>
+                <a:schemeClr val="tx1">
+                  <a:lumMod val="85000"/>
+                  <a:lumOff val="15000"/>
+                </a:schemeClr>
+              </a:solidFill>
+            </a:ln>
+          </p:spPr>
+          <p:style>
+            <a:lnRef idx="2">
+              <a:schemeClr val="accent1">
+                <a:shade val="15000"/>
+              </a:schemeClr>
+            </a:lnRef>
+            <a:fillRef idx="1">
+              <a:schemeClr val="accent1"/>
+            </a:fillRef>
+            <a:effectRef idx="0">
+              <a:schemeClr val="accent1"/>
+            </a:effectRef>
+            <a:fontRef idx="minor">
+              <a:schemeClr val="lt1"/>
+            </a:fontRef>
+          </p:style>
+          <p:txBody>
+            <a:bodyPr rtlCol="0" anchor="t"/>
+            <a:lstStyle/>
+            <a:p>
+              <a:pPr algn="ctr"/>
+              <a:r>
+                <a:rPr lang="en-US" sz="2400" b="1" dirty="0">
+                  <a:solidFill>
+                    <a:schemeClr val="tx1"/>
+                  </a:solidFill>
+                </a:rPr>
+                <a:t>K8s Ingress</a:t>
+              </a:r>
+            </a:p>
+          </p:txBody>
+        </p:sp>
+        <p:sp>
+          <p:nvSpPr>
+            <p:cNvPr id="4" name="Rectangle 3">
+              <a:extLst>
+                <a:ext uri="{FF2B5EF4-FFF2-40B4-BE49-F238E27FC236}">
+                  <a16:creationId xmlns:a16="http://schemas.microsoft.com/office/drawing/2014/main" id="{64B9758A-F4BC-F591-4719-C97F6489166B}"/>
+                </a:ext>
+              </a:extLst>
+            </p:cNvPr>
+            <p:cNvSpPr/>
+            <p:nvPr/>
+          </p:nvSpPr>
+          <p:spPr>
+            <a:xfrm>
+              <a:off x="8760567" y="3047245"/>
+              <a:ext cx="211593" cy="314491"/>
+            </a:xfrm>
+            <a:prstGeom prst="rect">
+              <a:avLst/>
+            </a:prstGeom>
+            <a:solidFill>
+              <a:schemeClr val="tx1"/>
+            </a:solidFill>
+            <a:ln>
+              <a:solidFill>
+                <a:schemeClr val="tx1">
+                  <a:lumMod val="85000"/>
+                  <a:lumOff val="15000"/>
+                </a:schemeClr>
+              </a:solidFill>
+            </a:ln>
+          </p:spPr>
+          <p:style>
+            <a:lnRef idx="2">
+              <a:schemeClr val="accent1">
+                <a:shade val="15000"/>
+              </a:schemeClr>
+            </a:lnRef>
+            <a:fillRef idx="1">
+              <a:schemeClr val="accent1"/>
+            </a:fillRef>
+            <a:effectRef idx="0">
+              <a:schemeClr val="accent1"/>
+            </a:effectRef>
+            <a:fontRef idx="minor">
+              <a:schemeClr val="lt1"/>
+            </a:fontRef>
+          </p:style>
+          <p:txBody>
+            <a:bodyPr rtlCol="0" anchor="ctr"/>
+            <a:lstStyle/>
+            <a:p>
+              <a:pPr algn="ctr"/>
+              <a:endParaRPr lang="en-US" sz="1600"/>
+            </a:p>
+          </p:txBody>
+        </p:sp>
+        <p:sp>
+          <p:nvSpPr>
+            <p:cNvPr id="5" name="Rectangle 4">
+              <a:extLst>
+                <a:ext uri="{FF2B5EF4-FFF2-40B4-BE49-F238E27FC236}">
+                  <a16:creationId xmlns:a16="http://schemas.microsoft.com/office/drawing/2014/main" id="{3FDF06E8-C6CF-8E1D-C925-7646ACA06CDF}"/>
+                </a:ext>
+              </a:extLst>
+            </p:cNvPr>
+            <p:cNvSpPr/>
+            <p:nvPr/>
+          </p:nvSpPr>
+          <p:spPr>
+            <a:xfrm>
+              <a:off x="8760567" y="3607198"/>
+              <a:ext cx="211593" cy="314491"/>
+            </a:xfrm>
+            <a:prstGeom prst="rect">
+              <a:avLst/>
+            </a:prstGeom>
+            <a:solidFill>
+              <a:schemeClr val="tx1"/>
+            </a:solidFill>
+            <a:ln>
+              <a:solidFill>
+                <a:schemeClr val="tx1">
+                  <a:lumMod val="85000"/>
+                  <a:lumOff val="15000"/>
+                </a:schemeClr>
+              </a:solidFill>
+            </a:ln>
+          </p:spPr>
+          <p:style>
+            <a:lnRef idx="2">
+              <a:schemeClr val="accent1">
+                <a:shade val="15000"/>
+              </a:schemeClr>
+            </a:lnRef>
+            <a:fillRef idx="1">
+              <a:schemeClr val="accent1"/>
+            </a:fillRef>
+            <a:effectRef idx="0">
+              <a:schemeClr val="accent1"/>
+            </a:effectRef>
+            <a:fontRef idx="minor">
+              <a:schemeClr val="lt1"/>
+            </a:fontRef>
+          </p:style>
+          <p:txBody>
+            <a:bodyPr rtlCol="0" anchor="ctr"/>
+            <a:lstStyle/>
+            <a:p>
+              <a:pPr algn="ctr"/>
+              <a:endParaRPr lang="en-US" sz="1600"/>
+            </a:p>
+          </p:txBody>
+        </p:sp>
+        <p:sp>
+          <p:nvSpPr>
+            <p:cNvPr id="7" name="Rectangle 6">
+              <a:extLst>
+                <a:ext uri="{FF2B5EF4-FFF2-40B4-BE49-F238E27FC236}">
+                  <a16:creationId xmlns:a16="http://schemas.microsoft.com/office/drawing/2014/main" id="{EC1BA4A2-0C14-A28C-CE47-6DBE17DFBD7B}"/>
+                </a:ext>
+              </a:extLst>
+            </p:cNvPr>
+            <p:cNvSpPr/>
+            <p:nvPr/>
+          </p:nvSpPr>
+          <p:spPr>
+            <a:xfrm>
+              <a:off x="8760565" y="4188619"/>
+              <a:ext cx="211593" cy="314491"/>
+            </a:xfrm>
+            <a:prstGeom prst="rect">
+              <a:avLst/>
+            </a:prstGeom>
+            <a:solidFill>
+              <a:schemeClr val="tx1"/>
+            </a:solidFill>
+            <a:ln>
+              <a:solidFill>
+                <a:schemeClr val="tx1">
+                  <a:lumMod val="85000"/>
+                  <a:lumOff val="15000"/>
+                </a:schemeClr>
+              </a:solidFill>
+            </a:ln>
+          </p:spPr>
+          <p:style>
+            <a:lnRef idx="2">
+              <a:schemeClr val="accent1">
+                <a:shade val="15000"/>
+              </a:schemeClr>
+            </a:lnRef>
+            <a:fillRef idx="1">
+              <a:schemeClr val="accent1"/>
+            </a:fillRef>
+            <a:effectRef idx="0">
+              <a:schemeClr val="accent1"/>
+            </a:effectRef>
+            <a:fontRef idx="minor">
+              <a:schemeClr val="lt1"/>
+            </a:fontRef>
+          </p:style>
+          <p:txBody>
+            <a:bodyPr rtlCol="0" anchor="ctr"/>
+            <a:lstStyle/>
+            <a:p>
+              <a:pPr algn="ctr"/>
+              <a:endParaRPr lang="en-US" sz="1600"/>
+            </a:p>
+          </p:txBody>
+        </p:sp>
+        <p:sp>
+          <p:nvSpPr>
+            <p:cNvPr id="8" name="Rectangle 7">
+              <a:extLst>
+                <a:ext uri="{FF2B5EF4-FFF2-40B4-BE49-F238E27FC236}">
+                  <a16:creationId xmlns:a16="http://schemas.microsoft.com/office/drawing/2014/main" id="{F0B15208-AE90-667D-A75B-ECB45F84F08D}"/>
+                </a:ext>
+              </a:extLst>
+            </p:cNvPr>
+            <p:cNvSpPr/>
+            <p:nvPr/>
+          </p:nvSpPr>
+          <p:spPr>
+            <a:xfrm>
+              <a:off x="8736890" y="4738924"/>
+              <a:ext cx="211593" cy="314491"/>
+            </a:xfrm>
+            <a:prstGeom prst="rect">
+              <a:avLst/>
+            </a:prstGeom>
+            <a:solidFill>
+              <a:schemeClr val="tx1"/>
+            </a:solidFill>
+            <a:ln>
+              <a:solidFill>
+                <a:schemeClr val="tx1">
+                  <a:lumMod val="85000"/>
+                  <a:lumOff val="15000"/>
+                </a:schemeClr>
+              </a:solidFill>
+            </a:ln>
+          </p:spPr>
+          <p:style>
+            <a:lnRef idx="2">
+              <a:schemeClr val="accent1">
+                <a:shade val="15000"/>
+              </a:schemeClr>
+            </a:lnRef>
+            <a:fillRef idx="1">
+              <a:schemeClr val="accent1"/>
+            </a:fillRef>
+            <a:effectRef idx="0">
+              <a:schemeClr val="accent1"/>
+            </a:effectRef>
+            <a:fontRef idx="minor">
+              <a:schemeClr val="lt1"/>
+            </a:fontRef>
+          </p:style>
+          <p:txBody>
+            <a:bodyPr rtlCol="0" anchor="ctr"/>
+            <a:lstStyle/>
+            <a:p>
+              <a:pPr algn="ctr"/>
+              <a:endParaRPr lang="en-US" sz="1600"/>
+            </a:p>
+          </p:txBody>
+        </p:sp>
+        <p:sp>
+          <p:nvSpPr>
+            <p:cNvPr id="22" name="Rectangle: Rounded Corners 21">
+              <a:extLst>
+                <a:ext uri="{FF2B5EF4-FFF2-40B4-BE49-F238E27FC236}">
+                  <a16:creationId xmlns:a16="http://schemas.microsoft.com/office/drawing/2014/main" id="{AEC46487-BB71-C587-8490-0F3D17180770}"/>
+                </a:ext>
+              </a:extLst>
+            </p:cNvPr>
+            <p:cNvSpPr/>
+            <p:nvPr/>
+          </p:nvSpPr>
+          <p:spPr>
+            <a:xfrm>
+              <a:off x="9655921" y="3700549"/>
+              <a:ext cx="1450028" cy="758846"/>
+            </a:xfrm>
+            <a:prstGeom prst="roundRect">
+              <a:avLst/>
+            </a:prstGeom>
+            <a:solidFill>
+              <a:schemeClr val="tx1"/>
+            </a:solidFill>
+            <a:ln>
+              <a:solidFill>
+                <a:schemeClr val="tx1">
+                  <a:lumMod val="85000"/>
+                  <a:lumOff val="15000"/>
+                </a:schemeClr>
+              </a:solidFill>
+            </a:ln>
+          </p:spPr>
+          <p:style>
+            <a:lnRef idx="2">
+              <a:schemeClr val="accent1">
+                <a:shade val="15000"/>
+              </a:schemeClr>
+            </a:lnRef>
+            <a:fillRef idx="1">
+              <a:schemeClr val="accent1"/>
+            </a:fillRef>
+            <a:effectRef idx="0">
+              <a:schemeClr val="accent1"/>
+            </a:effectRef>
+            <a:fontRef idx="minor">
+              <a:schemeClr val="lt1"/>
+            </a:fontRef>
+          </p:style>
+          <p:txBody>
+            <a:bodyPr rtlCol="0" anchor="t"/>
+            <a:lstStyle/>
+            <a:p>
+              <a:pPr algn="ctr"/>
+              <a:r>
+                <a:rPr lang="en-US" sz="2400" b="1" dirty="0">
+                  <a:solidFill>
+                    <a:schemeClr val="bg2"/>
+                  </a:solidFill>
+                </a:rPr>
+                <a:t>K8s Secrets</a:t>
+              </a:r>
+            </a:p>
+          </p:txBody>
+        </p:sp>
+        <p:cxnSp>
+          <p:nvCxnSpPr>
+            <p:cNvPr id="29" name="Connector: Elbow 28">
+              <a:extLst>
+                <a:ext uri="{FF2B5EF4-FFF2-40B4-BE49-F238E27FC236}">
+                  <a16:creationId xmlns:a16="http://schemas.microsoft.com/office/drawing/2014/main" id="{CE825B80-68AF-4BBA-034F-0FDBB462BD6D}"/>
+                </a:ext>
+              </a:extLst>
+            </p:cNvPr>
+            <p:cNvCxnSpPr>
+              <a:cxnSpLocks/>
+              <a:stCxn id="22" idx="1"/>
+              <a:endCxn id="4" idx="3"/>
+            </p:cNvCxnSpPr>
+            <p:nvPr/>
+          </p:nvCxnSpPr>
+          <p:spPr>
+            <a:xfrm rot="10800000">
+              <a:off x="8972161" y="3204492"/>
+              <a:ext cx="683761" cy="875481"/>
+            </a:xfrm>
+            <a:prstGeom prst="bentConnector3">
+              <a:avLst/>
+            </a:prstGeom>
+            <a:ln w="76200">
+              <a:solidFill>
+                <a:schemeClr val="tx1"/>
+              </a:solidFill>
+              <a:prstDash val="solid"/>
+              <a:headEnd type="triangle"/>
+              <a:tailEnd type="triangle"/>
+            </a:ln>
+          </p:spPr>
+          <p:style>
+            <a:lnRef idx="2">
+              <a:schemeClr val="accent1"/>
+            </a:lnRef>
+            <a:fillRef idx="0">
+              <a:schemeClr val="accent1"/>
+            </a:fillRef>
+            <a:effectRef idx="1">
+              <a:schemeClr val="accent1"/>
+            </a:effectRef>
+            <a:fontRef idx="minor">
+              <a:schemeClr val="tx1"/>
+            </a:fontRef>
+          </p:style>
+        </p:cxnSp>
+        <p:cxnSp>
+          <p:nvCxnSpPr>
+            <p:cNvPr id="32" name="Connector: Elbow 31">
+              <a:extLst>
+                <a:ext uri="{FF2B5EF4-FFF2-40B4-BE49-F238E27FC236}">
+                  <a16:creationId xmlns:a16="http://schemas.microsoft.com/office/drawing/2014/main" id="{6EA25F5B-D93D-D388-7D5C-7A634E6D36A3}"/>
+                </a:ext>
+              </a:extLst>
+            </p:cNvPr>
+            <p:cNvCxnSpPr>
+              <a:cxnSpLocks/>
+              <a:stCxn id="22" idx="1"/>
+              <a:endCxn id="5" idx="3"/>
+            </p:cNvCxnSpPr>
+            <p:nvPr/>
+          </p:nvCxnSpPr>
+          <p:spPr>
+            <a:xfrm rot="10800000">
+              <a:off x="8972161" y="3764444"/>
+              <a:ext cx="683761" cy="315528"/>
+            </a:xfrm>
+            <a:prstGeom prst="bentConnector3">
+              <a:avLst/>
+            </a:prstGeom>
+            <a:ln w="76200">
+              <a:solidFill>
+                <a:schemeClr val="tx1"/>
+              </a:solidFill>
+              <a:prstDash val="solid"/>
+              <a:headEnd type="triangle"/>
+              <a:tailEnd type="triangle"/>
+            </a:ln>
+          </p:spPr>
+          <p:style>
+            <a:lnRef idx="2">
+              <a:schemeClr val="accent1"/>
+            </a:lnRef>
+            <a:fillRef idx="0">
+              <a:schemeClr val="accent1"/>
+            </a:fillRef>
+            <a:effectRef idx="1">
+              <a:schemeClr val="accent1"/>
+            </a:effectRef>
+            <a:fontRef idx="minor">
+              <a:schemeClr val="tx1"/>
+            </a:fontRef>
+          </p:style>
+        </p:cxnSp>
+        <p:cxnSp>
+          <p:nvCxnSpPr>
+            <p:cNvPr id="38" name="Connector: Elbow 37">
+              <a:extLst>
+                <a:ext uri="{FF2B5EF4-FFF2-40B4-BE49-F238E27FC236}">
+                  <a16:creationId xmlns:a16="http://schemas.microsoft.com/office/drawing/2014/main" id="{6AA9FDB2-E0F8-C512-06B0-611701F74DDD}"/>
+                </a:ext>
+              </a:extLst>
+            </p:cNvPr>
+            <p:cNvCxnSpPr>
+              <a:cxnSpLocks/>
+              <a:endCxn id="7" idx="3"/>
+            </p:cNvCxnSpPr>
+            <p:nvPr/>
+          </p:nvCxnSpPr>
+          <p:spPr>
+            <a:xfrm rot="10800000" flipV="1">
+              <a:off x="8972158" y="4095143"/>
+              <a:ext cx="683762" cy="250722"/>
+            </a:xfrm>
+            <a:prstGeom prst="bentConnector3">
+              <a:avLst/>
+            </a:prstGeom>
+            <a:ln w="76200">
+              <a:solidFill>
+                <a:schemeClr val="tx1"/>
+              </a:solidFill>
+              <a:prstDash val="solid"/>
+              <a:headEnd type="triangle"/>
+              <a:tailEnd type="triangle"/>
+            </a:ln>
+          </p:spPr>
+          <p:style>
+            <a:lnRef idx="2">
+              <a:schemeClr val="accent1"/>
+            </a:lnRef>
+            <a:fillRef idx="0">
+              <a:schemeClr val="accent1"/>
+            </a:fillRef>
+            <a:effectRef idx="1">
+              <a:schemeClr val="accent1"/>
+            </a:effectRef>
+            <a:fontRef idx="minor">
+              <a:schemeClr val="tx1"/>
+            </a:fontRef>
+          </p:style>
+        </p:cxnSp>
+        <p:cxnSp>
+          <p:nvCxnSpPr>
+            <p:cNvPr id="44" name="Connector: Elbow 43">
+              <a:extLst>
+                <a:ext uri="{FF2B5EF4-FFF2-40B4-BE49-F238E27FC236}">
+                  <a16:creationId xmlns:a16="http://schemas.microsoft.com/office/drawing/2014/main" id="{3B39ABFB-320B-E82E-3D0E-B1B317A50763}"/>
+                </a:ext>
+              </a:extLst>
+            </p:cNvPr>
+            <p:cNvCxnSpPr>
+              <a:cxnSpLocks/>
+              <a:stCxn id="22" idx="1"/>
+              <a:endCxn id="8" idx="3"/>
+            </p:cNvCxnSpPr>
+            <p:nvPr/>
+          </p:nvCxnSpPr>
+          <p:spPr>
+            <a:xfrm rot="10800000" flipV="1">
+              <a:off x="8948483" y="4079972"/>
+              <a:ext cx="707438" cy="816198"/>
+            </a:xfrm>
+            <a:prstGeom prst="bentConnector3">
+              <a:avLst>
+                <a:gd name="adj1" fmla="val 48205"/>
+              </a:avLst>
+            </a:prstGeom>
+            <a:ln w="76200">
+              <a:solidFill>
+                <a:schemeClr val="tx1"/>
+              </a:solidFill>
+              <a:prstDash val="solid"/>
+              <a:headEnd type="triangle"/>
+              <a:tailEnd type="triangle"/>
+            </a:ln>
+          </p:spPr>
+          <p:style>
+            <a:lnRef idx="2">
+              <a:schemeClr val="accent1"/>
+            </a:lnRef>
+            <a:fillRef idx="0">
+              <a:schemeClr val="accent1"/>
+            </a:fillRef>
+            <a:effectRef idx="1">
+              <a:schemeClr val="accent1"/>
+            </a:effectRef>
+            <a:fontRef idx="minor">
+              <a:schemeClr val="tx1"/>
+            </a:fontRef>
+          </p:style>
+        </p:cxnSp>
+      </p:grpSp>
+    </p:spTree>
+    <p:extLst>
+      <p:ext uri="{BB962C8B-B14F-4D97-AF65-F5344CB8AC3E}">
+        <p14:creationId xmlns:p14="http://schemas.microsoft.com/office/powerpoint/2010/main" val="1669550685"/>
       </p:ext>
     </p:extLst>
   </p:cSld>

</xml_diff>

<commit_message>
Added new images to extra_materials. Finished making use case four. Updated use case three and use case two to name the ingress secret better. Added service names to server stage specific TLS certificates.
</commit_message>
<xml_diff>
--- a/extra_materials/Run Fibonacci Graphs.pptx
+++ b/extra_materials/Run Fibonacci Graphs.pptx
@@ -11,6 +11,8 @@
     <p:sldId id="258" r:id="rId5"/>
     <p:sldId id="260" r:id="rId6"/>
     <p:sldId id="261" r:id="rId7"/>
+    <p:sldId id="262" r:id="rId8"/>
+    <p:sldId id="264" r:id="rId9"/>
   </p:sldIdLst>
   <p:sldSz cx="12192000" cy="6858000"/>
   <p:notesSz cx="6858000" cy="9144000"/>
@@ -264,7 +266,7 @@
           <a:p>
             <a:fld id="{62C98A4D-3422-4F51-9ECD-C0D7C885462A}" type="datetimeFigureOut">
               <a:rPr lang="en-US" smtClean="0"/>
-              <a:t>10/1/2025</a:t>
+              <a:t>10/2/2025</a:t>
             </a:fld>
             <a:endParaRPr lang="en-US"/>
           </a:p>
@@ -462,7 +464,7 @@
           <a:p>
             <a:fld id="{62C98A4D-3422-4F51-9ECD-C0D7C885462A}" type="datetimeFigureOut">
               <a:rPr lang="en-US" smtClean="0"/>
-              <a:t>10/1/2025</a:t>
+              <a:t>10/2/2025</a:t>
             </a:fld>
             <a:endParaRPr lang="en-US"/>
           </a:p>
@@ -670,7 +672,7 @@
           <a:p>
             <a:fld id="{62C98A4D-3422-4F51-9ECD-C0D7C885462A}" type="datetimeFigureOut">
               <a:rPr lang="en-US" smtClean="0"/>
-              <a:t>10/1/2025</a:t>
+              <a:t>10/2/2025</a:t>
             </a:fld>
             <a:endParaRPr lang="en-US"/>
           </a:p>
@@ -868,7 +870,7 @@
           <a:p>
             <a:fld id="{62C98A4D-3422-4F51-9ECD-C0D7C885462A}" type="datetimeFigureOut">
               <a:rPr lang="en-US" smtClean="0"/>
-              <a:t>10/1/2025</a:t>
+              <a:t>10/2/2025</a:t>
             </a:fld>
             <a:endParaRPr lang="en-US"/>
           </a:p>
@@ -1143,7 +1145,7 @@
           <a:p>
             <a:fld id="{62C98A4D-3422-4F51-9ECD-C0D7C885462A}" type="datetimeFigureOut">
               <a:rPr lang="en-US" smtClean="0"/>
-              <a:t>10/1/2025</a:t>
+              <a:t>10/2/2025</a:t>
             </a:fld>
             <a:endParaRPr lang="en-US"/>
           </a:p>
@@ -1408,7 +1410,7 @@
           <a:p>
             <a:fld id="{62C98A4D-3422-4F51-9ECD-C0D7C885462A}" type="datetimeFigureOut">
               <a:rPr lang="en-US" smtClean="0"/>
-              <a:t>10/1/2025</a:t>
+              <a:t>10/2/2025</a:t>
             </a:fld>
             <a:endParaRPr lang="en-US"/>
           </a:p>
@@ -1820,7 +1822,7 @@
           <a:p>
             <a:fld id="{62C98A4D-3422-4F51-9ECD-C0D7C885462A}" type="datetimeFigureOut">
               <a:rPr lang="en-US" smtClean="0"/>
-              <a:t>10/1/2025</a:t>
+              <a:t>10/2/2025</a:t>
             </a:fld>
             <a:endParaRPr lang="en-US"/>
           </a:p>
@@ -1961,7 +1963,7 @@
           <a:p>
             <a:fld id="{62C98A4D-3422-4F51-9ECD-C0D7C885462A}" type="datetimeFigureOut">
               <a:rPr lang="en-US" smtClean="0"/>
-              <a:t>10/1/2025</a:t>
+              <a:t>10/2/2025</a:t>
             </a:fld>
             <a:endParaRPr lang="en-US"/>
           </a:p>
@@ -2074,7 +2076,7 @@
           <a:p>
             <a:fld id="{62C98A4D-3422-4F51-9ECD-C0D7C885462A}" type="datetimeFigureOut">
               <a:rPr lang="en-US" smtClean="0"/>
-              <a:t>10/1/2025</a:t>
+              <a:t>10/2/2025</a:t>
             </a:fld>
             <a:endParaRPr lang="en-US"/>
           </a:p>
@@ -2385,7 +2387,7 @@
           <a:p>
             <a:fld id="{62C98A4D-3422-4F51-9ECD-C0D7C885462A}" type="datetimeFigureOut">
               <a:rPr lang="en-US" smtClean="0"/>
-              <a:t>10/1/2025</a:t>
+              <a:t>10/2/2025</a:t>
             </a:fld>
             <a:endParaRPr lang="en-US"/>
           </a:p>
@@ -2673,7 +2675,7 @@
           <a:p>
             <a:fld id="{62C98A4D-3422-4F51-9ECD-C0D7C885462A}" type="datetimeFigureOut">
               <a:rPr lang="en-US" smtClean="0"/>
-              <a:t>10/1/2025</a:t>
+              <a:t>10/2/2025</a:t>
             </a:fld>
             <a:endParaRPr lang="en-US"/>
           </a:p>
@@ -2914,7 +2916,7 @@
           <a:p>
             <a:fld id="{62C98A4D-3422-4F51-9ECD-C0D7C885462A}" type="datetimeFigureOut">
               <a:rPr lang="en-US" smtClean="0"/>
-              <a:t>10/1/2025</a:t>
+              <a:t>10/2/2025</a:t>
             </a:fld>
             <a:endParaRPr lang="en-US"/>
           </a:p>
@@ -9660,7 +9662,7 @@
                     <a:schemeClr val="tx1"/>
                   </a:solidFill>
                 </a:rPr>
-                <a:t>Kubernetes Pod</a:t>
+                <a:t>Kubernetes Pod Template</a:t>
               </a:r>
             </a:p>
           </p:txBody>
@@ -13339,6 +13341,3519 @@
 </p:sld>
 </file>
 
+<file path=ppt/slides/slide7.xml><?xml version="1.0" encoding="utf-8"?>
+<p:sld xmlns:a="http://schemas.openxmlformats.org/drawingml/2006/main" xmlns:r="http://schemas.openxmlformats.org/officeDocument/2006/relationships" xmlns:p="http://schemas.openxmlformats.org/presentationml/2006/main">
+  <p:cSld>
+    <p:spTree>
+      <p:nvGrpSpPr>
+        <p:cNvPr id="1" name="">
+          <a:extLst>
+            <a:ext uri="{FF2B5EF4-FFF2-40B4-BE49-F238E27FC236}">
+              <a16:creationId xmlns:a16="http://schemas.microsoft.com/office/drawing/2014/main" id="{B15A1A0C-F0B3-4FF0-012C-F369176AAD58}"/>
+            </a:ext>
+          </a:extLst>
+        </p:cNvPr>
+        <p:cNvGrpSpPr/>
+        <p:nvPr/>
+      </p:nvGrpSpPr>
+      <p:grpSpPr>
+        <a:xfrm>
+          <a:off x="0" y="0"/>
+          <a:ext cx="0" cy="0"/>
+          <a:chOff x="0" y="0"/>
+          <a:chExt cx="0" cy="0"/>
+        </a:xfrm>
+      </p:grpSpPr>
+      <p:sp>
+        <p:nvSpPr>
+          <p:cNvPr id="32" name="Rectangle: Rounded Corners 31">
+            <a:extLst>
+              <a:ext uri="{FF2B5EF4-FFF2-40B4-BE49-F238E27FC236}">
+                <a16:creationId xmlns:a16="http://schemas.microsoft.com/office/drawing/2014/main" id="{353FFAA1-3225-35D6-DEBE-A7FBF1358D68}"/>
+              </a:ext>
+            </a:extLst>
+          </p:cNvPr>
+          <p:cNvSpPr/>
+          <p:nvPr/>
+        </p:nvSpPr>
+        <p:spPr>
+          <a:xfrm>
+            <a:off x="6189134" y="685274"/>
+            <a:ext cx="5816600" cy="5613925"/>
+          </a:xfrm>
+          <a:prstGeom prst="roundRect">
+            <a:avLst/>
+          </a:prstGeom>
+          <a:solidFill>
+            <a:schemeClr val="accent3">
+              <a:lumMod val="60000"/>
+              <a:lumOff val="40000"/>
+            </a:schemeClr>
+          </a:solidFill>
+          <a:ln>
+            <a:solidFill>
+              <a:schemeClr val="tx1">
+                <a:lumMod val="85000"/>
+                <a:lumOff val="15000"/>
+              </a:schemeClr>
+            </a:solidFill>
+          </a:ln>
+        </p:spPr>
+        <p:style>
+          <a:lnRef idx="2">
+            <a:schemeClr val="accent1">
+              <a:shade val="15000"/>
+            </a:schemeClr>
+          </a:lnRef>
+          <a:fillRef idx="1">
+            <a:schemeClr val="accent1"/>
+          </a:fillRef>
+          <a:effectRef idx="0">
+            <a:schemeClr val="accent1"/>
+          </a:effectRef>
+          <a:fontRef idx="minor">
+            <a:schemeClr val="lt1"/>
+          </a:fontRef>
+        </p:style>
+        <p:txBody>
+          <a:bodyPr rtlCol="0" anchor="t"/>
+          <a:lstStyle/>
+          <a:p>
+            <a:pPr algn="ctr"/>
+            <a:r>
+              <a:rPr lang="en-US" sz="3200" b="1" dirty="0">
+                <a:solidFill>
+                  <a:schemeClr val="tx1"/>
+                </a:solidFill>
+              </a:rPr>
+              <a:t>Server Stage Pod Template</a:t>
+            </a:r>
+          </a:p>
+        </p:txBody>
+      </p:sp>
+      <p:sp>
+        <p:nvSpPr>
+          <p:cNvPr id="19" name="Rectangle: Rounded Corners 18">
+            <a:extLst>
+              <a:ext uri="{FF2B5EF4-FFF2-40B4-BE49-F238E27FC236}">
+                <a16:creationId xmlns:a16="http://schemas.microsoft.com/office/drawing/2014/main" id="{8BD6C278-EC1A-27F9-C525-DB19361F968F}"/>
+              </a:ext>
+            </a:extLst>
+          </p:cNvPr>
+          <p:cNvSpPr/>
+          <p:nvPr/>
+        </p:nvSpPr>
+        <p:spPr>
+          <a:xfrm>
+            <a:off x="6525907" y="1692512"/>
+            <a:ext cx="5080093" cy="2113210"/>
+          </a:xfrm>
+          <a:prstGeom prst="roundRect">
+            <a:avLst/>
+          </a:prstGeom>
+          <a:solidFill>
+            <a:srgbClr val="B4E5A2"/>
+          </a:solidFill>
+          <a:ln>
+            <a:solidFill>
+              <a:schemeClr val="tx1">
+                <a:lumMod val="85000"/>
+                <a:lumOff val="15000"/>
+              </a:schemeClr>
+            </a:solidFill>
+          </a:ln>
+        </p:spPr>
+        <p:style>
+          <a:lnRef idx="2">
+            <a:schemeClr val="accent2">
+              <a:shade val="15000"/>
+            </a:schemeClr>
+          </a:lnRef>
+          <a:fillRef idx="1">
+            <a:schemeClr val="accent2"/>
+          </a:fillRef>
+          <a:effectRef idx="0">
+            <a:schemeClr val="accent2"/>
+          </a:effectRef>
+          <a:fontRef idx="minor">
+            <a:schemeClr val="lt1"/>
+          </a:fontRef>
+        </p:style>
+        <p:txBody>
+          <a:bodyPr rtlCol="0" anchor="t"/>
+          <a:lstStyle/>
+          <a:p>
+            <a:pPr algn="ctr"/>
+            <a:r>
+              <a:rPr lang="en-US" sz="2000" b="1" dirty="0">
+                <a:solidFill>
+                  <a:schemeClr val="tx1"/>
+                </a:solidFill>
+                <a:latin typeface="Arial" panose="020B0604020202020204" pitchFamily="34" charset="0"/>
+                <a:cs typeface="Arial" panose="020B0604020202020204" pitchFamily="34" charset="0"/>
+              </a:rPr>
+              <a:t>Server Stage Container</a:t>
+            </a:r>
+            <a:endParaRPr lang="en-US" sz="4000" b="1" dirty="0">
+              <a:solidFill>
+                <a:schemeClr val="tx1"/>
+              </a:solidFill>
+              <a:latin typeface="Arial" panose="020B0604020202020204" pitchFamily="34" charset="0"/>
+              <a:cs typeface="Arial" panose="020B0604020202020204" pitchFamily="34" charset="0"/>
+            </a:endParaRPr>
+          </a:p>
+        </p:txBody>
+      </p:sp>
+      <p:sp>
+        <p:nvSpPr>
+          <p:cNvPr id="21" name="Rectangle: Rounded Corners 20">
+            <a:extLst>
+              <a:ext uri="{FF2B5EF4-FFF2-40B4-BE49-F238E27FC236}">
+                <a16:creationId xmlns:a16="http://schemas.microsoft.com/office/drawing/2014/main" id="{E9DE5AD2-CE53-9BB1-96DC-5B794EEF00FD}"/>
+              </a:ext>
+            </a:extLst>
+          </p:cNvPr>
+          <p:cNvSpPr/>
+          <p:nvPr/>
+        </p:nvSpPr>
+        <p:spPr>
+          <a:xfrm>
+            <a:off x="6753137" y="2387739"/>
+            <a:ext cx="2029495" cy="534030"/>
+          </a:xfrm>
+          <a:prstGeom prst="roundRect">
+            <a:avLst/>
+          </a:prstGeom>
+          <a:solidFill>
+            <a:schemeClr val="accent1">
+              <a:lumMod val="50000"/>
+            </a:schemeClr>
+          </a:solidFill>
+          <a:ln>
+            <a:solidFill>
+              <a:schemeClr val="tx1">
+                <a:lumMod val="85000"/>
+                <a:lumOff val="15000"/>
+              </a:schemeClr>
+            </a:solidFill>
+          </a:ln>
+        </p:spPr>
+        <p:style>
+          <a:lnRef idx="2">
+            <a:schemeClr val="accent1">
+              <a:shade val="15000"/>
+            </a:schemeClr>
+          </a:lnRef>
+          <a:fillRef idx="1">
+            <a:schemeClr val="accent1"/>
+          </a:fillRef>
+          <a:effectRef idx="0">
+            <a:schemeClr val="accent1"/>
+          </a:effectRef>
+          <a:fontRef idx="minor">
+            <a:schemeClr val="lt1"/>
+          </a:fontRef>
+        </p:style>
+        <p:txBody>
+          <a:bodyPr rtlCol="0" anchor="ctr"/>
+          <a:lstStyle/>
+          <a:p>
+            <a:pPr algn="ctr"/>
+            <a:r>
+              <a:rPr lang="en-US" dirty="0">
+                <a:solidFill>
+                  <a:schemeClr val="bg1"/>
+                </a:solidFill>
+              </a:rPr>
+              <a:t>Env Variables</a:t>
+            </a:r>
+          </a:p>
+        </p:txBody>
+      </p:sp>
+      <p:sp>
+        <p:nvSpPr>
+          <p:cNvPr id="22" name="Rectangle: Rounded Corners 21">
+            <a:extLst>
+              <a:ext uri="{FF2B5EF4-FFF2-40B4-BE49-F238E27FC236}">
+                <a16:creationId xmlns:a16="http://schemas.microsoft.com/office/drawing/2014/main" id="{78BE175C-1758-F7A1-1B1B-09874ADF3AC9}"/>
+              </a:ext>
+            </a:extLst>
+          </p:cNvPr>
+          <p:cNvSpPr/>
+          <p:nvPr/>
+        </p:nvSpPr>
+        <p:spPr>
+          <a:xfrm>
+            <a:off x="9349277" y="2387738"/>
+            <a:ext cx="2042581" cy="534030"/>
+          </a:xfrm>
+          <a:prstGeom prst="roundRect">
+            <a:avLst/>
+          </a:prstGeom>
+          <a:solidFill>
+            <a:schemeClr val="accent1">
+              <a:lumMod val="50000"/>
+            </a:schemeClr>
+          </a:solidFill>
+          <a:ln>
+            <a:solidFill>
+              <a:schemeClr val="tx1">
+                <a:lumMod val="85000"/>
+                <a:lumOff val="15000"/>
+              </a:schemeClr>
+            </a:solidFill>
+          </a:ln>
+        </p:spPr>
+        <p:style>
+          <a:lnRef idx="2">
+            <a:schemeClr val="accent1">
+              <a:shade val="15000"/>
+            </a:schemeClr>
+          </a:lnRef>
+          <a:fillRef idx="1">
+            <a:schemeClr val="accent1"/>
+          </a:fillRef>
+          <a:effectRef idx="0">
+            <a:schemeClr val="accent1"/>
+          </a:effectRef>
+          <a:fontRef idx="minor">
+            <a:schemeClr val="lt1"/>
+          </a:fontRef>
+        </p:style>
+        <p:txBody>
+          <a:bodyPr rtlCol="0" anchor="ctr"/>
+          <a:lstStyle/>
+          <a:p>
+            <a:pPr algn="ctr"/>
+            <a:r>
+              <a:rPr lang="en-US" dirty="0">
+                <a:solidFill>
+                  <a:schemeClr val="bg1"/>
+                </a:solidFill>
+              </a:rPr>
+              <a:t>Fibonacci Image</a:t>
+            </a:r>
+          </a:p>
+        </p:txBody>
+      </p:sp>
+      <p:sp>
+        <p:nvSpPr>
+          <p:cNvPr id="23" name="Rectangle: Rounded Corners 22">
+            <a:extLst>
+              <a:ext uri="{FF2B5EF4-FFF2-40B4-BE49-F238E27FC236}">
+                <a16:creationId xmlns:a16="http://schemas.microsoft.com/office/drawing/2014/main" id="{18961156-C759-EFB6-5047-9762FDF2D40F}"/>
+              </a:ext>
+            </a:extLst>
+          </p:cNvPr>
+          <p:cNvSpPr/>
+          <p:nvPr/>
+        </p:nvSpPr>
+        <p:spPr>
+          <a:xfrm>
+            <a:off x="9349277" y="3065588"/>
+            <a:ext cx="2042581" cy="534030"/>
+          </a:xfrm>
+          <a:prstGeom prst="roundRect">
+            <a:avLst/>
+          </a:prstGeom>
+          <a:solidFill>
+            <a:schemeClr val="tx1"/>
+          </a:solidFill>
+          <a:ln>
+            <a:solidFill>
+              <a:schemeClr val="tx1">
+                <a:lumMod val="85000"/>
+                <a:lumOff val="15000"/>
+              </a:schemeClr>
+            </a:solidFill>
+          </a:ln>
+        </p:spPr>
+        <p:style>
+          <a:lnRef idx="2">
+            <a:schemeClr val="accent1">
+              <a:shade val="15000"/>
+            </a:schemeClr>
+          </a:lnRef>
+          <a:fillRef idx="1">
+            <a:schemeClr val="accent1"/>
+          </a:fillRef>
+          <a:effectRef idx="0">
+            <a:schemeClr val="accent1"/>
+          </a:effectRef>
+          <a:fontRef idx="minor">
+            <a:schemeClr val="lt1"/>
+          </a:fontRef>
+        </p:style>
+        <p:txBody>
+          <a:bodyPr rtlCol="0" anchor="ctr"/>
+          <a:lstStyle/>
+          <a:p>
+            <a:pPr algn="ctr"/>
+            <a:r>
+              <a:rPr lang="en-US" dirty="0">
+                <a:solidFill>
+                  <a:schemeClr val="bg1"/>
+                </a:solidFill>
+              </a:rPr>
+              <a:t>Secret Mount</a:t>
+            </a:r>
+          </a:p>
+        </p:txBody>
+      </p:sp>
+      <p:sp>
+        <p:nvSpPr>
+          <p:cNvPr id="24" name="Rectangle: Rounded Corners 23">
+            <a:extLst>
+              <a:ext uri="{FF2B5EF4-FFF2-40B4-BE49-F238E27FC236}">
+                <a16:creationId xmlns:a16="http://schemas.microsoft.com/office/drawing/2014/main" id="{75C9AEC0-33A5-234C-5668-08FC8E517EBE}"/>
+              </a:ext>
+            </a:extLst>
+          </p:cNvPr>
+          <p:cNvSpPr/>
+          <p:nvPr/>
+        </p:nvSpPr>
+        <p:spPr>
+          <a:xfrm>
+            <a:off x="6740051" y="3065589"/>
+            <a:ext cx="2042581" cy="534030"/>
+          </a:xfrm>
+          <a:prstGeom prst="roundRect">
+            <a:avLst/>
+          </a:prstGeom>
+          <a:solidFill>
+            <a:schemeClr val="accent3">
+              <a:lumMod val="50000"/>
+            </a:schemeClr>
+          </a:solidFill>
+          <a:ln>
+            <a:solidFill>
+              <a:schemeClr val="tx1">
+                <a:lumMod val="85000"/>
+                <a:lumOff val="15000"/>
+              </a:schemeClr>
+            </a:solidFill>
+          </a:ln>
+        </p:spPr>
+        <p:style>
+          <a:lnRef idx="2">
+            <a:schemeClr val="accent1">
+              <a:shade val="15000"/>
+            </a:schemeClr>
+          </a:lnRef>
+          <a:fillRef idx="1">
+            <a:schemeClr val="accent1"/>
+          </a:fillRef>
+          <a:effectRef idx="0">
+            <a:schemeClr val="accent1"/>
+          </a:effectRef>
+          <a:fontRef idx="minor">
+            <a:schemeClr val="lt1"/>
+          </a:fontRef>
+        </p:style>
+        <p:txBody>
+          <a:bodyPr rtlCol="0" anchor="ctr"/>
+          <a:lstStyle/>
+          <a:p>
+            <a:pPr algn="ctr"/>
+            <a:r>
+              <a:rPr lang="en-US" dirty="0">
+                <a:solidFill>
+                  <a:schemeClr val="bg1"/>
+                </a:solidFill>
+              </a:rPr>
+              <a:t>Port Binding</a:t>
+            </a:r>
+          </a:p>
+        </p:txBody>
+      </p:sp>
+      <p:sp>
+        <p:nvSpPr>
+          <p:cNvPr id="33" name="Rectangle: Rounded Corners 32">
+            <a:extLst>
+              <a:ext uri="{FF2B5EF4-FFF2-40B4-BE49-F238E27FC236}">
+                <a16:creationId xmlns:a16="http://schemas.microsoft.com/office/drawing/2014/main" id="{62D3E9A5-255B-6A10-6856-B53F72E4EC07}"/>
+              </a:ext>
+            </a:extLst>
+          </p:cNvPr>
+          <p:cNvSpPr/>
+          <p:nvPr/>
+        </p:nvSpPr>
+        <p:spPr>
+          <a:xfrm>
+            <a:off x="6525907" y="4216557"/>
+            <a:ext cx="2470871" cy="1737680"/>
+          </a:xfrm>
+          <a:prstGeom prst="roundRect">
+            <a:avLst/>
+          </a:prstGeom>
+          <a:solidFill>
+            <a:schemeClr val="accent3">
+              <a:lumMod val="50000"/>
+            </a:schemeClr>
+          </a:solidFill>
+          <a:ln>
+            <a:solidFill>
+              <a:schemeClr val="tx1">
+                <a:lumMod val="85000"/>
+                <a:lumOff val="15000"/>
+              </a:schemeClr>
+            </a:solidFill>
+          </a:ln>
+        </p:spPr>
+        <p:style>
+          <a:lnRef idx="2">
+            <a:schemeClr val="accent5">
+              <a:shade val="15000"/>
+            </a:schemeClr>
+          </a:lnRef>
+          <a:fillRef idx="1">
+            <a:schemeClr val="accent5"/>
+          </a:fillRef>
+          <a:effectRef idx="0">
+            <a:schemeClr val="accent5"/>
+          </a:effectRef>
+          <a:fontRef idx="minor">
+            <a:schemeClr val="lt1"/>
+          </a:fontRef>
+        </p:style>
+        <p:txBody>
+          <a:bodyPr rtlCol="0" anchor="ctr"/>
+          <a:lstStyle/>
+          <a:p>
+            <a:pPr algn="ctr"/>
+            <a:r>
+              <a:rPr lang="en-US" sz="4000" dirty="0"/>
+              <a:t>Network Interface</a:t>
+            </a:r>
+          </a:p>
+        </p:txBody>
+      </p:sp>
+      <p:sp>
+        <p:nvSpPr>
+          <p:cNvPr id="34" name="Rectangle: Rounded Corners 33">
+            <a:extLst>
+              <a:ext uri="{FF2B5EF4-FFF2-40B4-BE49-F238E27FC236}">
+                <a16:creationId xmlns:a16="http://schemas.microsoft.com/office/drawing/2014/main" id="{A50CDAF1-1CA6-89B9-BB74-6B658D28DF0C}"/>
+              </a:ext>
+            </a:extLst>
+          </p:cNvPr>
+          <p:cNvSpPr/>
+          <p:nvPr/>
+        </p:nvSpPr>
+        <p:spPr>
+          <a:xfrm>
+            <a:off x="9135132" y="4216557"/>
+            <a:ext cx="2470869" cy="1722586"/>
+          </a:xfrm>
+          <a:prstGeom prst="roundRect">
+            <a:avLst/>
+          </a:prstGeom>
+          <a:solidFill>
+            <a:schemeClr val="tx1"/>
+          </a:solidFill>
+          <a:ln>
+            <a:solidFill>
+              <a:schemeClr val="tx1">
+                <a:lumMod val="85000"/>
+                <a:lumOff val="15000"/>
+              </a:schemeClr>
+            </a:solidFill>
+          </a:ln>
+        </p:spPr>
+        <p:style>
+          <a:lnRef idx="2">
+            <a:schemeClr val="accent5">
+              <a:shade val="15000"/>
+            </a:schemeClr>
+          </a:lnRef>
+          <a:fillRef idx="1">
+            <a:schemeClr val="accent5"/>
+          </a:fillRef>
+          <a:effectRef idx="0">
+            <a:schemeClr val="accent5"/>
+          </a:effectRef>
+          <a:fontRef idx="minor">
+            <a:schemeClr val="lt1"/>
+          </a:fontRef>
+        </p:style>
+        <p:txBody>
+          <a:bodyPr rtlCol="0" anchor="ctr"/>
+          <a:lstStyle/>
+          <a:p>
+            <a:pPr algn="ctr"/>
+            <a:r>
+              <a:rPr lang="en-US" sz="4000" dirty="0"/>
+              <a:t>Pod Secrets</a:t>
+            </a:r>
+          </a:p>
+        </p:txBody>
+      </p:sp>
+      <p:cxnSp>
+        <p:nvCxnSpPr>
+          <p:cNvPr id="39" name="Connector: Elbow 38">
+            <a:extLst>
+              <a:ext uri="{FF2B5EF4-FFF2-40B4-BE49-F238E27FC236}">
+                <a16:creationId xmlns:a16="http://schemas.microsoft.com/office/drawing/2014/main" id="{101E3CC3-F36A-F277-E3F5-DD6CE3C19C3C}"/>
+              </a:ext>
+            </a:extLst>
+          </p:cNvPr>
+          <p:cNvCxnSpPr>
+            <a:cxnSpLocks/>
+            <a:stCxn id="33" idx="0"/>
+            <a:endCxn id="24" idx="2"/>
+          </p:cNvCxnSpPr>
+          <p:nvPr/>
+        </p:nvCxnSpPr>
+        <p:spPr>
+          <a:xfrm rot="16200000" flipV="1">
+            <a:off x="7452874" y="3908087"/>
+            <a:ext cx="616938" cy="1"/>
+          </a:xfrm>
+          <a:prstGeom prst="bentConnector3">
+            <a:avLst>
+              <a:gd name="adj1" fmla="val 50000"/>
+            </a:avLst>
+          </a:prstGeom>
+          <a:ln w="57150">
+            <a:solidFill>
+              <a:schemeClr val="accent3">
+                <a:lumMod val="50000"/>
+              </a:schemeClr>
+            </a:solidFill>
+            <a:headEnd type="triangle"/>
+            <a:tailEnd type="triangle"/>
+          </a:ln>
+        </p:spPr>
+        <p:style>
+          <a:lnRef idx="2">
+            <a:schemeClr val="accent1"/>
+          </a:lnRef>
+          <a:fillRef idx="0">
+            <a:schemeClr val="accent1"/>
+          </a:fillRef>
+          <a:effectRef idx="1">
+            <a:schemeClr val="accent1"/>
+          </a:effectRef>
+          <a:fontRef idx="minor">
+            <a:schemeClr val="tx1"/>
+          </a:fontRef>
+        </p:style>
+      </p:cxnSp>
+      <p:cxnSp>
+        <p:nvCxnSpPr>
+          <p:cNvPr id="59" name="Connector: Elbow 58">
+            <a:extLst>
+              <a:ext uri="{FF2B5EF4-FFF2-40B4-BE49-F238E27FC236}">
+                <a16:creationId xmlns:a16="http://schemas.microsoft.com/office/drawing/2014/main" id="{2D9002C0-75BD-3B10-114B-8DC2873AA105}"/>
+              </a:ext>
+            </a:extLst>
+          </p:cNvPr>
+          <p:cNvCxnSpPr>
+            <a:cxnSpLocks/>
+            <a:stCxn id="23" idx="2"/>
+            <a:endCxn id="34" idx="0"/>
+          </p:cNvCxnSpPr>
+          <p:nvPr/>
+        </p:nvCxnSpPr>
+        <p:spPr>
+          <a:xfrm rot="5400000">
+            <a:off x="10062099" y="3908087"/>
+            <a:ext cx="616939" cy="1"/>
+          </a:xfrm>
+          <a:prstGeom prst="bentConnector3">
+            <a:avLst>
+              <a:gd name="adj1" fmla="val 50000"/>
+            </a:avLst>
+          </a:prstGeom>
+          <a:ln w="57150">
+            <a:solidFill>
+              <a:schemeClr val="tx1"/>
+            </a:solidFill>
+            <a:prstDash val="solid"/>
+            <a:headEnd type="triangle"/>
+            <a:tailEnd type="triangle"/>
+          </a:ln>
+        </p:spPr>
+        <p:style>
+          <a:lnRef idx="2">
+            <a:schemeClr val="accent1"/>
+          </a:lnRef>
+          <a:fillRef idx="0">
+            <a:schemeClr val="accent1"/>
+          </a:fillRef>
+          <a:effectRef idx="1">
+            <a:schemeClr val="accent1"/>
+          </a:effectRef>
+          <a:fontRef idx="minor">
+            <a:schemeClr val="tx1"/>
+          </a:fontRef>
+        </p:style>
+      </p:cxnSp>
+      <p:sp>
+        <p:nvSpPr>
+          <p:cNvPr id="40" name="Rectangle: Rounded Corners 39">
+            <a:extLst>
+              <a:ext uri="{FF2B5EF4-FFF2-40B4-BE49-F238E27FC236}">
+                <a16:creationId xmlns:a16="http://schemas.microsoft.com/office/drawing/2014/main" id="{910249DA-8A02-24AC-DE2B-2D085125BDD7}"/>
+              </a:ext>
+            </a:extLst>
+          </p:cNvPr>
+          <p:cNvSpPr/>
+          <p:nvPr/>
+        </p:nvSpPr>
+        <p:spPr>
+          <a:xfrm>
+            <a:off x="204148" y="685274"/>
+            <a:ext cx="5816600" cy="5613925"/>
+          </a:xfrm>
+          <a:prstGeom prst="roundRect">
+            <a:avLst/>
+          </a:prstGeom>
+          <a:solidFill>
+            <a:srgbClr val="FFFF99"/>
+          </a:solidFill>
+          <a:ln>
+            <a:solidFill>
+              <a:schemeClr val="tx1">
+                <a:lumMod val="85000"/>
+                <a:lumOff val="15000"/>
+              </a:schemeClr>
+            </a:solidFill>
+          </a:ln>
+        </p:spPr>
+        <p:style>
+          <a:lnRef idx="2">
+            <a:schemeClr val="accent1">
+              <a:shade val="15000"/>
+            </a:schemeClr>
+          </a:lnRef>
+          <a:fillRef idx="1">
+            <a:schemeClr val="accent1"/>
+          </a:fillRef>
+          <a:effectRef idx="0">
+            <a:schemeClr val="accent1"/>
+          </a:effectRef>
+          <a:fontRef idx="minor">
+            <a:schemeClr val="lt1"/>
+          </a:fontRef>
+        </p:style>
+        <p:txBody>
+          <a:bodyPr rtlCol="0" anchor="t"/>
+          <a:lstStyle/>
+          <a:p>
+            <a:pPr algn="ctr"/>
+            <a:r>
+              <a:rPr lang="en-US" sz="3200" b="1" dirty="0">
+                <a:solidFill>
+                  <a:schemeClr val="tx1"/>
+                </a:solidFill>
+              </a:rPr>
+              <a:t>Server Stage Deployment</a:t>
+            </a:r>
+          </a:p>
+        </p:txBody>
+      </p:sp>
+      <p:sp>
+        <p:nvSpPr>
+          <p:cNvPr id="60" name="Rectangle: Rounded Corners 59">
+            <a:extLst>
+              <a:ext uri="{FF2B5EF4-FFF2-40B4-BE49-F238E27FC236}">
+                <a16:creationId xmlns:a16="http://schemas.microsoft.com/office/drawing/2014/main" id="{EC804EF4-D252-D1C6-E5EC-E504C982DFD4}"/>
+              </a:ext>
+            </a:extLst>
+          </p:cNvPr>
+          <p:cNvSpPr/>
+          <p:nvPr/>
+        </p:nvSpPr>
+        <p:spPr>
+          <a:xfrm>
+            <a:off x="945517" y="1794877"/>
+            <a:ext cx="4324610" cy="787699"/>
+          </a:xfrm>
+          <a:prstGeom prst="roundRect">
+            <a:avLst/>
+          </a:prstGeom>
+          <a:solidFill>
+            <a:schemeClr val="accent3">
+              <a:lumMod val="60000"/>
+              <a:lumOff val="40000"/>
+            </a:schemeClr>
+          </a:solidFill>
+          <a:ln>
+            <a:solidFill>
+              <a:schemeClr val="tx1">
+                <a:lumMod val="85000"/>
+                <a:lumOff val="15000"/>
+              </a:schemeClr>
+            </a:solidFill>
+          </a:ln>
+        </p:spPr>
+        <p:style>
+          <a:lnRef idx="2">
+            <a:schemeClr val="accent1">
+              <a:shade val="15000"/>
+            </a:schemeClr>
+          </a:lnRef>
+          <a:fillRef idx="1">
+            <a:schemeClr val="accent1"/>
+          </a:fillRef>
+          <a:effectRef idx="0">
+            <a:schemeClr val="accent1"/>
+          </a:effectRef>
+          <a:fontRef idx="minor">
+            <a:schemeClr val="lt1"/>
+          </a:fontRef>
+        </p:style>
+        <p:txBody>
+          <a:bodyPr rtlCol="0" anchor="ctr"/>
+          <a:lstStyle/>
+          <a:p>
+            <a:pPr algn="ctr"/>
+            <a:r>
+              <a:rPr lang="en-US" sz="2400" b="1" dirty="0">
+                <a:solidFill>
+                  <a:schemeClr val="tx1"/>
+                </a:solidFill>
+              </a:rPr>
+              <a:t>Server Stage Pod Replica</a:t>
+            </a:r>
+          </a:p>
+        </p:txBody>
+      </p:sp>
+      <p:sp>
+        <p:nvSpPr>
+          <p:cNvPr id="66" name="Rectangle: Rounded Corners 65">
+            <a:extLst>
+              <a:ext uri="{FF2B5EF4-FFF2-40B4-BE49-F238E27FC236}">
+                <a16:creationId xmlns:a16="http://schemas.microsoft.com/office/drawing/2014/main" id="{F76A8E93-1716-CDE4-892E-8D06DC54AAB8}"/>
+              </a:ext>
+            </a:extLst>
+          </p:cNvPr>
+          <p:cNvSpPr/>
+          <p:nvPr/>
+        </p:nvSpPr>
+        <p:spPr>
+          <a:xfrm>
+            <a:off x="945517" y="2851482"/>
+            <a:ext cx="4324610" cy="787699"/>
+          </a:xfrm>
+          <a:prstGeom prst="roundRect">
+            <a:avLst/>
+          </a:prstGeom>
+          <a:solidFill>
+            <a:schemeClr val="accent3">
+              <a:lumMod val="60000"/>
+              <a:lumOff val="40000"/>
+            </a:schemeClr>
+          </a:solidFill>
+          <a:ln>
+            <a:solidFill>
+              <a:schemeClr val="tx1">
+                <a:lumMod val="85000"/>
+                <a:lumOff val="15000"/>
+              </a:schemeClr>
+            </a:solidFill>
+          </a:ln>
+        </p:spPr>
+        <p:style>
+          <a:lnRef idx="2">
+            <a:schemeClr val="accent1">
+              <a:shade val="15000"/>
+            </a:schemeClr>
+          </a:lnRef>
+          <a:fillRef idx="1">
+            <a:schemeClr val="accent1"/>
+          </a:fillRef>
+          <a:effectRef idx="0">
+            <a:schemeClr val="accent1"/>
+          </a:effectRef>
+          <a:fontRef idx="minor">
+            <a:schemeClr val="lt1"/>
+          </a:fontRef>
+        </p:style>
+        <p:txBody>
+          <a:bodyPr rtlCol="0" anchor="ctr"/>
+          <a:lstStyle/>
+          <a:p>
+            <a:pPr algn="ctr"/>
+            <a:r>
+              <a:rPr lang="en-US" sz="2400" b="1" dirty="0">
+                <a:solidFill>
+                  <a:schemeClr val="tx1"/>
+                </a:solidFill>
+              </a:rPr>
+              <a:t>Server Stage Pod Replica</a:t>
+            </a:r>
+          </a:p>
+        </p:txBody>
+      </p:sp>
+      <p:sp>
+        <p:nvSpPr>
+          <p:cNvPr id="67" name="Rectangle: Rounded Corners 66">
+            <a:extLst>
+              <a:ext uri="{FF2B5EF4-FFF2-40B4-BE49-F238E27FC236}">
+                <a16:creationId xmlns:a16="http://schemas.microsoft.com/office/drawing/2014/main" id="{D7DF0305-A7BA-2E40-A071-54A58198D957}"/>
+              </a:ext>
+            </a:extLst>
+          </p:cNvPr>
+          <p:cNvSpPr/>
+          <p:nvPr/>
+        </p:nvSpPr>
+        <p:spPr>
+          <a:xfrm>
+            <a:off x="945517" y="3908087"/>
+            <a:ext cx="4324610" cy="787699"/>
+          </a:xfrm>
+          <a:prstGeom prst="roundRect">
+            <a:avLst/>
+          </a:prstGeom>
+          <a:solidFill>
+            <a:schemeClr val="accent3">
+              <a:lumMod val="60000"/>
+              <a:lumOff val="40000"/>
+            </a:schemeClr>
+          </a:solidFill>
+          <a:ln>
+            <a:solidFill>
+              <a:schemeClr val="tx1">
+                <a:lumMod val="85000"/>
+                <a:lumOff val="15000"/>
+              </a:schemeClr>
+            </a:solidFill>
+          </a:ln>
+        </p:spPr>
+        <p:style>
+          <a:lnRef idx="2">
+            <a:schemeClr val="accent1">
+              <a:shade val="15000"/>
+            </a:schemeClr>
+          </a:lnRef>
+          <a:fillRef idx="1">
+            <a:schemeClr val="accent1"/>
+          </a:fillRef>
+          <a:effectRef idx="0">
+            <a:schemeClr val="accent1"/>
+          </a:effectRef>
+          <a:fontRef idx="minor">
+            <a:schemeClr val="lt1"/>
+          </a:fontRef>
+        </p:style>
+        <p:txBody>
+          <a:bodyPr rtlCol="0" anchor="ctr"/>
+          <a:lstStyle/>
+          <a:p>
+            <a:pPr algn="ctr"/>
+            <a:r>
+              <a:rPr lang="en-US" sz="2400" b="1" dirty="0">
+                <a:solidFill>
+                  <a:schemeClr val="tx1"/>
+                </a:solidFill>
+              </a:rPr>
+              <a:t>Server Stage Pod Replica</a:t>
+            </a:r>
+          </a:p>
+        </p:txBody>
+      </p:sp>
+      <p:sp>
+        <p:nvSpPr>
+          <p:cNvPr id="68" name="Rectangle: Rounded Corners 67">
+            <a:extLst>
+              <a:ext uri="{FF2B5EF4-FFF2-40B4-BE49-F238E27FC236}">
+                <a16:creationId xmlns:a16="http://schemas.microsoft.com/office/drawing/2014/main" id="{722DF201-7F03-0449-45CF-416420EC3F98}"/>
+              </a:ext>
+            </a:extLst>
+          </p:cNvPr>
+          <p:cNvSpPr/>
+          <p:nvPr/>
+        </p:nvSpPr>
+        <p:spPr>
+          <a:xfrm>
+            <a:off x="945517" y="4964692"/>
+            <a:ext cx="4324610" cy="787699"/>
+          </a:xfrm>
+          <a:prstGeom prst="roundRect">
+            <a:avLst/>
+          </a:prstGeom>
+          <a:solidFill>
+            <a:schemeClr val="accent3">
+              <a:lumMod val="60000"/>
+              <a:lumOff val="40000"/>
+            </a:schemeClr>
+          </a:solidFill>
+          <a:ln>
+            <a:solidFill>
+              <a:schemeClr val="tx1">
+                <a:lumMod val="85000"/>
+                <a:lumOff val="15000"/>
+              </a:schemeClr>
+            </a:solidFill>
+          </a:ln>
+        </p:spPr>
+        <p:style>
+          <a:lnRef idx="2">
+            <a:schemeClr val="accent1">
+              <a:shade val="15000"/>
+            </a:schemeClr>
+          </a:lnRef>
+          <a:fillRef idx="1">
+            <a:schemeClr val="accent1"/>
+          </a:fillRef>
+          <a:effectRef idx="0">
+            <a:schemeClr val="accent1"/>
+          </a:effectRef>
+          <a:fontRef idx="minor">
+            <a:schemeClr val="lt1"/>
+          </a:fontRef>
+        </p:style>
+        <p:txBody>
+          <a:bodyPr rtlCol="0" anchor="ctr"/>
+          <a:lstStyle/>
+          <a:p>
+            <a:pPr algn="ctr"/>
+            <a:r>
+              <a:rPr lang="en-US" sz="2400" b="1" dirty="0">
+                <a:solidFill>
+                  <a:schemeClr val="tx1"/>
+                </a:solidFill>
+              </a:rPr>
+              <a:t>Server Stage Pod Replica</a:t>
+            </a:r>
+          </a:p>
+        </p:txBody>
+      </p:sp>
+      <p:sp>
+        <p:nvSpPr>
+          <p:cNvPr id="74" name="Rectangle 73">
+            <a:extLst>
+              <a:ext uri="{FF2B5EF4-FFF2-40B4-BE49-F238E27FC236}">
+                <a16:creationId xmlns:a16="http://schemas.microsoft.com/office/drawing/2014/main" id="{C17F2DCE-7522-A675-631A-B7160946C23C}"/>
+              </a:ext>
+            </a:extLst>
+          </p:cNvPr>
+          <p:cNvSpPr/>
+          <p:nvPr/>
+        </p:nvSpPr>
+        <p:spPr>
+          <a:xfrm>
+            <a:off x="762110" y="1911350"/>
+            <a:ext cx="366813" cy="575733"/>
+          </a:xfrm>
+          <a:prstGeom prst="rect">
+            <a:avLst/>
+          </a:prstGeom>
+          <a:solidFill>
+            <a:schemeClr val="accent3">
+              <a:lumMod val="50000"/>
+            </a:schemeClr>
+          </a:solidFill>
+          <a:ln>
+            <a:solidFill>
+              <a:schemeClr val="tx1">
+                <a:lumMod val="85000"/>
+                <a:lumOff val="15000"/>
+              </a:schemeClr>
+            </a:solidFill>
+          </a:ln>
+        </p:spPr>
+        <p:style>
+          <a:lnRef idx="2">
+            <a:schemeClr val="accent1">
+              <a:shade val="15000"/>
+            </a:schemeClr>
+          </a:lnRef>
+          <a:fillRef idx="1">
+            <a:schemeClr val="accent1"/>
+          </a:fillRef>
+          <a:effectRef idx="0">
+            <a:schemeClr val="accent1"/>
+          </a:effectRef>
+          <a:fontRef idx="minor">
+            <a:schemeClr val="lt1"/>
+          </a:fontRef>
+        </p:style>
+        <p:txBody>
+          <a:bodyPr rtlCol="0" anchor="ctr"/>
+          <a:lstStyle/>
+          <a:p>
+            <a:pPr algn="ctr"/>
+            <a:endParaRPr lang="en-US" sz="1600"/>
+          </a:p>
+        </p:txBody>
+      </p:sp>
+      <p:sp>
+        <p:nvSpPr>
+          <p:cNvPr id="75" name="Rectangle 74">
+            <a:extLst>
+              <a:ext uri="{FF2B5EF4-FFF2-40B4-BE49-F238E27FC236}">
+                <a16:creationId xmlns:a16="http://schemas.microsoft.com/office/drawing/2014/main" id="{7244C5E5-27A5-83A3-C7DE-1C4064927375}"/>
+              </a:ext>
+            </a:extLst>
+          </p:cNvPr>
+          <p:cNvSpPr/>
+          <p:nvPr/>
+        </p:nvSpPr>
+        <p:spPr>
+          <a:xfrm>
+            <a:off x="762109" y="2970619"/>
+            <a:ext cx="366813" cy="575733"/>
+          </a:xfrm>
+          <a:prstGeom prst="rect">
+            <a:avLst/>
+          </a:prstGeom>
+          <a:solidFill>
+            <a:schemeClr val="accent3">
+              <a:lumMod val="50000"/>
+            </a:schemeClr>
+          </a:solidFill>
+          <a:ln>
+            <a:solidFill>
+              <a:schemeClr val="tx1">
+                <a:lumMod val="85000"/>
+                <a:lumOff val="15000"/>
+              </a:schemeClr>
+            </a:solidFill>
+          </a:ln>
+        </p:spPr>
+        <p:style>
+          <a:lnRef idx="2">
+            <a:schemeClr val="accent1">
+              <a:shade val="15000"/>
+            </a:schemeClr>
+          </a:lnRef>
+          <a:fillRef idx="1">
+            <a:schemeClr val="accent1"/>
+          </a:fillRef>
+          <a:effectRef idx="0">
+            <a:schemeClr val="accent1"/>
+          </a:effectRef>
+          <a:fontRef idx="minor">
+            <a:schemeClr val="lt1"/>
+          </a:fontRef>
+        </p:style>
+        <p:txBody>
+          <a:bodyPr rtlCol="0" anchor="ctr"/>
+          <a:lstStyle/>
+          <a:p>
+            <a:pPr algn="ctr"/>
+            <a:endParaRPr lang="en-US" sz="1600"/>
+          </a:p>
+        </p:txBody>
+      </p:sp>
+      <p:sp>
+        <p:nvSpPr>
+          <p:cNvPr id="76" name="Rectangle 75">
+            <a:extLst>
+              <a:ext uri="{FF2B5EF4-FFF2-40B4-BE49-F238E27FC236}">
+                <a16:creationId xmlns:a16="http://schemas.microsoft.com/office/drawing/2014/main" id="{AB69B9A4-8D5D-44AA-FECE-8CA807803A37}"/>
+              </a:ext>
+            </a:extLst>
+          </p:cNvPr>
+          <p:cNvSpPr/>
+          <p:nvPr/>
+        </p:nvSpPr>
+        <p:spPr>
+          <a:xfrm>
+            <a:off x="762109" y="4014069"/>
+            <a:ext cx="366813" cy="575733"/>
+          </a:xfrm>
+          <a:prstGeom prst="rect">
+            <a:avLst/>
+          </a:prstGeom>
+          <a:solidFill>
+            <a:schemeClr val="accent3">
+              <a:lumMod val="50000"/>
+            </a:schemeClr>
+          </a:solidFill>
+          <a:ln>
+            <a:solidFill>
+              <a:schemeClr val="tx1">
+                <a:lumMod val="85000"/>
+                <a:lumOff val="15000"/>
+              </a:schemeClr>
+            </a:solidFill>
+          </a:ln>
+        </p:spPr>
+        <p:style>
+          <a:lnRef idx="2">
+            <a:schemeClr val="accent1">
+              <a:shade val="15000"/>
+            </a:schemeClr>
+          </a:lnRef>
+          <a:fillRef idx="1">
+            <a:schemeClr val="accent1"/>
+          </a:fillRef>
+          <a:effectRef idx="0">
+            <a:schemeClr val="accent1"/>
+          </a:effectRef>
+          <a:fontRef idx="minor">
+            <a:schemeClr val="lt1"/>
+          </a:fontRef>
+        </p:style>
+        <p:txBody>
+          <a:bodyPr rtlCol="0" anchor="ctr"/>
+          <a:lstStyle/>
+          <a:p>
+            <a:pPr algn="ctr"/>
+            <a:endParaRPr lang="en-US" sz="1600"/>
+          </a:p>
+        </p:txBody>
+      </p:sp>
+      <p:sp>
+        <p:nvSpPr>
+          <p:cNvPr id="77" name="Rectangle 76">
+            <a:extLst>
+              <a:ext uri="{FF2B5EF4-FFF2-40B4-BE49-F238E27FC236}">
+                <a16:creationId xmlns:a16="http://schemas.microsoft.com/office/drawing/2014/main" id="{29840ECF-330D-6683-94EE-EE91C8CC4B7F}"/>
+              </a:ext>
+            </a:extLst>
+          </p:cNvPr>
+          <p:cNvSpPr/>
+          <p:nvPr/>
+        </p:nvSpPr>
+        <p:spPr>
+          <a:xfrm>
+            <a:off x="762108" y="5070674"/>
+            <a:ext cx="366813" cy="575733"/>
+          </a:xfrm>
+          <a:prstGeom prst="rect">
+            <a:avLst/>
+          </a:prstGeom>
+          <a:solidFill>
+            <a:schemeClr val="accent3">
+              <a:lumMod val="50000"/>
+            </a:schemeClr>
+          </a:solidFill>
+          <a:ln>
+            <a:solidFill>
+              <a:schemeClr val="tx1">
+                <a:lumMod val="85000"/>
+                <a:lumOff val="15000"/>
+              </a:schemeClr>
+            </a:solidFill>
+          </a:ln>
+        </p:spPr>
+        <p:style>
+          <a:lnRef idx="2">
+            <a:schemeClr val="accent1">
+              <a:shade val="15000"/>
+            </a:schemeClr>
+          </a:lnRef>
+          <a:fillRef idx="1">
+            <a:schemeClr val="accent1"/>
+          </a:fillRef>
+          <a:effectRef idx="0">
+            <a:schemeClr val="accent1"/>
+          </a:effectRef>
+          <a:fontRef idx="minor">
+            <a:schemeClr val="lt1"/>
+          </a:fontRef>
+        </p:style>
+        <p:txBody>
+          <a:bodyPr rtlCol="0" anchor="ctr"/>
+          <a:lstStyle/>
+          <a:p>
+            <a:pPr algn="ctr"/>
+            <a:endParaRPr lang="en-US" sz="1600"/>
+          </a:p>
+        </p:txBody>
+      </p:sp>
+      <p:sp>
+        <p:nvSpPr>
+          <p:cNvPr id="78" name="Rectangle 77">
+            <a:extLst>
+              <a:ext uri="{FF2B5EF4-FFF2-40B4-BE49-F238E27FC236}">
+                <a16:creationId xmlns:a16="http://schemas.microsoft.com/office/drawing/2014/main" id="{BBD93F07-0E40-729E-8F64-600166F032CF}"/>
+              </a:ext>
+            </a:extLst>
+          </p:cNvPr>
+          <p:cNvSpPr/>
+          <p:nvPr/>
+        </p:nvSpPr>
+        <p:spPr>
+          <a:xfrm>
+            <a:off x="5086721" y="1911350"/>
+            <a:ext cx="366813" cy="575733"/>
+          </a:xfrm>
+          <a:prstGeom prst="rect">
+            <a:avLst/>
+          </a:prstGeom>
+          <a:solidFill>
+            <a:schemeClr val="tx1"/>
+          </a:solidFill>
+          <a:ln>
+            <a:solidFill>
+              <a:schemeClr val="tx1">
+                <a:lumMod val="85000"/>
+                <a:lumOff val="15000"/>
+              </a:schemeClr>
+            </a:solidFill>
+          </a:ln>
+        </p:spPr>
+        <p:style>
+          <a:lnRef idx="2">
+            <a:schemeClr val="accent1">
+              <a:shade val="15000"/>
+            </a:schemeClr>
+          </a:lnRef>
+          <a:fillRef idx="1">
+            <a:schemeClr val="accent1"/>
+          </a:fillRef>
+          <a:effectRef idx="0">
+            <a:schemeClr val="accent1"/>
+          </a:effectRef>
+          <a:fontRef idx="minor">
+            <a:schemeClr val="lt1"/>
+          </a:fontRef>
+        </p:style>
+        <p:txBody>
+          <a:bodyPr rtlCol="0" anchor="ctr"/>
+          <a:lstStyle/>
+          <a:p>
+            <a:pPr algn="ctr"/>
+            <a:endParaRPr lang="en-US" sz="1600"/>
+          </a:p>
+        </p:txBody>
+      </p:sp>
+      <p:cxnSp>
+        <p:nvCxnSpPr>
+          <p:cNvPr id="70" name="Straight Connector 69">
+            <a:extLst>
+              <a:ext uri="{FF2B5EF4-FFF2-40B4-BE49-F238E27FC236}">
+                <a16:creationId xmlns:a16="http://schemas.microsoft.com/office/drawing/2014/main" id="{E4E142AD-DEB9-176B-C9C9-F773CC09413A}"/>
+              </a:ext>
+            </a:extLst>
+          </p:cNvPr>
+          <p:cNvCxnSpPr/>
+          <p:nvPr/>
+        </p:nvCxnSpPr>
+        <p:spPr>
+          <a:xfrm flipV="1">
+            <a:off x="5222240" y="939800"/>
+            <a:ext cx="1264920" cy="1911682"/>
+          </a:xfrm>
+          <a:prstGeom prst="line">
+            <a:avLst/>
+          </a:prstGeom>
+          <a:ln w="76200">
+            <a:prstDash val="sysDash"/>
+          </a:ln>
+        </p:spPr>
+        <p:style>
+          <a:lnRef idx="2">
+            <a:schemeClr val="dk1"/>
+          </a:lnRef>
+          <a:fillRef idx="0">
+            <a:schemeClr val="dk1"/>
+          </a:fillRef>
+          <a:effectRef idx="1">
+            <a:schemeClr val="dk1"/>
+          </a:effectRef>
+          <a:fontRef idx="minor">
+            <a:schemeClr val="tx1"/>
+          </a:fontRef>
+        </p:style>
+      </p:cxnSp>
+      <p:sp>
+        <p:nvSpPr>
+          <p:cNvPr id="79" name="Rectangle 78">
+            <a:extLst>
+              <a:ext uri="{FF2B5EF4-FFF2-40B4-BE49-F238E27FC236}">
+                <a16:creationId xmlns:a16="http://schemas.microsoft.com/office/drawing/2014/main" id="{066B6612-6FC8-CC17-0982-C27704D53A5C}"/>
+              </a:ext>
+            </a:extLst>
+          </p:cNvPr>
+          <p:cNvSpPr/>
+          <p:nvPr/>
+        </p:nvSpPr>
+        <p:spPr>
+          <a:xfrm>
+            <a:off x="5086720" y="2957464"/>
+            <a:ext cx="366813" cy="575733"/>
+          </a:xfrm>
+          <a:prstGeom prst="rect">
+            <a:avLst/>
+          </a:prstGeom>
+          <a:solidFill>
+            <a:schemeClr val="tx1"/>
+          </a:solidFill>
+          <a:ln>
+            <a:solidFill>
+              <a:schemeClr val="tx1">
+                <a:lumMod val="85000"/>
+                <a:lumOff val="15000"/>
+              </a:schemeClr>
+            </a:solidFill>
+          </a:ln>
+        </p:spPr>
+        <p:style>
+          <a:lnRef idx="2">
+            <a:schemeClr val="accent1">
+              <a:shade val="15000"/>
+            </a:schemeClr>
+          </a:lnRef>
+          <a:fillRef idx="1">
+            <a:schemeClr val="accent1"/>
+          </a:fillRef>
+          <a:effectRef idx="0">
+            <a:schemeClr val="accent1"/>
+          </a:effectRef>
+          <a:fontRef idx="minor">
+            <a:schemeClr val="lt1"/>
+          </a:fontRef>
+        </p:style>
+        <p:txBody>
+          <a:bodyPr rtlCol="0" anchor="ctr"/>
+          <a:lstStyle/>
+          <a:p>
+            <a:pPr algn="ctr"/>
+            <a:endParaRPr lang="en-US" sz="1600"/>
+          </a:p>
+        </p:txBody>
+      </p:sp>
+      <p:sp>
+        <p:nvSpPr>
+          <p:cNvPr id="80" name="Rectangle 79">
+            <a:extLst>
+              <a:ext uri="{FF2B5EF4-FFF2-40B4-BE49-F238E27FC236}">
+                <a16:creationId xmlns:a16="http://schemas.microsoft.com/office/drawing/2014/main" id="{D1F54363-1538-4058-DA17-D26F3B0270F1}"/>
+              </a:ext>
+            </a:extLst>
+          </p:cNvPr>
+          <p:cNvSpPr/>
+          <p:nvPr/>
+        </p:nvSpPr>
+        <p:spPr>
+          <a:xfrm>
+            <a:off x="5083886" y="4014069"/>
+            <a:ext cx="366813" cy="575733"/>
+          </a:xfrm>
+          <a:prstGeom prst="rect">
+            <a:avLst/>
+          </a:prstGeom>
+          <a:solidFill>
+            <a:schemeClr val="tx1"/>
+          </a:solidFill>
+          <a:ln>
+            <a:solidFill>
+              <a:schemeClr val="tx1">
+                <a:lumMod val="85000"/>
+                <a:lumOff val="15000"/>
+              </a:schemeClr>
+            </a:solidFill>
+          </a:ln>
+        </p:spPr>
+        <p:style>
+          <a:lnRef idx="2">
+            <a:schemeClr val="accent1">
+              <a:shade val="15000"/>
+            </a:schemeClr>
+          </a:lnRef>
+          <a:fillRef idx="1">
+            <a:schemeClr val="accent1"/>
+          </a:fillRef>
+          <a:effectRef idx="0">
+            <a:schemeClr val="accent1"/>
+          </a:effectRef>
+          <a:fontRef idx="minor">
+            <a:schemeClr val="lt1"/>
+          </a:fontRef>
+        </p:style>
+        <p:txBody>
+          <a:bodyPr rtlCol="0" anchor="ctr"/>
+          <a:lstStyle/>
+          <a:p>
+            <a:pPr algn="ctr"/>
+            <a:endParaRPr lang="en-US" sz="1600"/>
+          </a:p>
+        </p:txBody>
+      </p:sp>
+      <p:sp>
+        <p:nvSpPr>
+          <p:cNvPr id="81" name="Rectangle 80">
+            <a:extLst>
+              <a:ext uri="{FF2B5EF4-FFF2-40B4-BE49-F238E27FC236}">
+                <a16:creationId xmlns:a16="http://schemas.microsoft.com/office/drawing/2014/main" id="{F3200539-3A7F-28E5-CDC1-031E59612F83}"/>
+              </a:ext>
+            </a:extLst>
+          </p:cNvPr>
+          <p:cNvSpPr/>
+          <p:nvPr/>
+        </p:nvSpPr>
+        <p:spPr>
+          <a:xfrm>
+            <a:off x="5083886" y="5070673"/>
+            <a:ext cx="366813" cy="575733"/>
+          </a:xfrm>
+          <a:prstGeom prst="rect">
+            <a:avLst/>
+          </a:prstGeom>
+          <a:solidFill>
+            <a:schemeClr val="tx1"/>
+          </a:solidFill>
+          <a:ln>
+            <a:solidFill>
+              <a:schemeClr val="tx1">
+                <a:lumMod val="85000"/>
+                <a:lumOff val="15000"/>
+              </a:schemeClr>
+            </a:solidFill>
+          </a:ln>
+        </p:spPr>
+        <p:style>
+          <a:lnRef idx="2">
+            <a:schemeClr val="accent1">
+              <a:shade val="15000"/>
+            </a:schemeClr>
+          </a:lnRef>
+          <a:fillRef idx="1">
+            <a:schemeClr val="accent1"/>
+          </a:fillRef>
+          <a:effectRef idx="0">
+            <a:schemeClr val="accent1"/>
+          </a:effectRef>
+          <a:fontRef idx="minor">
+            <a:schemeClr val="lt1"/>
+          </a:fontRef>
+        </p:style>
+        <p:txBody>
+          <a:bodyPr rtlCol="0" anchor="ctr"/>
+          <a:lstStyle/>
+          <a:p>
+            <a:pPr algn="ctr"/>
+            <a:endParaRPr lang="en-US" sz="1600"/>
+          </a:p>
+        </p:txBody>
+      </p:sp>
+      <p:cxnSp>
+        <p:nvCxnSpPr>
+          <p:cNvPr id="71" name="Straight Connector 70">
+            <a:extLst>
+              <a:ext uri="{FF2B5EF4-FFF2-40B4-BE49-F238E27FC236}">
+                <a16:creationId xmlns:a16="http://schemas.microsoft.com/office/drawing/2014/main" id="{7E890B09-A260-30C3-F683-0F3A90DD82B8}"/>
+              </a:ext>
+            </a:extLst>
+          </p:cNvPr>
+          <p:cNvCxnSpPr>
+            <a:cxnSpLocks/>
+          </p:cNvCxnSpPr>
+          <p:nvPr/>
+        </p:nvCxnSpPr>
+        <p:spPr>
+          <a:xfrm>
+            <a:off x="5222240" y="3599618"/>
+            <a:ext cx="1219747" cy="2421679"/>
+          </a:xfrm>
+          <a:prstGeom prst="line">
+            <a:avLst/>
+          </a:prstGeom>
+          <a:ln w="76200">
+            <a:prstDash val="sysDash"/>
+          </a:ln>
+        </p:spPr>
+        <p:style>
+          <a:lnRef idx="2">
+            <a:schemeClr val="dk1"/>
+          </a:lnRef>
+          <a:fillRef idx="0">
+            <a:schemeClr val="dk1"/>
+          </a:fillRef>
+          <a:effectRef idx="1">
+            <a:schemeClr val="dk1"/>
+          </a:effectRef>
+          <a:fontRef idx="minor">
+            <a:schemeClr val="tx1"/>
+          </a:fontRef>
+        </p:style>
+      </p:cxnSp>
+    </p:spTree>
+    <p:extLst>
+      <p:ext uri="{BB962C8B-B14F-4D97-AF65-F5344CB8AC3E}">
+        <p14:creationId xmlns:p14="http://schemas.microsoft.com/office/powerpoint/2010/main" val="9306312"/>
+      </p:ext>
+    </p:extLst>
+  </p:cSld>
+  <p:clrMapOvr>
+    <a:masterClrMapping/>
+  </p:clrMapOvr>
+</p:sld>
+</file>
+
+<file path=ppt/slides/slide8.xml><?xml version="1.0" encoding="utf-8"?>
+<p:sld xmlns:a="http://schemas.openxmlformats.org/drawingml/2006/main" xmlns:r="http://schemas.openxmlformats.org/officeDocument/2006/relationships" xmlns:p="http://schemas.openxmlformats.org/presentationml/2006/main">
+  <p:cSld>
+    <p:spTree>
+      <p:nvGrpSpPr>
+        <p:cNvPr id="1" name="">
+          <a:extLst>
+            <a:ext uri="{FF2B5EF4-FFF2-40B4-BE49-F238E27FC236}">
+              <a16:creationId xmlns:a16="http://schemas.microsoft.com/office/drawing/2014/main" id="{4C6A6D65-091A-DBBC-1D25-5D99DB1A9038}"/>
+            </a:ext>
+          </a:extLst>
+        </p:cNvPr>
+        <p:cNvGrpSpPr/>
+        <p:nvPr/>
+      </p:nvGrpSpPr>
+      <p:grpSpPr>
+        <a:xfrm>
+          <a:off x="0" y="0"/>
+          <a:ext cx="0" cy="0"/>
+          <a:chOff x="0" y="0"/>
+          <a:chExt cx="0" cy="0"/>
+        </a:xfrm>
+      </p:grpSpPr>
+      <p:sp>
+        <p:nvSpPr>
+          <p:cNvPr id="18" name="Rectangle: Rounded Corners 17">
+            <a:extLst>
+              <a:ext uri="{FF2B5EF4-FFF2-40B4-BE49-F238E27FC236}">
+                <a16:creationId xmlns:a16="http://schemas.microsoft.com/office/drawing/2014/main" id="{4643CB42-D4E7-AE61-20B8-BB77F90C0E15}"/>
+              </a:ext>
+            </a:extLst>
+          </p:cNvPr>
+          <p:cNvSpPr/>
+          <p:nvPr/>
+        </p:nvSpPr>
+        <p:spPr>
+          <a:xfrm>
+            <a:off x="2703787" y="379674"/>
+            <a:ext cx="9276178" cy="6098651"/>
+          </a:xfrm>
+          <a:prstGeom prst="roundRect">
+            <a:avLst/>
+          </a:prstGeom>
+          <a:solidFill>
+            <a:schemeClr val="accent4">
+              <a:lumMod val="20000"/>
+              <a:lumOff val="80000"/>
+            </a:schemeClr>
+          </a:solidFill>
+          <a:ln>
+            <a:solidFill>
+              <a:schemeClr val="tx1">
+                <a:lumMod val="85000"/>
+                <a:lumOff val="15000"/>
+              </a:schemeClr>
+            </a:solidFill>
+          </a:ln>
+        </p:spPr>
+        <p:style>
+          <a:lnRef idx="2">
+            <a:schemeClr val="accent1">
+              <a:shade val="15000"/>
+            </a:schemeClr>
+          </a:lnRef>
+          <a:fillRef idx="1">
+            <a:schemeClr val="accent1"/>
+          </a:fillRef>
+          <a:effectRef idx="0">
+            <a:schemeClr val="accent1"/>
+          </a:effectRef>
+          <a:fontRef idx="minor">
+            <a:schemeClr val="lt1"/>
+          </a:fontRef>
+        </p:style>
+        <p:txBody>
+          <a:bodyPr rtlCol="0" anchor="t"/>
+          <a:lstStyle/>
+          <a:p>
+            <a:pPr algn="ctr"/>
+            <a:r>
+              <a:rPr lang="en-US" sz="4000" b="1" dirty="0">
+                <a:solidFill>
+                  <a:schemeClr val="tx1"/>
+                </a:solidFill>
+              </a:rPr>
+              <a:t>K8s Namespace &amp; Security Policy</a:t>
+            </a:r>
+          </a:p>
+        </p:txBody>
+      </p:sp>
+      <p:sp>
+        <p:nvSpPr>
+          <p:cNvPr id="13" name="Rectangle: Rounded Corners 12">
+            <a:extLst>
+              <a:ext uri="{FF2B5EF4-FFF2-40B4-BE49-F238E27FC236}">
+                <a16:creationId xmlns:a16="http://schemas.microsoft.com/office/drawing/2014/main" id="{D02890E6-CB82-9F4F-084D-71B59F9C326E}"/>
+              </a:ext>
+            </a:extLst>
+          </p:cNvPr>
+          <p:cNvSpPr/>
+          <p:nvPr/>
+        </p:nvSpPr>
+        <p:spPr>
+          <a:xfrm>
+            <a:off x="6937030" y="1625731"/>
+            <a:ext cx="2825798" cy="4568357"/>
+          </a:xfrm>
+          <a:prstGeom prst="roundRect">
+            <a:avLst/>
+          </a:prstGeom>
+          <a:solidFill>
+            <a:srgbClr val="DCC480"/>
+          </a:solidFill>
+          <a:ln>
+            <a:solidFill>
+              <a:schemeClr val="tx1">
+                <a:lumMod val="85000"/>
+                <a:lumOff val="15000"/>
+              </a:schemeClr>
+            </a:solidFill>
+          </a:ln>
+        </p:spPr>
+        <p:style>
+          <a:lnRef idx="2">
+            <a:schemeClr val="accent1">
+              <a:shade val="15000"/>
+            </a:schemeClr>
+          </a:lnRef>
+          <a:fillRef idx="1">
+            <a:schemeClr val="accent1"/>
+          </a:fillRef>
+          <a:effectRef idx="0">
+            <a:schemeClr val="accent1"/>
+          </a:effectRef>
+          <a:fontRef idx="minor">
+            <a:schemeClr val="lt1"/>
+          </a:fontRef>
+        </p:style>
+        <p:txBody>
+          <a:bodyPr rtlCol="0" anchor="t"/>
+          <a:lstStyle/>
+          <a:p>
+            <a:pPr algn="ctr"/>
+            <a:r>
+              <a:rPr lang="en-US" sz="2400" b="1" dirty="0">
+                <a:solidFill>
+                  <a:schemeClr val="tx1"/>
+                </a:solidFill>
+              </a:rPr>
+              <a:t>K8s Admission Policy</a:t>
+            </a:r>
+          </a:p>
+        </p:txBody>
+      </p:sp>
+      <p:sp>
+        <p:nvSpPr>
+          <p:cNvPr id="6" name="Rectangle: Rounded Corners 5">
+            <a:extLst>
+              <a:ext uri="{FF2B5EF4-FFF2-40B4-BE49-F238E27FC236}">
+                <a16:creationId xmlns:a16="http://schemas.microsoft.com/office/drawing/2014/main" id="{4CD0A2D7-4CA6-1D8A-568B-AB5A31B0F877}"/>
+              </a:ext>
+            </a:extLst>
+          </p:cNvPr>
+          <p:cNvSpPr/>
+          <p:nvPr/>
+        </p:nvSpPr>
+        <p:spPr>
+          <a:xfrm>
+            <a:off x="7249619" y="2776979"/>
+            <a:ext cx="2200619" cy="590718"/>
+          </a:xfrm>
+          <a:prstGeom prst="roundRect">
+            <a:avLst/>
+          </a:prstGeom>
+          <a:solidFill>
+            <a:srgbClr val="FFFF99"/>
+          </a:solidFill>
+          <a:ln>
+            <a:solidFill>
+              <a:schemeClr val="tx1">
+                <a:lumMod val="85000"/>
+                <a:lumOff val="15000"/>
+              </a:schemeClr>
+            </a:solidFill>
+          </a:ln>
+        </p:spPr>
+        <p:style>
+          <a:lnRef idx="2">
+            <a:schemeClr val="accent1">
+              <a:shade val="15000"/>
+            </a:schemeClr>
+          </a:lnRef>
+          <a:fillRef idx="1">
+            <a:schemeClr val="accent1"/>
+          </a:fillRef>
+          <a:effectRef idx="0">
+            <a:schemeClr val="accent1"/>
+          </a:effectRef>
+          <a:fontRef idx="minor">
+            <a:schemeClr val="lt1"/>
+          </a:fontRef>
+        </p:style>
+        <p:txBody>
+          <a:bodyPr rtlCol="0" anchor="ctr"/>
+          <a:lstStyle/>
+          <a:p>
+            <a:pPr algn="ctr"/>
+            <a:r>
+              <a:rPr lang="en-US" sz="2000" b="1" dirty="0">
+                <a:solidFill>
+                  <a:schemeClr val="tx1"/>
+                </a:solidFill>
+              </a:rPr>
+              <a:t>Server Stage D1</a:t>
+            </a:r>
+          </a:p>
+        </p:txBody>
+      </p:sp>
+      <p:pic>
+        <p:nvPicPr>
+          <p:cNvPr id="58" name="Graphic 57" descr="User with solid fill">
+            <a:extLst>
+              <a:ext uri="{FF2B5EF4-FFF2-40B4-BE49-F238E27FC236}">
+                <a16:creationId xmlns:a16="http://schemas.microsoft.com/office/drawing/2014/main" id="{55DC5A3E-B9CD-0A81-C8CA-141FF9C016F9}"/>
+              </a:ext>
+            </a:extLst>
+          </p:cNvPr>
+          <p:cNvPicPr>
+            <a:picLocks noChangeAspect="1"/>
+          </p:cNvPicPr>
+          <p:nvPr/>
+        </p:nvPicPr>
+        <p:blipFill>
+          <a:blip r:embed="rId2">
+            <a:extLst>
+              <a:ext uri="{96DAC541-7B7A-43D3-8B79-37D633B846F1}">
+                <asvg:svgBlip xmlns:asvg="http://schemas.microsoft.com/office/drawing/2016/SVG/main" r:embed="rId3"/>
+              </a:ext>
+            </a:extLst>
+          </a:blip>
+          <a:srcRect l="14735" t="12485" r="14357" b="12791"/>
+          <a:stretch>
+            <a:fillRect/>
+          </a:stretch>
+        </p:blipFill>
+        <p:spPr>
+          <a:xfrm>
+            <a:off x="424286" y="2602913"/>
+            <a:ext cx="1350674" cy="1529567"/>
+          </a:xfrm>
+          <a:prstGeom prst="rect">
+            <a:avLst/>
+          </a:prstGeom>
+        </p:spPr>
+      </p:pic>
+      <p:sp>
+        <p:nvSpPr>
+          <p:cNvPr id="3" name="Rectangle: Rounded Corners 2">
+            <a:extLst>
+              <a:ext uri="{FF2B5EF4-FFF2-40B4-BE49-F238E27FC236}">
+                <a16:creationId xmlns:a16="http://schemas.microsoft.com/office/drawing/2014/main" id="{24182203-C6B2-FC67-7430-4DFFB15A515A}"/>
+              </a:ext>
+            </a:extLst>
+          </p:cNvPr>
+          <p:cNvSpPr/>
+          <p:nvPr/>
+        </p:nvSpPr>
+        <p:spPr>
+          <a:xfrm>
+            <a:off x="2741762" y="1625731"/>
+            <a:ext cx="3211118" cy="4568355"/>
+          </a:xfrm>
+          <a:prstGeom prst="roundRect">
+            <a:avLst/>
+          </a:prstGeom>
+          <a:solidFill>
+            <a:srgbClr val="DCC480"/>
+          </a:solidFill>
+          <a:ln>
+            <a:solidFill>
+              <a:schemeClr val="tx1">
+                <a:lumMod val="85000"/>
+                <a:lumOff val="15000"/>
+              </a:schemeClr>
+            </a:solidFill>
+          </a:ln>
+        </p:spPr>
+        <p:style>
+          <a:lnRef idx="2">
+            <a:schemeClr val="accent1">
+              <a:shade val="15000"/>
+            </a:schemeClr>
+          </a:lnRef>
+          <a:fillRef idx="1">
+            <a:schemeClr val="accent1"/>
+          </a:fillRef>
+          <a:effectRef idx="0">
+            <a:schemeClr val="accent1"/>
+          </a:effectRef>
+          <a:fontRef idx="minor">
+            <a:schemeClr val="lt1"/>
+          </a:fontRef>
+        </p:style>
+        <p:txBody>
+          <a:bodyPr rtlCol="0" anchor="t"/>
+          <a:lstStyle/>
+          <a:p>
+            <a:pPr algn="ctr"/>
+            <a:r>
+              <a:rPr lang="en-US" sz="2400" b="1" dirty="0">
+                <a:solidFill>
+                  <a:schemeClr val="tx1"/>
+                </a:solidFill>
+              </a:rPr>
+              <a:t>K8s Network Policy</a:t>
+            </a:r>
+          </a:p>
+        </p:txBody>
+      </p:sp>
+      <p:sp>
+        <p:nvSpPr>
+          <p:cNvPr id="10" name="Rectangle: Rounded Corners 9">
+            <a:extLst>
+              <a:ext uri="{FF2B5EF4-FFF2-40B4-BE49-F238E27FC236}">
+                <a16:creationId xmlns:a16="http://schemas.microsoft.com/office/drawing/2014/main" id="{8FBC0C27-5242-DDB9-3767-E1313188935C}"/>
+              </a:ext>
+            </a:extLst>
+          </p:cNvPr>
+          <p:cNvSpPr/>
+          <p:nvPr/>
+        </p:nvSpPr>
+        <p:spPr>
+          <a:xfrm>
+            <a:off x="4566920" y="4447285"/>
+            <a:ext cx="1385958" cy="590718"/>
+          </a:xfrm>
+          <a:prstGeom prst="roundRect">
+            <a:avLst/>
+          </a:prstGeom>
+          <a:solidFill>
+            <a:srgbClr val="FFFF99"/>
+          </a:solidFill>
+          <a:ln>
+            <a:solidFill>
+              <a:schemeClr val="tx1">
+                <a:lumMod val="85000"/>
+                <a:lumOff val="15000"/>
+              </a:schemeClr>
+            </a:solidFill>
+          </a:ln>
+        </p:spPr>
+        <p:style>
+          <a:lnRef idx="2">
+            <a:schemeClr val="accent1">
+              <a:shade val="15000"/>
+            </a:schemeClr>
+          </a:lnRef>
+          <a:fillRef idx="1">
+            <a:schemeClr val="accent1"/>
+          </a:fillRef>
+          <a:effectRef idx="0">
+            <a:schemeClr val="accent1"/>
+          </a:effectRef>
+          <a:fontRef idx="minor">
+            <a:schemeClr val="lt1"/>
+          </a:fontRef>
+        </p:style>
+        <p:txBody>
+          <a:bodyPr rtlCol="0" anchor="ctr"/>
+          <a:lstStyle/>
+          <a:p>
+            <a:pPr algn="ctr"/>
+            <a:r>
+              <a:rPr lang="en-US" sz="2000" b="1" dirty="0">
+                <a:solidFill>
+                  <a:schemeClr val="tx1"/>
+                </a:solidFill>
+              </a:rPr>
+              <a:t>Service …</a:t>
+            </a:r>
+          </a:p>
+        </p:txBody>
+      </p:sp>
+      <p:sp>
+        <p:nvSpPr>
+          <p:cNvPr id="57" name="Rectangle: Rounded Corners 56">
+            <a:extLst>
+              <a:ext uri="{FF2B5EF4-FFF2-40B4-BE49-F238E27FC236}">
+                <a16:creationId xmlns:a16="http://schemas.microsoft.com/office/drawing/2014/main" id="{4532FD3D-3883-F1C6-4C06-D7FE4E9BB520}"/>
+              </a:ext>
+            </a:extLst>
+          </p:cNvPr>
+          <p:cNvSpPr/>
+          <p:nvPr/>
+        </p:nvSpPr>
+        <p:spPr>
+          <a:xfrm>
+            <a:off x="2520525" y="3153023"/>
+            <a:ext cx="1131399" cy="913619"/>
+          </a:xfrm>
+          <a:prstGeom prst="roundRect">
+            <a:avLst/>
+          </a:prstGeom>
+          <a:solidFill>
+            <a:srgbClr val="FFFF99"/>
+          </a:solidFill>
+          <a:ln>
+            <a:solidFill>
+              <a:schemeClr val="tx1">
+                <a:lumMod val="85000"/>
+                <a:lumOff val="15000"/>
+              </a:schemeClr>
+            </a:solidFill>
+          </a:ln>
+        </p:spPr>
+        <p:style>
+          <a:lnRef idx="2">
+            <a:schemeClr val="accent1">
+              <a:shade val="15000"/>
+            </a:schemeClr>
+          </a:lnRef>
+          <a:fillRef idx="1">
+            <a:schemeClr val="accent1"/>
+          </a:fillRef>
+          <a:effectRef idx="0">
+            <a:schemeClr val="accent1"/>
+          </a:effectRef>
+          <a:fontRef idx="minor">
+            <a:schemeClr val="lt1"/>
+          </a:fontRef>
+        </p:style>
+        <p:txBody>
+          <a:bodyPr rtlCol="0" anchor="ctr"/>
+          <a:lstStyle/>
+          <a:p>
+            <a:pPr algn="ctr"/>
+            <a:r>
+              <a:rPr lang="en-US" sz="2000" b="1" dirty="0">
+                <a:solidFill>
+                  <a:schemeClr val="tx1"/>
+                </a:solidFill>
+              </a:rPr>
+              <a:t>K8s Ingress</a:t>
+            </a:r>
+          </a:p>
+        </p:txBody>
+      </p:sp>
+      <p:sp>
+        <p:nvSpPr>
+          <p:cNvPr id="22" name="Rectangle: Rounded Corners 21">
+            <a:extLst>
+              <a:ext uri="{FF2B5EF4-FFF2-40B4-BE49-F238E27FC236}">
+                <a16:creationId xmlns:a16="http://schemas.microsoft.com/office/drawing/2014/main" id="{1424EB6F-2B4E-30F9-18C4-BFBB383FDD3A}"/>
+              </a:ext>
+            </a:extLst>
+          </p:cNvPr>
+          <p:cNvSpPr/>
+          <p:nvPr/>
+        </p:nvSpPr>
+        <p:spPr>
+          <a:xfrm>
+            <a:off x="10355419" y="3854425"/>
+            <a:ext cx="1624546" cy="913619"/>
+          </a:xfrm>
+          <a:prstGeom prst="roundRect">
+            <a:avLst/>
+          </a:prstGeom>
+          <a:solidFill>
+            <a:schemeClr val="tx1"/>
+          </a:solidFill>
+          <a:ln>
+            <a:solidFill>
+              <a:schemeClr val="tx1">
+                <a:lumMod val="85000"/>
+                <a:lumOff val="15000"/>
+              </a:schemeClr>
+            </a:solidFill>
+          </a:ln>
+        </p:spPr>
+        <p:style>
+          <a:lnRef idx="2">
+            <a:schemeClr val="accent1">
+              <a:shade val="15000"/>
+            </a:schemeClr>
+          </a:lnRef>
+          <a:fillRef idx="1">
+            <a:schemeClr val="accent1"/>
+          </a:fillRef>
+          <a:effectRef idx="0">
+            <a:schemeClr val="accent1"/>
+          </a:effectRef>
+          <a:fontRef idx="minor">
+            <a:schemeClr val="lt1"/>
+          </a:fontRef>
+        </p:style>
+        <p:txBody>
+          <a:bodyPr rtlCol="0" anchor="t"/>
+          <a:lstStyle/>
+          <a:p>
+            <a:pPr algn="ctr"/>
+            <a:r>
+              <a:rPr lang="en-US" sz="2400" b="1" dirty="0">
+                <a:solidFill>
+                  <a:schemeClr val="bg2"/>
+                </a:solidFill>
+              </a:rPr>
+              <a:t>K8s Secrets</a:t>
+            </a:r>
+          </a:p>
+        </p:txBody>
+      </p:sp>
+      <p:sp>
+        <p:nvSpPr>
+          <p:cNvPr id="23" name="Rectangle: Rounded Corners 22">
+            <a:extLst>
+              <a:ext uri="{FF2B5EF4-FFF2-40B4-BE49-F238E27FC236}">
+                <a16:creationId xmlns:a16="http://schemas.microsoft.com/office/drawing/2014/main" id="{FB34242A-6689-4855-2C46-B743C3896631}"/>
+              </a:ext>
+            </a:extLst>
+          </p:cNvPr>
+          <p:cNvSpPr/>
+          <p:nvPr/>
+        </p:nvSpPr>
+        <p:spPr>
+          <a:xfrm>
+            <a:off x="7249619" y="3612132"/>
+            <a:ext cx="2200619" cy="590718"/>
+          </a:xfrm>
+          <a:prstGeom prst="roundRect">
+            <a:avLst/>
+          </a:prstGeom>
+          <a:solidFill>
+            <a:srgbClr val="FFFF99"/>
+          </a:solidFill>
+          <a:ln>
+            <a:solidFill>
+              <a:schemeClr val="tx1">
+                <a:lumMod val="85000"/>
+                <a:lumOff val="15000"/>
+              </a:schemeClr>
+            </a:solidFill>
+          </a:ln>
+        </p:spPr>
+        <p:style>
+          <a:lnRef idx="2">
+            <a:schemeClr val="accent1">
+              <a:shade val="15000"/>
+            </a:schemeClr>
+          </a:lnRef>
+          <a:fillRef idx="1">
+            <a:schemeClr val="accent1"/>
+          </a:fillRef>
+          <a:effectRef idx="0">
+            <a:schemeClr val="accent1"/>
+          </a:effectRef>
+          <a:fontRef idx="minor">
+            <a:schemeClr val="lt1"/>
+          </a:fontRef>
+        </p:style>
+        <p:txBody>
+          <a:bodyPr rtlCol="0" anchor="ctr"/>
+          <a:lstStyle/>
+          <a:p>
+            <a:pPr algn="ctr"/>
+            <a:r>
+              <a:rPr lang="en-US" sz="2000" b="1" dirty="0">
+                <a:solidFill>
+                  <a:schemeClr val="tx1"/>
+                </a:solidFill>
+              </a:rPr>
+              <a:t>Server Stage D2</a:t>
+            </a:r>
+          </a:p>
+        </p:txBody>
+      </p:sp>
+      <p:sp>
+        <p:nvSpPr>
+          <p:cNvPr id="25" name="Rectangle: Rounded Corners 24">
+            <a:extLst>
+              <a:ext uri="{FF2B5EF4-FFF2-40B4-BE49-F238E27FC236}">
+                <a16:creationId xmlns:a16="http://schemas.microsoft.com/office/drawing/2014/main" id="{82648BFB-A9A4-7B65-63E8-44469FADA6EB}"/>
+              </a:ext>
+            </a:extLst>
+          </p:cNvPr>
+          <p:cNvSpPr/>
+          <p:nvPr/>
+        </p:nvSpPr>
+        <p:spPr>
+          <a:xfrm>
+            <a:off x="7249619" y="4447285"/>
+            <a:ext cx="2200619" cy="590718"/>
+          </a:xfrm>
+          <a:prstGeom prst="roundRect">
+            <a:avLst/>
+          </a:prstGeom>
+          <a:solidFill>
+            <a:srgbClr val="FFFF99"/>
+          </a:solidFill>
+          <a:ln>
+            <a:solidFill>
+              <a:schemeClr val="tx1">
+                <a:lumMod val="85000"/>
+                <a:lumOff val="15000"/>
+              </a:schemeClr>
+            </a:solidFill>
+          </a:ln>
+        </p:spPr>
+        <p:style>
+          <a:lnRef idx="2">
+            <a:schemeClr val="accent1">
+              <a:shade val="15000"/>
+            </a:schemeClr>
+          </a:lnRef>
+          <a:fillRef idx="1">
+            <a:schemeClr val="accent1"/>
+          </a:fillRef>
+          <a:effectRef idx="0">
+            <a:schemeClr val="accent1"/>
+          </a:effectRef>
+          <a:fontRef idx="minor">
+            <a:schemeClr val="lt1"/>
+          </a:fontRef>
+        </p:style>
+        <p:txBody>
+          <a:bodyPr rtlCol="0" anchor="ctr"/>
+          <a:lstStyle/>
+          <a:p>
+            <a:pPr algn="ctr"/>
+            <a:r>
+              <a:rPr lang="en-US" sz="2000" b="1" dirty="0">
+                <a:solidFill>
+                  <a:schemeClr val="tx1"/>
+                </a:solidFill>
+              </a:rPr>
+              <a:t>Server Stage D…</a:t>
+            </a:r>
+          </a:p>
+        </p:txBody>
+      </p:sp>
+      <p:sp>
+        <p:nvSpPr>
+          <p:cNvPr id="26" name="Rectangle: Rounded Corners 25">
+            <a:extLst>
+              <a:ext uri="{FF2B5EF4-FFF2-40B4-BE49-F238E27FC236}">
+                <a16:creationId xmlns:a16="http://schemas.microsoft.com/office/drawing/2014/main" id="{1DEF336D-DE2A-1F4B-2A66-61A809595AE8}"/>
+              </a:ext>
+            </a:extLst>
+          </p:cNvPr>
+          <p:cNvSpPr/>
+          <p:nvPr/>
+        </p:nvSpPr>
+        <p:spPr>
+          <a:xfrm>
+            <a:off x="7249619" y="5280822"/>
+            <a:ext cx="2200619" cy="590718"/>
+          </a:xfrm>
+          <a:prstGeom prst="roundRect">
+            <a:avLst/>
+          </a:prstGeom>
+          <a:solidFill>
+            <a:srgbClr val="FFFF99"/>
+          </a:solidFill>
+          <a:ln>
+            <a:solidFill>
+              <a:schemeClr val="tx1">
+                <a:lumMod val="85000"/>
+                <a:lumOff val="15000"/>
+              </a:schemeClr>
+            </a:solidFill>
+          </a:ln>
+        </p:spPr>
+        <p:style>
+          <a:lnRef idx="2">
+            <a:schemeClr val="accent1">
+              <a:shade val="15000"/>
+            </a:schemeClr>
+          </a:lnRef>
+          <a:fillRef idx="1">
+            <a:schemeClr val="accent1"/>
+          </a:fillRef>
+          <a:effectRef idx="0">
+            <a:schemeClr val="accent1"/>
+          </a:effectRef>
+          <a:fontRef idx="minor">
+            <a:schemeClr val="lt1"/>
+          </a:fontRef>
+        </p:style>
+        <p:txBody>
+          <a:bodyPr rtlCol="0" anchor="ctr"/>
+          <a:lstStyle/>
+          <a:p>
+            <a:pPr algn="ctr"/>
+            <a:r>
+              <a:rPr lang="en-US" sz="2000" b="1" dirty="0">
+                <a:solidFill>
+                  <a:schemeClr val="tx1"/>
+                </a:solidFill>
+              </a:rPr>
+              <a:t>Server Stage DN</a:t>
+            </a:r>
+          </a:p>
+        </p:txBody>
+      </p:sp>
+      <p:sp>
+        <p:nvSpPr>
+          <p:cNvPr id="78" name="Rectangle: Rounded Corners 77">
+            <a:extLst>
+              <a:ext uri="{FF2B5EF4-FFF2-40B4-BE49-F238E27FC236}">
+                <a16:creationId xmlns:a16="http://schemas.microsoft.com/office/drawing/2014/main" id="{2DAEA5E3-E241-B21F-7311-63B3FEE932BA}"/>
+              </a:ext>
+            </a:extLst>
+          </p:cNvPr>
+          <p:cNvSpPr/>
+          <p:nvPr/>
+        </p:nvSpPr>
+        <p:spPr>
+          <a:xfrm>
+            <a:off x="6937029" y="2776979"/>
+            <a:ext cx="312590" cy="590718"/>
+          </a:xfrm>
+          <a:prstGeom prst="roundRect">
+            <a:avLst/>
+          </a:prstGeom>
+          <a:solidFill>
+            <a:schemeClr val="accent3">
+              <a:lumMod val="50000"/>
+            </a:schemeClr>
+          </a:solidFill>
+          <a:ln>
+            <a:solidFill>
+              <a:schemeClr val="tx1">
+                <a:lumMod val="85000"/>
+                <a:lumOff val="15000"/>
+              </a:schemeClr>
+            </a:solidFill>
+          </a:ln>
+        </p:spPr>
+        <p:style>
+          <a:lnRef idx="2">
+            <a:schemeClr val="accent5">
+              <a:shade val="15000"/>
+            </a:schemeClr>
+          </a:lnRef>
+          <a:fillRef idx="1">
+            <a:schemeClr val="accent5"/>
+          </a:fillRef>
+          <a:effectRef idx="0">
+            <a:schemeClr val="accent5"/>
+          </a:effectRef>
+          <a:fontRef idx="minor">
+            <a:schemeClr val="lt1"/>
+          </a:fontRef>
+        </p:style>
+        <p:txBody>
+          <a:bodyPr rtlCol="0" anchor="ctr"/>
+          <a:lstStyle/>
+          <a:p>
+            <a:pPr algn="ctr"/>
+            <a:endParaRPr lang="en-US" sz="4000" dirty="0"/>
+          </a:p>
+        </p:txBody>
+      </p:sp>
+      <p:sp>
+        <p:nvSpPr>
+          <p:cNvPr id="79" name="Rectangle: Rounded Corners 78">
+            <a:extLst>
+              <a:ext uri="{FF2B5EF4-FFF2-40B4-BE49-F238E27FC236}">
+                <a16:creationId xmlns:a16="http://schemas.microsoft.com/office/drawing/2014/main" id="{95E09F16-2254-51D2-7C8A-9B8568C723E1}"/>
+              </a:ext>
+            </a:extLst>
+          </p:cNvPr>
+          <p:cNvSpPr/>
+          <p:nvPr/>
+        </p:nvSpPr>
+        <p:spPr>
+          <a:xfrm>
+            <a:off x="6937029" y="3612132"/>
+            <a:ext cx="312590" cy="590718"/>
+          </a:xfrm>
+          <a:prstGeom prst="roundRect">
+            <a:avLst/>
+          </a:prstGeom>
+          <a:solidFill>
+            <a:schemeClr val="accent3">
+              <a:lumMod val="50000"/>
+            </a:schemeClr>
+          </a:solidFill>
+          <a:ln>
+            <a:solidFill>
+              <a:schemeClr val="tx1">
+                <a:lumMod val="85000"/>
+                <a:lumOff val="15000"/>
+              </a:schemeClr>
+            </a:solidFill>
+          </a:ln>
+        </p:spPr>
+        <p:style>
+          <a:lnRef idx="2">
+            <a:schemeClr val="accent5">
+              <a:shade val="15000"/>
+            </a:schemeClr>
+          </a:lnRef>
+          <a:fillRef idx="1">
+            <a:schemeClr val="accent5"/>
+          </a:fillRef>
+          <a:effectRef idx="0">
+            <a:schemeClr val="accent5"/>
+          </a:effectRef>
+          <a:fontRef idx="minor">
+            <a:schemeClr val="lt1"/>
+          </a:fontRef>
+        </p:style>
+        <p:txBody>
+          <a:bodyPr rtlCol="0" anchor="ctr"/>
+          <a:lstStyle/>
+          <a:p>
+            <a:pPr algn="ctr"/>
+            <a:endParaRPr lang="en-US" sz="4000" dirty="0"/>
+          </a:p>
+        </p:txBody>
+      </p:sp>
+      <p:sp>
+        <p:nvSpPr>
+          <p:cNvPr id="80" name="Rectangle: Rounded Corners 79">
+            <a:extLst>
+              <a:ext uri="{FF2B5EF4-FFF2-40B4-BE49-F238E27FC236}">
+                <a16:creationId xmlns:a16="http://schemas.microsoft.com/office/drawing/2014/main" id="{400410BD-C5C3-E4DE-F70B-F8DAC50B9DDF}"/>
+              </a:ext>
+            </a:extLst>
+          </p:cNvPr>
+          <p:cNvSpPr/>
+          <p:nvPr/>
+        </p:nvSpPr>
+        <p:spPr>
+          <a:xfrm>
+            <a:off x="6937029" y="4447968"/>
+            <a:ext cx="312590" cy="590718"/>
+          </a:xfrm>
+          <a:prstGeom prst="roundRect">
+            <a:avLst/>
+          </a:prstGeom>
+          <a:solidFill>
+            <a:schemeClr val="accent3">
+              <a:lumMod val="50000"/>
+            </a:schemeClr>
+          </a:solidFill>
+          <a:ln>
+            <a:solidFill>
+              <a:schemeClr val="tx1">
+                <a:lumMod val="85000"/>
+                <a:lumOff val="15000"/>
+              </a:schemeClr>
+            </a:solidFill>
+          </a:ln>
+        </p:spPr>
+        <p:style>
+          <a:lnRef idx="2">
+            <a:schemeClr val="accent5">
+              <a:shade val="15000"/>
+            </a:schemeClr>
+          </a:lnRef>
+          <a:fillRef idx="1">
+            <a:schemeClr val="accent5"/>
+          </a:fillRef>
+          <a:effectRef idx="0">
+            <a:schemeClr val="accent5"/>
+          </a:effectRef>
+          <a:fontRef idx="minor">
+            <a:schemeClr val="lt1"/>
+          </a:fontRef>
+        </p:style>
+        <p:txBody>
+          <a:bodyPr rtlCol="0" anchor="ctr"/>
+          <a:lstStyle/>
+          <a:p>
+            <a:pPr algn="ctr"/>
+            <a:endParaRPr lang="en-US" sz="4000" dirty="0"/>
+          </a:p>
+        </p:txBody>
+      </p:sp>
+      <p:sp>
+        <p:nvSpPr>
+          <p:cNvPr id="81" name="Rectangle: Rounded Corners 80">
+            <a:extLst>
+              <a:ext uri="{FF2B5EF4-FFF2-40B4-BE49-F238E27FC236}">
+                <a16:creationId xmlns:a16="http://schemas.microsoft.com/office/drawing/2014/main" id="{8A06E386-ECD2-671C-1FA5-89192911576E}"/>
+              </a:ext>
+            </a:extLst>
+          </p:cNvPr>
+          <p:cNvSpPr/>
+          <p:nvPr/>
+        </p:nvSpPr>
+        <p:spPr>
+          <a:xfrm>
+            <a:off x="6937029" y="5280822"/>
+            <a:ext cx="312590" cy="590718"/>
+          </a:xfrm>
+          <a:prstGeom prst="roundRect">
+            <a:avLst/>
+          </a:prstGeom>
+          <a:solidFill>
+            <a:schemeClr val="accent3">
+              <a:lumMod val="50000"/>
+            </a:schemeClr>
+          </a:solidFill>
+          <a:ln>
+            <a:solidFill>
+              <a:schemeClr val="tx1">
+                <a:lumMod val="85000"/>
+                <a:lumOff val="15000"/>
+              </a:schemeClr>
+            </a:solidFill>
+          </a:ln>
+        </p:spPr>
+        <p:style>
+          <a:lnRef idx="2">
+            <a:schemeClr val="accent5">
+              <a:shade val="15000"/>
+            </a:schemeClr>
+          </a:lnRef>
+          <a:fillRef idx="1">
+            <a:schemeClr val="accent5"/>
+          </a:fillRef>
+          <a:effectRef idx="0">
+            <a:schemeClr val="accent5"/>
+          </a:effectRef>
+          <a:fontRef idx="minor">
+            <a:schemeClr val="lt1"/>
+          </a:fontRef>
+        </p:style>
+        <p:txBody>
+          <a:bodyPr rtlCol="0" anchor="ctr"/>
+          <a:lstStyle/>
+          <a:p>
+            <a:pPr algn="ctr"/>
+            <a:endParaRPr lang="en-US" sz="4000" dirty="0"/>
+          </a:p>
+        </p:txBody>
+      </p:sp>
+      <p:sp>
+        <p:nvSpPr>
+          <p:cNvPr id="82" name="Rectangle: Rounded Corners 81">
+            <a:extLst>
+              <a:ext uri="{FF2B5EF4-FFF2-40B4-BE49-F238E27FC236}">
+                <a16:creationId xmlns:a16="http://schemas.microsoft.com/office/drawing/2014/main" id="{9281CFEE-2075-E1B4-9383-C965F875C1A2}"/>
+              </a:ext>
+            </a:extLst>
+          </p:cNvPr>
+          <p:cNvSpPr/>
+          <p:nvPr/>
+        </p:nvSpPr>
+        <p:spPr>
+          <a:xfrm>
+            <a:off x="9450238" y="2776979"/>
+            <a:ext cx="312590" cy="590718"/>
+          </a:xfrm>
+          <a:prstGeom prst="roundRect">
+            <a:avLst/>
+          </a:prstGeom>
+          <a:solidFill>
+            <a:schemeClr val="tx1"/>
+          </a:solidFill>
+          <a:ln>
+            <a:solidFill>
+              <a:schemeClr val="tx1">
+                <a:lumMod val="85000"/>
+                <a:lumOff val="15000"/>
+              </a:schemeClr>
+            </a:solidFill>
+          </a:ln>
+        </p:spPr>
+        <p:style>
+          <a:lnRef idx="2">
+            <a:schemeClr val="accent5">
+              <a:shade val="15000"/>
+            </a:schemeClr>
+          </a:lnRef>
+          <a:fillRef idx="1">
+            <a:schemeClr val="accent5"/>
+          </a:fillRef>
+          <a:effectRef idx="0">
+            <a:schemeClr val="accent5"/>
+          </a:effectRef>
+          <a:fontRef idx="minor">
+            <a:schemeClr val="lt1"/>
+          </a:fontRef>
+        </p:style>
+        <p:txBody>
+          <a:bodyPr rtlCol="0" anchor="ctr"/>
+          <a:lstStyle/>
+          <a:p>
+            <a:pPr algn="ctr"/>
+            <a:endParaRPr lang="en-US" sz="4000" dirty="0"/>
+          </a:p>
+        </p:txBody>
+      </p:sp>
+      <p:sp>
+        <p:nvSpPr>
+          <p:cNvPr id="84" name="Rectangle: Rounded Corners 83">
+            <a:extLst>
+              <a:ext uri="{FF2B5EF4-FFF2-40B4-BE49-F238E27FC236}">
+                <a16:creationId xmlns:a16="http://schemas.microsoft.com/office/drawing/2014/main" id="{57A2696D-F4A8-4BDF-86A2-A23E47FC5428}"/>
+              </a:ext>
+            </a:extLst>
+          </p:cNvPr>
+          <p:cNvSpPr/>
+          <p:nvPr/>
+        </p:nvSpPr>
+        <p:spPr>
+          <a:xfrm>
+            <a:off x="9450238" y="3609833"/>
+            <a:ext cx="312590" cy="590718"/>
+          </a:xfrm>
+          <a:prstGeom prst="roundRect">
+            <a:avLst/>
+          </a:prstGeom>
+          <a:solidFill>
+            <a:schemeClr val="tx1"/>
+          </a:solidFill>
+          <a:ln>
+            <a:solidFill>
+              <a:schemeClr val="tx1">
+                <a:lumMod val="85000"/>
+                <a:lumOff val="15000"/>
+              </a:schemeClr>
+            </a:solidFill>
+          </a:ln>
+        </p:spPr>
+        <p:style>
+          <a:lnRef idx="2">
+            <a:schemeClr val="accent5">
+              <a:shade val="15000"/>
+            </a:schemeClr>
+          </a:lnRef>
+          <a:fillRef idx="1">
+            <a:schemeClr val="accent5"/>
+          </a:fillRef>
+          <a:effectRef idx="0">
+            <a:schemeClr val="accent5"/>
+          </a:effectRef>
+          <a:fontRef idx="minor">
+            <a:schemeClr val="lt1"/>
+          </a:fontRef>
+        </p:style>
+        <p:txBody>
+          <a:bodyPr rtlCol="0" anchor="ctr"/>
+          <a:lstStyle/>
+          <a:p>
+            <a:pPr algn="ctr"/>
+            <a:endParaRPr lang="en-US" sz="4000" dirty="0"/>
+          </a:p>
+        </p:txBody>
+      </p:sp>
+      <p:sp>
+        <p:nvSpPr>
+          <p:cNvPr id="85" name="Rectangle: Rounded Corners 84">
+            <a:extLst>
+              <a:ext uri="{FF2B5EF4-FFF2-40B4-BE49-F238E27FC236}">
+                <a16:creationId xmlns:a16="http://schemas.microsoft.com/office/drawing/2014/main" id="{6729D9CB-B783-EEC0-A11C-1D9B42096BAC}"/>
+              </a:ext>
+            </a:extLst>
+          </p:cNvPr>
+          <p:cNvSpPr/>
+          <p:nvPr/>
+        </p:nvSpPr>
+        <p:spPr>
+          <a:xfrm>
+            <a:off x="9450238" y="4447285"/>
+            <a:ext cx="312590" cy="590718"/>
+          </a:xfrm>
+          <a:prstGeom prst="roundRect">
+            <a:avLst/>
+          </a:prstGeom>
+          <a:solidFill>
+            <a:schemeClr val="tx1"/>
+          </a:solidFill>
+          <a:ln>
+            <a:solidFill>
+              <a:schemeClr val="tx1">
+                <a:lumMod val="85000"/>
+                <a:lumOff val="15000"/>
+              </a:schemeClr>
+            </a:solidFill>
+          </a:ln>
+        </p:spPr>
+        <p:style>
+          <a:lnRef idx="2">
+            <a:schemeClr val="accent5">
+              <a:shade val="15000"/>
+            </a:schemeClr>
+          </a:lnRef>
+          <a:fillRef idx="1">
+            <a:schemeClr val="accent5"/>
+          </a:fillRef>
+          <a:effectRef idx="0">
+            <a:schemeClr val="accent5"/>
+          </a:effectRef>
+          <a:fontRef idx="minor">
+            <a:schemeClr val="lt1"/>
+          </a:fontRef>
+        </p:style>
+        <p:txBody>
+          <a:bodyPr rtlCol="0" anchor="ctr"/>
+          <a:lstStyle/>
+          <a:p>
+            <a:pPr algn="ctr"/>
+            <a:endParaRPr lang="en-US" sz="4000" dirty="0"/>
+          </a:p>
+        </p:txBody>
+      </p:sp>
+      <p:sp>
+        <p:nvSpPr>
+          <p:cNvPr id="86" name="Rectangle: Rounded Corners 85">
+            <a:extLst>
+              <a:ext uri="{FF2B5EF4-FFF2-40B4-BE49-F238E27FC236}">
+                <a16:creationId xmlns:a16="http://schemas.microsoft.com/office/drawing/2014/main" id="{B2AC878C-2524-01F6-3225-C8764FC75595}"/>
+              </a:ext>
+            </a:extLst>
+          </p:cNvPr>
+          <p:cNvSpPr/>
+          <p:nvPr/>
+        </p:nvSpPr>
+        <p:spPr>
+          <a:xfrm>
+            <a:off x="9450238" y="5280822"/>
+            <a:ext cx="312590" cy="590718"/>
+          </a:xfrm>
+          <a:prstGeom prst="roundRect">
+            <a:avLst/>
+          </a:prstGeom>
+          <a:solidFill>
+            <a:schemeClr val="tx1"/>
+          </a:solidFill>
+          <a:ln>
+            <a:solidFill>
+              <a:schemeClr val="tx1">
+                <a:lumMod val="85000"/>
+                <a:lumOff val="15000"/>
+              </a:schemeClr>
+            </a:solidFill>
+          </a:ln>
+        </p:spPr>
+        <p:style>
+          <a:lnRef idx="2">
+            <a:schemeClr val="accent5">
+              <a:shade val="15000"/>
+            </a:schemeClr>
+          </a:lnRef>
+          <a:fillRef idx="1">
+            <a:schemeClr val="accent5"/>
+          </a:fillRef>
+          <a:effectRef idx="0">
+            <a:schemeClr val="accent5"/>
+          </a:effectRef>
+          <a:fontRef idx="minor">
+            <a:schemeClr val="lt1"/>
+          </a:fontRef>
+        </p:style>
+        <p:txBody>
+          <a:bodyPr rtlCol="0" anchor="ctr"/>
+          <a:lstStyle/>
+          <a:p>
+            <a:pPr algn="ctr"/>
+            <a:endParaRPr lang="en-US" sz="4000" dirty="0"/>
+          </a:p>
+        </p:txBody>
+      </p:sp>
+      <p:sp>
+        <p:nvSpPr>
+          <p:cNvPr id="87" name="Rectangle: Rounded Corners 86">
+            <a:extLst>
+              <a:ext uri="{FF2B5EF4-FFF2-40B4-BE49-F238E27FC236}">
+                <a16:creationId xmlns:a16="http://schemas.microsoft.com/office/drawing/2014/main" id="{DA2A3F5D-3C75-5036-25BD-229A422661A3}"/>
+              </a:ext>
+            </a:extLst>
+          </p:cNvPr>
+          <p:cNvSpPr/>
+          <p:nvPr/>
+        </p:nvSpPr>
+        <p:spPr>
+          <a:xfrm>
+            <a:off x="4566921" y="5280822"/>
+            <a:ext cx="1385958" cy="590718"/>
+          </a:xfrm>
+          <a:prstGeom prst="roundRect">
+            <a:avLst/>
+          </a:prstGeom>
+          <a:solidFill>
+            <a:srgbClr val="FFFF99"/>
+          </a:solidFill>
+          <a:ln>
+            <a:solidFill>
+              <a:schemeClr val="tx1">
+                <a:lumMod val="85000"/>
+                <a:lumOff val="15000"/>
+              </a:schemeClr>
+            </a:solidFill>
+          </a:ln>
+        </p:spPr>
+        <p:style>
+          <a:lnRef idx="2">
+            <a:schemeClr val="accent1">
+              <a:shade val="15000"/>
+            </a:schemeClr>
+          </a:lnRef>
+          <a:fillRef idx="1">
+            <a:schemeClr val="accent1"/>
+          </a:fillRef>
+          <a:effectRef idx="0">
+            <a:schemeClr val="accent1"/>
+          </a:effectRef>
+          <a:fontRef idx="minor">
+            <a:schemeClr val="lt1"/>
+          </a:fontRef>
+        </p:style>
+        <p:txBody>
+          <a:bodyPr rtlCol="0" anchor="ctr"/>
+          <a:lstStyle/>
+          <a:p>
+            <a:pPr algn="ctr"/>
+            <a:r>
+              <a:rPr lang="en-US" sz="2000" b="1" dirty="0">
+                <a:solidFill>
+                  <a:schemeClr val="tx1"/>
+                </a:solidFill>
+              </a:rPr>
+              <a:t>Service N</a:t>
+            </a:r>
+          </a:p>
+        </p:txBody>
+      </p:sp>
+      <p:sp>
+        <p:nvSpPr>
+          <p:cNvPr id="88" name="Rectangle: Rounded Corners 87">
+            <a:extLst>
+              <a:ext uri="{FF2B5EF4-FFF2-40B4-BE49-F238E27FC236}">
+                <a16:creationId xmlns:a16="http://schemas.microsoft.com/office/drawing/2014/main" id="{51AA17BE-D076-9F17-8C38-2696DEFFB329}"/>
+              </a:ext>
+            </a:extLst>
+          </p:cNvPr>
+          <p:cNvSpPr/>
+          <p:nvPr/>
+        </p:nvSpPr>
+        <p:spPr>
+          <a:xfrm>
+            <a:off x="4566920" y="2776979"/>
+            <a:ext cx="1385958" cy="590718"/>
+          </a:xfrm>
+          <a:prstGeom prst="roundRect">
+            <a:avLst/>
+          </a:prstGeom>
+          <a:solidFill>
+            <a:srgbClr val="FFFF99"/>
+          </a:solidFill>
+          <a:ln>
+            <a:solidFill>
+              <a:schemeClr val="tx1">
+                <a:lumMod val="85000"/>
+                <a:lumOff val="15000"/>
+              </a:schemeClr>
+            </a:solidFill>
+          </a:ln>
+        </p:spPr>
+        <p:style>
+          <a:lnRef idx="2">
+            <a:schemeClr val="accent1">
+              <a:shade val="15000"/>
+            </a:schemeClr>
+          </a:lnRef>
+          <a:fillRef idx="1">
+            <a:schemeClr val="accent1"/>
+          </a:fillRef>
+          <a:effectRef idx="0">
+            <a:schemeClr val="accent1"/>
+          </a:effectRef>
+          <a:fontRef idx="minor">
+            <a:schemeClr val="lt1"/>
+          </a:fontRef>
+        </p:style>
+        <p:txBody>
+          <a:bodyPr rtlCol="0" anchor="ctr"/>
+          <a:lstStyle/>
+          <a:p>
+            <a:pPr algn="ctr"/>
+            <a:r>
+              <a:rPr lang="en-US" sz="2000" b="1" dirty="0">
+                <a:solidFill>
+                  <a:schemeClr val="tx1"/>
+                </a:solidFill>
+              </a:rPr>
+              <a:t>Service 1</a:t>
+            </a:r>
+          </a:p>
+        </p:txBody>
+      </p:sp>
+      <p:sp>
+        <p:nvSpPr>
+          <p:cNvPr id="89" name="Rectangle: Rounded Corners 88">
+            <a:extLst>
+              <a:ext uri="{FF2B5EF4-FFF2-40B4-BE49-F238E27FC236}">
+                <a16:creationId xmlns:a16="http://schemas.microsoft.com/office/drawing/2014/main" id="{DE788CF6-F99D-21AF-C93A-0F444B453F7D}"/>
+              </a:ext>
+            </a:extLst>
+          </p:cNvPr>
+          <p:cNvSpPr/>
+          <p:nvPr/>
+        </p:nvSpPr>
+        <p:spPr>
+          <a:xfrm>
+            <a:off x="4566920" y="3609833"/>
+            <a:ext cx="1385958" cy="590718"/>
+          </a:xfrm>
+          <a:prstGeom prst="roundRect">
+            <a:avLst/>
+          </a:prstGeom>
+          <a:solidFill>
+            <a:srgbClr val="FFFF99"/>
+          </a:solidFill>
+          <a:ln>
+            <a:solidFill>
+              <a:schemeClr val="tx1">
+                <a:lumMod val="85000"/>
+                <a:lumOff val="15000"/>
+              </a:schemeClr>
+            </a:solidFill>
+          </a:ln>
+        </p:spPr>
+        <p:style>
+          <a:lnRef idx="2">
+            <a:schemeClr val="accent1">
+              <a:shade val="15000"/>
+            </a:schemeClr>
+          </a:lnRef>
+          <a:fillRef idx="1">
+            <a:schemeClr val="accent1"/>
+          </a:fillRef>
+          <a:effectRef idx="0">
+            <a:schemeClr val="accent1"/>
+          </a:effectRef>
+          <a:fontRef idx="minor">
+            <a:schemeClr val="lt1"/>
+          </a:fontRef>
+        </p:style>
+        <p:txBody>
+          <a:bodyPr rtlCol="0" anchor="ctr"/>
+          <a:lstStyle/>
+          <a:p>
+            <a:pPr algn="ctr"/>
+            <a:r>
+              <a:rPr lang="en-US" sz="2000" b="1" dirty="0">
+                <a:solidFill>
+                  <a:schemeClr val="tx1"/>
+                </a:solidFill>
+              </a:rPr>
+              <a:t>Service 2</a:t>
+            </a:r>
+          </a:p>
+        </p:txBody>
+      </p:sp>
+      <p:cxnSp>
+        <p:nvCxnSpPr>
+          <p:cNvPr id="90" name="Connector: Elbow 89">
+            <a:extLst>
+              <a:ext uri="{FF2B5EF4-FFF2-40B4-BE49-F238E27FC236}">
+                <a16:creationId xmlns:a16="http://schemas.microsoft.com/office/drawing/2014/main" id="{64E4DD45-A484-2718-9A44-3F9A5A128A9F}"/>
+              </a:ext>
+            </a:extLst>
+          </p:cNvPr>
+          <p:cNvCxnSpPr>
+            <a:cxnSpLocks/>
+            <a:stCxn id="78" idx="1"/>
+            <a:endCxn id="88" idx="3"/>
+          </p:cNvCxnSpPr>
+          <p:nvPr/>
+        </p:nvCxnSpPr>
+        <p:spPr>
+          <a:xfrm rot="10800000">
+            <a:off x="5952879" y="3072338"/>
+            <a:ext cx="984151" cy="12700"/>
+          </a:xfrm>
+          <a:prstGeom prst="bentConnector3">
+            <a:avLst>
+              <a:gd name="adj1" fmla="val 50000"/>
+            </a:avLst>
+          </a:prstGeom>
+          <a:ln w="57150">
+            <a:solidFill>
+              <a:schemeClr val="accent3">
+                <a:lumMod val="50000"/>
+              </a:schemeClr>
+            </a:solidFill>
+            <a:headEnd type="triangle"/>
+            <a:tailEnd type="triangle"/>
+          </a:ln>
+        </p:spPr>
+        <p:style>
+          <a:lnRef idx="2">
+            <a:schemeClr val="accent1"/>
+          </a:lnRef>
+          <a:fillRef idx="0">
+            <a:schemeClr val="accent1"/>
+          </a:fillRef>
+          <a:effectRef idx="1">
+            <a:schemeClr val="accent1"/>
+          </a:effectRef>
+          <a:fontRef idx="minor">
+            <a:schemeClr val="tx1"/>
+          </a:fontRef>
+        </p:style>
+      </p:cxnSp>
+      <p:cxnSp>
+        <p:nvCxnSpPr>
+          <p:cNvPr id="93" name="Connector: Elbow 92">
+            <a:extLst>
+              <a:ext uri="{FF2B5EF4-FFF2-40B4-BE49-F238E27FC236}">
+                <a16:creationId xmlns:a16="http://schemas.microsoft.com/office/drawing/2014/main" id="{26688AA8-D250-9A8E-8B3F-3CD46B0FF483}"/>
+              </a:ext>
+            </a:extLst>
+          </p:cNvPr>
+          <p:cNvCxnSpPr>
+            <a:cxnSpLocks/>
+            <a:stCxn id="79" idx="1"/>
+            <a:endCxn id="89" idx="3"/>
+          </p:cNvCxnSpPr>
+          <p:nvPr/>
+        </p:nvCxnSpPr>
+        <p:spPr>
+          <a:xfrm rot="10800000">
+            <a:off x="5952879" y="3905193"/>
+            <a:ext cx="984151" cy="2299"/>
+          </a:xfrm>
+          <a:prstGeom prst="bentConnector3">
+            <a:avLst>
+              <a:gd name="adj1" fmla="val 50000"/>
+            </a:avLst>
+          </a:prstGeom>
+          <a:ln w="57150">
+            <a:solidFill>
+              <a:schemeClr val="accent3">
+                <a:lumMod val="50000"/>
+              </a:schemeClr>
+            </a:solidFill>
+            <a:headEnd type="triangle"/>
+            <a:tailEnd type="triangle"/>
+          </a:ln>
+        </p:spPr>
+        <p:style>
+          <a:lnRef idx="2">
+            <a:schemeClr val="accent1"/>
+          </a:lnRef>
+          <a:fillRef idx="0">
+            <a:schemeClr val="accent1"/>
+          </a:fillRef>
+          <a:effectRef idx="1">
+            <a:schemeClr val="accent1"/>
+          </a:effectRef>
+          <a:fontRef idx="minor">
+            <a:schemeClr val="tx1"/>
+          </a:fontRef>
+        </p:style>
+      </p:cxnSp>
+      <p:cxnSp>
+        <p:nvCxnSpPr>
+          <p:cNvPr id="96" name="Connector: Elbow 95">
+            <a:extLst>
+              <a:ext uri="{FF2B5EF4-FFF2-40B4-BE49-F238E27FC236}">
+                <a16:creationId xmlns:a16="http://schemas.microsoft.com/office/drawing/2014/main" id="{AFDB8561-7823-E3D8-106C-7D3CDB2FB744}"/>
+              </a:ext>
+            </a:extLst>
+          </p:cNvPr>
+          <p:cNvCxnSpPr>
+            <a:cxnSpLocks/>
+            <a:stCxn id="80" idx="1"/>
+            <a:endCxn id="10" idx="3"/>
+          </p:cNvCxnSpPr>
+          <p:nvPr/>
+        </p:nvCxnSpPr>
+        <p:spPr>
+          <a:xfrm rot="10800000">
+            <a:off x="5952879" y="4742645"/>
+            <a:ext cx="984151" cy="683"/>
+          </a:xfrm>
+          <a:prstGeom prst="bentConnector3">
+            <a:avLst>
+              <a:gd name="adj1" fmla="val 50000"/>
+            </a:avLst>
+          </a:prstGeom>
+          <a:ln w="57150">
+            <a:solidFill>
+              <a:schemeClr val="accent3">
+                <a:lumMod val="50000"/>
+              </a:schemeClr>
+            </a:solidFill>
+            <a:headEnd type="triangle"/>
+            <a:tailEnd type="triangle"/>
+          </a:ln>
+        </p:spPr>
+        <p:style>
+          <a:lnRef idx="2">
+            <a:schemeClr val="accent1"/>
+          </a:lnRef>
+          <a:fillRef idx="0">
+            <a:schemeClr val="accent1"/>
+          </a:fillRef>
+          <a:effectRef idx="1">
+            <a:schemeClr val="accent1"/>
+          </a:effectRef>
+          <a:fontRef idx="minor">
+            <a:schemeClr val="tx1"/>
+          </a:fontRef>
+        </p:style>
+      </p:cxnSp>
+      <p:cxnSp>
+        <p:nvCxnSpPr>
+          <p:cNvPr id="99" name="Connector: Elbow 98">
+            <a:extLst>
+              <a:ext uri="{FF2B5EF4-FFF2-40B4-BE49-F238E27FC236}">
+                <a16:creationId xmlns:a16="http://schemas.microsoft.com/office/drawing/2014/main" id="{93B9426A-8E8B-1C40-BE1D-78C19D2BE3AA}"/>
+              </a:ext>
+            </a:extLst>
+          </p:cNvPr>
+          <p:cNvCxnSpPr>
+            <a:cxnSpLocks/>
+            <a:stCxn id="81" idx="1"/>
+            <a:endCxn id="87" idx="3"/>
+          </p:cNvCxnSpPr>
+          <p:nvPr/>
+        </p:nvCxnSpPr>
+        <p:spPr>
+          <a:xfrm rot="10800000">
+            <a:off x="5952879" y="5576181"/>
+            <a:ext cx="984150" cy="12700"/>
+          </a:xfrm>
+          <a:prstGeom prst="bentConnector3">
+            <a:avLst>
+              <a:gd name="adj1" fmla="val 50000"/>
+            </a:avLst>
+          </a:prstGeom>
+          <a:ln w="57150">
+            <a:solidFill>
+              <a:schemeClr val="accent3">
+                <a:lumMod val="50000"/>
+              </a:schemeClr>
+            </a:solidFill>
+            <a:headEnd type="triangle"/>
+            <a:tailEnd type="triangle"/>
+          </a:ln>
+        </p:spPr>
+        <p:style>
+          <a:lnRef idx="2">
+            <a:schemeClr val="accent1"/>
+          </a:lnRef>
+          <a:fillRef idx="0">
+            <a:schemeClr val="accent1"/>
+          </a:fillRef>
+          <a:effectRef idx="1">
+            <a:schemeClr val="accent1"/>
+          </a:effectRef>
+          <a:fontRef idx="minor">
+            <a:schemeClr val="tx1"/>
+          </a:fontRef>
+        </p:style>
+      </p:cxnSp>
+      <p:cxnSp>
+        <p:nvCxnSpPr>
+          <p:cNvPr id="102" name="Connector: Elbow 101">
+            <a:extLst>
+              <a:ext uri="{FF2B5EF4-FFF2-40B4-BE49-F238E27FC236}">
+                <a16:creationId xmlns:a16="http://schemas.microsoft.com/office/drawing/2014/main" id="{E97BD760-54F7-9773-65C6-CBF8BF8ED54B}"/>
+              </a:ext>
+            </a:extLst>
+          </p:cNvPr>
+          <p:cNvCxnSpPr>
+            <a:cxnSpLocks/>
+            <a:stCxn id="22" idx="1"/>
+            <a:endCxn id="82" idx="3"/>
+          </p:cNvCxnSpPr>
+          <p:nvPr/>
+        </p:nvCxnSpPr>
+        <p:spPr>
+          <a:xfrm rot="10800000">
+            <a:off x="9762829" y="3072339"/>
+            <a:ext cx="592591" cy="1238897"/>
+          </a:xfrm>
+          <a:prstGeom prst="bentConnector3">
+            <a:avLst>
+              <a:gd name="adj1" fmla="val 50000"/>
+            </a:avLst>
+          </a:prstGeom>
+          <a:ln w="57150">
+            <a:solidFill>
+              <a:schemeClr val="tx1"/>
+            </a:solidFill>
+            <a:headEnd type="triangle"/>
+            <a:tailEnd type="triangle"/>
+          </a:ln>
+        </p:spPr>
+        <p:style>
+          <a:lnRef idx="2">
+            <a:schemeClr val="accent1"/>
+          </a:lnRef>
+          <a:fillRef idx="0">
+            <a:schemeClr val="accent1"/>
+          </a:fillRef>
+          <a:effectRef idx="1">
+            <a:schemeClr val="accent1"/>
+          </a:effectRef>
+          <a:fontRef idx="minor">
+            <a:schemeClr val="tx1"/>
+          </a:fontRef>
+        </p:style>
+      </p:cxnSp>
+      <p:cxnSp>
+        <p:nvCxnSpPr>
+          <p:cNvPr id="105" name="Connector: Elbow 104">
+            <a:extLst>
+              <a:ext uri="{FF2B5EF4-FFF2-40B4-BE49-F238E27FC236}">
+                <a16:creationId xmlns:a16="http://schemas.microsoft.com/office/drawing/2014/main" id="{687B6573-D0BF-EBB6-8EEA-B7536669F90A}"/>
+              </a:ext>
+            </a:extLst>
+          </p:cNvPr>
+          <p:cNvCxnSpPr>
+            <a:cxnSpLocks/>
+            <a:stCxn id="22" idx="1"/>
+            <a:endCxn id="84" idx="3"/>
+          </p:cNvCxnSpPr>
+          <p:nvPr/>
+        </p:nvCxnSpPr>
+        <p:spPr>
+          <a:xfrm rot="10800000">
+            <a:off x="9762829" y="3905193"/>
+            <a:ext cx="592591" cy="406043"/>
+          </a:xfrm>
+          <a:prstGeom prst="bentConnector3">
+            <a:avLst>
+              <a:gd name="adj1" fmla="val 50000"/>
+            </a:avLst>
+          </a:prstGeom>
+          <a:ln w="57150">
+            <a:solidFill>
+              <a:schemeClr val="tx1"/>
+            </a:solidFill>
+            <a:headEnd type="triangle"/>
+            <a:tailEnd type="triangle"/>
+          </a:ln>
+        </p:spPr>
+        <p:style>
+          <a:lnRef idx="2">
+            <a:schemeClr val="accent1"/>
+          </a:lnRef>
+          <a:fillRef idx="0">
+            <a:schemeClr val="accent1"/>
+          </a:fillRef>
+          <a:effectRef idx="1">
+            <a:schemeClr val="accent1"/>
+          </a:effectRef>
+          <a:fontRef idx="minor">
+            <a:schemeClr val="tx1"/>
+          </a:fontRef>
+        </p:style>
+      </p:cxnSp>
+      <p:cxnSp>
+        <p:nvCxnSpPr>
+          <p:cNvPr id="108" name="Connector: Elbow 107">
+            <a:extLst>
+              <a:ext uri="{FF2B5EF4-FFF2-40B4-BE49-F238E27FC236}">
+                <a16:creationId xmlns:a16="http://schemas.microsoft.com/office/drawing/2014/main" id="{900568C7-44FD-E3E6-19E7-BB225E84CFE2}"/>
+              </a:ext>
+            </a:extLst>
+          </p:cNvPr>
+          <p:cNvCxnSpPr>
+            <a:cxnSpLocks/>
+            <a:stCxn id="22" idx="1"/>
+            <a:endCxn id="85" idx="3"/>
+          </p:cNvCxnSpPr>
+          <p:nvPr/>
+        </p:nvCxnSpPr>
+        <p:spPr>
+          <a:xfrm rot="10800000" flipV="1">
+            <a:off x="9762829" y="4311234"/>
+            <a:ext cx="592591" cy="431409"/>
+          </a:xfrm>
+          <a:prstGeom prst="bentConnector3">
+            <a:avLst>
+              <a:gd name="adj1" fmla="val 50000"/>
+            </a:avLst>
+          </a:prstGeom>
+          <a:ln w="57150">
+            <a:solidFill>
+              <a:schemeClr val="tx1"/>
+            </a:solidFill>
+            <a:headEnd type="triangle"/>
+            <a:tailEnd type="triangle"/>
+          </a:ln>
+        </p:spPr>
+        <p:style>
+          <a:lnRef idx="2">
+            <a:schemeClr val="accent1"/>
+          </a:lnRef>
+          <a:fillRef idx="0">
+            <a:schemeClr val="accent1"/>
+          </a:fillRef>
+          <a:effectRef idx="1">
+            <a:schemeClr val="accent1"/>
+          </a:effectRef>
+          <a:fontRef idx="minor">
+            <a:schemeClr val="tx1"/>
+          </a:fontRef>
+        </p:style>
+      </p:cxnSp>
+      <p:cxnSp>
+        <p:nvCxnSpPr>
+          <p:cNvPr id="111" name="Connector: Elbow 110">
+            <a:extLst>
+              <a:ext uri="{FF2B5EF4-FFF2-40B4-BE49-F238E27FC236}">
+                <a16:creationId xmlns:a16="http://schemas.microsoft.com/office/drawing/2014/main" id="{42CF6CD4-3786-2E66-81E5-269BC2F7AC9B}"/>
+              </a:ext>
+            </a:extLst>
+          </p:cNvPr>
+          <p:cNvCxnSpPr>
+            <a:cxnSpLocks/>
+            <a:stCxn id="22" idx="1"/>
+            <a:endCxn id="86" idx="3"/>
+          </p:cNvCxnSpPr>
+          <p:nvPr/>
+        </p:nvCxnSpPr>
+        <p:spPr>
+          <a:xfrm rot="10800000" flipV="1">
+            <a:off x="9762829" y="4311235"/>
+            <a:ext cx="592591" cy="1264946"/>
+          </a:xfrm>
+          <a:prstGeom prst="bentConnector3">
+            <a:avLst>
+              <a:gd name="adj1" fmla="val 50000"/>
+            </a:avLst>
+          </a:prstGeom>
+          <a:ln w="57150">
+            <a:solidFill>
+              <a:schemeClr val="tx1"/>
+            </a:solidFill>
+            <a:headEnd type="triangle"/>
+            <a:tailEnd type="triangle"/>
+          </a:ln>
+        </p:spPr>
+        <p:style>
+          <a:lnRef idx="2">
+            <a:schemeClr val="accent1"/>
+          </a:lnRef>
+          <a:fillRef idx="0">
+            <a:schemeClr val="accent1"/>
+          </a:fillRef>
+          <a:effectRef idx="1">
+            <a:schemeClr val="accent1"/>
+          </a:effectRef>
+          <a:fontRef idx="minor">
+            <a:schemeClr val="tx1"/>
+          </a:fontRef>
+        </p:style>
+      </p:cxnSp>
+      <p:cxnSp>
+        <p:nvCxnSpPr>
+          <p:cNvPr id="119" name="Connector: Elbow 118">
+            <a:extLst>
+              <a:ext uri="{FF2B5EF4-FFF2-40B4-BE49-F238E27FC236}">
+                <a16:creationId xmlns:a16="http://schemas.microsoft.com/office/drawing/2014/main" id="{8E8F2131-C742-2C18-892C-EF32E85FDD97}"/>
+              </a:ext>
+            </a:extLst>
+          </p:cNvPr>
+          <p:cNvCxnSpPr>
+            <a:cxnSpLocks/>
+            <a:stCxn id="88" idx="1"/>
+            <a:endCxn id="87" idx="1"/>
+          </p:cNvCxnSpPr>
+          <p:nvPr/>
+        </p:nvCxnSpPr>
+        <p:spPr>
+          <a:xfrm rot="10800000" flipH="1" flipV="1">
+            <a:off x="4566919" y="3072337"/>
+            <a:ext cx="1" cy="2503843"/>
+          </a:xfrm>
+          <a:prstGeom prst="bentConnector3">
+            <a:avLst>
+              <a:gd name="adj1" fmla="val -22860000000"/>
+            </a:avLst>
+          </a:prstGeom>
+          <a:ln w="57150">
+            <a:solidFill>
+              <a:schemeClr val="accent3">
+                <a:lumMod val="50000"/>
+              </a:schemeClr>
+            </a:solidFill>
+            <a:headEnd type="triangle"/>
+            <a:tailEnd type="triangle"/>
+          </a:ln>
+        </p:spPr>
+        <p:style>
+          <a:lnRef idx="2">
+            <a:schemeClr val="accent1"/>
+          </a:lnRef>
+          <a:fillRef idx="0">
+            <a:schemeClr val="accent1"/>
+          </a:fillRef>
+          <a:effectRef idx="1">
+            <a:schemeClr val="accent1"/>
+          </a:effectRef>
+          <a:fontRef idx="minor">
+            <a:schemeClr val="tx1"/>
+          </a:fontRef>
+        </p:style>
+      </p:cxnSp>
+      <p:cxnSp>
+        <p:nvCxnSpPr>
+          <p:cNvPr id="122" name="Connector: Elbow 121">
+            <a:extLst>
+              <a:ext uri="{FF2B5EF4-FFF2-40B4-BE49-F238E27FC236}">
+                <a16:creationId xmlns:a16="http://schemas.microsoft.com/office/drawing/2014/main" id="{D1599BBF-71BD-E03E-3F8A-4729D995C3EA}"/>
+              </a:ext>
+            </a:extLst>
+          </p:cNvPr>
+          <p:cNvCxnSpPr>
+            <a:cxnSpLocks/>
+            <a:stCxn id="89" idx="1"/>
+            <a:endCxn id="10" idx="1"/>
+          </p:cNvCxnSpPr>
+          <p:nvPr/>
+        </p:nvCxnSpPr>
+        <p:spPr>
+          <a:xfrm rot="10800000" flipV="1">
+            <a:off x="4566920" y="3905192"/>
+            <a:ext cx="12700" cy="837452"/>
+          </a:xfrm>
+          <a:prstGeom prst="bentConnector3">
+            <a:avLst>
+              <a:gd name="adj1" fmla="val 1850000"/>
+            </a:avLst>
+          </a:prstGeom>
+          <a:ln w="57150">
+            <a:solidFill>
+              <a:schemeClr val="accent3">
+                <a:lumMod val="50000"/>
+              </a:schemeClr>
+            </a:solidFill>
+            <a:headEnd type="triangle"/>
+            <a:tailEnd type="triangle"/>
+          </a:ln>
+        </p:spPr>
+        <p:style>
+          <a:lnRef idx="2">
+            <a:schemeClr val="accent1"/>
+          </a:lnRef>
+          <a:fillRef idx="0">
+            <a:schemeClr val="accent1"/>
+          </a:fillRef>
+          <a:effectRef idx="1">
+            <a:schemeClr val="accent1"/>
+          </a:effectRef>
+          <a:fontRef idx="minor">
+            <a:schemeClr val="tx1"/>
+          </a:fontRef>
+        </p:style>
+      </p:cxnSp>
+      <p:cxnSp>
+        <p:nvCxnSpPr>
+          <p:cNvPr id="134" name="Connector: Elbow 133">
+            <a:extLst>
+              <a:ext uri="{FF2B5EF4-FFF2-40B4-BE49-F238E27FC236}">
+                <a16:creationId xmlns:a16="http://schemas.microsoft.com/office/drawing/2014/main" id="{0CBB18DF-F116-BFEB-9DFF-F97FCA2AC87C}"/>
+              </a:ext>
+            </a:extLst>
+          </p:cNvPr>
+          <p:cNvCxnSpPr>
+            <a:cxnSpLocks/>
+            <a:stCxn id="88" idx="0"/>
+            <a:endCxn id="57" idx="3"/>
+          </p:cNvCxnSpPr>
+          <p:nvPr/>
+        </p:nvCxnSpPr>
+        <p:spPr>
+          <a:xfrm rot="16200000" flipH="1" flipV="1">
+            <a:off x="4039485" y="2389418"/>
+            <a:ext cx="832854" cy="1607975"/>
+          </a:xfrm>
+          <a:prstGeom prst="bentConnector4">
+            <a:avLst>
+              <a:gd name="adj1" fmla="val -42994"/>
+              <a:gd name="adj2" fmla="val 71548"/>
+            </a:avLst>
+          </a:prstGeom>
+          <a:ln w="57150">
+            <a:solidFill>
+              <a:schemeClr val="accent3">
+                <a:lumMod val="50000"/>
+              </a:schemeClr>
+            </a:solidFill>
+            <a:headEnd type="triangle"/>
+            <a:tailEnd type="triangle"/>
+          </a:ln>
+        </p:spPr>
+        <p:style>
+          <a:lnRef idx="2">
+            <a:schemeClr val="accent1"/>
+          </a:lnRef>
+          <a:fillRef idx="0">
+            <a:schemeClr val="accent1"/>
+          </a:fillRef>
+          <a:effectRef idx="1">
+            <a:schemeClr val="accent1"/>
+          </a:effectRef>
+          <a:fontRef idx="minor">
+            <a:schemeClr val="tx1"/>
+          </a:fontRef>
+        </p:style>
+      </p:cxnSp>
+      <p:cxnSp>
+        <p:nvCxnSpPr>
+          <p:cNvPr id="140" name="Connector: Elbow 139">
+            <a:extLst>
+              <a:ext uri="{FF2B5EF4-FFF2-40B4-BE49-F238E27FC236}">
+                <a16:creationId xmlns:a16="http://schemas.microsoft.com/office/drawing/2014/main" id="{F472FD84-AACB-25DF-86F0-61EDB4CBBD4D}"/>
+              </a:ext>
+            </a:extLst>
+          </p:cNvPr>
+          <p:cNvCxnSpPr>
+            <a:cxnSpLocks/>
+            <a:stCxn id="57" idx="1"/>
+          </p:cNvCxnSpPr>
+          <p:nvPr/>
+        </p:nvCxnSpPr>
+        <p:spPr>
+          <a:xfrm rot="10800000">
+            <a:off x="1753421" y="3609833"/>
+            <a:ext cx="767105" cy="1"/>
+          </a:xfrm>
+          <a:prstGeom prst="bentConnector3">
+            <a:avLst>
+              <a:gd name="adj1" fmla="val 50000"/>
+            </a:avLst>
+          </a:prstGeom>
+          <a:ln w="57150">
+            <a:solidFill>
+              <a:schemeClr val="accent3">
+                <a:lumMod val="50000"/>
+              </a:schemeClr>
+            </a:solidFill>
+            <a:headEnd type="triangle"/>
+            <a:tailEnd type="triangle"/>
+          </a:ln>
+        </p:spPr>
+        <p:style>
+          <a:lnRef idx="2">
+            <a:schemeClr val="accent1"/>
+          </a:lnRef>
+          <a:fillRef idx="0">
+            <a:schemeClr val="accent1"/>
+          </a:fillRef>
+          <a:effectRef idx="1">
+            <a:schemeClr val="accent1"/>
+          </a:effectRef>
+          <a:fontRef idx="minor">
+            <a:schemeClr val="tx1"/>
+          </a:fontRef>
+        </p:style>
+      </p:cxnSp>
+    </p:spTree>
+    <p:extLst>
+      <p:ext uri="{BB962C8B-B14F-4D97-AF65-F5344CB8AC3E}">
+        <p14:creationId xmlns:p14="http://schemas.microsoft.com/office/powerpoint/2010/main" val="2581581349"/>
+      </p:ext>
+    </p:extLst>
+  </p:cSld>
+  <p:clrMapOvr>
+    <a:masterClrMapping/>
+  </p:clrMapOvr>
+</p:sld>
+</file>
+
 <file path=ppt/theme/theme1.xml><?xml version="1.0" encoding="utf-8"?>
 <a:theme xmlns:a="http://schemas.openxmlformats.org/drawingml/2006/main" name="Office Theme">
   <a:themeElements>

</xml_diff>